<commit_message>
Made progress on SRP
</commit_message>
<xml_diff>
--- a/src/SingleResponsibilityPrinciple/images.pptx
+++ b/src/SingleResponsibilityPrinciple/images.pptx
@@ -9,7 +9,9 @@
     <p:sldId id="257" r:id="rId3"/>
     <p:sldId id="258" r:id="rId4"/>
     <p:sldId id="260" r:id="rId5"/>
-    <p:sldId id="259" r:id="rId6"/>
+    <p:sldId id="261" r:id="rId6"/>
+    <p:sldId id="259" r:id="rId7"/>
+    <p:sldId id="262" r:id="rId8"/>
   </p:sldIdLst>
   <p:sldSz cx="12192000" cy="6858000"/>
   <p:notesSz cx="6858000" cy="9144000"/>
@@ -3438,6 +3440,757 @@
   <dgm:styleLbl name="revTx">
     <dgm:fillClrLst meth="repeat">
       <a:schemeClr val="lt1">
+        <a:alpha val="0"/>
+      </a:schemeClr>
+    </dgm:fillClrLst>
+    <dgm:linClrLst meth="repeat">
+      <a:schemeClr val="dk1">
+        <a:alpha val="0"/>
+      </a:schemeClr>
+    </dgm:linClrLst>
+    <dgm:effectClrLst/>
+    <dgm:txLinClrLst/>
+    <dgm:txFillClrLst meth="repeat">
+      <a:schemeClr val="tx1"/>
+    </dgm:txFillClrLst>
+    <dgm:txEffectClrLst/>
+  </dgm:styleLbl>
+</dgm:colorsDef>
+</file>
+
+<file path=ppt/diagrams/colors5.xml><?xml version="1.0" encoding="utf-8"?>
+<dgm:colorsDef xmlns:dgm="http://schemas.openxmlformats.org/drawingml/2006/diagram" xmlns:a="http://schemas.openxmlformats.org/drawingml/2006/main" uniqueId="urn:microsoft.com/office/officeart/2005/8/colors/accent0_3">
+  <dgm:title val=""/>
+  <dgm:desc val=""/>
+  <dgm:catLst>
+    <dgm:cat type="mainScheme" pri="10300"/>
+  </dgm:catLst>
+  <dgm:styleLbl name="node0">
+    <dgm:fillClrLst meth="repeat">
+      <a:schemeClr val="dk2"/>
+    </dgm:fillClrLst>
+    <dgm:linClrLst meth="repeat">
+      <a:schemeClr val="lt2"/>
+    </dgm:linClrLst>
+    <dgm:effectClrLst/>
+    <dgm:txLinClrLst/>
+    <dgm:txFillClrLst/>
+    <dgm:txEffectClrLst/>
+  </dgm:styleLbl>
+  <dgm:styleLbl name="alignNode1">
+    <dgm:fillClrLst meth="repeat">
+      <a:schemeClr val="dk2"/>
+    </dgm:fillClrLst>
+    <dgm:linClrLst meth="repeat">
+      <a:schemeClr val="dk2"/>
+    </dgm:linClrLst>
+    <dgm:effectClrLst/>
+    <dgm:txLinClrLst/>
+    <dgm:txFillClrLst/>
+    <dgm:txEffectClrLst/>
+  </dgm:styleLbl>
+  <dgm:styleLbl name="node1">
+    <dgm:fillClrLst meth="repeat">
+      <a:schemeClr val="dk2"/>
+    </dgm:fillClrLst>
+    <dgm:linClrLst meth="repeat">
+      <a:schemeClr val="lt2"/>
+    </dgm:linClrLst>
+    <dgm:effectClrLst/>
+    <dgm:txLinClrLst/>
+    <dgm:txFillClrLst/>
+    <dgm:txEffectClrLst/>
+  </dgm:styleLbl>
+  <dgm:styleLbl name="lnNode1">
+    <dgm:fillClrLst meth="repeat">
+      <a:schemeClr val="dk2"/>
+    </dgm:fillClrLst>
+    <dgm:linClrLst meth="repeat">
+      <a:schemeClr val="lt2"/>
+    </dgm:linClrLst>
+    <dgm:effectClrLst/>
+    <dgm:txLinClrLst/>
+    <dgm:txFillClrLst/>
+    <dgm:txEffectClrLst/>
+  </dgm:styleLbl>
+  <dgm:styleLbl name="vennNode1">
+    <dgm:fillClrLst meth="repeat">
+      <a:schemeClr val="dk2">
+        <a:alpha val="50000"/>
+      </a:schemeClr>
+    </dgm:fillClrLst>
+    <dgm:linClrLst meth="repeat">
+      <a:schemeClr val="lt2"/>
+    </dgm:linClrLst>
+    <dgm:effectClrLst/>
+    <dgm:txLinClrLst/>
+    <dgm:txFillClrLst/>
+    <dgm:txEffectClrLst/>
+  </dgm:styleLbl>
+  <dgm:styleLbl name="node2">
+    <dgm:fillClrLst meth="repeat">
+      <a:schemeClr val="dk2"/>
+    </dgm:fillClrLst>
+    <dgm:linClrLst meth="repeat">
+      <a:schemeClr val="lt2"/>
+    </dgm:linClrLst>
+    <dgm:effectClrLst/>
+    <dgm:txLinClrLst/>
+    <dgm:txFillClrLst/>
+    <dgm:txEffectClrLst/>
+  </dgm:styleLbl>
+  <dgm:styleLbl name="node3">
+    <dgm:fillClrLst meth="repeat">
+      <a:schemeClr val="dk2"/>
+    </dgm:fillClrLst>
+    <dgm:linClrLst meth="repeat">
+      <a:schemeClr val="lt2"/>
+    </dgm:linClrLst>
+    <dgm:effectClrLst/>
+    <dgm:txLinClrLst/>
+    <dgm:txFillClrLst/>
+    <dgm:txEffectClrLst/>
+  </dgm:styleLbl>
+  <dgm:styleLbl name="node4">
+    <dgm:fillClrLst meth="repeat">
+      <a:schemeClr val="dk2"/>
+    </dgm:fillClrLst>
+    <dgm:linClrLst meth="repeat">
+      <a:schemeClr val="lt2"/>
+    </dgm:linClrLst>
+    <dgm:effectClrLst/>
+    <dgm:txLinClrLst/>
+    <dgm:txFillClrLst/>
+    <dgm:txEffectClrLst/>
+  </dgm:styleLbl>
+  <dgm:styleLbl name="fgImgPlace1">
+    <dgm:fillClrLst meth="repeat">
+      <a:schemeClr val="dk2">
+        <a:tint val="50000"/>
+      </a:schemeClr>
+    </dgm:fillClrLst>
+    <dgm:linClrLst meth="repeat">
+      <a:schemeClr val="lt2"/>
+    </dgm:linClrLst>
+    <dgm:effectClrLst/>
+    <dgm:txLinClrLst/>
+    <dgm:txFillClrLst meth="repeat">
+      <a:schemeClr val="lt2"/>
+    </dgm:txFillClrLst>
+    <dgm:txEffectClrLst/>
+  </dgm:styleLbl>
+  <dgm:styleLbl name="alignImgPlace1">
+    <dgm:fillClrLst meth="repeat">
+      <a:schemeClr val="dk2">
+        <a:tint val="50000"/>
+      </a:schemeClr>
+    </dgm:fillClrLst>
+    <dgm:linClrLst meth="repeat">
+      <a:schemeClr val="dk2">
+        <a:shade val="80000"/>
+      </a:schemeClr>
+    </dgm:linClrLst>
+    <dgm:effectClrLst/>
+    <dgm:txLinClrLst/>
+    <dgm:txFillClrLst meth="repeat">
+      <a:schemeClr val="lt2"/>
+    </dgm:txFillClrLst>
+    <dgm:txEffectClrLst/>
+  </dgm:styleLbl>
+  <dgm:styleLbl name="bgImgPlace1">
+    <dgm:fillClrLst meth="repeat">
+      <a:schemeClr val="dk2">
+        <a:tint val="50000"/>
+      </a:schemeClr>
+    </dgm:fillClrLst>
+    <dgm:linClrLst meth="repeat">
+      <a:schemeClr val="dk2">
+        <a:shade val="80000"/>
+      </a:schemeClr>
+    </dgm:linClrLst>
+    <dgm:effectClrLst/>
+    <dgm:txLinClrLst/>
+    <dgm:txFillClrLst meth="repeat">
+      <a:schemeClr val="lt2"/>
+    </dgm:txFillClrLst>
+    <dgm:txEffectClrLst/>
+  </dgm:styleLbl>
+  <dgm:styleLbl name="sibTrans2D1">
+    <dgm:fillClrLst meth="repeat">
+      <a:schemeClr val="dk2">
+        <a:tint val="60000"/>
+      </a:schemeClr>
+    </dgm:fillClrLst>
+    <dgm:linClrLst meth="repeat">
+      <a:schemeClr val="dk2">
+        <a:tint val="60000"/>
+      </a:schemeClr>
+    </dgm:linClrLst>
+    <dgm:effectClrLst/>
+    <dgm:txLinClrLst/>
+    <dgm:txFillClrLst/>
+    <dgm:txEffectClrLst/>
+  </dgm:styleLbl>
+  <dgm:styleLbl name="fgSibTrans2D1">
+    <dgm:fillClrLst meth="repeat">
+      <a:schemeClr val="dk2">
+        <a:tint val="60000"/>
+      </a:schemeClr>
+    </dgm:fillClrLst>
+    <dgm:linClrLst meth="repeat">
+      <a:schemeClr val="dk2">
+        <a:tint val="60000"/>
+      </a:schemeClr>
+    </dgm:linClrLst>
+    <dgm:effectClrLst/>
+    <dgm:txLinClrLst/>
+    <dgm:txFillClrLst/>
+    <dgm:txEffectClrLst/>
+  </dgm:styleLbl>
+  <dgm:styleLbl name="bgSibTrans2D1">
+    <dgm:fillClrLst meth="repeat">
+      <a:schemeClr val="dk2">
+        <a:tint val="60000"/>
+      </a:schemeClr>
+    </dgm:fillClrLst>
+    <dgm:linClrLst meth="repeat">
+      <a:schemeClr val="dk2">
+        <a:tint val="60000"/>
+      </a:schemeClr>
+    </dgm:linClrLst>
+    <dgm:effectClrLst/>
+    <dgm:txLinClrLst/>
+    <dgm:txFillClrLst/>
+    <dgm:txEffectClrLst/>
+  </dgm:styleLbl>
+  <dgm:styleLbl name="sibTrans1D1">
+    <dgm:fillClrLst meth="repeat">
+      <a:schemeClr val="dk2"/>
+    </dgm:fillClrLst>
+    <dgm:linClrLst meth="repeat">
+      <a:schemeClr val="dk2"/>
+    </dgm:linClrLst>
+    <dgm:effectClrLst/>
+    <dgm:txLinClrLst/>
+    <dgm:txFillClrLst meth="repeat">
+      <a:schemeClr val="lt2"/>
+    </dgm:txFillClrLst>
+    <dgm:txEffectClrLst/>
+  </dgm:styleLbl>
+  <dgm:styleLbl name="callout">
+    <dgm:fillClrLst meth="repeat">
+      <a:schemeClr val="dk2"/>
+    </dgm:fillClrLst>
+    <dgm:linClrLst meth="repeat">
+      <a:schemeClr val="dk2">
+        <a:tint val="50000"/>
+      </a:schemeClr>
+    </dgm:linClrLst>
+    <dgm:effectClrLst/>
+    <dgm:txLinClrLst/>
+    <dgm:txFillClrLst meth="repeat">
+      <a:schemeClr val="lt2"/>
+    </dgm:txFillClrLst>
+    <dgm:txEffectClrLst/>
+  </dgm:styleLbl>
+  <dgm:styleLbl name="asst0">
+    <dgm:fillClrLst meth="repeat">
+      <a:schemeClr val="dk2"/>
+    </dgm:fillClrLst>
+    <dgm:linClrLst meth="repeat">
+      <a:schemeClr val="lt2"/>
+    </dgm:linClrLst>
+    <dgm:effectClrLst/>
+    <dgm:txLinClrLst/>
+    <dgm:txFillClrLst/>
+    <dgm:txEffectClrLst/>
+  </dgm:styleLbl>
+  <dgm:styleLbl name="asst1">
+    <dgm:fillClrLst meth="repeat">
+      <a:schemeClr val="dk2"/>
+    </dgm:fillClrLst>
+    <dgm:linClrLst meth="repeat">
+      <a:schemeClr val="lt2"/>
+    </dgm:linClrLst>
+    <dgm:effectClrLst/>
+    <dgm:txLinClrLst/>
+    <dgm:txFillClrLst/>
+    <dgm:txEffectClrLst/>
+  </dgm:styleLbl>
+  <dgm:styleLbl name="asst2">
+    <dgm:fillClrLst meth="repeat">
+      <a:schemeClr val="dk2"/>
+    </dgm:fillClrLst>
+    <dgm:linClrLst meth="repeat">
+      <a:schemeClr val="lt2"/>
+    </dgm:linClrLst>
+    <dgm:effectClrLst/>
+    <dgm:txLinClrLst/>
+    <dgm:txFillClrLst/>
+    <dgm:txEffectClrLst/>
+  </dgm:styleLbl>
+  <dgm:styleLbl name="asst3">
+    <dgm:fillClrLst meth="repeat">
+      <a:schemeClr val="dk2"/>
+    </dgm:fillClrLst>
+    <dgm:linClrLst meth="repeat">
+      <a:schemeClr val="lt2"/>
+    </dgm:linClrLst>
+    <dgm:effectClrLst/>
+    <dgm:txLinClrLst/>
+    <dgm:txFillClrLst/>
+    <dgm:txEffectClrLst/>
+  </dgm:styleLbl>
+  <dgm:styleLbl name="asst4">
+    <dgm:fillClrLst meth="repeat">
+      <a:schemeClr val="dk2"/>
+    </dgm:fillClrLst>
+    <dgm:linClrLst meth="repeat">
+      <a:schemeClr val="lt2"/>
+    </dgm:linClrLst>
+    <dgm:effectClrLst/>
+    <dgm:txLinClrLst/>
+    <dgm:txFillClrLst/>
+    <dgm:txEffectClrLst/>
+  </dgm:styleLbl>
+  <dgm:styleLbl name="parChTrans2D1">
+    <dgm:fillClrLst meth="repeat">
+      <a:schemeClr val="dk2">
+        <a:tint val="60000"/>
+      </a:schemeClr>
+    </dgm:fillClrLst>
+    <dgm:linClrLst meth="repeat">
+      <a:schemeClr val="dk2">
+        <a:tint val="60000"/>
+      </a:schemeClr>
+    </dgm:linClrLst>
+    <dgm:effectClrLst/>
+    <dgm:txLinClrLst/>
+    <dgm:txFillClrLst meth="repeat">
+      <a:schemeClr val="lt2"/>
+    </dgm:txFillClrLst>
+    <dgm:txEffectClrLst/>
+  </dgm:styleLbl>
+  <dgm:styleLbl name="parChTrans2D2">
+    <dgm:fillClrLst meth="repeat">
+      <a:schemeClr val="dk2"/>
+    </dgm:fillClrLst>
+    <dgm:linClrLst meth="repeat">
+      <a:schemeClr val="dk2"/>
+    </dgm:linClrLst>
+    <dgm:effectClrLst/>
+    <dgm:txLinClrLst/>
+    <dgm:txFillClrLst meth="repeat">
+      <a:schemeClr val="lt2"/>
+    </dgm:txFillClrLst>
+    <dgm:txEffectClrLst/>
+  </dgm:styleLbl>
+  <dgm:styleLbl name="parChTrans2D3">
+    <dgm:fillClrLst meth="repeat">
+      <a:schemeClr val="dk2"/>
+    </dgm:fillClrLst>
+    <dgm:linClrLst meth="repeat">
+      <a:schemeClr val="dk2"/>
+    </dgm:linClrLst>
+    <dgm:effectClrLst/>
+    <dgm:txLinClrLst/>
+    <dgm:txFillClrLst meth="repeat">
+      <a:schemeClr val="lt2"/>
+    </dgm:txFillClrLst>
+    <dgm:txEffectClrLst/>
+  </dgm:styleLbl>
+  <dgm:styleLbl name="parChTrans2D4">
+    <dgm:fillClrLst meth="repeat">
+      <a:schemeClr val="dk2"/>
+    </dgm:fillClrLst>
+    <dgm:linClrLst meth="repeat">
+      <a:schemeClr val="dk2"/>
+    </dgm:linClrLst>
+    <dgm:effectClrLst/>
+    <dgm:txLinClrLst/>
+    <dgm:txFillClrLst meth="repeat">
+      <a:schemeClr val="lt2"/>
+    </dgm:txFillClrLst>
+    <dgm:txEffectClrLst/>
+  </dgm:styleLbl>
+  <dgm:styleLbl name="parChTrans1D1">
+    <dgm:fillClrLst meth="repeat">
+      <a:schemeClr val="dk2"/>
+    </dgm:fillClrLst>
+    <dgm:linClrLst meth="repeat">
+      <a:schemeClr val="dk2">
+        <a:shade val="60000"/>
+      </a:schemeClr>
+    </dgm:linClrLst>
+    <dgm:effectClrLst/>
+    <dgm:txLinClrLst/>
+    <dgm:txFillClrLst meth="repeat">
+      <a:schemeClr val="tx1"/>
+    </dgm:txFillClrLst>
+    <dgm:txEffectClrLst/>
+  </dgm:styleLbl>
+  <dgm:styleLbl name="parChTrans1D2">
+    <dgm:fillClrLst meth="repeat">
+      <a:schemeClr val="dk2"/>
+    </dgm:fillClrLst>
+    <dgm:linClrLst meth="repeat">
+      <a:schemeClr val="dk2">
+        <a:shade val="60000"/>
+      </a:schemeClr>
+    </dgm:linClrLst>
+    <dgm:effectClrLst/>
+    <dgm:txLinClrLst/>
+    <dgm:txFillClrLst meth="repeat">
+      <a:schemeClr val="tx1"/>
+    </dgm:txFillClrLst>
+    <dgm:txEffectClrLst/>
+  </dgm:styleLbl>
+  <dgm:styleLbl name="parChTrans1D3">
+    <dgm:fillClrLst meth="repeat">
+      <a:schemeClr val="dk2"/>
+    </dgm:fillClrLst>
+    <dgm:linClrLst meth="repeat">
+      <a:schemeClr val="dk2">
+        <a:shade val="80000"/>
+      </a:schemeClr>
+    </dgm:linClrLst>
+    <dgm:effectClrLst/>
+    <dgm:txLinClrLst/>
+    <dgm:txFillClrLst meth="repeat">
+      <a:schemeClr val="tx1"/>
+    </dgm:txFillClrLst>
+    <dgm:txEffectClrLst/>
+  </dgm:styleLbl>
+  <dgm:styleLbl name="parChTrans1D4">
+    <dgm:fillClrLst meth="repeat">
+      <a:schemeClr val="dk2"/>
+    </dgm:fillClrLst>
+    <dgm:linClrLst meth="repeat">
+      <a:schemeClr val="dk2">
+        <a:shade val="80000"/>
+      </a:schemeClr>
+    </dgm:linClrLst>
+    <dgm:effectClrLst/>
+    <dgm:txLinClrLst/>
+    <dgm:txFillClrLst meth="repeat">
+      <a:schemeClr val="tx1"/>
+    </dgm:txFillClrLst>
+    <dgm:txEffectClrLst/>
+  </dgm:styleLbl>
+  <dgm:styleLbl name="fgAcc1">
+    <dgm:fillClrLst meth="repeat">
+      <a:schemeClr val="lt2">
+        <a:alpha val="90000"/>
+      </a:schemeClr>
+    </dgm:fillClrLst>
+    <dgm:linClrLst meth="repeat">
+      <a:schemeClr val="dk2"/>
+    </dgm:linClrLst>
+    <dgm:effectClrLst/>
+    <dgm:txLinClrLst/>
+    <dgm:txFillClrLst meth="repeat">
+      <a:schemeClr val="dk1"/>
+    </dgm:txFillClrLst>
+    <dgm:txEffectClrLst/>
+  </dgm:styleLbl>
+  <dgm:styleLbl name="conFgAcc1">
+    <dgm:fillClrLst meth="repeat">
+      <a:schemeClr val="lt2">
+        <a:alpha val="90000"/>
+      </a:schemeClr>
+    </dgm:fillClrLst>
+    <dgm:linClrLst meth="repeat">
+      <a:schemeClr val="dk2"/>
+    </dgm:linClrLst>
+    <dgm:effectClrLst/>
+    <dgm:txLinClrLst/>
+    <dgm:txFillClrLst meth="repeat">
+      <a:schemeClr val="dk1"/>
+    </dgm:txFillClrLst>
+    <dgm:txEffectClrLst/>
+  </dgm:styleLbl>
+  <dgm:styleLbl name="alignAcc1">
+    <dgm:fillClrLst meth="repeat">
+      <a:schemeClr val="lt2">
+        <a:alpha val="90000"/>
+      </a:schemeClr>
+    </dgm:fillClrLst>
+    <dgm:linClrLst meth="repeat">
+      <a:schemeClr val="dk2"/>
+    </dgm:linClrLst>
+    <dgm:effectClrLst/>
+    <dgm:txLinClrLst/>
+    <dgm:txFillClrLst meth="repeat">
+      <a:schemeClr val="dk1"/>
+    </dgm:txFillClrLst>
+    <dgm:txEffectClrLst/>
+  </dgm:styleLbl>
+  <dgm:styleLbl name="trAlignAcc1">
+    <dgm:fillClrLst meth="repeat">
+      <a:schemeClr val="lt2">
+        <a:alpha val="40000"/>
+      </a:schemeClr>
+    </dgm:fillClrLst>
+    <dgm:linClrLst meth="repeat">
+      <a:schemeClr val="dk2"/>
+    </dgm:linClrLst>
+    <dgm:effectClrLst/>
+    <dgm:txLinClrLst/>
+    <dgm:txFillClrLst meth="repeat">
+      <a:schemeClr val="dk1"/>
+    </dgm:txFillClrLst>
+    <dgm:txEffectClrLst/>
+  </dgm:styleLbl>
+  <dgm:styleLbl name="bgAcc1">
+    <dgm:fillClrLst meth="repeat">
+      <a:schemeClr val="lt2">
+        <a:alpha val="90000"/>
+      </a:schemeClr>
+    </dgm:fillClrLst>
+    <dgm:linClrLst meth="repeat">
+      <a:schemeClr val="dk2"/>
+    </dgm:linClrLst>
+    <dgm:effectClrLst/>
+    <dgm:txLinClrLst/>
+    <dgm:txFillClrLst meth="repeat">
+      <a:schemeClr val="dk1"/>
+    </dgm:txFillClrLst>
+    <dgm:txEffectClrLst/>
+  </dgm:styleLbl>
+  <dgm:styleLbl name="solidFgAcc1">
+    <dgm:fillClrLst meth="repeat">
+      <a:schemeClr val="lt2"/>
+    </dgm:fillClrLst>
+    <dgm:linClrLst meth="repeat">
+      <a:schemeClr val="dk2"/>
+    </dgm:linClrLst>
+    <dgm:effectClrLst/>
+    <dgm:txLinClrLst/>
+    <dgm:txFillClrLst meth="repeat">
+      <a:schemeClr val="dk1"/>
+    </dgm:txFillClrLst>
+    <dgm:txEffectClrLst/>
+  </dgm:styleLbl>
+  <dgm:styleLbl name="solidAlignAcc1">
+    <dgm:fillClrLst meth="repeat">
+      <a:schemeClr val="lt2"/>
+    </dgm:fillClrLst>
+    <dgm:linClrLst meth="repeat">
+      <a:schemeClr val="dk2"/>
+    </dgm:linClrLst>
+    <dgm:effectClrLst/>
+    <dgm:txLinClrLst/>
+    <dgm:txFillClrLst meth="repeat">
+      <a:schemeClr val="dk1"/>
+    </dgm:txFillClrLst>
+    <dgm:txEffectClrLst/>
+  </dgm:styleLbl>
+  <dgm:styleLbl name="solidBgAcc1">
+    <dgm:fillClrLst meth="repeat">
+      <a:schemeClr val="lt2"/>
+    </dgm:fillClrLst>
+    <dgm:linClrLst meth="repeat">
+      <a:schemeClr val="dk2"/>
+    </dgm:linClrLst>
+    <dgm:effectClrLst/>
+    <dgm:txLinClrLst/>
+    <dgm:txFillClrLst meth="repeat">
+      <a:schemeClr val="dk1"/>
+    </dgm:txFillClrLst>
+    <dgm:txEffectClrLst/>
+  </dgm:styleLbl>
+  <dgm:styleLbl name="fgAccFollowNode1">
+    <dgm:fillClrLst meth="repeat">
+      <a:schemeClr val="dk2">
+        <a:alpha val="90000"/>
+        <a:tint val="40000"/>
+      </a:schemeClr>
+    </dgm:fillClrLst>
+    <dgm:linClrLst meth="repeat">
+      <a:schemeClr val="dk2">
+        <a:alpha val="90000"/>
+        <a:tint val="40000"/>
+      </a:schemeClr>
+    </dgm:linClrLst>
+    <dgm:effectClrLst/>
+    <dgm:txLinClrLst/>
+    <dgm:txFillClrLst meth="repeat">
+      <a:schemeClr val="dk1"/>
+    </dgm:txFillClrLst>
+    <dgm:txEffectClrLst/>
+  </dgm:styleLbl>
+  <dgm:styleLbl name="alignAccFollowNode1">
+    <dgm:fillClrLst meth="repeat">
+      <a:schemeClr val="dk2">
+        <a:alpha val="90000"/>
+        <a:tint val="40000"/>
+      </a:schemeClr>
+    </dgm:fillClrLst>
+    <dgm:linClrLst meth="repeat">
+      <a:schemeClr val="dk2">
+        <a:alpha val="90000"/>
+        <a:tint val="40000"/>
+      </a:schemeClr>
+    </dgm:linClrLst>
+    <dgm:effectClrLst/>
+    <dgm:txLinClrLst/>
+    <dgm:txFillClrLst meth="repeat">
+      <a:schemeClr val="dk1"/>
+    </dgm:txFillClrLst>
+    <dgm:txEffectClrLst/>
+  </dgm:styleLbl>
+  <dgm:styleLbl name="bgAccFollowNode1">
+    <dgm:fillClrLst meth="repeat">
+      <a:schemeClr val="dk2">
+        <a:alpha val="90000"/>
+        <a:tint val="40000"/>
+      </a:schemeClr>
+    </dgm:fillClrLst>
+    <dgm:linClrLst meth="repeat">
+      <a:schemeClr val="dk2">
+        <a:alpha val="90000"/>
+        <a:tint val="40000"/>
+      </a:schemeClr>
+    </dgm:linClrLst>
+    <dgm:effectClrLst/>
+    <dgm:txLinClrLst/>
+    <dgm:txFillClrLst meth="repeat">
+      <a:schemeClr val="dk1"/>
+    </dgm:txFillClrLst>
+    <dgm:txEffectClrLst/>
+  </dgm:styleLbl>
+  <dgm:styleLbl name="fgAcc0">
+    <dgm:fillClrLst meth="repeat">
+      <a:schemeClr val="lt2">
+        <a:alpha val="90000"/>
+      </a:schemeClr>
+    </dgm:fillClrLst>
+    <dgm:linClrLst meth="repeat">
+      <a:schemeClr val="dk2"/>
+    </dgm:linClrLst>
+    <dgm:effectClrLst/>
+    <dgm:txLinClrLst/>
+    <dgm:txFillClrLst meth="repeat">
+      <a:schemeClr val="dk1"/>
+    </dgm:txFillClrLst>
+    <dgm:txEffectClrLst/>
+  </dgm:styleLbl>
+  <dgm:styleLbl name="fgAcc2">
+    <dgm:fillClrLst meth="repeat">
+      <a:schemeClr val="lt2">
+        <a:alpha val="90000"/>
+      </a:schemeClr>
+    </dgm:fillClrLst>
+    <dgm:linClrLst meth="repeat">
+      <a:schemeClr val="dk2"/>
+    </dgm:linClrLst>
+    <dgm:effectClrLst/>
+    <dgm:txLinClrLst/>
+    <dgm:txFillClrLst meth="repeat">
+      <a:schemeClr val="dk1"/>
+    </dgm:txFillClrLst>
+    <dgm:txEffectClrLst/>
+  </dgm:styleLbl>
+  <dgm:styleLbl name="fgAcc3">
+    <dgm:fillClrLst meth="repeat">
+      <a:schemeClr val="lt2">
+        <a:alpha val="90000"/>
+      </a:schemeClr>
+    </dgm:fillClrLst>
+    <dgm:linClrLst meth="repeat">
+      <a:schemeClr val="dk2"/>
+    </dgm:linClrLst>
+    <dgm:effectClrLst/>
+    <dgm:txLinClrLst/>
+    <dgm:txFillClrLst meth="repeat">
+      <a:schemeClr val="dk1"/>
+    </dgm:txFillClrLst>
+    <dgm:txEffectClrLst/>
+  </dgm:styleLbl>
+  <dgm:styleLbl name="fgAcc4">
+    <dgm:fillClrLst meth="repeat">
+      <a:schemeClr val="lt2">
+        <a:alpha val="90000"/>
+      </a:schemeClr>
+    </dgm:fillClrLst>
+    <dgm:linClrLst meth="repeat">
+      <a:schemeClr val="dk2"/>
+    </dgm:linClrLst>
+    <dgm:effectClrLst/>
+    <dgm:txLinClrLst/>
+    <dgm:txFillClrLst meth="repeat">
+      <a:schemeClr val="dk1"/>
+    </dgm:txFillClrLst>
+    <dgm:txEffectClrLst/>
+  </dgm:styleLbl>
+  <dgm:styleLbl name="bgShp">
+    <dgm:fillClrLst meth="repeat">
+      <a:schemeClr val="dk2">
+        <a:tint val="40000"/>
+      </a:schemeClr>
+    </dgm:fillClrLst>
+    <dgm:linClrLst meth="repeat">
+      <a:schemeClr val="dk2"/>
+    </dgm:linClrLst>
+    <dgm:effectClrLst/>
+    <dgm:txLinClrLst/>
+    <dgm:txFillClrLst meth="repeat">
+      <a:schemeClr val="dk1"/>
+    </dgm:txFillClrLst>
+    <dgm:txEffectClrLst/>
+  </dgm:styleLbl>
+  <dgm:styleLbl name="dkBgShp">
+    <dgm:fillClrLst meth="repeat">
+      <a:schemeClr val="dk2">
+        <a:shade val="80000"/>
+      </a:schemeClr>
+    </dgm:fillClrLst>
+    <dgm:linClrLst meth="repeat">
+      <a:schemeClr val="dk2"/>
+    </dgm:linClrLst>
+    <dgm:effectClrLst/>
+    <dgm:txLinClrLst/>
+    <dgm:txFillClrLst meth="repeat">
+      <a:schemeClr val="lt1"/>
+    </dgm:txFillClrLst>
+    <dgm:txEffectClrLst/>
+  </dgm:styleLbl>
+  <dgm:styleLbl name="trBgShp">
+    <dgm:fillClrLst meth="repeat">
+      <a:schemeClr val="dk2">
+        <a:tint val="50000"/>
+        <a:alpha val="40000"/>
+      </a:schemeClr>
+    </dgm:fillClrLst>
+    <dgm:linClrLst meth="repeat">
+      <a:schemeClr val="dk2"/>
+    </dgm:linClrLst>
+    <dgm:effectClrLst/>
+    <dgm:txLinClrLst/>
+    <dgm:txFillClrLst meth="repeat">
+      <a:schemeClr val="lt1"/>
+    </dgm:txFillClrLst>
+    <dgm:txEffectClrLst/>
+  </dgm:styleLbl>
+  <dgm:styleLbl name="fgShp">
+    <dgm:fillClrLst meth="repeat">
+      <a:schemeClr val="dk2">
+        <a:tint val="60000"/>
+      </a:schemeClr>
+    </dgm:fillClrLst>
+    <dgm:linClrLst meth="repeat">
+      <a:schemeClr val="lt2"/>
+    </dgm:linClrLst>
+    <dgm:effectClrLst/>
+    <dgm:txLinClrLst/>
+    <dgm:txFillClrLst meth="repeat">
+      <a:schemeClr val="dk1"/>
+    </dgm:txFillClrLst>
+    <dgm:txEffectClrLst/>
+  </dgm:styleLbl>
+  <dgm:styleLbl name="revTx">
+    <dgm:fillClrLst meth="repeat">
+      <a:schemeClr val="lt2">
         <a:alpha val="0"/>
       </a:schemeClr>
     </dgm:fillClrLst>
@@ -4732,6 +5485,309 @@
     <dgm:cxn modelId="{BB44E0A3-E89C-46B2-A43E-E13B5861B628}" type="presParOf" srcId="{1ED46E02-AE9D-4352-BE72-F522FDF53B62}" destId="{A3171A6B-2788-4C46-9C3C-41F51AE49733}" srcOrd="5" destOrd="0" presId="urn:microsoft.com/office/officeart/2005/8/layout/chart3"/>
     <dgm:cxn modelId="{2469B375-DD26-4A30-8949-AE487A43FFC8}" type="presParOf" srcId="{1ED46E02-AE9D-4352-BE72-F522FDF53B62}" destId="{540E09A5-463C-4AE8-BDB0-8D9EE4F13D73}" srcOrd="6" destOrd="0" presId="urn:microsoft.com/office/officeart/2005/8/layout/chart3"/>
     <dgm:cxn modelId="{7A7A46F9-504A-4434-84FC-15F18BA12F01}" type="presParOf" srcId="{1ED46E02-AE9D-4352-BE72-F522FDF53B62}" destId="{122B6D95-4901-4927-81B4-C7E987AD7FB1}" srcOrd="7" destOrd="0" presId="urn:microsoft.com/office/officeart/2005/8/layout/chart3"/>
+  </dgm:cxnLst>
+  <dgm:bg/>
+  <dgm:whole/>
+  <dgm:extLst>
+    <a:ext uri="http://schemas.microsoft.com/office/drawing/2008/diagram">
+      <dsp:dataModelExt xmlns:dsp="http://schemas.microsoft.com/office/drawing/2008/diagram" relId="rId6" minVer="http://schemas.openxmlformats.org/drawingml/2006/diagram"/>
+    </a:ext>
+  </dgm:extLst>
+</dgm:dataModel>
+</file>
+
+<file path=ppt/diagrams/data5.xml><?xml version="1.0" encoding="utf-8"?>
+<dgm:dataModel xmlns:dgm="http://schemas.openxmlformats.org/drawingml/2006/diagram" xmlns:a="http://schemas.openxmlformats.org/drawingml/2006/main">
+  <dgm:ptLst>
+    <dgm:pt modelId="{9EB7CB55-A0FE-4925-B369-A65200EDDF9E}" type="doc">
+      <dgm:prSet loTypeId="urn:microsoft.com/office/officeart/2005/8/layout/process4" loCatId="list" qsTypeId="urn:microsoft.com/office/officeart/2005/8/quickstyle/simple1" qsCatId="simple" csTypeId="urn:microsoft.com/office/officeart/2005/8/colors/accent0_3" csCatId="mainScheme" phldr="1"/>
+      <dgm:spPr/>
+      <dgm:t>
+        <a:bodyPr/>
+        <a:lstStyle/>
+        <a:p>
+          <a:endParaRPr lang="en-US"/>
+        </a:p>
+      </dgm:t>
+    </dgm:pt>
+    <dgm:pt modelId="{E1DE6ACA-E28E-418A-9F61-3781A4E791C1}">
+      <dgm:prSet phldrT="[Text]"/>
+      <dgm:spPr/>
+      <dgm:t>
+        <a:bodyPr/>
+        <a:lstStyle/>
+        <a:p>
+          <a:r>
+            <a:rPr lang="en-US"/>
+            <a:t>User Interface</a:t>
+          </a:r>
+          <a:endParaRPr lang="en-US" dirty="0"/>
+        </a:p>
+      </dgm:t>
+    </dgm:pt>
+    <dgm:pt modelId="{B1177B14-EE61-48A9-B143-6C59692B2991}" type="parTrans" cxnId="{607D0DEE-AD18-49D4-8866-38DD859881F4}">
+      <dgm:prSet/>
+      <dgm:spPr/>
+      <dgm:t>
+        <a:bodyPr/>
+        <a:lstStyle/>
+        <a:p>
+          <a:endParaRPr lang="en-US"/>
+        </a:p>
+      </dgm:t>
+    </dgm:pt>
+    <dgm:pt modelId="{3006B499-C909-4E24-98A6-D6C8E43F45E6}" type="sibTrans" cxnId="{607D0DEE-AD18-49D4-8866-38DD859881F4}">
+      <dgm:prSet/>
+      <dgm:spPr/>
+      <dgm:t>
+        <a:bodyPr/>
+        <a:lstStyle/>
+        <a:p>
+          <a:endParaRPr lang="en-US"/>
+        </a:p>
+      </dgm:t>
+    </dgm:pt>
+    <dgm:pt modelId="{7D83F234-BB59-498E-B452-3BBBB49FD138}">
+      <dgm:prSet phldrT="[Text]"/>
+      <dgm:spPr/>
+      <dgm:t>
+        <a:bodyPr/>
+        <a:lstStyle/>
+        <a:p>
+          <a:r>
+            <a:rPr lang="en-US"/>
+            <a:t>API</a:t>
+          </a:r>
+          <a:endParaRPr lang="en-US" dirty="0"/>
+        </a:p>
+      </dgm:t>
+    </dgm:pt>
+    <dgm:pt modelId="{1CABF1A7-A79B-43B8-BCEB-9E345895A801}" type="parTrans" cxnId="{F4CDF0D1-5244-4175-8528-5E9704198695}">
+      <dgm:prSet/>
+      <dgm:spPr/>
+      <dgm:t>
+        <a:bodyPr/>
+        <a:lstStyle/>
+        <a:p>
+          <a:endParaRPr lang="en-US"/>
+        </a:p>
+      </dgm:t>
+    </dgm:pt>
+    <dgm:pt modelId="{5C5C56CE-7F60-48B4-8902-A052BA65B8CE}" type="sibTrans" cxnId="{F4CDF0D1-5244-4175-8528-5E9704198695}">
+      <dgm:prSet/>
+      <dgm:spPr/>
+      <dgm:t>
+        <a:bodyPr/>
+        <a:lstStyle/>
+        <a:p>
+          <a:endParaRPr lang="en-US"/>
+        </a:p>
+      </dgm:t>
+    </dgm:pt>
+    <dgm:pt modelId="{B7996E7A-0667-4C2C-9B52-6380DD5A3016}">
+      <dgm:prSet phldrT="[Text]"/>
+      <dgm:spPr/>
+      <dgm:t>
+        <a:bodyPr/>
+        <a:lstStyle/>
+        <a:p>
+          <a:r>
+            <a:rPr lang="en-US"/>
+            <a:t>Business Logic</a:t>
+          </a:r>
+          <a:endParaRPr lang="en-US" dirty="0"/>
+        </a:p>
+      </dgm:t>
+    </dgm:pt>
+    <dgm:pt modelId="{AED51966-461C-4702-9999-DF81758D7387}" type="parTrans" cxnId="{DC2D3F03-D109-4B38-A8EB-189BC7BAF224}">
+      <dgm:prSet/>
+      <dgm:spPr/>
+      <dgm:t>
+        <a:bodyPr/>
+        <a:lstStyle/>
+        <a:p>
+          <a:endParaRPr lang="en-US"/>
+        </a:p>
+      </dgm:t>
+    </dgm:pt>
+    <dgm:pt modelId="{2213BB05-C7C6-484B-A029-53F3BFFD0A92}" type="sibTrans" cxnId="{DC2D3F03-D109-4B38-A8EB-189BC7BAF224}">
+      <dgm:prSet/>
+      <dgm:spPr/>
+      <dgm:t>
+        <a:bodyPr/>
+        <a:lstStyle/>
+        <a:p>
+          <a:endParaRPr lang="en-US"/>
+        </a:p>
+      </dgm:t>
+    </dgm:pt>
+    <dgm:pt modelId="{5CB57BA4-034A-4D09-8F0B-A95408FE0BB2}">
+      <dgm:prSet phldrT="[Text]"/>
+      <dgm:spPr/>
+      <dgm:t>
+        <a:bodyPr/>
+        <a:lstStyle/>
+        <a:p>
+          <a:r>
+            <a:rPr lang="en-US"/>
+            <a:t>Data Access</a:t>
+          </a:r>
+          <a:endParaRPr lang="en-US" dirty="0"/>
+        </a:p>
+      </dgm:t>
+    </dgm:pt>
+    <dgm:pt modelId="{2AA53FD4-EAF6-4AB5-9CE8-72E5AD113407}" type="parTrans" cxnId="{0ED2FF6A-124D-4AAF-887B-D6C0A5A76D3B}">
+      <dgm:prSet/>
+      <dgm:spPr/>
+      <dgm:t>
+        <a:bodyPr/>
+        <a:lstStyle/>
+        <a:p>
+          <a:endParaRPr lang="en-US"/>
+        </a:p>
+      </dgm:t>
+    </dgm:pt>
+    <dgm:pt modelId="{9BAF5063-AFDF-426E-9758-4CEF7680E6D1}" type="sibTrans" cxnId="{0ED2FF6A-124D-4AAF-887B-D6C0A5A76D3B}">
+      <dgm:prSet/>
+      <dgm:spPr/>
+      <dgm:t>
+        <a:bodyPr/>
+        <a:lstStyle/>
+        <a:p>
+          <a:endParaRPr lang="en-US"/>
+        </a:p>
+      </dgm:t>
+    </dgm:pt>
+    <dgm:pt modelId="{5CD7EEF4-8136-4796-B7A3-6C15077EB4A6}">
+      <dgm:prSet phldrT="[Text]"/>
+      <dgm:spPr/>
+      <dgm:t>
+        <a:bodyPr/>
+        <a:lstStyle/>
+        <a:p>
+          <a:r>
+            <a:rPr lang="en-US"/>
+            <a:t>Database</a:t>
+          </a:r>
+          <a:endParaRPr lang="en-US" dirty="0"/>
+        </a:p>
+      </dgm:t>
+    </dgm:pt>
+    <dgm:pt modelId="{2E58F5AC-3D55-40B6-8CC9-249B7381F650}" type="parTrans" cxnId="{C9101D71-0422-4AD9-AB12-9E139771B3FD}">
+      <dgm:prSet/>
+      <dgm:spPr/>
+      <dgm:t>
+        <a:bodyPr/>
+        <a:lstStyle/>
+        <a:p>
+          <a:endParaRPr lang="en-US"/>
+        </a:p>
+      </dgm:t>
+    </dgm:pt>
+    <dgm:pt modelId="{5D84C833-A75C-4F7A-B153-3DC19242E9B8}" type="sibTrans" cxnId="{C9101D71-0422-4AD9-AB12-9E139771B3FD}">
+      <dgm:prSet/>
+      <dgm:spPr/>
+      <dgm:t>
+        <a:bodyPr/>
+        <a:lstStyle/>
+        <a:p>
+          <a:endParaRPr lang="en-US"/>
+        </a:p>
+      </dgm:t>
+    </dgm:pt>
+    <dgm:pt modelId="{ED668D62-559B-4B79-ABC7-8F540E7ACCB5}" type="pres">
+      <dgm:prSet presAssocID="{9EB7CB55-A0FE-4925-B369-A65200EDDF9E}" presName="Name0" presStyleCnt="0">
+        <dgm:presLayoutVars>
+          <dgm:dir/>
+          <dgm:animLvl val="lvl"/>
+          <dgm:resizeHandles val="exact"/>
+        </dgm:presLayoutVars>
+      </dgm:prSet>
+      <dgm:spPr/>
+    </dgm:pt>
+    <dgm:pt modelId="{D7AE8C84-A790-4B25-91D2-6A0BB95B9ED5}" type="pres">
+      <dgm:prSet presAssocID="{5CD7EEF4-8136-4796-B7A3-6C15077EB4A6}" presName="boxAndChildren" presStyleCnt="0"/>
+      <dgm:spPr/>
+    </dgm:pt>
+    <dgm:pt modelId="{D2DB9587-F9E7-4FB4-8452-785D4BC0D8AC}" type="pres">
+      <dgm:prSet presAssocID="{5CD7EEF4-8136-4796-B7A3-6C15077EB4A6}" presName="parentTextBox" presStyleLbl="node1" presStyleIdx="0" presStyleCnt="5"/>
+      <dgm:spPr/>
+    </dgm:pt>
+    <dgm:pt modelId="{E59F4DD1-4340-4921-BFD0-935F63448982}" type="pres">
+      <dgm:prSet presAssocID="{9BAF5063-AFDF-426E-9758-4CEF7680E6D1}" presName="sp" presStyleCnt="0"/>
+      <dgm:spPr/>
+    </dgm:pt>
+    <dgm:pt modelId="{9E55F738-00A9-4191-B52B-B4045A62A4A3}" type="pres">
+      <dgm:prSet presAssocID="{5CB57BA4-034A-4D09-8F0B-A95408FE0BB2}" presName="arrowAndChildren" presStyleCnt="0"/>
+      <dgm:spPr/>
+    </dgm:pt>
+    <dgm:pt modelId="{3397C3CB-F991-4BEE-9129-BE8A93B93626}" type="pres">
+      <dgm:prSet presAssocID="{5CB57BA4-034A-4D09-8F0B-A95408FE0BB2}" presName="parentTextArrow" presStyleLbl="node1" presStyleIdx="1" presStyleCnt="5"/>
+      <dgm:spPr/>
+    </dgm:pt>
+    <dgm:pt modelId="{9AAA17EE-331B-46D0-9B6E-817485CEBAF9}" type="pres">
+      <dgm:prSet presAssocID="{2213BB05-C7C6-484B-A029-53F3BFFD0A92}" presName="sp" presStyleCnt="0"/>
+      <dgm:spPr/>
+    </dgm:pt>
+    <dgm:pt modelId="{29080523-95C4-4E09-97F4-C6B5D5BE88F0}" type="pres">
+      <dgm:prSet presAssocID="{B7996E7A-0667-4C2C-9B52-6380DD5A3016}" presName="arrowAndChildren" presStyleCnt="0"/>
+      <dgm:spPr/>
+    </dgm:pt>
+    <dgm:pt modelId="{16F61E82-84C3-4B19-A112-1073BED56190}" type="pres">
+      <dgm:prSet presAssocID="{B7996E7A-0667-4C2C-9B52-6380DD5A3016}" presName="parentTextArrow" presStyleLbl="node1" presStyleIdx="2" presStyleCnt="5"/>
+      <dgm:spPr/>
+    </dgm:pt>
+    <dgm:pt modelId="{6E6380AB-6C09-4ACE-BB79-54C4788FD1DE}" type="pres">
+      <dgm:prSet presAssocID="{5C5C56CE-7F60-48B4-8902-A052BA65B8CE}" presName="sp" presStyleCnt="0"/>
+      <dgm:spPr/>
+    </dgm:pt>
+    <dgm:pt modelId="{97C9CAEB-621D-424D-81FD-3199781059C7}" type="pres">
+      <dgm:prSet presAssocID="{7D83F234-BB59-498E-B452-3BBBB49FD138}" presName="arrowAndChildren" presStyleCnt="0"/>
+      <dgm:spPr/>
+    </dgm:pt>
+    <dgm:pt modelId="{CCB77D97-CCFC-40D1-8543-E12C7A862DD2}" type="pres">
+      <dgm:prSet presAssocID="{7D83F234-BB59-498E-B452-3BBBB49FD138}" presName="parentTextArrow" presStyleLbl="node1" presStyleIdx="3" presStyleCnt="5"/>
+      <dgm:spPr/>
+    </dgm:pt>
+    <dgm:pt modelId="{B6E5EE9E-1487-4FC4-A3EC-D1ED12378D27}" type="pres">
+      <dgm:prSet presAssocID="{3006B499-C909-4E24-98A6-D6C8E43F45E6}" presName="sp" presStyleCnt="0"/>
+      <dgm:spPr/>
+    </dgm:pt>
+    <dgm:pt modelId="{D156B02D-7883-4130-919E-AA9BFC143E71}" type="pres">
+      <dgm:prSet presAssocID="{E1DE6ACA-E28E-418A-9F61-3781A4E791C1}" presName="arrowAndChildren" presStyleCnt="0"/>
+      <dgm:spPr/>
+    </dgm:pt>
+    <dgm:pt modelId="{E339E651-E574-4F67-9DB5-397D700AC419}" type="pres">
+      <dgm:prSet presAssocID="{E1DE6ACA-E28E-418A-9F61-3781A4E791C1}" presName="parentTextArrow" presStyleLbl="node1" presStyleIdx="4" presStyleCnt="5" custLinFactNeighborX="-23074" custLinFactNeighborY="-57352"/>
+      <dgm:spPr/>
+    </dgm:pt>
+  </dgm:ptLst>
+  <dgm:cxnLst>
+    <dgm:cxn modelId="{DC2D3F03-D109-4B38-A8EB-189BC7BAF224}" srcId="{9EB7CB55-A0FE-4925-B369-A65200EDDF9E}" destId="{B7996E7A-0667-4C2C-9B52-6380DD5A3016}" srcOrd="2" destOrd="0" parTransId="{AED51966-461C-4702-9999-DF81758D7387}" sibTransId="{2213BB05-C7C6-484B-A029-53F3BFFD0A92}"/>
+    <dgm:cxn modelId="{EFB4BC2C-B877-4339-8B93-91F54676F08E}" type="presOf" srcId="{B7996E7A-0667-4C2C-9B52-6380DD5A3016}" destId="{16F61E82-84C3-4B19-A112-1073BED56190}" srcOrd="0" destOrd="0" presId="urn:microsoft.com/office/officeart/2005/8/layout/process4"/>
+    <dgm:cxn modelId="{D3B8E53E-D2F2-4FAB-8AC6-AB411FF57838}" type="presOf" srcId="{5CD7EEF4-8136-4796-B7A3-6C15077EB4A6}" destId="{D2DB9587-F9E7-4FB4-8452-785D4BC0D8AC}" srcOrd="0" destOrd="0" presId="urn:microsoft.com/office/officeart/2005/8/layout/process4"/>
+    <dgm:cxn modelId="{FA6AAB43-7E66-4C64-A225-AEE14D360A12}" type="presOf" srcId="{9EB7CB55-A0FE-4925-B369-A65200EDDF9E}" destId="{ED668D62-559B-4B79-ABC7-8F540E7ACCB5}" srcOrd="0" destOrd="0" presId="urn:microsoft.com/office/officeart/2005/8/layout/process4"/>
+    <dgm:cxn modelId="{0ED2FF6A-124D-4AAF-887B-D6C0A5A76D3B}" srcId="{9EB7CB55-A0FE-4925-B369-A65200EDDF9E}" destId="{5CB57BA4-034A-4D09-8F0B-A95408FE0BB2}" srcOrd="3" destOrd="0" parTransId="{2AA53FD4-EAF6-4AB5-9CE8-72E5AD113407}" sibTransId="{9BAF5063-AFDF-426E-9758-4CEF7680E6D1}"/>
+    <dgm:cxn modelId="{C9101D71-0422-4AD9-AB12-9E139771B3FD}" srcId="{9EB7CB55-A0FE-4925-B369-A65200EDDF9E}" destId="{5CD7EEF4-8136-4796-B7A3-6C15077EB4A6}" srcOrd="4" destOrd="0" parTransId="{2E58F5AC-3D55-40B6-8CC9-249B7381F650}" sibTransId="{5D84C833-A75C-4F7A-B153-3DC19242E9B8}"/>
+    <dgm:cxn modelId="{BA79429A-BD0D-4528-9D13-093794BFB01F}" type="presOf" srcId="{5CB57BA4-034A-4D09-8F0B-A95408FE0BB2}" destId="{3397C3CB-F991-4BEE-9129-BE8A93B93626}" srcOrd="0" destOrd="0" presId="urn:microsoft.com/office/officeart/2005/8/layout/process4"/>
+    <dgm:cxn modelId="{A15B17AB-1775-49AC-A27B-59762B11F20A}" type="presOf" srcId="{E1DE6ACA-E28E-418A-9F61-3781A4E791C1}" destId="{E339E651-E574-4F67-9DB5-397D700AC419}" srcOrd="0" destOrd="0" presId="urn:microsoft.com/office/officeart/2005/8/layout/process4"/>
+    <dgm:cxn modelId="{37D9CDC1-8BDA-4446-93C1-ED98A1222A4B}" type="presOf" srcId="{7D83F234-BB59-498E-B452-3BBBB49FD138}" destId="{CCB77D97-CCFC-40D1-8543-E12C7A862DD2}" srcOrd="0" destOrd="0" presId="urn:microsoft.com/office/officeart/2005/8/layout/process4"/>
+    <dgm:cxn modelId="{F4CDF0D1-5244-4175-8528-5E9704198695}" srcId="{9EB7CB55-A0FE-4925-B369-A65200EDDF9E}" destId="{7D83F234-BB59-498E-B452-3BBBB49FD138}" srcOrd="1" destOrd="0" parTransId="{1CABF1A7-A79B-43B8-BCEB-9E345895A801}" sibTransId="{5C5C56CE-7F60-48B4-8902-A052BA65B8CE}"/>
+    <dgm:cxn modelId="{607D0DEE-AD18-49D4-8866-38DD859881F4}" srcId="{9EB7CB55-A0FE-4925-B369-A65200EDDF9E}" destId="{E1DE6ACA-E28E-418A-9F61-3781A4E791C1}" srcOrd="0" destOrd="0" parTransId="{B1177B14-EE61-48A9-B143-6C59692B2991}" sibTransId="{3006B499-C909-4E24-98A6-D6C8E43F45E6}"/>
+    <dgm:cxn modelId="{F06E65C4-A276-46B9-B364-730EF6DF4A9C}" type="presParOf" srcId="{ED668D62-559B-4B79-ABC7-8F540E7ACCB5}" destId="{D7AE8C84-A790-4B25-91D2-6A0BB95B9ED5}" srcOrd="0" destOrd="0" presId="urn:microsoft.com/office/officeart/2005/8/layout/process4"/>
+    <dgm:cxn modelId="{CB6284C1-B317-4AF8-A5FC-42A67170AC4F}" type="presParOf" srcId="{D7AE8C84-A790-4B25-91D2-6A0BB95B9ED5}" destId="{D2DB9587-F9E7-4FB4-8452-785D4BC0D8AC}" srcOrd="0" destOrd="0" presId="urn:microsoft.com/office/officeart/2005/8/layout/process4"/>
+    <dgm:cxn modelId="{42A24CFB-2B5F-4E60-B27F-551AC3AA441B}" type="presParOf" srcId="{ED668D62-559B-4B79-ABC7-8F540E7ACCB5}" destId="{E59F4DD1-4340-4921-BFD0-935F63448982}" srcOrd="1" destOrd="0" presId="urn:microsoft.com/office/officeart/2005/8/layout/process4"/>
+    <dgm:cxn modelId="{65A0AF9C-FCEA-4FDD-9CB6-1458A713D958}" type="presParOf" srcId="{ED668D62-559B-4B79-ABC7-8F540E7ACCB5}" destId="{9E55F738-00A9-4191-B52B-B4045A62A4A3}" srcOrd="2" destOrd="0" presId="urn:microsoft.com/office/officeart/2005/8/layout/process4"/>
+    <dgm:cxn modelId="{CB56B6FE-0302-47AA-B768-6B0B0C0FA6D1}" type="presParOf" srcId="{9E55F738-00A9-4191-B52B-B4045A62A4A3}" destId="{3397C3CB-F991-4BEE-9129-BE8A93B93626}" srcOrd="0" destOrd="0" presId="urn:microsoft.com/office/officeart/2005/8/layout/process4"/>
+    <dgm:cxn modelId="{A2CD5C3C-60EE-4AAC-8651-4FAD8A4D1F6C}" type="presParOf" srcId="{ED668D62-559B-4B79-ABC7-8F540E7ACCB5}" destId="{9AAA17EE-331B-46D0-9B6E-817485CEBAF9}" srcOrd="3" destOrd="0" presId="urn:microsoft.com/office/officeart/2005/8/layout/process4"/>
+    <dgm:cxn modelId="{8B2F387F-1648-4E68-8B2B-0182C19C9462}" type="presParOf" srcId="{ED668D62-559B-4B79-ABC7-8F540E7ACCB5}" destId="{29080523-95C4-4E09-97F4-C6B5D5BE88F0}" srcOrd="4" destOrd="0" presId="urn:microsoft.com/office/officeart/2005/8/layout/process4"/>
+    <dgm:cxn modelId="{80BA1097-125B-4EB3-B390-800568139706}" type="presParOf" srcId="{29080523-95C4-4E09-97F4-C6B5D5BE88F0}" destId="{16F61E82-84C3-4B19-A112-1073BED56190}" srcOrd="0" destOrd="0" presId="urn:microsoft.com/office/officeart/2005/8/layout/process4"/>
+    <dgm:cxn modelId="{5B728032-27BC-47E5-9F74-52A825B70B60}" type="presParOf" srcId="{ED668D62-559B-4B79-ABC7-8F540E7ACCB5}" destId="{6E6380AB-6C09-4ACE-BB79-54C4788FD1DE}" srcOrd="5" destOrd="0" presId="urn:microsoft.com/office/officeart/2005/8/layout/process4"/>
+    <dgm:cxn modelId="{208D6530-B618-480D-8BEE-F16CD05238FC}" type="presParOf" srcId="{ED668D62-559B-4B79-ABC7-8F540E7ACCB5}" destId="{97C9CAEB-621D-424D-81FD-3199781059C7}" srcOrd="6" destOrd="0" presId="urn:microsoft.com/office/officeart/2005/8/layout/process4"/>
+    <dgm:cxn modelId="{49C5ADB3-E21C-4589-8F59-15729D4BC8A0}" type="presParOf" srcId="{97C9CAEB-621D-424D-81FD-3199781059C7}" destId="{CCB77D97-CCFC-40D1-8543-E12C7A862DD2}" srcOrd="0" destOrd="0" presId="urn:microsoft.com/office/officeart/2005/8/layout/process4"/>
+    <dgm:cxn modelId="{5F605130-B63C-4728-B2B4-BAB95090977D}" type="presParOf" srcId="{ED668D62-559B-4B79-ABC7-8F540E7ACCB5}" destId="{B6E5EE9E-1487-4FC4-A3EC-D1ED12378D27}" srcOrd="7" destOrd="0" presId="urn:microsoft.com/office/officeart/2005/8/layout/process4"/>
+    <dgm:cxn modelId="{1C699E99-324C-4D70-A228-CEC2E4A73950}" type="presParOf" srcId="{ED668D62-559B-4B79-ABC7-8F540E7ACCB5}" destId="{D156B02D-7883-4130-919E-AA9BFC143E71}" srcOrd="8" destOrd="0" presId="urn:microsoft.com/office/officeart/2005/8/layout/process4"/>
+    <dgm:cxn modelId="{94995FD0-D8CD-498F-BE4A-B714DD07DB31}" type="presParOf" srcId="{D156B02D-7883-4130-919E-AA9BFC143E71}" destId="{E339E651-E574-4F67-9DB5-397D700AC419}" srcOrd="0" destOrd="0" presId="urn:microsoft.com/office/officeart/2005/8/layout/process4"/>
   </dgm:cxnLst>
   <dgm:bg/>
   <dgm:whole/>
@@ -6531,6 +7587,413 @@
       <dsp:txXfrm>
         <a:off x="2207022" y="1369297"/>
         <a:ext cx="1679786" cy="1354666"/>
+      </dsp:txXfrm>
+    </dsp:sp>
+  </dsp:spTree>
+</dsp:drawing>
+</file>
+
+<file path=ppt/diagrams/drawing5.xml><?xml version="1.0" encoding="utf-8"?>
+<dsp:drawing xmlns:dgm="http://schemas.openxmlformats.org/drawingml/2006/diagram" xmlns:dsp="http://schemas.microsoft.com/office/drawing/2008/diagram" xmlns:a="http://schemas.openxmlformats.org/drawingml/2006/main">
+  <dsp:spTree>
+    <dsp:nvGrpSpPr>
+      <dsp:cNvPr id="0" name=""/>
+      <dsp:cNvGrpSpPr/>
+    </dsp:nvGrpSpPr>
+    <dsp:grpSpPr/>
+    <dsp:sp modelId="{D2DB9587-F9E7-4FB4-8452-785D4BC0D8AC}">
+      <dsp:nvSpPr>
+        <dsp:cNvPr id="0" name=""/>
+        <dsp:cNvSpPr/>
+      </dsp:nvSpPr>
+      <dsp:spPr>
+        <a:xfrm>
+          <a:off x="0" y="5219140"/>
+          <a:ext cx="10802776" cy="856243"/>
+        </a:xfrm>
+        <a:prstGeom prst="rect">
+          <a:avLst/>
+        </a:prstGeom>
+        <a:solidFill>
+          <a:schemeClr val="dk2">
+            <a:hueOff val="0"/>
+            <a:satOff val="0"/>
+            <a:lumOff val="0"/>
+            <a:alphaOff val="0"/>
+          </a:schemeClr>
+        </a:solidFill>
+        <a:ln w="12700" cap="flat" cmpd="sng" algn="ctr">
+          <a:solidFill>
+            <a:schemeClr val="lt2">
+              <a:hueOff val="0"/>
+              <a:satOff val="0"/>
+              <a:lumOff val="0"/>
+              <a:alphaOff val="0"/>
+            </a:schemeClr>
+          </a:solidFill>
+          <a:prstDash val="solid"/>
+          <a:miter lim="800000"/>
+        </a:ln>
+        <a:effectLst/>
+      </dsp:spPr>
+      <dsp:style>
+        <a:lnRef idx="2">
+          <a:scrgbClr r="0" g="0" b="0"/>
+        </a:lnRef>
+        <a:fillRef idx="1">
+          <a:scrgbClr r="0" g="0" b="0"/>
+        </a:fillRef>
+        <a:effectRef idx="0">
+          <a:scrgbClr r="0" g="0" b="0"/>
+        </a:effectRef>
+        <a:fontRef idx="minor">
+          <a:schemeClr val="lt1"/>
+        </a:fontRef>
+      </dsp:style>
+      <dsp:txBody>
+        <a:bodyPr spcFirstLastPara="0" vert="horz" wrap="square" lIns="213360" tIns="213360" rIns="213360" bIns="213360" numCol="1" spcCol="1270" anchor="ctr" anchorCtr="0">
+          <a:noAutofit/>
+        </a:bodyPr>
+        <a:lstStyle/>
+        <a:p>
+          <a:pPr marL="0" lvl="0" indent="0" algn="ctr" defTabSz="1333500">
+            <a:lnSpc>
+              <a:spcPct val="90000"/>
+            </a:lnSpc>
+            <a:spcBef>
+              <a:spcPct val="0"/>
+            </a:spcBef>
+            <a:spcAft>
+              <a:spcPct val="35000"/>
+            </a:spcAft>
+            <a:buNone/>
+          </a:pPr>
+          <a:r>
+            <a:rPr lang="en-US" sz="3000" kern="1200"/>
+            <a:t>Database</a:t>
+          </a:r>
+          <a:endParaRPr lang="en-US" sz="3000" kern="1200" dirty="0"/>
+        </a:p>
+      </dsp:txBody>
+      <dsp:txXfrm>
+        <a:off x="0" y="5219140"/>
+        <a:ext cx="10802776" cy="856243"/>
+      </dsp:txXfrm>
+    </dsp:sp>
+    <dsp:sp modelId="{3397C3CB-F991-4BEE-9129-BE8A93B93626}">
+      <dsp:nvSpPr>
+        <dsp:cNvPr id="0" name=""/>
+        <dsp:cNvSpPr/>
+      </dsp:nvSpPr>
+      <dsp:spPr>
+        <a:xfrm rot="10800000">
+          <a:off x="0" y="3915082"/>
+          <a:ext cx="10802776" cy="1316902"/>
+        </a:xfrm>
+        <a:prstGeom prst="upArrowCallout">
+          <a:avLst/>
+        </a:prstGeom>
+        <a:solidFill>
+          <a:schemeClr val="dk2">
+            <a:hueOff val="0"/>
+            <a:satOff val="0"/>
+            <a:lumOff val="0"/>
+            <a:alphaOff val="0"/>
+          </a:schemeClr>
+        </a:solidFill>
+        <a:ln w="12700" cap="flat" cmpd="sng" algn="ctr">
+          <a:solidFill>
+            <a:schemeClr val="lt2">
+              <a:hueOff val="0"/>
+              <a:satOff val="0"/>
+              <a:lumOff val="0"/>
+              <a:alphaOff val="0"/>
+            </a:schemeClr>
+          </a:solidFill>
+          <a:prstDash val="solid"/>
+          <a:miter lim="800000"/>
+        </a:ln>
+        <a:effectLst/>
+      </dsp:spPr>
+      <dsp:style>
+        <a:lnRef idx="2">
+          <a:scrgbClr r="0" g="0" b="0"/>
+        </a:lnRef>
+        <a:fillRef idx="1">
+          <a:scrgbClr r="0" g="0" b="0"/>
+        </a:fillRef>
+        <a:effectRef idx="0">
+          <a:scrgbClr r="0" g="0" b="0"/>
+        </a:effectRef>
+        <a:fontRef idx="minor">
+          <a:schemeClr val="lt1"/>
+        </a:fontRef>
+      </dsp:style>
+      <dsp:txBody>
+        <a:bodyPr spcFirstLastPara="0" vert="horz" wrap="square" lIns="213360" tIns="213360" rIns="213360" bIns="213360" numCol="1" spcCol="1270" anchor="ctr" anchorCtr="0">
+          <a:noAutofit/>
+        </a:bodyPr>
+        <a:lstStyle/>
+        <a:p>
+          <a:pPr marL="0" lvl="0" indent="0" algn="ctr" defTabSz="1333500">
+            <a:lnSpc>
+              <a:spcPct val="90000"/>
+            </a:lnSpc>
+            <a:spcBef>
+              <a:spcPct val="0"/>
+            </a:spcBef>
+            <a:spcAft>
+              <a:spcPct val="35000"/>
+            </a:spcAft>
+            <a:buNone/>
+          </a:pPr>
+          <a:r>
+            <a:rPr lang="en-US" sz="3000" kern="1200"/>
+            <a:t>Data Access</a:t>
+          </a:r>
+          <a:endParaRPr lang="en-US" sz="3000" kern="1200" dirty="0"/>
+        </a:p>
+      </dsp:txBody>
+      <dsp:txXfrm rot="10800000">
+        <a:off x="0" y="3915082"/>
+        <a:ext cx="10802776" cy="855683"/>
+      </dsp:txXfrm>
+    </dsp:sp>
+    <dsp:sp modelId="{16F61E82-84C3-4B19-A112-1073BED56190}">
+      <dsp:nvSpPr>
+        <dsp:cNvPr id="0" name=""/>
+        <dsp:cNvSpPr/>
+      </dsp:nvSpPr>
+      <dsp:spPr>
+        <a:xfrm rot="10800000">
+          <a:off x="0" y="2611023"/>
+          <a:ext cx="10802776" cy="1316902"/>
+        </a:xfrm>
+        <a:prstGeom prst="upArrowCallout">
+          <a:avLst/>
+        </a:prstGeom>
+        <a:solidFill>
+          <a:schemeClr val="dk2">
+            <a:hueOff val="0"/>
+            <a:satOff val="0"/>
+            <a:lumOff val="0"/>
+            <a:alphaOff val="0"/>
+          </a:schemeClr>
+        </a:solidFill>
+        <a:ln w="12700" cap="flat" cmpd="sng" algn="ctr">
+          <a:solidFill>
+            <a:schemeClr val="lt2">
+              <a:hueOff val="0"/>
+              <a:satOff val="0"/>
+              <a:lumOff val="0"/>
+              <a:alphaOff val="0"/>
+            </a:schemeClr>
+          </a:solidFill>
+          <a:prstDash val="solid"/>
+          <a:miter lim="800000"/>
+        </a:ln>
+        <a:effectLst/>
+      </dsp:spPr>
+      <dsp:style>
+        <a:lnRef idx="2">
+          <a:scrgbClr r="0" g="0" b="0"/>
+        </a:lnRef>
+        <a:fillRef idx="1">
+          <a:scrgbClr r="0" g="0" b="0"/>
+        </a:fillRef>
+        <a:effectRef idx="0">
+          <a:scrgbClr r="0" g="0" b="0"/>
+        </a:effectRef>
+        <a:fontRef idx="minor">
+          <a:schemeClr val="lt1"/>
+        </a:fontRef>
+      </dsp:style>
+      <dsp:txBody>
+        <a:bodyPr spcFirstLastPara="0" vert="horz" wrap="square" lIns="213360" tIns="213360" rIns="213360" bIns="213360" numCol="1" spcCol="1270" anchor="ctr" anchorCtr="0">
+          <a:noAutofit/>
+        </a:bodyPr>
+        <a:lstStyle/>
+        <a:p>
+          <a:pPr marL="0" lvl="0" indent="0" algn="ctr" defTabSz="1333500">
+            <a:lnSpc>
+              <a:spcPct val="90000"/>
+            </a:lnSpc>
+            <a:spcBef>
+              <a:spcPct val="0"/>
+            </a:spcBef>
+            <a:spcAft>
+              <a:spcPct val="35000"/>
+            </a:spcAft>
+            <a:buNone/>
+          </a:pPr>
+          <a:r>
+            <a:rPr lang="en-US" sz="3000" kern="1200"/>
+            <a:t>Business Logic</a:t>
+          </a:r>
+          <a:endParaRPr lang="en-US" sz="3000" kern="1200" dirty="0"/>
+        </a:p>
+      </dsp:txBody>
+      <dsp:txXfrm rot="10800000">
+        <a:off x="0" y="2611023"/>
+        <a:ext cx="10802776" cy="855683"/>
+      </dsp:txXfrm>
+    </dsp:sp>
+    <dsp:sp modelId="{CCB77D97-CCFC-40D1-8543-E12C7A862DD2}">
+      <dsp:nvSpPr>
+        <dsp:cNvPr id="0" name=""/>
+        <dsp:cNvSpPr/>
+      </dsp:nvSpPr>
+      <dsp:spPr>
+        <a:xfrm rot="10800000">
+          <a:off x="0" y="1306964"/>
+          <a:ext cx="10802776" cy="1316902"/>
+        </a:xfrm>
+        <a:prstGeom prst="upArrowCallout">
+          <a:avLst/>
+        </a:prstGeom>
+        <a:solidFill>
+          <a:schemeClr val="dk2">
+            <a:hueOff val="0"/>
+            <a:satOff val="0"/>
+            <a:lumOff val="0"/>
+            <a:alphaOff val="0"/>
+          </a:schemeClr>
+        </a:solidFill>
+        <a:ln w="12700" cap="flat" cmpd="sng" algn="ctr">
+          <a:solidFill>
+            <a:schemeClr val="lt2">
+              <a:hueOff val="0"/>
+              <a:satOff val="0"/>
+              <a:lumOff val="0"/>
+              <a:alphaOff val="0"/>
+            </a:schemeClr>
+          </a:solidFill>
+          <a:prstDash val="solid"/>
+          <a:miter lim="800000"/>
+        </a:ln>
+        <a:effectLst/>
+      </dsp:spPr>
+      <dsp:style>
+        <a:lnRef idx="2">
+          <a:scrgbClr r="0" g="0" b="0"/>
+        </a:lnRef>
+        <a:fillRef idx="1">
+          <a:scrgbClr r="0" g="0" b="0"/>
+        </a:fillRef>
+        <a:effectRef idx="0">
+          <a:scrgbClr r="0" g="0" b="0"/>
+        </a:effectRef>
+        <a:fontRef idx="minor">
+          <a:schemeClr val="lt1"/>
+        </a:fontRef>
+      </dsp:style>
+      <dsp:txBody>
+        <a:bodyPr spcFirstLastPara="0" vert="horz" wrap="square" lIns="213360" tIns="213360" rIns="213360" bIns="213360" numCol="1" spcCol="1270" anchor="ctr" anchorCtr="0">
+          <a:noAutofit/>
+        </a:bodyPr>
+        <a:lstStyle/>
+        <a:p>
+          <a:pPr marL="0" lvl="0" indent="0" algn="ctr" defTabSz="1333500">
+            <a:lnSpc>
+              <a:spcPct val="90000"/>
+            </a:lnSpc>
+            <a:spcBef>
+              <a:spcPct val="0"/>
+            </a:spcBef>
+            <a:spcAft>
+              <a:spcPct val="35000"/>
+            </a:spcAft>
+            <a:buNone/>
+          </a:pPr>
+          <a:r>
+            <a:rPr lang="en-US" sz="3000" kern="1200"/>
+            <a:t>API</a:t>
+          </a:r>
+          <a:endParaRPr lang="en-US" sz="3000" kern="1200" dirty="0"/>
+        </a:p>
+      </dsp:txBody>
+      <dsp:txXfrm rot="10800000">
+        <a:off x="0" y="1306964"/>
+        <a:ext cx="10802776" cy="855683"/>
+      </dsp:txXfrm>
+    </dsp:sp>
+    <dsp:sp modelId="{E339E651-E574-4F67-9DB5-397D700AC419}">
+      <dsp:nvSpPr>
+        <dsp:cNvPr id="0" name=""/>
+        <dsp:cNvSpPr/>
+      </dsp:nvSpPr>
+      <dsp:spPr>
+        <a:xfrm rot="10800000">
+          <a:off x="0" y="0"/>
+          <a:ext cx="10802776" cy="1316902"/>
+        </a:xfrm>
+        <a:prstGeom prst="upArrowCallout">
+          <a:avLst/>
+        </a:prstGeom>
+        <a:solidFill>
+          <a:schemeClr val="dk2">
+            <a:hueOff val="0"/>
+            <a:satOff val="0"/>
+            <a:lumOff val="0"/>
+            <a:alphaOff val="0"/>
+          </a:schemeClr>
+        </a:solidFill>
+        <a:ln w="12700" cap="flat" cmpd="sng" algn="ctr">
+          <a:solidFill>
+            <a:schemeClr val="lt2">
+              <a:hueOff val="0"/>
+              <a:satOff val="0"/>
+              <a:lumOff val="0"/>
+              <a:alphaOff val="0"/>
+            </a:schemeClr>
+          </a:solidFill>
+          <a:prstDash val="solid"/>
+          <a:miter lim="800000"/>
+        </a:ln>
+        <a:effectLst/>
+      </dsp:spPr>
+      <dsp:style>
+        <a:lnRef idx="2">
+          <a:scrgbClr r="0" g="0" b="0"/>
+        </a:lnRef>
+        <a:fillRef idx="1">
+          <a:scrgbClr r="0" g="0" b="0"/>
+        </a:fillRef>
+        <a:effectRef idx="0">
+          <a:scrgbClr r="0" g="0" b="0"/>
+        </a:effectRef>
+        <a:fontRef idx="minor">
+          <a:schemeClr val="lt1"/>
+        </a:fontRef>
+      </dsp:style>
+      <dsp:txBody>
+        <a:bodyPr spcFirstLastPara="0" vert="horz" wrap="square" lIns="213360" tIns="213360" rIns="213360" bIns="213360" numCol="1" spcCol="1270" anchor="ctr" anchorCtr="0">
+          <a:noAutofit/>
+        </a:bodyPr>
+        <a:lstStyle/>
+        <a:p>
+          <a:pPr marL="0" lvl="0" indent="0" algn="ctr" defTabSz="1333500">
+            <a:lnSpc>
+              <a:spcPct val="90000"/>
+            </a:lnSpc>
+            <a:spcBef>
+              <a:spcPct val="0"/>
+            </a:spcBef>
+            <a:spcAft>
+              <a:spcPct val="35000"/>
+            </a:spcAft>
+            <a:buNone/>
+          </a:pPr>
+          <a:r>
+            <a:rPr lang="en-US" sz="3000" kern="1200"/>
+            <a:t>User Interface</a:t>
+          </a:r>
+          <a:endParaRPr lang="en-US" sz="3000" kern="1200" dirty="0"/>
+        </a:p>
+      </dsp:txBody>
+      <dsp:txXfrm rot="10800000">
+        <a:off x="0" y="0"/>
+        <a:ext cx="10802776" cy="855683"/>
       </dsp:txXfrm>
     </dsp:sp>
   </dsp:spTree>
@@ -8780,6 +10243,359 @@
 </dgm:layoutDef>
 </file>
 
+<file path=ppt/diagrams/layout5.xml><?xml version="1.0" encoding="utf-8"?>
+<dgm:layoutDef xmlns:dgm="http://schemas.openxmlformats.org/drawingml/2006/diagram" xmlns:a="http://schemas.openxmlformats.org/drawingml/2006/main" uniqueId="urn:microsoft.com/office/officeart/2005/8/layout/process4">
+  <dgm:title val=""/>
+  <dgm:desc val=""/>
+  <dgm:catLst>
+    <dgm:cat type="process" pri="16000"/>
+    <dgm:cat type="list" pri="20000"/>
+  </dgm:catLst>
+  <dgm:sampData>
+    <dgm:dataModel>
+      <dgm:ptLst>
+        <dgm:pt modelId="0" type="doc"/>
+        <dgm:pt modelId="1">
+          <dgm:prSet phldr="1"/>
+        </dgm:pt>
+        <dgm:pt modelId="11">
+          <dgm:prSet phldr="1"/>
+        </dgm:pt>
+        <dgm:pt modelId="12">
+          <dgm:prSet phldr="1"/>
+        </dgm:pt>
+        <dgm:pt modelId="2">
+          <dgm:prSet phldr="1"/>
+        </dgm:pt>
+        <dgm:pt modelId="21">
+          <dgm:prSet phldr="1"/>
+        </dgm:pt>
+        <dgm:pt modelId="22">
+          <dgm:prSet phldr="1"/>
+        </dgm:pt>
+        <dgm:pt modelId="3">
+          <dgm:prSet phldr="1"/>
+        </dgm:pt>
+        <dgm:pt modelId="31">
+          <dgm:prSet phldr="1"/>
+        </dgm:pt>
+        <dgm:pt modelId="32">
+          <dgm:prSet phldr="1"/>
+        </dgm:pt>
+      </dgm:ptLst>
+      <dgm:cxnLst>
+        <dgm:cxn modelId="4" srcId="0" destId="1" srcOrd="0" destOrd="0"/>
+        <dgm:cxn modelId="5" srcId="0" destId="2" srcOrd="1" destOrd="0"/>
+        <dgm:cxn modelId="6" srcId="0" destId="3" srcOrd="2" destOrd="0"/>
+        <dgm:cxn modelId="13" srcId="1" destId="11" srcOrd="0" destOrd="0"/>
+        <dgm:cxn modelId="14" srcId="1" destId="12" srcOrd="1" destOrd="0"/>
+        <dgm:cxn modelId="23" srcId="2" destId="21" srcOrd="0" destOrd="0"/>
+        <dgm:cxn modelId="24" srcId="2" destId="22" srcOrd="1" destOrd="0"/>
+        <dgm:cxn modelId="33" srcId="3" destId="31" srcOrd="0" destOrd="0"/>
+        <dgm:cxn modelId="34" srcId="3" destId="32" srcOrd="1" destOrd="0"/>
+      </dgm:cxnLst>
+      <dgm:bg/>
+      <dgm:whole/>
+    </dgm:dataModel>
+  </dgm:sampData>
+  <dgm:styleData>
+    <dgm:dataModel>
+      <dgm:ptLst>
+        <dgm:pt modelId="0" type="doc"/>
+        <dgm:pt modelId="1"/>
+        <dgm:pt modelId="11"/>
+        <dgm:pt modelId="2"/>
+        <dgm:pt modelId="21"/>
+      </dgm:ptLst>
+      <dgm:cxnLst>
+        <dgm:cxn modelId="4" srcId="0" destId="1" srcOrd="0" destOrd="0"/>
+        <dgm:cxn modelId="5" srcId="0" destId="2" srcOrd="1" destOrd="0"/>
+        <dgm:cxn modelId="13" srcId="1" destId="11" srcOrd="0" destOrd="0"/>
+        <dgm:cxn modelId="23" srcId="2" destId="21" srcOrd="0" destOrd="0"/>
+      </dgm:cxnLst>
+      <dgm:bg/>
+      <dgm:whole/>
+    </dgm:dataModel>
+  </dgm:styleData>
+  <dgm:clrData>
+    <dgm:dataModel>
+      <dgm:ptLst>
+        <dgm:pt modelId="0" type="doc"/>
+        <dgm:pt modelId="1"/>
+        <dgm:pt modelId="11"/>
+        <dgm:pt modelId="2"/>
+        <dgm:pt modelId="21"/>
+        <dgm:pt modelId="3"/>
+        <dgm:pt modelId="31"/>
+        <dgm:pt modelId="4"/>
+        <dgm:pt modelId="41"/>
+      </dgm:ptLst>
+      <dgm:cxnLst>
+        <dgm:cxn modelId="5" srcId="0" destId="1" srcOrd="0" destOrd="0"/>
+        <dgm:cxn modelId="6" srcId="0" destId="2" srcOrd="1" destOrd="0"/>
+        <dgm:cxn modelId="7" srcId="0" destId="3" srcOrd="2" destOrd="0"/>
+        <dgm:cxn modelId="8" srcId="0" destId="4" srcOrd="3" destOrd="0"/>
+        <dgm:cxn modelId="13" srcId="1" destId="11" srcOrd="0" destOrd="0"/>
+        <dgm:cxn modelId="23" srcId="2" destId="21" srcOrd="0" destOrd="0"/>
+        <dgm:cxn modelId="33" srcId="3" destId="31" srcOrd="0" destOrd="0"/>
+        <dgm:cxn modelId="43" srcId="4" destId="41" srcOrd="0" destOrd="0"/>
+      </dgm:cxnLst>
+      <dgm:bg/>
+      <dgm:whole/>
+    </dgm:dataModel>
+  </dgm:clrData>
+  <dgm:layoutNode name="Name0">
+    <dgm:varLst>
+      <dgm:dir/>
+      <dgm:animLvl val="lvl"/>
+      <dgm:resizeHandles val="exact"/>
+    </dgm:varLst>
+    <dgm:alg type="lin">
+      <dgm:param type="linDir" val="fromB"/>
+    </dgm:alg>
+    <dgm:shape xmlns:r="http://schemas.openxmlformats.org/officeDocument/2006/relationships" r:blip="">
+      <dgm:adjLst/>
+    </dgm:shape>
+    <dgm:presOf/>
+    <dgm:constrLst>
+      <dgm:constr type="h" for="ch" forName="boxAndChildren" refType="h"/>
+      <dgm:constr type="h" for="ch" forName="arrowAndChildren" refType="h" refFor="ch" refForName="boxAndChildren" op="equ" fact="1.538"/>
+      <dgm:constr type="w" for="ch" forName="arrowAndChildren" refType="w"/>
+      <dgm:constr type="w" for="ch" forName="boxAndChildren" refType="w"/>
+      <dgm:constr type="h" for="ch" forName="sp" refType="h" fact="-0.015"/>
+      <dgm:constr type="primFontSz" for="des" forName="parentTextBox" val="65"/>
+      <dgm:constr type="primFontSz" for="des" forName="parentTextArrow" refType="primFontSz" refFor="des" refForName="parentTextBox" op="equ"/>
+      <dgm:constr type="primFontSz" for="des" forName="childTextArrow" val="65"/>
+      <dgm:constr type="primFontSz" for="des" forName="childTextBox" refType="primFontSz" refFor="des" refForName="childTextArrow" op="equ"/>
+    </dgm:constrLst>
+    <dgm:ruleLst/>
+    <dgm:forEach name="Name1" axis="ch" ptType="node" st="-1" step="-1">
+      <dgm:choose name="Name2">
+        <dgm:if name="Name3" axis="self" ptType="node" func="revPos" op="equ" val="1">
+          <dgm:layoutNode name="boxAndChildren">
+            <dgm:alg type="composite"/>
+            <dgm:shape xmlns:r="http://schemas.openxmlformats.org/officeDocument/2006/relationships" r:blip="">
+              <dgm:adjLst/>
+            </dgm:shape>
+            <dgm:presOf/>
+            <dgm:choose name="Name4">
+              <dgm:if name="Name5" axis="ch" ptType="node" func="cnt" op="gte" val="1">
+                <dgm:constrLst>
+                  <dgm:constr type="w" for="ch" forName="parentTextBox" refType="w"/>
+                  <dgm:constr type="h" for="ch" forName="parentTextBox" refType="h" fact="0.54"/>
+                  <dgm:constr type="t" for="ch" forName="parentTextBox"/>
+                  <dgm:constr type="w" for="ch" forName="entireBox" refType="w"/>
+                  <dgm:constr type="h" for="ch" forName="entireBox" refType="h"/>
+                  <dgm:constr type="w" for="ch" forName="descendantBox" refType="w"/>
+                  <dgm:constr type="b" for="ch" forName="descendantBox" refType="h" fact="0.98"/>
+                  <dgm:constr type="h" for="ch" forName="descendantBox" refType="h" fact="0.46"/>
+                </dgm:constrLst>
+              </dgm:if>
+              <dgm:else name="Name6">
+                <dgm:constrLst>
+                  <dgm:constr type="w" for="ch" forName="parentTextBox" refType="w"/>
+                  <dgm:constr type="h" for="ch" forName="parentTextBox" refType="h"/>
+                </dgm:constrLst>
+              </dgm:else>
+            </dgm:choose>
+            <dgm:ruleLst/>
+            <dgm:layoutNode name="parentTextBox">
+              <dgm:alg type="tx"/>
+              <dgm:choose name="Name7">
+                <dgm:if name="Name8" axis="ch" ptType="node" func="cnt" op="gte" val="1">
+                  <dgm:shape xmlns:r="http://schemas.openxmlformats.org/officeDocument/2006/relationships" type="rect" r:blip="" zOrderOff="1" hideGeom="1">
+                    <dgm:adjLst/>
+                  </dgm:shape>
+                </dgm:if>
+                <dgm:else name="Name9">
+                  <dgm:shape xmlns:r="http://schemas.openxmlformats.org/officeDocument/2006/relationships" type="rect" r:blip="">
+                    <dgm:adjLst/>
+                  </dgm:shape>
+                </dgm:else>
+              </dgm:choose>
+              <dgm:presOf axis="self"/>
+              <dgm:constrLst/>
+              <dgm:ruleLst>
+                <dgm:rule type="primFontSz" val="5" fact="NaN" max="NaN"/>
+              </dgm:ruleLst>
+            </dgm:layoutNode>
+            <dgm:choose name="Name10">
+              <dgm:if name="Name11" axis="ch" ptType="node" func="cnt" op="gte" val="1">
+                <dgm:layoutNode name="entireBox">
+                  <dgm:alg type="sp"/>
+                  <dgm:shape xmlns:r="http://schemas.openxmlformats.org/officeDocument/2006/relationships" type="rect" r:blip="">
+                    <dgm:adjLst/>
+                  </dgm:shape>
+                  <dgm:presOf axis="self"/>
+                  <dgm:constrLst/>
+                  <dgm:ruleLst/>
+                </dgm:layoutNode>
+                <dgm:layoutNode name="descendantBox" styleLbl="fgAccFollowNode1">
+                  <dgm:choose name="Name12">
+                    <dgm:if name="Name13" func="var" arg="dir" op="equ" val="norm">
+                      <dgm:alg type="lin"/>
+                    </dgm:if>
+                    <dgm:else name="Name14">
+                      <dgm:alg type="lin">
+                        <dgm:param type="linDir" val="fromR"/>
+                      </dgm:alg>
+                    </dgm:else>
+                  </dgm:choose>
+                  <dgm:shape xmlns:r="http://schemas.openxmlformats.org/officeDocument/2006/relationships" r:blip="">
+                    <dgm:adjLst/>
+                  </dgm:shape>
+                  <dgm:presOf/>
+                  <dgm:constrLst>
+                    <dgm:constr type="w" for="ch" forName="childTextBox" refType="w"/>
+                    <dgm:constr type="h" for="ch" forName="childTextBox" refType="h"/>
+                  </dgm:constrLst>
+                  <dgm:ruleLst/>
+                  <dgm:forEach name="Name15" axis="ch" ptType="node">
+                    <dgm:layoutNode name="childTextBox" styleLbl="fgAccFollowNode1">
+                      <dgm:varLst>
+                        <dgm:bulletEnabled val="1"/>
+                      </dgm:varLst>
+                      <dgm:alg type="tx"/>
+                      <dgm:shape xmlns:r="http://schemas.openxmlformats.org/officeDocument/2006/relationships" type="rect" r:blip="">
+                        <dgm:adjLst/>
+                      </dgm:shape>
+                      <dgm:presOf axis="desOrSelf" ptType="node"/>
+                      <dgm:constrLst>
+                        <dgm:constr type="tMarg" refType="primFontSz" fact="0.1"/>
+                        <dgm:constr type="bMarg" refType="primFontSz" fact="0.1"/>
+                      </dgm:constrLst>
+                      <dgm:ruleLst>
+                        <dgm:rule type="primFontSz" val="5" fact="NaN" max="NaN"/>
+                      </dgm:ruleLst>
+                    </dgm:layoutNode>
+                  </dgm:forEach>
+                </dgm:layoutNode>
+              </dgm:if>
+              <dgm:else name="Name16"/>
+            </dgm:choose>
+          </dgm:layoutNode>
+        </dgm:if>
+        <dgm:else name="Name17">
+          <dgm:layoutNode name="arrowAndChildren">
+            <dgm:alg type="composite"/>
+            <dgm:shape xmlns:r="http://schemas.openxmlformats.org/officeDocument/2006/relationships" r:blip="">
+              <dgm:adjLst/>
+            </dgm:shape>
+            <dgm:presOf/>
+            <dgm:choose name="Name18">
+              <dgm:if name="Name19" axis="ch" ptType="node" func="cnt" op="gte" val="1">
+                <dgm:constrLst>
+                  <dgm:constr type="w" for="ch" forName="parentTextArrow" refType="w"/>
+                  <dgm:constr type="t" for="ch" forName="parentTextArrow"/>
+                  <dgm:constr type="h" for="ch" forName="parentTextArrow" refType="h" fact="0.351"/>
+                  <dgm:constr type="w" for="ch" forName="arrow" refType="w"/>
+                  <dgm:constr type="h" for="ch" forName="arrow" refType="h"/>
+                  <dgm:constr type="w" for="ch" forName="descendantArrow" refType="w"/>
+                  <dgm:constr type="b" for="ch" forName="descendantArrow" refType="h" fact="0.65"/>
+                  <dgm:constr type="h" for="ch" forName="descendantArrow" refType="h" fact="0.299"/>
+                </dgm:constrLst>
+              </dgm:if>
+              <dgm:else name="Name20">
+                <dgm:constrLst>
+                  <dgm:constr type="w" for="ch" forName="parentTextArrow" refType="w"/>
+                  <dgm:constr type="h" for="ch" forName="parentTextArrow" refType="h"/>
+                </dgm:constrLst>
+              </dgm:else>
+            </dgm:choose>
+            <dgm:ruleLst/>
+            <dgm:layoutNode name="parentTextArrow">
+              <dgm:alg type="tx"/>
+              <dgm:choose name="Name21">
+                <dgm:if name="Name22" axis="ch" ptType="node" func="cnt" op="gte" val="1">
+                  <dgm:shape xmlns:r="http://schemas.openxmlformats.org/officeDocument/2006/relationships" type="rect" r:blip="" zOrderOff="1" hideGeom="1">
+                    <dgm:adjLst/>
+                  </dgm:shape>
+                </dgm:if>
+                <dgm:else name="Name23">
+                  <dgm:shape xmlns:r="http://schemas.openxmlformats.org/officeDocument/2006/relationships" rot="180" type="upArrowCallout" r:blip="">
+                    <dgm:adjLst/>
+                  </dgm:shape>
+                </dgm:else>
+              </dgm:choose>
+              <dgm:presOf axis="self"/>
+              <dgm:constrLst/>
+              <dgm:ruleLst>
+                <dgm:rule type="primFontSz" val="5" fact="NaN" max="NaN"/>
+              </dgm:ruleLst>
+            </dgm:layoutNode>
+            <dgm:choose name="Name24">
+              <dgm:if name="Name25" axis="ch" ptType="node" func="cnt" op="gte" val="1">
+                <dgm:layoutNode name="arrow">
+                  <dgm:alg type="sp"/>
+                  <dgm:shape xmlns:r="http://schemas.openxmlformats.org/officeDocument/2006/relationships" rot="180" type="upArrowCallout" r:blip="">
+                    <dgm:adjLst/>
+                  </dgm:shape>
+                  <dgm:presOf axis="self"/>
+                  <dgm:constrLst/>
+                  <dgm:ruleLst/>
+                </dgm:layoutNode>
+                <dgm:layoutNode name="descendantArrow">
+                  <dgm:choose name="Name26">
+                    <dgm:if name="Name27" func="var" arg="dir" op="equ" val="norm">
+                      <dgm:alg type="lin"/>
+                    </dgm:if>
+                    <dgm:else name="Name28">
+                      <dgm:alg type="lin">
+                        <dgm:param type="linDir" val="fromR"/>
+                      </dgm:alg>
+                    </dgm:else>
+                  </dgm:choose>
+                  <dgm:shape xmlns:r="http://schemas.openxmlformats.org/officeDocument/2006/relationships" r:blip="">
+                    <dgm:adjLst/>
+                  </dgm:shape>
+                  <dgm:presOf/>
+                  <dgm:constrLst>
+                    <dgm:constr type="w" for="ch" forName="childTextArrow" refType="w"/>
+                    <dgm:constr type="h" for="ch" forName="childTextArrow" refType="h"/>
+                  </dgm:constrLst>
+                  <dgm:ruleLst/>
+                  <dgm:forEach name="Name29" axis="ch" ptType="node">
+                    <dgm:layoutNode name="childTextArrow" styleLbl="fgAccFollowNode1">
+                      <dgm:varLst>
+                        <dgm:bulletEnabled val="1"/>
+                      </dgm:varLst>
+                      <dgm:alg type="tx"/>
+                      <dgm:shape xmlns:r="http://schemas.openxmlformats.org/officeDocument/2006/relationships" type="rect" r:blip="">
+                        <dgm:adjLst/>
+                      </dgm:shape>
+                      <dgm:presOf axis="desOrSelf" ptType="node"/>
+                      <dgm:constrLst>
+                        <dgm:constr type="tMarg" refType="primFontSz" fact="0.1"/>
+                        <dgm:constr type="bMarg" refType="primFontSz" fact="0.1"/>
+                      </dgm:constrLst>
+                      <dgm:ruleLst>
+                        <dgm:rule type="primFontSz" val="5" fact="NaN" max="NaN"/>
+                      </dgm:ruleLst>
+                    </dgm:layoutNode>
+                  </dgm:forEach>
+                </dgm:layoutNode>
+              </dgm:if>
+              <dgm:else name="Name30"/>
+            </dgm:choose>
+          </dgm:layoutNode>
+        </dgm:else>
+      </dgm:choose>
+      <dgm:forEach name="Name31" axis="precedSib" ptType="sibTrans" st="-1" cnt="1">
+        <dgm:layoutNode name="sp">
+          <dgm:alg type="sp"/>
+          <dgm:shape xmlns:r="http://schemas.openxmlformats.org/officeDocument/2006/relationships" r:blip="">
+            <dgm:adjLst/>
+          </dgm:shape>
+          <dgm:presOf axis="self"/>
+          <dgm:constrLst/>
+          <dgm:ruleLst/>
+        </dgm:layoutNode>
+      </dgm:forEach>
+    </dgm:forEach>
+  </dgm:layoutNode>
+</dgm:layoutDef>
+</file>
+
 <file path=ppt/diagrams/quickStyle1.xml><?xml version="1.0" encoding="utf-8"?>
 <dgm:styleDef xmlns:dgm="http://schemas.openxmlformats.org/drawingml/2006/diagram" xmlns:a="http://schemas.openxmlformats.org/drawingml/2006/main" uniqueId="urn:microsoft.com/office/officeart/2005/8/quickstyle/simple5">
   <dgm:title val=""/>
@@ -11883,6 +13699,1040 @@
 </file>
 
 <file path=ppt/diagrams/quickStyle4.xml><?xml version="1.0" encoding="utf-8"?>
+<dgm:styleDef xmlns:dgm="http://schemas.openxmlformats.org/drawingml/2006/diagram" xmlns:a="http://schemas.openxmlformats.org/drawingml/2006/main" uniqueId="urn:microsoft.com/office/officeart/2005/8/quickstyle/simple1">
+  <dgm:title val=""/>
+  <dgm:desc val=""/>
+  <dgm:catLst>
+    <dgm:cat type="simple" pri="10100"/>
+  </dgm:catLst>
+  <dgm:scene3d>
+    <a:camera prst="orthographicFront"/>
+    <a:lightRig rig="threePt" dir="t"/>
+  </dgm:scene3d>
+  <dgm:styleLbl name="node0">
+    <dgm:scene3d>
+      <a:camera prst="orthographicFront"/>
+      <a:lightRig rig="threePt" dir="t"/>
+    </dgm:scene3d>
+    <dgm:sp3d/>
+    <dgm:txPr/>
+    <dgm:style>
+      <a:lnRef idx="2">
+        <a:scrgbClr r="0" g="0" b="0"/>
+      </a:lnRef>
+      <a:fillRef idx="1">
+        <a:scrgbClr r="0" g="0" b="0"/>
+      </a:fillRef>
+      <a:effectRef idx="0">
+        <a:scrgbClr r="0" g="0" b="0"/>
+      </a:effectRef>
+      <a:fontRef idx="minor">
+        <a:schemeClr val="lt1"/>
+      </a:fontRef>
+    </dgm:style>
+  </dgm:styleLbl>
+  <dgm:styleLbl name="lnNode1">
+    <dgm:scene3d>
+      <a:camera prst="orthographicFront"/>
+      <a:lightRig rig="threePt" dir="t"/>
+    </dgm:scene3d>
+    <dgm:sp3d/>
+    <dgm:txPr/>
+    <dgm:style>
+      <a:lnRef idx="2">
+        <a:scrgbClr r="0" g="0" b="0"/>
+      </a:lnRef>
+      <a:fillRef idx="1">
+        <a:scrgbClr r="0" g="0" b="0"/>
+      </a:fillRef>
+      <a:effectRef idx="0">
+        <a:scrgbClr r="0" g="0" b="0"/>
+      </a:effectRef>
+      <a:fontRef idx="minor">
+        <a:schemeClr val="lt1"/>
+      </a:fontRef>
+    </dgm:style>
+  </dgm:styleLbl>
+  <dgm:styleLbl name="vennNode1">
+    <dgm:scene3d>
+      <a:camera prst="orthographicFront"/>
+      <a:lightRig rig="threePt" dir="t"/>
+    </dgm:scene3d>
+    <dgm:sp3d/>
+    <dgm:txPr/>
+    <dgm:style>
+      <a:lnRef idx="2">
+        <a:scrgbClr r="0" g="0" b="0"/>
+      </a:lnRef>
+      <a:fillRef idx="1">
+        <a:scrgbClr r="0" g="0" b="0"/>
+      </a:fillRef>
+      <a:effectRef idx="0">
+        <a:scrgbClr r="0" g="0" b="0"/>
+      </a:effectRef>
+      <a:fontRef idx="minor">
+        <a:schemeClr val="tx1"/>
+      </a:fontRef>
+    </dgm:style>
+  </dgm:styleLbl>
+  <dgm:styleLbl name="alignNode1">
+    <dgm:scene3d>
+      <a:camera prst="orthographicFront"/>
+      <a:lightRig rig="threePt" dir="t"/>
+    </dgm:scene3d>
+    <dgm:sp3d/>
+    <dgm:txPr/>
+    <dgm:style>
+      <a:lnRef idx="2">
+        <a:scrgbClr r="0" g="0" b="0"/>
+      </a:lnRef>
+      <a:fillRef idx="1">
+        <a:scrgbClr r="0" g="0" b="0"/>
+      </a:fillRef>
+      <a:effectRef idx="0">
+        <a:scrgbClr r="0" g="0" b="0"/>
+      </a:effectRef>
+      <a:fontRef idx="minor">
+        <a:schemeClr val="lt1"/>
+      </a:fontRef>
+    </dgm:style>
+  </dgm:styleLbl>
+  <dgm:styleLbl name="node1">
+    <dgm:scene3d>
+      <a:camera prst="orthographicFront"/>
+      <a:lightRig rig="threePt" dir="t"/>
+    </dgm:scene3d>
+    <dgm:sp3d/>
+    <dgm:txPr/>
+    <dgm:style>
+      <a:lnRef idx="2">
+        <a:scrgbClr r="0" g="0" b="0"/>
+      </a:lnRef>
+      <a:fillRef idx="1">
+        <a:scrgbClr r="0" g="0" b="0"/>
+      </a:fillRef>
+      <a:effectRef idx="0">
+        <a:scrgbClr r="0" g="0" b="0"/>
+      </a:effectRef>
+      <a:fontRef idx="minor">
+        <a:schemeClr val="lt1"/>
+      </a:fontRef>
+    </dgm:style>
+  </dgm:styleLbl>
+  <dgm:styleLbl name="node2">
+    <dgm:scene3d>
+      <a:camera prst="orthographicFront"/>
+      <a:lightRig rig="threePt" dir="t"/>
+    </dgm:scene3d>
+    <dgm:sp3d/>
+    <dgm:txPr/>
+    <dgm:style>
+      <a:lnRef idx="2">
+        <a:scrgbClr r="0" g="0" b="0"/>
+      </a:lnRef>
+      <a:fillRef idx="1">
+        <a:scrgbClr r="0" g="0" b="0"/>
+      </a:fillRef>
+      <a:effectRef idx="0">
+        <a:scrgbClr r="0" g="0" b="0"/>
+      </a:effectRef>
+      <a:fontRef idx="minor">
+        <a:schemeClr val="lt1"/>
+      </a:fontRef>
+    </dgm:style>
+  </dgm:styleLbl>
+  <dgm:styleLbl name="node3">
+    <dgm:scene3d>
+      <a:camera prst="orthographicFront"/>
+      <a:lightRig rig="threePt" dir="t"/>
+    </dgm:scene3d>
+    <dgm:sp3d/>
+    <dgm:txPr/>
+    <dgm:style>
+      <a:lnRef idx="2">
+        <a:scrgbClr r="0" g="0" b="0"/>
+      </a:lnRef>
+      <a:fillRef idx="1">
+        <a:scrgbClr r="0" g="0" b="0"/>
+      </a:fillRef>
+      <a:effectRef idx="0">
+        <a:scrgbClr r="0" g="0" b="0"/>
+      </a:effectRef>
+      <a:fontRef idx="minor">
+        <a:schemeClr val="lt1"/>
+      </a:fontRef>
+    </dgm:style>
+  </dgm:styleLbl>
+  <dgm:styleLbl name="node4">
+    <dgm:scene3d>
+      <a:camera prst="orthographicFront"/>
+      <a:lightRig rig="threePt" dir="t"/>
+    </dgm:scene3d>
+    <dgm:sp3d/>
+    <dgm:txPr/>
+    <dgm:style>
+      <a:lnRef idx="2">
+        <a:scrgbClr r="0" g="0" b="0"/>
+      </a:lnRef>
+      <a:fillRef idx="1">
+        <a:scrgbClr r="0" g="0" b="0"/>
+      </a:fillRef>
+      <a:effectRef idx="0">
+        <a:scrgbClr r="0" g="0" b="0"/>
+      </a:effectRef>
+      <a:fontRef idx="minor">
+        <a:schemeClr val="lt1"/>
+      </a:fontRef>
+    </dgm:style>
+  </dgm:styleLbl>
+  <dgm:styleLbl name="fgImgPlace1">
+    <dgm:scene3d>
+      <a:camera prst="orthographicFront"/>
+      <a:lightRig rig="threePt" dir="t"/>
+    </dgm:scene3d>
+    <dgm:sp3d/>
+    <dgm:txPr/>
+    <dgm:style>
+      <a:lnRef idx="2">
+        <a:scrgbClr r="0" g="0" b="0"/>
+      </a:lnRef>
+      <a:fillRef idx="1">
+        <a:scrgbClr r="0" g="0" b="0"/>
+      </a:fillRef>
+      <a:effectRef idx="0">
+        <a:scrgbClr r="0" g="0" b="0"/>
+      </a:effectRef>
+      <a:fontRef idx="minor"/>
+    </dgm:style>
+  </dgm:styleLbl>
+  <dgm:styleLbl name="alignImgPlace1">
+    <dgm:scene3d>
+      <a:camera prst="orthographicFront"/>
+      <a:lightRig rig="threePt" dir="t"/>
+    </dgm:scene3d>
+    <dgm:sp3d/>
+    <dgm:txPr/>
+    <dgm:style>
+      <a:lnRef idx="2">
+        <a:scrgbClr r="0" g="0" b="0"/>
+      </a:lnRef>
+      <a:fillRef idx="1">
+        <a:scrgbClr r="0" g="0" b="0"/>
+      </a:fillRef>
+      <a:effectRef idx="0">
+        <a:scrgbClr r="0" g="0" b="0"/>
+      </a:effectRef>
+      <a:fontRef idx="minor"/>
+    </dgm:style>
+  </dgm:styleLbl>
+  <dgm:styleLbl name="bgImgPlace1">
+    <dgm:scene3d>
+      <a:camera prst="orthographicFront"/>
+      <a:lightRig rig="threePt" dir="t"/>
+    </dgm:scene3d>
+    <dgm:sp3d/>
+    <dgm:txPr/>
+    <dgm:style>
+      <a:lnRef idx="2">
+        <a:scrgbClr r="0" g="0" b="0"/>
+      </a:lnRef>
+      <a:fillRef idx="1">
+        <a:scrgbClr r="0" g="0" b="0"/>
+      </a:fillRef>
+      <a:effectRef idx="0">
+        <a:scrgbClr r="0" g="0" b="0"/>
+      </a:effectRef>
+      <a:fontRef idx="minor"/>
+    </dgm:style>
+  </dgm:styleLbl>
+  <dgm:styleLbl name="sibTrans2D1">
+    <dgm:scene3d>
+      <a:camera prst="orthographicFront"/>
+      <a:lightRig rig="threePt" dir="t"/>
+    </dgm:scene3d>
+    <dgm:sp3d/>
+    <dgm:txPr/>
+    <dgm:style>
+      <a:lnRef idx="0">
+        <a:scrgbClr r="0" g="0" b="0"/>
+      </a:lnRef>
+      <a:fillRef idx="1">
+        <a:scrgbClr r="0" g="0" b="0"/>
+      </a:fillRef>
+      <a:effectRef idx="0">
+        <a:scrgbClr r="0" g="0" b="0"/>
+      </a:effectRef>
+      <a:fontRef idx="minor">
+        <a:schemeClr val="lt1"/>
+      </a:fontRef>
+    </dgm:style>
+  </dgm:styleLbl>
+  <dgm:styleLbl name="fgSibTrans2D1">
+    <dgm:scene3d>
+      <a:camera prst="orthographicFront"/>
+      <a:lightRig rig="threePt" dir="t"/>
+    </dgm:scene3d>
+    <dgm:sp3d/>
+    <dgm:txPr/>
+    <dgm:style>
+      <a:lnRef idx="0">
+        <a:scrgbClr r="0" g="0" b="0"/>
+      </a:lnRef>
+      <a:fillRef idx="1">
+        <a:scrgbClr r="0" g="0" b="0"/>
+      </a:fillRef>
+      <a:effectRef idx="0">
+        <a:scrgbClr r="0" g="0" b="0"/>
+      </a:effectRef>
+      <a:fontRef idx="minor">
+        <a:schemeClr val="lt1"/>
+      </a:fontRef>
+    </dgm:style>
+  </dgm:styleLbl>
+  <dgm:styleLbl name="bgSibTrans2D1">
+    <dgm:scene3d>
+      <a:camera prst="orthographicFront"/>
+      <a:lightRig rig="threePt" dir="t"/>
+    </dgm:scene3d>
+    <dgm:sp3d/>
+    <dgm:txPr/>
+    <dgm:style>
+      <a:lnRef idx="0">
+        <a:scrgbClr r="0" g="0" b="0"/>
+      </a:lnRef>
+      <a:fillRef idx="1">
+        <a:scrgbClr r="0" g="0" b="0"/>
+      </a:fillRef>
+      <a:effectRef idx="0">
+        <a:scrgbClr r="0" g="0" b="0"/>
+      </a:effectRef>
+      <a:fontRef idx="minor">
+        <a:schemeClr val="lt1"/>
+      </a:fontRef>
+    </dgm:style>
+  </dgm:styleLbl>
+  <dgm:styleLbl name="sibTrans1D1">
+    <dgm:scene3d>
+      <a:camera prst="orthographicFront"/>
+      <a:lightRig rig="threePt" dir="t"/>
+    </dgm:scene3d>
+    <dgm:sp3d/>
+    <dgm:txPr/>
+    <dgm:style>
+      <a:lnRef idx="1">
+        <a:scrgbClr r="0" g="0" b="0"/>
+      </a:lnRef>
+      <a:fillRef idx="0">
+        <a:scrgbClr r="0" g="0" b="0"/>
+      </a:fillRef>
+      <a:effectRef idx="0">
+        <a:scrgbClr r="0" g="0" b="0"/>
+      </a:effectRef>
+      <a:fontRef idx="minor"/>
+    </dgm:style>
+  </dgm:styleLbl>
+  <dgm:styleLbl name="callout">
+    <dgm:scene3d>
+      <a:camera prst="orthographicFront"/>
+      <a:lightRig rig="threePt" dir="t"/>
+    </dgm:scene3d>
+    <dgm:sp3d/>
+    <dgm:txPr/>
+    <dgm:style>
+      <a:lnRef idx="2">
+        <a:scrgbClr r="0" g="0" b="0"/>
+      </a:lnRef>
+      <a:fillRef idx="1">
+        <a:scrgbClr r="0" g="0" b="0"/>
+      </a:fillRef>
+      <a:effectRef idx="0">
+        <a:scrgbClr r="0" g="0" b="0"/>
+      </a:effectRef>
+      <a:fontRef idx="minor"/>
+    </dgm:style>
+  </dgm:styleLbl>
+  <dgm:styleLbl name="asst0">
+    <dgm:scene3d>
+      <a:camera prst="orthographicFront"/>
+      <a:lightRig rig="threePt" dir="t"/>
+    </dgm:scene3d>
+    <dgm:sp3d/>
+    <dgm:txPr/>
+    <dgm:style>
+      <a:lnRef idx="2">
+        <a:scrgbClr r="0" g="0" b="0"/>
+      </a:lnRef>
+      <a:fillRef idx="1">
+        <a:scrgbClr r="0" g="0" b="0"/>
+      </a:fillRef>
+      <a:effectRef idx="0">
+        <a:scrgbClr r="0" g="0" b="0"/>
+      </a:effectRef>
+      <a:fontRef idx="minor">
+        <a:schemeClr val="lt1"/>
+      </a:fontRef>
+    </dgm:style>
+  </dgm:styleLbl>
+  <dgm:styleLbl name="asst1">
+    <dgm:scene3d>
+      <a:camera prst="orthographicFront"/>
+      <a:lightRig rig="threePt" dir="t"/>
+    </dgm:scene3d>
+    <dgm:sp3d/>
+    <dgm:txPr/>
+    <dgm:style>
+      <a:lnRef idx="2">
+        <a:scrgbClr r="0" g="0" b="0"/>
+      </a:lnRef>
+      <a:fillRef idx="1">
+        <a:scrgbClr r="0" g="0" b="0"/>
+      </a:fillRef>
+      <a:effectRef idx="0">
+        <a:scrgbClr r="0" g="0" b="0"/>
+      </a:effectRef>
+      <a:fontRef idx="minor">
+        <a:schemeClr val="lt1"/>
+      </a:fontRef>
+    </dgm:style>
+  </dgm:styleLbl>
+  <dgm:styleLbl name="asst2">
+    <dgm:scene3d>
+      <a:camera prst="orthographicFront"/>
+      <a:lightRig rig="threePt" dir="t"/>
+    </dgm:scene3d>
+    <dgm:sp3d/>
+    <dgm:txPr/>
+    <dgm:style>
+      <a:lnRef idx="2">
+        <a:scrgbClr r="0" g="0" b="0"/>
+      </a:lnRef>
+      <a:fillRef idx="1">
+        <a:scrgbClr r="0" g="0" b="0"/>
+      </a:fillRef>
+      <a:effectRef idx="0">
+        <a:scrgbClr r="0" g="0" b="0"/>
+      </a:effectRef>
+      <a:fontRef idx="minor">
+        <a:schemeClr val="lt1"/>
+      </a:fontRef>
+    </dgm:style>
+  </dgm:styleLbl>
+  <dgm:styleLbl name="asst3">
+    <dgm:scene3d>
+      <a:camera prst="orthographicFront"/>
+      <a:lightRig rig="threePt" dir="t"/>
+    </dgm:scene3d>
+    <dgm:sp3d/>
+    <dgm:txPr/>
+    <dgm:style>
+      <a:lnRef idx="2">
+        <a:scrgbClr r="0" g="0" b="0"/>
+      </a:lnRef>
+      <a:fillRef idx="1">
+        <a:scrgbClr r="0" g="0" b="0"/>
+      </a:fillRef>
+      <a:effectRef idx="0">
+        <a:scrgbClr r="0" g="0" b="0"/>
+      </a:effectRef>
+      <a:fontRef idx="minor">
+        <a:schemeClr val="lt1"/>
+      </a:fontRef>
+    </dgm:style>
+  </dgm:styleLbl>
+  <dgm:styleLbl name="asst4">
+    <dgm:scene3d>
+      <a:camera prst="orthographicFront"/>
+      <a:lightRig rig="threePt" dir="t"/>
+    </dgm:scene3d>
+    <dgm:sp3d/>
+    <dgm:txPr/>
+    <dgm:style>
+      <a:lnRef idx="2">
+        <a:scrgbClr r="0" g="0" b="0"/>
+      </a:lnRef>
+      <a:fillRef idx="1">
+        <a:scrgbClr r="0" g="0" b="0"/>
+      </a:fillRef>
+      <a:effectRef idx="0">
+        <a:scrgbClr r="0" g="0" b="0"/>
+      </a:effectRef>
+      <a:fontRef idx="minor">
+        <a:schemeClr val="lt1"/>
+      </a:fontRef>
+    </dgm:style>
+  </dgm:styleLbl>
+  <dgm:styleLbl name="parChTrans2D1">
+    <dgm:scene3d>
+      <a:camera prst="orthographicFront"/>
+      <a:lightRig rig="threePt" dir="t"/>
+    </dgm:scene3d>
+    <dgm:sp3d/>
+    <dgm:txPr/>
+    <dgm:style>
+      <a:lnRef idx="2">
+        <a:scrgbClr r="0" g="0" b="0"/>
+      </a:lnRef>
+      <a:fillRef idx="1">
+        <a:scrgbClr r="0" g="0" b="0"/>
+      </a:fillRef>
+      <a:effectRef idx="0">
+        <a:scrgbClr r="0" g="0" b="0"/>
+      </a:effectRef>
+      <a:fontRef idx="minor">
+        <a:schemeClr val="lt1"/>
+      </a:fontRef>
+    </dgm:style>
+  </dgm:styleLbl>
+  <dgm:styleLbl name="parChTrans2D2">
+    <dgm:scene3d>
+      <a:camera prst="orthographicFront"/>
+      <a:lightRig rig="threePt" dir="t"/>
+    </dgm:scene3d>
+    <dgm:sp3d/>
+    <dgm:txPr/>
+    <dgm:style>
+      <a:lnRef idx="2">
+        <a:scrgbClr r="0" g="0" b="0"/>
+      </a:lnRef>
+      <a:fillRef idx="1">
+        <a:scrgbClr r="0" g="0" b="0"/>
+      </a:fillRef>
+      <a:effectRef idx="0">
+        <a:scrgbClr r="0" g="0" b="0"/>
+      </a:effectRef>
+      <a:fontRef idx="minor">
+        <a:schemeClr val="lt1"/>
+      </a:fontRef>
+    </dgm:style>
+  </dgm:styleLbl>
+  <dgm:styleLbl name="parChTrans2D3">
+    <dgm:scene3d>
+      <a:camera prst="orthographicFront"/>
+      <a:lightRig rig="threePt" dir="t"/>
+    </dgm:scene3d>
+    <dgm:sp3d/>
+    <dgm:txPr/>
+    <dgm:style>
+      <a:lnRef idx="2">
+        <a:scrgbClr r="0" g="0" b="0"/>
+      </a:lnRef>
+      <a:fillRef idx="1">
+        <a:scrgbClr r="0" g="0" b="0"/>
+      </a:fillRef>
+      <a:effectRef idx="0">
+        <a:scrgbClr r="0" g="0" b="0"/>
+      </a:effectRef>
+      <a:fontRef idx="minor">
+        <a:schemeClr val="lt1"/>
+      </a:fontRef>
+    </dgm:style>
+  </dgm:styleLbl>
+  <dgm:styleLbl name="parChTrans2D4">
+    <dgm:scene3d>
+      <a:camera prst="orthographicFront"/>
+      <a:lightRig rig="threePt" dir="t"/>
+    </dgm:scene3d>
+    <dgm:sp3d/>
+    <dgm:txPr/>
+    <dgm:style>
+      <a:lnRef idx="2">
+        <a:scrgbClr r="0" g="0" b="0"/>
+      </a:lnRef>
+      <a:fillRef idx="1">
+        <a:scrgbClr r="0" g="0" b="0"/>
+      </a:fillRef>
+      <a:effectRef idx="0">
+        <a:scrgbClr r="0" g="0" b="0"/>
+      </a:effectRef>
+      <a:fontRef idx="minor">
+        <a:schemeClr val="lt1"/>
+      </a:fontRef>
+    </dgm:style>
+  </dgm:styleLbl>
+  <dgm:styleLbl name="parChTrans1D1">
+    <dgm:scene3d>
+      <a:camera prst="orthographicFront"/>
+      <a:lightRig rig="threePt" dir="t"/>
+    </dgm:scene3d>
+    <dgm:sp3d/>
+    <dgm:txPr/>
+    <dgm:style>
+      <a:lnRef idx="2">
+        <a:scrgbClr r="0" g="0" b="0"/>
+      </a:lnRef>
+      <a:fillRef idx="0">
+        <a:scrgbClr r="0" g="0" b="0"/>
+      </a:fillRef>
+      <a:effectRef idx="0">
+        <a:scrgbClr r="0" g="0" b="0"/>
+      </a:effectRef>
+      <a:fontRef idx="minor"/>
+    </dgm:style>
+  </dgm:styleLbl>
+  <dgm:styleLbl name="parChTrans1D2">
+    <dgm:scene3d>
+      <a:camera prst="orthographicFront"/>
+      <a:lightRig rig="threePt" dir="t"/>
+    </dgm:scene3d>
+    <dgm:sp3d/>
+    <dgm:txPr/>
+    <dgm:style>
+      <a:lnRef idx="2">
+        <a:scrgbClr r="0" g="0" b="0"/>
+      </a:lnRef>
+      <a:fillRef idx="0">
+        <a:scrgbClr r="0" g="0" b="0"/>
+      </a:fillRef>
+      <a:effectRef idx="0">
+        <a:scrgbClr r="0" g="0" b="0"/>
+      </a:effectRef>
+      <a:fontRef idx="minor"/>
+    </dgm:style>
+  </dgm:styleLbl>
+  <dgm:styleLbl name="parChTrans1D3">
+    <dgm:scene3d>
+      <a:camera prst="orthographicFront"/>
+      <a:lightRig rig="threePt" dir="t"/>
+    </dgm:scene3d>
+    <dgm:sp3d/>
+    <dgm:txPr/>
+    <dgm:style>
+      <a:lnRef idx="2">
+        <a:scrgbClr r="0" g="0" b="0"/>
+      </a:lnRef>
+      <a:fillRef idx="0">
+        <a:scrgbClr r="0" g="0" b="0"/>
+      </a:fillRef>
+      <a:effectRef idx="0">
+        <a:scrgbClr r="0" g="0" b="0"/>
+      </a:effectRef>
+      <a:fontRef idx="minor"/>
+    </dgm:style>
+  </dgm:styleLbl>
+  <dgm:styleLbl name="parChTrans1D4">
+    <dgm:scene3d>
+      <a:camera prst="orthographicFront"/>
+      <a:lightRig rig="threePt" dir="t"/>
+    </dgm:scene3d>
+    <dgm:sp3d/>
+    <dgm:txPr/>
+    <dgm:style>
+      <a:lnRef idx="2">
+        <a:scrgbClr r="0" g="0" b="0"/>
+      </a:lnRef>
+      <a:fillRef idx="0">
+        <a:scrgbClr r="0" g="0" b="0"/>
+      </a:fillRef>
+      <a:effectRef idx="0">
+        <a:scrgbClr r="0" g="0" b="0"/>
+      </a:effectRef>
+      <a:fontRef idx="minor"/>
+    </dgm:style>
+  </dgm:styleLbl>
+  <dgm:styleLbl name="fgAcc1">
+    <dgm:scene3d>
+      <a:camera prst="orthographicFront"/>
+      <a:lightRig rig="threePt" dir="t"/>
+    </dgm:scene3d>
+    <dgm:sp3d/>
+    <dgm:txPr/>
+    <dgm:style>
+      <a:lnRef idx="2">
+        <a:scrgbClr r="0" g="0" b="0"/>
+      </a:lnRef>
+      <a:fillRef idx="1">
+        <a:scrgbClr r="0" g="0" b="0"/>
+      </a:fillRef>
+      <a:effectRef idx="0">
+        <a:scrgbClr r="0" g="0" b="0"/>
+      </a:effectRef>
+      <a:fontRef idx="minor"/>
+    </dgm:style>
+  </dgm:styleLbl>
+  <dgm:styleLbl name="conFgAcc1">
+    <dgm:scene3d>
+      <a:camera prst="orthographicFront"/>
+      <a:lightRig rig="threePt" dir="t"/>
+    </dgm:scene3d>
+    <dgm:sp3d/>
+    <dgm:txPr/>
+    <dgm:style>
+      <a:lnRef idx="2">
+        <a:scrgbClr r="0" g="0" b="0"/>
+      </a:lnRef>
+      <a:fillRef idx="1">
+        <a:scrgbClr r="0" g="0" b="0"/>
+      </a:fillRef>
+      <a:effectRef idx="0">
+        <a:scrgbClr r="0" g="0" b="0"/>
+      </a:effectRef>
+      <a:fontRef idx="minor"/>
+    </dgm:style>
+  </dgm:styleLbl>
+  <dgm:styleLbl name="alignAcc1">
+    <dgm:scene3d>
+      <a:camera prst="orthographicFront"/>
+      <a:lightRig rig="threePt" dir="t"/>
+    </dgm:scene3d>
+    <dgm:sp3d/>
+    <dgm:txPr/>
+    <dgm:style>
+      <a:lnRef idx="2">
+        <a:scrgbClr r="0" g="0" b="0"/>
+      </a:lnRef>
+      <a:fillRef idx="1">
+        <a:scrgbClr r="0" g="0" b="0"/>
+      </a:fillRef>
+      <a:effectRef idx="0">
+        <a:scrgbClr r="0" g="0" b="0"/>
+      </a:effectRef>
+      <a:fontRef idx="minor"/>
+    </dgm:style>
+  </dgm:styleLbl>
+  <dgm:styleLbl name="trAlignAcc1">
+    <dgm:scene3d>
+      <a:camera prst="orthographicFront"/>
+      <a:lightRig rig="threePt" dir="t"/>
+    </dgm:scene3d>
+    <dgm:sp3d/>
+    <dgm:txPr/>
+    <dgm:style>
+      <a:lnRef idx="1">
+        <a:scrgbClr r="0" g="0" b="0"/>
+      </a:lnRef>
+      <a:fillRef idx="1">
+        <a:scrgbClr r="0" g="0" b="0"/>
+      </a:fillRef>
+      <a:effectRef idx="0">
+        <a:scrgbClr r="0" g="0" b="0"/>
+      </a:effectRef>
+      <a:fontRef idx="minor"/>
+    </dgm:style>
+  </dgm:styleLbl>
+  <dgm:styleLbl name="bgAcc1">
+    <dgm:scene3d>
+      <a:camera prst="orthographicFront"/>
+      <a:lightRig rig="threePt" dir="t"/>
+    </dgm:scene3d>
+    <dgm:sp3d/>
+    <dgm:txPr/>
+    <dgm:style>
+      <a:lnRef idx="2">
+        <a:scrgbClr r="0" g="0" b="0"/>
+      </a:lnRef>
+      <a:fillRef idx="1">
+        <a:scrgbClr r="0" g="0" b="0"/>
+      </a:fillRef>
+      <a:effectRef idx="0">
+        <a:scrgbClr r="0" g="0" b="0"/>
+      </a:effectRef>
+      <a:fontRef idx="minor"/>
+    </dgm:style>
+  </dgm:styleLbl>
+  <dgm:styleLbl name="solidFgAcc1">
+    <dgm:scene3d>
+      <a:camera prst="orthographicFront"/>
+      <a:lightRig rig="threePt" dir="t"/>
+    </dgm:scene3d>
+    <dgm:sp3d/>
+    <dgm:txPr/>
+    <dgm:style>
+      <a:lnRef idx="2">
+        <a:scrgbClr r="0" g="0" b="0"/>
+      </a:lnRef>
+      <a:fillRef idx="1">
+        <a:scrgbClr r="0" g="0" b="0"/>
+      </a:fillRef>
+      <a:effectRef idx="0">
+        <a:scrgbClr r="0" g="0" b="0"/>
+      </a:effectRef>
+      <a:fontRef idx="minor"/>
+    </dgm:style>
+  </dgm:styleLbl>
+  <dgm:styleLbl name="solidAlignAcc1">
+    <dgm:scene3d>
+      <a:camera prst="orthographicFront"/>
+      <a:lightRig rig="threePt" dir="t"/>
+    </dgm:scene3d>
+    <dgm:sp3d/>
+    <dgm:txPr/>
+    <dgm:style>
+      <a:lnRef idx="2">
+        <a:scrgbClr r="0" g="0" b="0"/>
+      </a:lnRef>
+      <a:fillRef idx="1">
+        <a:scrgbClr r="0" g="0" b="0"/>
+      </a:fillRef>
+      <a:effectRef idx="0">
+        <a:scrgbClr r="0" g="0" b="0"/>
+      </a:effectRef>
+      <a:fontRef idx="minor"/>
+    </dgm:style>
+  </dgm:styleLbl>
+  <dgm:styleLbl name="solidBgAcc1">
+    <dgm:scene3d>
+      <a:camera prst="orthographicFront"/>
+      <a:lightRig rig="threePt" dir="t"/>
+    </dgm:scene3d>
+    <dgm:sp3d/>
+    <dgm:txPr/>
+    <dgm:style>
+      <a:lnRef idx="2">
+        <a:scrgbClr r="0" g="0" b="0"/>
+      </a:lnRef>
+      <a:fillRef idx="1">
+        <a:scrgbClr r="0" g="0" b="0"/>
+      </a:fillRef>
+      <a:effectRef idx="0">
+        <a:scrgbClr r="0" g="0" b="0"/>
+      </a:effectRef>
+      <a:fontRef idx="minor"/>
+    </dgm:style>
+  </dgm:styleLbl>
+  <dgm:styleLbl name="fgAccFollowNode1">
+    <dgm:scene3d>
+      <a:camera prst="orthographicFront"/>
+      <a:lightRig rig="threePt" dir="t"/>
+    </dgm:scene3d>
+    <dgm:sp3d/>
+    <dgm:txPr/>
+    <dgm:style>
+      <a:lnRef idx="2">
+        <a:scrgbClr r="0" g="0" b="0"/>
+      </a:lnRef>
+      <a:fillRef idx="1">
+        <a:scrgbClr r="0" g="0" b="0"/>
+      </a:fillRef>
+      <a:effectRef idx="0">
+        <a:scrgbClr r="0" g="0" b="0"/>
+      </a:effectRef>
+      <a:fontRef idx="minor"/>
+    </dgm:style>
+  </dgm:styleLbl>
+  <dgm:styleLbl name="alignAccFollowNode1">
+    <dgm:scene3d>
+      <a:camera prst="orthographicFront"/>
+      <a:lightRig rig="threePt" dir="t"/>
+    </dgm:scene3d>
+    <dgm:sp3d/>
+    <dgm:txPr/>
+    <dgm:style>
+      <a:lnRef idx="2">
+        <a:scrgbClr r="0" g="0" b="0"/>
+      </a:lnRef>
+      <a:fillRef idx="1">
+        <a:scrgbClr r="0" g="0" b="0"/>
+      </a:fillRef>
+      <a:effectRef idx="0">
+        <a:scrgbClr r="0" g="0" b="0"/>
+      </a:effectRef>
+      <a:fontRef idx="minor"/>
+    </dgm:style>
+  </dgm:styleLbl>
+  <dgm:styleLbl name="bgAccFollowNode1">
+    <dgm:scene3d>
+      <a:camera prst="orthographicFront"/>
+      <a:lightRig rig="threePt" dir="t"/>
+    </dgm:scene3d>
+    <dgm:sp3d/>
+    <dgm:txPr/>
+    <dgm:style>
+      <a:lnRef idx="2">
+        <a:scrgbClr r="0" g="0" b="0"/>
+      </a:lnRef>
+      <a:fillRef idx="1">
+        <a:scrgbClr r="0" g="0" b="0"/>
+      </a:fillRef>
+      <a:effectRef idx="0">
+        <a:scrgbClr r="0" g="0" b="0"/>
+      </a:effectRef>
+      <a:fontRef idx="minor"/>
+    </dgm:style>
+  </dgm:styleLbl>
+  <dgm:styleLbl name="fgAcc0">
+    <dgm:scene3d>
+      <a:camera prst="orthographicFront"/>
+      <a:lightRig rig="threePt" dir="t"/>
+    </dgm:scene3d>
+    <dgm:sp3d/>
+    <dgm:txPr/>
+    <dgm:style>
+      <a:lnRef idx="2">
+        <a:scrgbClr r="0" g="0" b="0"/>
+      </a:lnRef>
+      <a:fillRef idx="1">
+        <a:scrgbClr r="0" g="0" b="0"/>
+      </a:fillRef>
+      <a:effectRef idx="0">
+        <a:scrgbClr r="0" g="0" b="0"/>
+      </a:effectRef>
+      <a:fontRef idx="minor"/>
+    </dgm:style>
+  </dgm:styleLbl>
+  <dgm:styleLbl name="fgAcc2">
+    <dgm:scene3d>
+      <a:camera prst="orthographicFront"/>
+      <a:lightRig rig="threePt" dir="t"/>
+    </dgm:scene3d>
+    <dgm:sp3d/>
+    <dgm:txPr/>
+    <dgm:style>
+      <a:lnRef idx="2">
+        <a:scrgbClr r="0" g="0" b="0"/>
+      </a:lnRef>
+      <a:fillRef idx="1">
+        <a:scrgbClr r="0" g="0" b="0"/>
+      </a:fillRef>
+      <a:effectRef idx="0">
+        <a:scrgbClr r="0" g="0" b="0"/>
+      </a:effectRef>
+      <a:fontRef idx="minor"/>
+    </dgm:style>
+  </dgm:styleLbl>
+  <dgm:styleLbl name="fgAcc3">
+    <dgm:scene3d>
+      <a:camera prst="orthographicFront"/>
+      <a:lightRig rig="threePt" dir="t"/>
+    </dgm:scene3d>
+    <dgm:sp3d/>
+    <dgm:txPr/>
+    <dgm:style>
+      <a:lnRef idx="2">
+        <a:scrgbClr r="0" g="0" b="0"/>
+      </a:lnRef>
+      <a:fillRef idx="1">
+        <a:scrgbClr r="0" g="0" b="0"/>
+      </a:fillRef>
+      <a:effectRef idx="0">
+        <a:scrgbClr r="0" g="0" b="0"/>
+      </a:effectRef>
+      <a:fontRef idx="minor"/>
+    </dgm:style>
+  </dgm:styleLbl>
+  <dgm:styleLbl name="fgAcc4">
+    <dgm:scene3d>
+      <a:camera prst="orthographicFront"/>
+      <a:lightRig rig="threePt" dir="t"/>
+    </dgm:scene3d>
+    <dgm:sp3d/>
+    <dgm:txPr/>
+    <dgm:style>
+      <a:lnRef idx="2">
+        <a:scrgbClr r="0" g="0" b="0"/>
+      </a:lnRef>
+      <a:fillRef idx="1">
+        <a:scrgbClr r="0" g="0" b="0"/>
+      </a:fillRef>
+      <a:effectRef idx="0">
+        <a:scrgbClr r="0" g="0" b="0"/>
+      </a:effectRef>
+      <a:fontRef idx="minor"/>
+    </dgm:style>
+  </dgm:styleLbl>
+  <dgm:styleLbl name="bgShp">
+    <dgm:scene3d>
+      <a:camera prst="orthographicFront"/>
+      <a:lightRig rig="threePt" dir="t"/>
+    </dgm:scene3d>
+    <dgm:sp3d/>
+    <dgm:txPr/>
+    <dgm:style>
+      <a:lnRef idx="0">
+        <a:scrgbClr r="0" g="0" b="0"/>
+      </a:lnRef>
+      <a:fillRef idx="1">
+        <a:scrgbClr r="0" g="0" b="0"/>
+      </a:fillRef>
+      <a:effectRef idx="0">
+        <a:scrgbClr r="0" g="0" b="0"/>
+      </a:effectRef>
+      <a:fontRef idx="minor"/>
+    </dgm:style>
+  </dgm:styleLbl>
+  <dgm:styleLbl name="dkBgShp">
+    <dgm:scene3d>
+      <a:camera prst="orthographicFront"/>
+      <a:lightRig rig="threePt" dir="t"/>
+    </dgm:scene3d>
+    <dgm:sp3d/>
+    <dgm:txPr/>
+    <dgm:style>
+      <a:lnRef idx="0">
+        <a:scrgbClr r="0" g="0" b="0"/>
+      </a:lnRef>
+      <a:fillRef idx="1">
+        <a:scrgbClr r="0" g="0" b="0"/>
+      </a:fillRef>
+      <a:effectRef idx="0">
+        <a:scrgbClr r="0" g="0" b="0"/>
+      </a:effectRef>
+      <a:fontRef idx="minor"/>
+    </dgm:style>
+  </dgm:styleLbl>
+  <dgm:styleLbl name="trBgShp">
+    <dgm:scene3d>
+      <a:camera prst="orthographicFront"/>
+      <a:lightRig rig="threePt" dir="t"/>
+    </dgm:scene3d>
+    <dgm:sp3d/>
+    <dgm:txPr/>
+    <dgm:style>
+      <a:lnRef idx="0">
+        <a:scrgbClr r="0" g="0" b="0"/>
+      </a:lnRef>
+      <a:fillRef idx="1">
+        <a:scrgbClr r="0" g="0" b="0"/>
+      </a:fillRef>
+      <a:effectRef idx="0">
+        <a:scrgbClr r="0" g="0" b="0"/>
+      </a:effectRef>
+      <a:fontRef idx="minor"/>
+    </dgm:style>
+  </dgm:styleLbl>
+  <dgm:styleLbl name="fgShp">
+    <dgm:scene3d>
+      <a:camera prst="orthographicFront"/>
+      <a:lightRig rig="threePt" dir="t"/>
+    </dgm:scene3d>
+    <dgm:sp3d/>
+    <dgm:txPr/>
+    <dgm:style>
+      <a:lnRef idx="2">
+        <a:scrgbClr r="0" g="0" b="0"/>
+      </a:lnRef>
+      <a:fillRef idx="1">
+        <a:scrgbClr r="0" g="0" b="0"/>
+      </a:fillRef>
+      <a:effectRef idx="0">
+        <a:scrgbClr r="0" g="0" b="0"/>
+      </a:effectRef>
+      <a:fontRef idx="minor"/>
+    </dgm:style>
+  </dgm:styleLbl>
+  <dgm:styleLbl name="revTx">
+    <dgm:scene3d>
+      <a:camera prst="orthographicFront"/>
+      <a:lightRig rig="threePt" dir="t"/>
+    </dgm:scene3d>
+    <dgm:sp3d/>
+    <dgm:txPr/>
+    <dgm:style>
+      <a:lnRef idx="0">
+        <a:scrgbClr r="0" g="0" b="0"/>
+      </a:lnRef>
+      <a:fillRef idx="0">
+        <a:scrgbClr r="0" g="0" b="0"/>
+      </a:fillRef>
+      <a:effectRef idx="0">
+        <a:scrgbClr r="0" g="0" b="0"/>
+      </a:effectRef>
+      <a:fontRef idx="minor"/>
+    </dgm:style>
+  </dgm:styleLbl>
+</dgm:styleDef>
+</file>
+
+<file path=ppt/diagrams/quickStyle5.xml><?xml version="1.0" encoding="utf-8"?>
 <dgm:styleDef xmlns:dgm="http://schemas.openxmlformats.org/drawingml/2006/diagram" xmlns:a="http://schemas.openxmlformats.org/drawingml/2006/main" uniqueId="urn:microsoft.com/office/officeart/2005/8/quickstyle/simple1">
   <dgm:title val=""/>
   <dgm:desc val=""/>
@@ -13063,7 +15913,7 @@
           <a:p>
             <a:fld id="{90D4E0A7-C40C-472C-9687-D093D3F53AEA}" type="datetimeFigureOut">
               <a:rPr lang="en-US" smtClean="0"/>
-              <a:t>12/12/2018</a:t>
+              <a:t>12/14/2018</a:t>
             </a:fld>
             <a:endParaRPr lang="en-US"/>
           </a:p>
@@ -13261,7 +16111,7 @@
           <a:p>
             <a:fld id="{90D4E0A7-C40C-472C-9687-D093D3F53AEA}" type="datetimeFigureOut">
               <a:rPr lang="en-US" smtClean="0"/>
-              <a:t>12/12/2018</a:t>
+              <a:t>12/14/2018</a:t>
             </a:fld>
             <a:endParaRPr lang="en-US"/>
           </a:p>
@@ -13469,7 +16319,7 @@
           <a:p>
             <a:fld id="{90D4E0A7-C40C-472C-9687-D093D3F53AEA}" type="datetimeFigureOut">
               <a:rPr lang="en-US" smtClean="0"/>
-              <a:t>12/12/2018</a:t>
+              <a:t>12/14/2018</a:t>
             </a:fld>
             <a:endParaRPr lang="en-US"/>
           </a:p>
@@ -13667,7 +16517,7 @@
           <a:p>
             <a:fld id="{90D4E0A7-C40C-472C-9687-D093D3F53AEA}" type="datetimeFigureOut">
               <a:rPr lang="en-US" smtClean="0"/>
-              <a:t>12/12/2018</a:t>
+              <a:t>12/14/2018</a:t>
             </a:fld>
             <a:endParaRPr lang="en-US"/>
           </a:p>
@@ -13942,7 +16792,7 @@
           <a:p>
             <a:fld id="{90D4E0A7-C40C-472C-9687-D093D3F53AEA}" type="datetimeFigureOut">
               <a:rPr lang="en-US" smtClean="0"/>
-              <a:t>12/12/2018</a:t>
+              <a:t>12/14/2018</a:t>
             </a:fld>
             <a:endParaRPr lang="en-US"/>
           </a:p>
@@ -14207,7 +17057,7 @@
           <a:p>
             <a:fld id="{90D4E0A7-C40C-472C-9687-D093D3F53AEA}" type="datetimeFigureOut">
               <a:rPr lang="en-US" smtClean="0"/>
-              <a:t>12/12/2018</a:t>
+              <a:t>12/14/2018</a:t>
             </a:fld>
             <a:endParaRPr lang="en-US"/>
           </a:p>
@@ -14619,7 +17469,7 @@
           <a:p>
             <a:fld id="{90D4E0A7-C40C-472C-9687-D093D3F53AEA}" type="datetimeFigureOut">
               <a:rPr lang="en-US" smtClean="0"/>
-              <a:t>12/12/2018</a:t>
+              <a:t>12/14/2018</a:t>
             </a:fld>
             <a:endParaRPr lang="en-US"/>
           </a:p>
@@ -14760,7 +17610,7 @@
           <a:p>
             <a:fld id="{90D4E0A7-C40C-472C-9687-D093D3F53AEA}" type="datetimeFigureOut">
               <a:rPr lang="en-US" smtClean="0"/>
-              <a:t>12/12/2018</a:t>
+              <a:t>12/14/2018</a:t>
             </a:fld>
             <a:endParaRPr lang="en-US"/>
           </a:p>
@@ -14873,7 +17723,7 @@
           <a:p>
             <a:fld id="{90D4E0A7-C40C-472C-9687-D093D3F53AEA}" type="datetimeFigureOut">
               <a:rPr lang="en-US" smtClean="0"/>
-              <a:t>12/12/2018</a:t>
+              <a:t>12/14/2018</a:t>
             </a:fld>
             <a:endParaRPr lang="en-US"/>
           </a:p>
@@ -15184,7 +18034,7 @@
           <a:p>
             <a:fld id="{90D4E0A7-C40C-472C-9687-D093D3F53AEA}" type="datetimeFigureOut">
               <a:rPr lang="en-US" smtClean="0"/>
-              <a:t>12/12/2018</a:t>
+              <a:t>12/14/2018</a:t>
             </a:fld>
             <a:endParaRPr lang="en-US"/>
           </a:p>
@@ -15472,7 +18322,7 @@
           <a:p>
             <a:fld id="{90D4E0A7-C40C-472C-9687-D093D3F53AEA}" type="datetimeFigureOut">
               <a:rPr lang="en-US" smtClean="0"/>
-              <a:t>12/12/2018</a:t>
+              <a:t>12/14/2018</a:t>
             </a:fld>
             <a:endParaRPr lang="en-US"/>
           </a:p>
@@ -15713,7 +18563,7 @@
           <a:p>
             <a:fld id="{90D4E0A7-C40C-472C-9687-D093D3F53AEA}" type="datetimeFigureOut">
               <a:rPr lang="en-US" smtClean="0"/>
-              <a:t>12/12/2018</a:t>
+              <a:t>12/14/2018</a:t>
             </a:fld>
             <a:endParaRPr lang="en-US"/>
           </a:p>
@@ -16816,7 +19666,7 @@
         </p:nvSpPr>
         <p:spPr>
           <a:xfrm>
-            <a:off x="4515873" y="2124075"/>
+            <a:off x="4515872" y="2124075"/>
             <a:ext cx="1015021" cy="830997"/>
           </a:xfrm>
           <a:prstGeom prst="rect">
@@ -16978,7 +19828,7 @@
         </p:nvSpPr>
         <p:spPr>
           <a:xfrm>
-            <a:off x="6325623" y="3896376"/>
+            <a:off x="6325628" y="3896376"/>
             <a:ext cx="1015021" cy="830997"/>
           </a:xfrm>
           <a:prstGeom prst="rect">
@@ -17048,12 +19898,36 @@
           <a:chExt cx="0" cy="0"/>
         </a:xfrm>
       </p:grpSpPr>
+      <p:graphicFrame>
+        <p:nvGraphicFramePr>
+          <p:cNvPr id="7" name="Diagram 6">
+            <a:extLst>
+              <a:ext uri="{FF2B5EF4-FFF2-40B4-BE49-F238E27FC236}">
+                <a16:creationId xmlns:a16="http://schemas.microsoft.com/office/drawing/2014/main" id="{510BCB13-E2FB-4946-BBF4-7C78531C8573}"/>
+              </a:ext>
+            </a:extLst>
+          </p:cNvPr>
+          <p:cNvGraphicFramePr/>
+          <p:nvPr>
+            <p:extLst/>
+          </p:nvPr>
+        </p:nvGraphicFramePr>
+        <p:xfrm>
+          <a:off x="694612" y="389855"/>
+          <a:ext cx="10802776" cy="6078290"/>
+        </p:xfrm>
+        <a:graphic>
+          <a:graphicData uri="http://schemas.openxmlformats.org/drawingml/2006/diagram">
+            <dgm:relIds xmlns:dgm="http://schemas.openxmlformats.org/drawingml/2006/diagram" xmlns:r="http://schemas.openxmlformats.org/officeDocument/2006/relationships" r:dm="rId2" r:lo="rId3" r:qs="rId4" r:cs="rId5"/>
+          </a:graphicData>
+        </a:graphic>
+      </p:graphicFrame>
       <p:sp>
         <p:nvSpPr>
-          <p:cNvPr id="4" name="Rectangle 3">
+          <p:cNvPr id="4" name="Arrow: Up-Down 3">
             <a:extLst>
               <a:ext uri="{FF2B5EF4-FFF2-40B4-BE49-F238E27FC236}">
-                <a16:creationId xmlns:a16="http://schemas.microsoft.com/office/drawing/2014/main" id="{85E86770-4990-4AE3-A8F8-4FE49F8985CD}"/>
+                <a16:creationId xmlns:a16="http://schemas.microsoft.com/office/drawing/2014/main" id="{6904FB70-7659-4BB1-BBFB-A004C0943B14}"/>
               </a:ext>
             </a:extLst>
           </p:cNvPr>
@@ -17062,12 +19936,15 @@
         </p:nvSpPr>
         <p:spPr>
           <a:xfrm>
-            <a:off x="647701" y="653145"/>
-            <a:ext cx="2647949" cy="3051110"/>
+            <a:off x="1688841" y="261257"/>
+            <a:ext cx="1464906" cy="6382139"/>
           </a:xfrm>
-          <a:prstGeom prst="rect">
+          <a:prstGeom prst="upDownArrow">
             <a:avLst/>
           </a:prstGeom>
+          <a:solidFill>
+            <a:schemeClr val="accent6"/>
+          </a:solidFill>
         </p:spPr>
         <p:style>
           <a:lnRef idx="2">
@@ -17096,10 +19973,10 @@
       </p:sp>
       <p:sp>
         <p:nvSpPr>
-          <p:cNvPr id="6" name="Rectangle 5">
+          <p:cNvPr id="6" name="Arrow: Up-Down 5">
             <a:extLst>
               <a:ext uri="{FF2B5EF4-FFF2-40B4-BE49-F238E27FC236}">
-                <a16:creationId xmlns:a16="http://schemas.microsoft.com/office/drawing/2014/main" id="{343BA7AA-C649-43E9-8980-EFF6B5CBD307}"/>
+                <a16:creationId xmlns:a16="http://schemas.microsoft.com/office/drawing/2014/main" id="{6F6533A5-A064-48E5-A280-7290BAECFD3C}"/>
               </a:ext>
             </a:extLst>
           </p:cNvPr>
@@ -17108,24 +19985,27 @@
         </p:nvSpPr>
         <p:spPr>
           <a:xfrm>
-            <a:off x="3438526" y="653143"/>
-            <a:ext cx="2647949" cy="3051110"/>
+            <a:off x="3949959" y="261257"/>
+            <a:ext cx="1464906" cy="6382139"/>
           </a:xfrm>
-          <a:prstGeom prst="rect">
+          <a:prstGeom prst="upDownArrow">
             <a:avLst/>
           </a:prstGeom>
+          <a:solidFill>
+            <a:schemeClr val="accent5"/>
+          </a:solidFill>
         </p:spPr>
         <p:style>
           <a:lnRef idx="2">
-            <a:schemeClr val="accent1">
+            <a:schemeClr val="accent5">
               <a:shade val="50000"/>
             </a:schemeClr>
           </a:lnRef>
           <a:fillRef idx="1">
-            <a:schemeClr val="accent1"/>
+            <a:schemeClr val="accent5"/>
           </a:fillRef>
           <a:effectRef idx="0">
-            <a:schemeClr val="accent1"/>
+            <a:schemeClr val="accent5"/>
           </a:effectRef>
           <a:fontRef idx="minor">
             <a:schemeClr val="lt1"/>
@@ -17142,10 +20022,10 @@
       </p:sp>
       <p:sp>
         <p:nvSpPr>
-          <p:cNvPr id="7" name="Rectangle 6">
+          <p:cNvPr id="8" name="Arrow: Up-Down 7">
             <a:extLst>
               <a:ext uri="{FF2B5EF4-FFF2-40B4-BE49-F238E27FC236}">
-                <a16:creationId xmlns:a16="http://schemas.microsoft.com/office/drawing/2014/main" id="{D268C448-08A7-4A37-A33C-C8795E19A0B7}"/>
+                <a16:creationId xmlns:a16="http://schemas.microsoft.com/office/drawing/2014/main" id="{07B5E316-6936-4C60-BC54-D89CD5585FFD}"/>
               </a:ext>
             </a:extLst>
           </p:cNvPr>
@@ -17154,12 +20034,15 @@
         </p:nvSpPr>
         <p:spPr>
           <a:xfrm>
-            <a:off x="6229351" y="653143"/>
-            <a:ext cx="2647949" cy="3051110"/>
+            <a:off x="6777137" y="261257"/>
+            <a:ext cx="1464906" cy="6382139"/>
           </a:xfrm>
-          <a:prstGeom prst="rect">
+          <a:prstGeom prst="upDownArrow">
             <a:avLst/>
           </a:prstGeom>
+          <a:solidFill>
+            <a:schemeClr val="accent4"/>
+          </a:solidFill>
         </p:spPr>
         <p:style>
           <a:lnRef idx="2">
@@ -17188,10 +20071,10 @@
       </p:sp>
       <p:sp>
         <p:nvSpPr>
-          <p:cNvPr id="8" name="Rectangle 7">
+          <p:cNvPr id="9" name="Arrow: Up-Down 8">
             <a:extLst>
               <a:ext uri="{FF2B5EF4-FFF2-40B4-BE49-F238E27FC236}">
-                <a16:creationId xmlns:a16="http://schemas.microsoft.com/office/drawing/2014/main" id="{E907507F-E651-4DDF-947F-CA3D55D51CBA}"/>
+                <a16:creationId xmlns:a16="http://schemas.microsoft.com/office/drawing/2014/main" id="{F73C8A14-24F4-4E4F-A8A3-7305A26FA1DA}"/>
               </a:ext>
             </a:extLst>
           </p:cNvPr>
@@ -17200,12 +20083,15 @@
         </p:nvSpPr>
         <p:spPr>
           <a:xfrm>
-            <a:off x="9020176" y="653143"/>
-            <a:ext cx="2647949" cy="3051110"/>
+            <a:off x="9137262" y="261257"/>
+            <a:ext cx="1464906" cy="6382139"/>
           </a:xfrm>
-          <a:prstGeom prst="rect">
+          <a:prstGeom prst="upDownArrow">
             <a:avLst/>
           </a:prstGeom>
+          <a:solidFill>
+            <a:schemeClr val="accent2"/>
+          </a:solidFill>
         </p:spPr>
         <p:style>
           <a:lnRef idx="2">
@@ -17234,6 +20120,432 @@
       </p:sp>
       <p:sp>
         <p:nvSpPr>
+          <p:cNvPr id="2" name="TextBox 1">
+            <a:extLst>
+              <a:ext uri="{FF2B5EF4-FFF2-40B4-BE49-F238E27FC236}">
+                <a16:creationId xmlns:a16="http://schemas.microsoft.com/office/drawing/2014/main" id="{F609FA1F-65C2-44F5-93E2-DA3C71660180}"/>
+              </a:ext>
+            </a:extLst>
+          </p:cNvPr>
+          <p:cNvSpPr txBox="1"/>
+          <p:nvPr/>
+        </p:nvSpPr>
+        <p:spPr>
+          <a:xfrm>
+            <a:off x="2113517" y="2007731"/>
+            <a:ext cx="615553" cy="2889189"/>
+          </a:xfrm>
+          <a:prstGeom prst="rect">
+            <a:avLst/>
+          </a:prstGeom>
+          <a:noFill/>
+        </p:spPr>
+        <p:txBody>
+          <a:bodyPr vert="vert270" wrap="none" rtlCol="0">
+            <a:spAutoFit/>
+          </a:bodyPr>
+          <a:lstStyle/>
+          <a:p>
+            <a:r>
+              <a:rPr lang="en-US" sz="2800" dirty="0"/>
+              <a:t>Bounded Context 1</a:t>
+            </a:r>
+          </a:p>
+        </p:txBody>
+      </p:sp>
+      <p:sp>
+        <p:nvSpPr>
+          <p:cNvPr id="10" name="TextBox 9">
+            <a:extLst>
+              <a:ext uri="{FF2B5EF4-FFF2-40B4-BE49-F238E27FC236}">
+                <a16:creationId xmlns:a16="http://schemas.microsoft.com/office/drawing/2014/main" id="{B567F649-F77C-4F12-B6E6-A4DB9036FC81}"/>
+              </a:ext>
+            </a:extLst>
+          </p:cNvPr>
+          <p:cNvSpPr txBox="1"/>
+          <p:nvPr/>
+        </p:nvSpPr>
+        <p:spPr>
+          <a:xfrm>
+            <a:off x="4374635" y="1984405"/>
+            <a:ext cx="615553" cy="2889189"/>
+          </a:xfrm>
+          <a:prstGeom prst="rect">
+            <a:avLst/>
+          </a:prstGeom>
+          <a:noFill/>
+        </p:spPr>
+        <p:txBody>
+          <a:bodyPr vert="vert270" wrap="none" rtlCol="0">
+            <a:spAutoFit/>
+          </a:bodyPr>
+          <a:lstStyle/>
+          <a:p>
+            <a:r>
+              <a:rPr lang="en-US" sz="2800" dirty="0"/>
+              <a:t>Bounded Context 2</a:t>
+            </a:r>
+          </a:p>
+        </p:txBody>
+      </p:sp>
+      <p:sp>
+        <p:nvSpPr>
+          <p:cNvPr id="11" name="TextBox 10">
+            <a:extLst>
+              <a:ext uri="{FF2B5EF4-FFF2-40B4-BE49-F238E27FC236}">
+                <a16:creationId xmlns:a16="http://schemas.microsoft.com/office/drawing/2014/main" id="{CF56EC9C-05E0-45D6-A171-0E8FB9802B1F}"/>
+              </a:ext>
+            </a:extLst>
+          </p:cNvPr>
+          <p:cNvSpPr txBox="1"/>
+          <p:nvPr/>
+        </p:nvSpPr>
+        <p:spPr>
+          <a:xfrm>
+            <a:off x="7201813" y="1984404"/>
+            <a:ext cx="615553" cy="2889189"/>
+          </a:xfrm>
+          <a:prstGeom prst="rect">
+            <a:avLst/>
+          </a:prstGeom>
+          <a:noFill/>
+        </p:spPr>
+        <p:txBody>
+          <a:bodyPr vert="vert270" wrap="none" rtlCol="0">
+            <a:spAutoFit/>
+          </a:bodyPr>
+          <a:lstStyle/>
+          <a:p>
+            <a:r>
+              <a:rPr lang="en-US" sz="2800" dirty="0"/>
+              <a:t>Bounded Context 3</a:t>
+            </a:r>
+          </a:p>
+        </p:txBody>
+      </p:sp>
+      <p:sp>
+        <p:nvSpPr>
+          <p:cNvPr id="12" name="TextBox 11">
+            <a:extLst>
+              <a:ext uri="{FF2B5EF4-FFF2-40B4-BE49-F238E27FC236}">
+                <a16:creationId xmlns:a16="http://schemas.microsoft.com/office/drawing/2014/main" id="{10268226-E840-43D7-B760-2FDF79558910}"/>
+              </a:ext>
+            </a:extLst>
+          </p:cNvPr>
+          <p:cNvSpPr txBox="1"/>
+          <p:nvPr/>
+        </p:nvSpPr>
+        <p:spPr>
+          <a:xfrm>
+            <a:off x="9561938" y="1984403"/>
+            <a:ext cx="615553" cy="2889189"/>
+          </a:xfrm>
+          <a:prstGeom prst="rect">
+            <a:avLst/>
+          </a:prstGeom>
+          <a:noFill/>
+        </p:spPr>
+        <p:txBody>
+          <a:bodyPr vert="vert270" wrap="none" rtlCol="0">
+            <a:spAutoFit/>
+          </a:bodyPr>
+          <a:lstStyle/>
+          <a:p>
+            <a:r>
+              <a:rPr lang="en-US" sz="2800" dirty="0"/>
+              <a:t>Bounded Context 4</a:t>
+            </a:r>
+          </a:p>
+        </p:txBody>
+      </p:sp>
+    </p:spTree>
+    <p:extLst>
+      <p:ext uri="{BB962C8B-B14F-4D97-AF65-F5344CB8AC3E}">
+        <p14:creationId xmlns:p14="http://schemas.microsoft.com/office/powerpoint/2010/main" val="2663699314"/>
+      </p:ext>
+    </p:extLst>
+  </p:cSld>
+  <p:clrMapOvr>
+    <a:masterClrMapping/>
+  </p:clrMapOvr>
+</p:sld>
+</file>
+
+<file path=ppt/slides/slide6.xml><?xml version="1.0" encoding="utf-8"?>
+<p:sld xmlns:a="http://schemas.openxmlformats.org/drawingml/2006/main" xmlns:r="http://schemas.openxmlformats.org/officeDocument/2006/relationships" xmlns:p="http://schemas.openxmlformats.org/presentationml/2006/main">
+  <p:cSld>
+    <p:spTree>
+      <p:nvGrpSpPr>
+        <p:cNvPr id="1" name=""/>
+        <p:cNvGrpSpPr/>
+        <p:nvPr/>
+      </p:nvGrpSpPr>
+      <p:grpSpPr>
+        <a:xfrm>
+          <a:off x="0" y="0"/>
+          <a:ext cx="0" cy="0"/>
+          <a:chOff x="0" y="0"/>
+          <a:chExt cx="0" cy="0"/>
+        </a:xfrm>
+      </p:grpSpPr>
+      <p:sp>
+        <p:nvSpPr>
+          <p:cNvPr id="15" name="Rectangle 14">
+            <a:extLst>
+              <a:ext uri="{FF2B5EF4-FFF2-40B4-BE49-F238E27FC236}">
+                <a16:creationId xmlns:a16="http://schemas.microsoft.com/office/drawing/2014/main" id="{527C8F35-DC02-456A-A997-39FD7A02F176}"/>
+              </a:ext>
+            </a:extLst>
+          </p:cNvPr>
+          <p:cNvSpPr/>
+          <p:nvPr/>
+        </p:nvSpPr>
+        <p:spPr>
+          <a:xfrm>
+            <a:off x="469783" y="1468073"/>
+            <a:ext cx="11299971" cy="4144162"/>
+          </a:xfrm>
+          <a:prstGeom prst="rect">
+            <a:avLst/>
+          </a:prstGeom>
+          <a:ln/>
+        </p:spPr>
+        <p:style>
+          <a:lnRef idx="0">
+            <a:schemeClr val="dk1"/>
+          </a:lnRef>
+          <a:fillRef idx="3">
+            <a:schemeClr val="dk1"/>
+          </a:fillRef>
+          <a:effectRef idx="3">
+            <a:schemeClr val="dk1"/>
+          </a:effectRef>
+          <a:fontRef idx="minor">
+            <a:schemeClr val="lt1"/>
+          </a:fontRef>
+        </p:style>
+        <p:txBody>
+          <a:bodyPr rtlCol="0" anchor="ctr"/>
+          <a:lstStyle/>
+          <a:p>
+            <a:pPr algn="ctr"/>
+            <a:endParaRPr lang="en-US"/>
+          </a:p>
+        </p:txBody>
+      </p:sp>
+      <p:sp>
+        <p:nvSpPr>
+          <p:cNvPr id="4" name="Rectangle 3">
+            <a:extLst>
+              <a:ext uri="{FF2B5EF4-FFF2-40B4-BE49-F238E27FC236}">
+                <a16:creationId xmlns:a16="http://schemas.microsoft.com/office/drawing/2014/main" id="{85E86770-4990-4AE3-A8F8-4FE49F8985CD}"/>
+              </a:ext>
+            </a:extLst>
+          </p:cNvPr>
+          <p:cNvSpPr/>
+          <p:nvPr/>
+        </p:nvSpPr>
+        <p:spPr>
+          <a:xfrm>
+            <a:off x="585788" y="1995385"/>
+            <a:ext cx="2647949" cy="3051110"/>
+          </a:xfrm>
+          <a:prstGeom prst="rect">
+            <a:avLst/>
+          </a:prstGeom>
+        </p:spPr>
+        <p:style>
+          <a:lnRef idx="2">
+            <a:schemeClr val="accent6">
+              <a:shade val="50000"/>
+            </a:schemeClr>
+          </a:lnRef>
+          <a:fillRef idx="1">
+            <a:schemeClr val="accent6"/>
+          </a:fillRef>
+          <a:effectRef idx="0">
+            <a:schemeClr val="accent6"/>
+          </a:effectRef>
+          <a:fontRef idx="minor">
+            <a:schemeClr val="lt1"/>
+          </a:fontRef>
+        </p:style>
+        <p:txBody>
+          <a:bodyPr rtlCol="0" anchor="t"/>
+          <a:lstStyle/>
+          <a:p>
+            <a:r>
+              <a:rPr lang="en-US" dirty="0">
+                <a:solidFill>
+                  <a:schemeClr val="tx1"/>
+                </a:solidFill>
+              </a:rPr>
+              <a:t>Bounded Context 1</a:t>
+            </a:r>
+          </a:p>
+        </p:txBody>
+      </p:sp>
+      <p:sp>
+        <p:nvSpPr>
+          <p:cNvPr id="6" name="Rectangle 5">
+            <a:extLst>
+              <a:ext uri="{FF2B5EF4-FFF2-40B4-BE49-F238E27FC236}">
+                <a16:creationId xmlns:a16="http://schemas.microsoft.com/office/drawing/2014/main" id="{343BA7AA-C649-43E9-8980-EFF6B5CBD307}"/>
+              </a:ext>
+            </a:extLst>
+          </p:cNvPr>
+          <p:cNvSpPr/>
+          <p:nvPr/>
+        </p:nvSpPr>
+        <p:spPr>
+          <a:xfrm>
+            <a:off x="3376613" y="1995383"/>
+            <a:ext cx="2647949" cy="3051110"/>
+          </a:xfrm>
+          <a:prstGeom prst="rect">
+            <a:avLst/>
+          </a:prstGeom>
+        </p:spPr>
+        <p:style>
+          <a:lnRef idx="2">
+            <a:schemeClr val="accent1">
+              <a:shade val="50000"/>
+            </a:schemeClr>
+          </a:lnRef>
+          <a:fillRef idx="1">
+            <a:schemeClr val="accent1"/>
+          </a:fillRef>
+          <a:effectRef idx="0">
+            <a:schemeClr val="accent1"/>
+          </a:effectRef>
+          <a:fontRef idx="minor">
+            <a:schemeClr val="lt1"/>
+          </a:fontRef>
+        </p:style>
+        <p:txBody>
+          <a:bodyPr rtlCol="0" anchor="t"/>
+          <a:lstStyle/>
+          <a:p>
+            <a:r>
+              <a:rPr lang="en-US" dirty="0">
+                <a:solidFill>
+                  <a:schemeClr val="tx1"/>
+                </a:solidFill>
+              </a:rPr>
+              <a:t>Bounded Context 2</a:t>
+            </a:r>
+          </a:p>
+          <a:p>
+            <a:endParaRPr lang="en-US" dirty="0"/>
+          </a:p>
+        </p:txBody>
+      </p:sp>
+      <p:sp>
+        <p:nvSpPr>
+          <p:cNvPr id="7" name="Rectangle 6">
+            <a:extLst>
+              <a:ext uri="{FF2B5EF4-FFF2-40B4-BE49-F238E27FC236}">
+                <a16:creationId xmlns:a16="http://schemas.microsoft.com/office/drawing/2014/main" id="{D268C448-08A7-4A37-A33C-C8795E19A0B7}"/>
+              </a:ext>
+            </a:extLst>
+          </p:cNvPr>
+          <p:cNvSpPr/>
+          <p:nvPr/>
+        </p:nvSpPr>
+        <p:spPr>
+          <a:xfrm>
+            <a:off x="6167438" y="1995383"/>
+            <a:ext cx="2647949" cy="3051110"/>
+          </a:xfrm>
+          <a:prstGeom prst="rect">
+            <a:avLst/>
+          </a:prstGeom>
+        </p:spPr>
+        <p:style>
+          <a:lnRef idx="2">
+            <a:schemeClr val="accent4">
+              <a:shade val="50000"/>
+            </a:schemeClr>
+          </a:lnRef>
+          <a:fillRef idx="1">
+            <a:schemeClr val="accent4"/>
+          </a:fillRef>
+          <a:effectRef idx="0">
+            <a:schemeClr val="accent4"/>
+          </a:effectRef>
+          <a:fontRef idx="minor">
+            <a:schemeClr val="lt1"/>
+          </a:fontRef>
+        </p:style>
+        <p:txBody>
+          <a:bodyPr rtlCol="0" anchor="t"/>
+          <a:lstStyle/>
+          <a:p>
+            <a:r>
+              <a:rPr lang="en-US" dirty="0">
+                <a:solidFill>
+                  <a:schemeClr val="tx1"/>
+                </a:solidFill>
+              </a:rPr>
+              <a:t>Bounded Context 3</a:t>
+            </a:r>
+          </a:p>
+        </p:txBody>
+      </p:sp>
+      <p:sp>
+        <p:nvSpPr>
+          <p:cNvPr id="8" name="Rectangle 7">
+            <a:extLst>
+              <a:ext uri="{FF2B5EF4-FFF2-40B4-BE49-F238E27FC236}">
+                <a16:creationId xmlns:a16="http://schemas.microsoft.com/office/drawing/2014/main" id="{E907507F-E651-4DDF-947F-CA3D55D51CBA}"/>
+              </a:ext>
+            </a:extLst>
+          </p:cNvPr>
+          <p:cNvSpPr/>
+          <p:nvPr/>
+        </p:nvSpPr>
+        <p:spPr>
+          <a:xfrm>
+            <a:off x="8958263" y="1995383"/>
+            <a:ext cx="2647949" cy="3051110"/>
+          </a:xfrm>
+          <a:prstGeom prst="rect">
+            <a:avLst/>
+          </a:prstGeom>
+        </p:spPr>
+        <p:style>
+          <a:lnRef idx="2">
+            <a:schemeClr val="accent2">
+              <a:shade val="50000"/>
+            </a:schemeClr>
+          </a:lnRef>
+          <a:fillRef idx="1">
+            <a:schemeClr val="accent2"/>
+          </a:fillRef>
+          <a:effectRef idx="0">
+            <a:schemeClr val="accent2"/>
+          </a:effectRef>
+          <a:fontRef idx="minor">
+            <a:schemeClr val="lt1"/>
+          </a:fontRef>
+        </p:style>
+        <p:txBody>
+          <a:bodyPr rtlCol="0" anchor="t"/>
+          <a:lstStyle/>
+          <a:p>
+            <a:r>
+              <a:rPr lang="en-US" dirty="0">
+                <a:solidFill>
+                  <a:schemeClr val="tx1"/>
+                </a:solidFill>
+              </a:rPr>
+              <a:t>Bounded Context 4</a:t>
+            </a:r>
+          </a:p>
+        </p:txBody>
+      </p:sp>
+      <p:sp>
+        <p:nvSpPr>
           <p:cNvPr id="2" name="Rectangle 1">
             <a:extLst>
               <a:ext uri="{FF2B5EF4-FFF2-40B4-BE49-F238E27FC236}">
@@ -17246,7 +20558,7 @@
         </p:nvSpPr>
         <p:spPr>
           <a:xfrm>
-            <a:off x="917315" y="1164736"/>
+            <a:off x="855402" y="2506976"/>
             <a:ext cx="2108719" cy="1129004"/>
           </a:xfrm>
           <a:prstGeom prst="rect">
@@ -17277,7 +20589,7 @@
           <a:p>
             <a:pPr algn="ctr"/>
             <a:r>
-              <a:rPr lang="en-US" dirty="0"/>
+              <a:rPr lang="en-US" sz="1400" dirty="0"/>
               <a:t>Business Logic</a:t>
             </a:r>
           </a:p>
@@ -17297,7 +20609,7 @@
         </p:nvSpPr>
         <p:spPr>
           <a:xfrm>
-            <a:off x="2279585" y="2542591"/>
+            <a:off x="2217672" y="3884831"/>
             <a:ext cx="746449" cy="886408"/>
           </a:xfrm>
           <a:prstGeom prst="can">
@@ -17349,7 +20661,7 @@
         </p:nvSpPr>
         <p:spPr>
           <a:xfrm>
-            <a:off x="3708140" y="1164736"/>
+            <a:off x="3646227" y="2506976"/>
             <a:ext cx="2108719" cy="1129004"/>
           </a:xfrm>
           <a:prstGeom prst="rect">
@@ -17380,7 +20692,7 @@
           <a:p>
             <a:pPr algn="ctr"/>
             <a:r>
-              <a:rPr lang="en-US" dirty="0"/>
+              <a:rPr lang="en-US" sz="1400" dirty="0"/>
               <a:t>Business Logic</a:t>
             </a:r>
           </a:p>
@@ -17400,7 +20712,7 @@
         </p:nvSpPr>
         <p:spPr>
           <a:xfrm>
-            <a:off x="6498965" y="1164736"/>
+            <a:off x="6437052" y="2506976"/>
             <a:ext cx="2108719" cy="1129004"/>
           </a:xfrm>
           <a:prstGeom prst="rect">
@@ -17431,7 +20743,7 @@
           <a:p>
             <a:pPr algn="ctr"/>
             <a:r>
-              <a:rPr lang="en-US" dirty="0"/>
+              <a:rPr lang="en-US" sz="1400" dirty="0"/>
               <a:t>Business Logic</a:t>
             </a:r>
           </a:p>
@@ -17451,7 +20763,7 @@
         </p:nvSpPr>
         <p:spPr>
           <a:xfrm>
-            <a:off x="9289790" y="1164736"/>
+            <a:off x="9227877" y="2506976"/>
             <a:ext cx="2108719" cy="1129004"/>
           </a:xfrm>
           <a:prstGeom prst="rect">
@@ -17482,7 +20794,7 @@
           <a:p>
             <a:pPr algn="ctr"/>
             <a:r>
-              <a:rPr lang="en-US" dirty="0"/>
+              <a:rPr lang="en-US" sz="1400" dirty="0"/>
               <a:t>Business Logic</a:t>
             </a:r>
           </a:p>
@@ -17502,7 +20814,7 @@
         </p:nvSpPr>
         <p:spPr>
           <a:xfrm>
-            <a:off x="5064968" y="2542591"/>
+            <a:off x="5003055" y="3884831"/>
             <a:ext cx="746449" cy="886408"/>
           </a:xfrm>
           <a:prstGeom prst="can">
@@ -17554,7 +20866,7 @@
         </p:nvSpPr>
         <p:spPr>
           <a:xfrm>
-            <a:off x="7861235" y="2542591"/>
+            <a:off x="7799322" y="3884831"/>
             <a:ext cx="746449" cy="886408"/>
           </a:xfrm>
           <a:prstGeom prst="can">
@@ -17606,7 +20918,7 @@
         </p:nvSpPr>
         <p:spPr>
           <a:xfrm>
-            <a:off x="10652060" y="2542591"/>
+            <a:off x="10590147" y="3884831"/>
             <a:ext cx="746449" cy="886408"/>
           </a:xfrm>
           <a:prstGeom prst="can">
@@ -17646,57 +20958,6 @@
       </p:sp>
       <p:sp>
         <p:nvSpPr>
-          <p:cNvPr id="5" name="Rectangle 4">
-            <a:extLst>
-              <a:ext uri="{FF2B5EF4-FFF2-40B4-BE49-F238E27FC236}">
-                <a16:creationId xmlns:a16="http://schemas.microsoft.com/office/drawing/2014/main" id="{9DBF5615-E7AE-4BCD-9F9F-6A469794C059}"/>
-              </a:ext>
-            </a:extLst>
-          </p:cNvPr>
-          <p:cNvSpPr/>
-          <p:nvPr/>
-        </p:nvSpPr>
-        <p:spPr>
-          <a:xfrm>
-            <a:off x="647701" y="242596"/>
-            <a:ext cx="11020424" cy="298580"/>
-          </a:xfrm>
-          <a:prstGeom prst="rect">
-            <a:avLst/>
-          </a:prstGeom>
-        </p:spPr>
-        <p:style>
-          <a:lnRef idx="1">
-            <a:schemeClr val="dk1"/>
-          </a:lnRef>
-          <a:fillRef idx="2">
-            <a:schemeClr val="dk1"/>
-          </a:fillRef>
-          <a:effectRef idx="1">
-            <a:schemeClr val="dk1"/>
-          </a:effectRef>
-          <a:fontRef idx="minor">
-            <a:schemeClr val="dk1"/>
-          </a:fontRef>
-        </p:style>
-        <p:txBody>
-          <a:bodyPr rtlCol="0" anchor="ctr"/>
-          <a:lstStyle/>
-          <a:p>
-            <a:pPr algn="ctr"/>
-            <a:r>
-              <a:rPr lang="en-US" sz="1600" dirty="0">
-                <a:solidFill>
-                  <a:schemeClr val="bg1"/>
-                </a:solidFill>
-              </a:rPr>
-              <a:t>Data Delivery</a:t>
-            </a:r>
-          </a:p>
-        </p:txBody>
-      </p:sp>
-      <p:sp>
-        <p:nvSpPr>
           <p:cNvPr id="16" name="Rectangle 15">
             <a:extLst>
               <a:ext uri="{FF2B5EF4-FFF2-40B4-BE49-F238E27FC236}">
@@ -17709,7 +20970,7 @@
         </p:nvSpPr>
         <p:spPr>
           <a:xfrm>
-            <a:off x="647701" y="3816220"/>
+            <a:off x="585788" y="5158460"/>
             <a:ext cx="11020424" cy="298580"/>
           </a:xfrm>
           <a:prstGeom prst="rect">
@@ -17746,10 +21007,1137 @@
           </a:p>
         </p:txBody>
       </p:sp>
+      <p:sp>
+        <p:nvSpPr>
+          <p:cNvPr id="17" name="Rectangle 16">
+            <a:extLst>
+              <a:ext uri="{FF2B5EF4-FFF2-40B4-BE49-F238E27FC236}">
+                <a16:creationId xmlns:a16="http://schemas.microsoft.com/office/drawing/2014/main" id="{A6457479-8EC7-48D6-A735-A2C336A8CD0B}"/>
+              </a:ext>
+            </a:extLst>
+          </p:cNvPr>
+          <p:cNvSpPr/>
+          <p:nvPr/>
+        </p:nvSpPr>
+        <p:spPr>
+          <a:xfrm>
+            <a:off x="585788" y="1584836"/>
+            <a:ext cx="11020424" cy="298580"/>
+          </a:xfrm>
+          <a:prstGeom prst="rect">
+            <a:avLst/>
+          </a:prstGeom>
+        </p:spPr>
+        <p:style>
+          <a:lnRef idx="1">
+            <a:schemeClr val="accent3"/>
+          </a:lnRef>
+          <a:fillRef idx="2">
+            <a:schemeClr val="accent3"/>
+          </a:fillRef>
+          <a:effectRef idx="1">
+            <a:schemeClr val="accent3"/>
+          </a:effectRef>
+          <a:fontRef idx="minor">
+            <a:schemeClr val="dk1"/>
+          </a:fontRef>
+        </p:style>
+        <p:txBody>
+          <a:bodyPr rtlCol="0" anchor="ctr"/>
+          <a:lstStyle/>
+          <a:p>
+            <a:pPr algn="ctr"/>
+            <a:r>
+              <a:rPr lang="en-US" sz="1600" dirty="0">
+                <a:solidFill>
+                  <a:schemeClr val="tx1"/>
+                </a:solidFill>
+              </a:rPr>
+              <a:t>Data Delivery</a:t>
+            </a:r>
+          </a:p>
+        </p:txBody>
+      </p:sp>
     </p:spTree>
     <p:extLst>
       <p:ext uri="{BB962C8B-B14F-4D97-AF65-F5344CB8AC3E}">
         <p14:creationId xmlns:p14="http://schemas.microsoft.com/office/powerpoint/2010/main" val="4094938629"/>
+      </p:ext>
+    </p:extLst>
+  </p:cSld>
+  <p:clrMapOvr>
+    <a:masterClrMapping/>
+  </p:clrMapOvr>
+</p:sld>
+</file>
+
+<file path=ppt/slides/slide7.xml><?xml version="1.0" encoding="utf-8"?>
+<p:sld xmlns:a="http://schemas.openxmlformats.org/drawingml/2006/main" xmlns:r="http://schemas.openxmlformats.org/officeDocument/2006/relationships" xmlns:p="http://schemas.openxmlformats.org/presentationml/2006/main">
+  <p:cSld>
+    <p:spTree>
+      <p:nvGrpSpPr>
+        <p:cNvPr id="1" name=""/>
+        <p:cNvGrpSpPr/>
+        <p:nvPr/>
+      </p:nvGrpSpPr>
+      <p:grpSpPr>
+        <a:xfrm>
+          <a:off x="0" y="0"/>
+          <a:ext cx="0" cy="0"/>
+          <a:chOff x="0" y="0"/>
+          <a:chExt cx="0" cy="0"/>
+        </a:xfrm>
+      </p:grpSpPr>
+      <p:sp>
+        <p:nvSpPr>
+          <p:cNvPr id="4" name="Rectangle 3">
+            <a:extLst>
+              <a:ext uri="{FF2B5EF4-FFF2-40B4-BE49-F238E27FC236}">
+                <a16:creationId xmlns:a16="http://schemas.microsoft.com/office/drawing/2014/main" id="{85E86770-4990-4AE3-A8F8-4FE49F8985CD}"/>
+              </a:ext>
+            </a:extLst>
+          </p:cNvPr>
+          <p:cNvSpPr/>
+          <p:nvPr/>
+        </p:nvSpPr>
+        <p:spPr>
+          <a:xfrm>
+            <a:off x="585788" y="1995385"/>
+            <a:ext cx="2647949" cy="3051110"/>
+          </a:xfrm>
+          <a:prstGeom prst="rect">
+            <a:avLst/>
+          </a:prstGeom>
+        </p:spPr>
+        <p:style>
+          <a:lnRef idx="0">
+            <a:schemeClr val="accent6"/>
+          </a:lnRef>
+          <a:fillRef idx="3">
+            <a:schemeClr val="accent6"/>
+          </a:fillRef>
+          <a:effectRef idx="3">
+            <a:schemeClr val="accent6"/>
+          </a:effectRef>
+          <a:fontRef idx="minor">
+            <a:schemeClr val="lt1"/>
+          </a:fontRef>
+        </p:style>
+        <p:txBody>
+          <a:bodyPr rtlCol="0" anchor="t"/>
+          <a:lstStyle/>
+          <a:p>
+            <a:r>
+              <a:rPr lang="en-US" dirty="0">
+                <a:solidFill>
+                  <a:schemeClr val="tx1"/>
+                </a:solidFill>
+              </a:rPr>
+              <a:t>Service 1</a:t>
+            </a:r>
+          </a:p>
+        </p:txBody>
+      </p:sp>
+      <p:sp>
+        <p:nvSpPr>
+          <p:cNvPr id="6" name="Rectangle 5">
+            <a:extLst>
+              <a:ext uri="{FF2B5EF4-FFF2-40B4-BE49-F238E27FC236}">
+                <a16:creationId xmlns:a16="http://schemas.microsoft.com/office/drawing/2014/main" id="{343BA7AA-C649-43E9-8980-EFF6B5CBD307}"/>
+              </a:ext>
+            </a:extLst>
+          </p:cNvPr>
+          <p:cNvSpPr/>
+          <p:nvPr/>
+        </p:nvSpPr>
+        <p:spPr>
+          <a:xfrm>
+            <a:off x="3376613" y="1995383"/>
+            <a:ext cx="2647949" cy="3051110"/>
+          </a:xfrm>
+          <a:prstGeom prst="rect">
+            <a:avLst/>
+          </a:prstGeom>
+        </p:spPr>
+        <p:style>
+          <a:lnRef idx="0">
+            <a:schemeClr val="accent5"/>
+          </a:lnRef>
+          <a:fillRef idx="3">
+            <a:schemeClr val="accent5"/>
+          </a:fillRef>
+          <a:effectRef idx="3">
+            <a:schemeClr val="accent5"/>
+          </a:effectRef>
+          <a:fontRef idx="minor">
+            <a:schemeClr val="lt1"/>
+          </a:fontRef>
+        </p:style>
+        <p:txBody>
+          <a:bodyPr rtlCol="0" anchor="t"/>
+          <a:lstStyle/>
+          <a:p>
+            <a:r>
+              <a:rPr lang="en-US" dirty="0">
+                <a:solidFill>
+                  <a:schemeClr val="tx1"/>
+                </a:solidFill>
+              </a:rPr>
+              <a:t>Service 2</a:t>
+            </a:r>
+          </a:p>
+          <a:p>
+            <a:endParaRPr lang="en-US" dirty="0"/>
+          </a:p>
+        </p:txBody>
+      </p:sp>
+      <p:sp>
+        <p:nvSpPr>
+          <p:cNvPr id="7" name="Rectangle 6">
+            <a:extLst>
+              <a:ext uri="{FF2B5EF4-FFF2-40B4-BE49-F238E27FC236}">
+                <a16:creationId xmlns:a16="http://schemas.microsoft.com/office/drawing/2014/main" id="{D268C448-08A7-4A37-A33C-C8795E19A0B7}"/>
+              </a:ext>
+            </a:extLst>
+          </p:cNvPr>
+          <p:cNvSpPr/>
+          <p:nvPr/>
+        </p:nvSpPr>
+        <p:spPr>
+          <a:xfrm>
+            <a:off x="6167438" y="1995383"/>
+            <a:ext cx="2647949" cy="3051110"/>
+          </a:xfrm>
+          <a:prstGeom prst="rect">
+            <a:avLst/>
+          </a:prstGeom>
+        </p:spPr>
+        <p:style>
+          <a:lnRef idx="0">
+            <a:schemeClr val="accent4"/>
+          </a:lnRef>
+          <a:fillRef idx="3">
+            <a:schemeClr val="accent4"/>
+          </a:fillRef>
+          <a:effectRef idx="3">
+            <a:schemeClr val="accent4"/>
+          </a:effectRef>
+          <a:fontRef idx="minor">
+            <a:schemeClr val="lt1"/>
+          </a:fontRef>
+        </p:style>
+        <p:txBody>
+          <a:bodyPr rtlCol="0" anchor="t"/>
+          <a:lstStyle/>
+          <a:p>
+            <a:r>
+              <a:rPr lang="en-US" dirty="0">
+                <a:solidFill>
+                  <a:schemeClr val="tx1"/>
+                </a:solidFill>
+              </a:rPr>
+              <a:t>Service 3</a:t>
+            </a:r>
+          </a:p>
+        </p:txBody>
+      </p:sp>
+      <p:sp>
+        <p:nvSpPr>
+          <p:cNvPr id="8" name="Rectangle 7">
+            <a:extLst>
+              <a:ext uri="{FF2B5EF4-FFF2-40B4-BE49-F238E27FC236}">
+                <a16:creationId xmlns:a16="http://schemas.microsoft.com/office/drawing/2014/main" id="{E907507F-E651-4DDF-947F-CA3D55D51CBA}"/>
+              </a:ext>
+            </a:extLst>
+          </p:cNvPr>
+          <p:cNvSpPr/>
+          <p:nvPr/>
+        </p:nvSpPr>
+        <p:spPr>
+          <a:xfrm>
+            <a:off x="8958263" y="1995383"/>
+            <a:ext cx="2647949" cy="3051110"/>
+          </a:xfrm>
+          <a:prstGeom prst="rect">
+            <a:avLst/>
+          </a:prstGeom>
+        </p:spPr>
+        <p:style>
+          <a:lnRef idx="0">
+            <a:schemeClr val="accent2"/>
+          </a:lnRef>
+          <a:fillRef idx="3">
+            <a:schemeClr val="accent2"/>
+          </a:fillRef>
+          <a:effectRef idx="3">
+            <a:schemeClr val="accent2"/>
+          </a:effectRef>
+          <a:fontRef idx="minor">
+            <a:schemeClr val="lt1"/>
+          </a:fontRef>
+        </p:style>
+        <p:txBody>
+          <a:bodyPr rtlCol="0" anchor="t"/>
+          <a:lstStyle/>
+          <a:p>
+            <a:r>
+              <a:rPr lang="en-US" dirty="0">
+                <a:solidFill>
+                  <a:schemeClr val="tx1"/>
+                </a:solidFill>
+              </a:rPr>
+              <a:t>Service 4</a:t>
+            </a:r>
+          </a:p>
+        </p:txBody>
+      </p:sp>
+      <p:sp>
+        <p:nvSpPr>
+          <p:cNvPr id="2" name="Rectangle 1">
+            <a:extLst>
+              <a:ext uri="{FF2B5EF4-FFF2-40B4-BE49-F238E27FC236}">
+                <a16:creationId xmlns:a16="http://schemas.microsoft.com/office/drawing/2014/main" id="{D3374E5E-A9F1-49B5-8CAB-913EC56AAF32}"/>
+              </a:ext>
+            </a:extLst>
+          </p:cNvPr>
+          <p:cNvSpPr/>
+          <p:nvPr/>
+        </p:nvSpPr>
+        <p:spPr>
+          <a:xfrm>
+            <a:off x="849960" y="2777440"/>
+            <a:ext cx="2108719" cy="1009542"/>
+          </a:xfrm>
+          <a:prstGeom prst="rect">
+            <a:avLst/>
+          </a:prstGeom>
+          <a:ln>
+            <a:headEnd type="none" w="med" len="med"/>
+            <a:tailEnd type="none" w="med" len="med"/>
+          </a:ln>
+        </p:spPr>
+        <p:style>
+          <a:lnRef idx="1">
+            <a:schemeClr val="accent6"/>
+          </a:lnRef>
+          <a:fillRef idx="2">
+            <a:schemeClr val="accent6"/>
+          </a:fillRef>
+          <a:effectRef idx="1">
+            <a:schemeClr val="accent6"/>
+          </a:effectRef>
+          <a:fontRef idx="minor">
+            <a:schemeClr val="dk1"/>
+          </a:fontRef>
+        </p:style>
+        <p:txBody>
+          <a:bodyPr rtlCol="0" anchor="ctr"/>
+          <a:lstStyle/>
+          <a:p>
+            <a:pPr algn="ctr"/>
+            <a:r>
+              <a:rPr lang="en-US" sz="1400" dirty="0"/>
+              <a:t>Business Logic</a:t>
+            </a:r>
+          </a:p>
+        </p:txBody>
+      </p:sp>
+      <p:sp>
+        <p:nvSpPr>
+          <p:cNvPr id="3" name="Cylinder 2">
+            <a:extLst>
+              <a:ext uri="{FF2B5EF4-FFF2-40B4-BE49-F238E27FC236}">
+                <a16:creationId xmlns:a16="http://schemas.microsoft.com/office/drawing/2014/main" id="{8F03E13F-DDDF-4C13-B245-A90B316C0ADF}"/>
+              </a:ext>
+            </a:extLst>
+          </p:cNvPr>
+          <p:cNvSpPr/>
+          <p:nvPr/>
+        </p:nvSpPr>
+        <p:spPr>
+          <a:xfrm>
+            <a:off x="2217672" y="3884831"/>
+            <a:ext cx="746449" cy="886408"/>
+          </a:xfrm>
+          <a:prstGeom prst="can">
+            <a:avLst/>
+          </a:prstGeom>
+          <a:solidFill>
+            <a:schemeClr val="dk1">
+              <a:alpha val="50000"/>
+            </a:schemeClr>
+          </a:solidFill>
+          <a:ln>
+            <a:noFill/>
+          </a:ln>
+        </p:spPr>
+        <p:style>
+          <a:lnRef idx="0">
+            <a:scrgbClr r="0" g="0" b="0"/>
+          </a:lnRef>
+          <a:fillRef idx="0">
+            <a:scrgbClr r="0" g="0" b="0"/>
+          </a:fillRef>
+          <a:effectRef idx="0">
+            <a:scrgbClr r="0" g="0" b="0"/>
+          </a:effectRef>
+          <a:fontRef idx="minor">
+            <a:schemeClr val="lt1"/>
+          </a:fontRef>
+        </p:style>
+        <p:txBody>
+          <a:bodyPr rtlCol="0" anchor="ctr"/>
+          <a:lstStyle/>
+          <a:p>
+            <a:pPr algn="ctr"/>
+            <a:endParaRPr lang="en-US"/>
+          </a:p>
+        </p:txBody>
+      </p:sp>
+      <p:sp>
+        <p:nvSpPr>
+          <p:cNvPr id="9" name="Rectangle 8">
+            <a:extLst>
+              <a:ext uri="{FF2B5EF4-FFF2-40B4-BE49-F238E27FC236}">
+                <a16:creationId xmlns:a16="http://schemas.microsoft.com/office/drawing/2014/main" id="{4E2B55EF-9362-4D96-897C-B9CE5E84AB99}"/>
+              </a:ext>
+            </a:extLst>
+          </p:cNvPr>
+          <p:cNvSpPr/>
+          <p:nvPr/>
+        </p:nvSpPr>
+        <p:spPr>
+          <a:xfrm>
+            <a:off x="3640785" y="2777440"/>
+            <a:ext cx="2108719" cy="1009542"/>
+          </a:xfrm>
+          <a:prstGeom prst="rect">
+            <a:avLst/>
+          </a:prstGeom>
+          <a:ln>
+            <a:headEnd type="none" w="med" len="med"/>
+            <a:tailEnd type="none" w="med" len="med"/>
+          </a:ln>
+        </p:spPr>
+        <p:style>
+          <a:lnRef idx="1">
+            <a:schemeClr val="accent5"/>
+          </a:lnRef>
+          <a:fillRef idx="2">
+            <a:schemeClr val="accent5"/>
+          </a:fillRef>
+          <a:effectRef idx="1">
+            <a:schemeClr val="accent5"/>
+          </a:effectRef>
+          <a:fontRef idx="minor">
+            <a:schemeClr val="dk1"/>
+          </a:fontRef>
+        </p:style>
+        <p:txBody>
+          <a:bodyPr rtlCol="0" anchor="ctr"/>
+          <a:lstStyle/>
+          <a:p>
+            <a:pPr algn="ctr"/>
+            <a:r>
+              <a:rPr lang="en-US" sz="1400" dirty="0"/>
+              <a:t>Business Logic</a:t>
+            </a:r>
+          </a:p>
+        </p:txBody>
+      </p:sp>
+      <p:sp>
+        <p:nvSpPr>
+          <p:cNvPr id="10" name="Rectangle 9">
+            <a:extLst>
+              <a:ext uri="{FF2B5EF4-FFF2-40B4-BE49-F238E27FC236}">
+                <a16:creationId xmlns:a16="http://schemas.microsoft.com/office/drawing/2014/main" id="{0BA22D8B-DC3C-4A49-90F9-A32CB051BB47}"/>
+              </a:ext>
+            </a:extLst>
+          </p:cNvPr>
+          <p:cNvSpPr/>
+          <p:nvPr/>
+        </p:nvSpPr>
+        <p:spPr>
+          <a:xfrm>
+            <a:off x="6431610" y="2777440"/>
+            <a:ext cx="2108719" cy="1009542"/>
+          </a:xfrm>
+          <a:prstGeom prst="rect">
+            <a:avLst/>
+          </a:prstGeom>
+          <a:ln>
+            <a:headEnd type="none" w="med" len="med"/>
+            <a:tailEnd type="none" w="med" len="med"/>
+          </a:ln>
+        </p:spPr>
+        <p:style>
+          <a:lnRef idx="1">
+            <a:schemeClr val="accent4"/>
+          </a:lnRef>
+          <a:fillRef idx="2">
+            <a:schemeClr val="accent4"/>
+          </a:fillRef>
+          <a:effectRef idx="1">
+            <a:schemeClr val="accent4"/>
+          </a:effectRef>
+          <a:fontRef idx="minor">
+            <a:schemeClr val="dk1"/>
+          </a:fontRef>
+        </p:style>
+        <p:txBody>
+          <a:bodyPr rtlCol="0" anchor="ctr"/>
+          <a:lstStyle/>
+          <a:p>
+            <a:pPr algn="ctr"/>
+            <a:r>
+              <a:rPr lang="en-US" sz="1400" dirty="0"/>
+              <a:t>Business Logic</a:t>
+            </a:r>
+          </a:p>
+        </p:txBody>
+      </p:sp>
+      <p:sp>
+        <p:nvSpPr>
+          <p:cNvPr id="11" name="Rectangle 10">
+            <a:extLst>
+              <a:ext uri="{FF2B5EF4-FFF2-40B4-BE49-F238E27FC236}">
+                <a16:creationId xmlns:a16="http://schemas.microsoft.com/office/drawing/2014/main" id="{03056D2E-EB75-4C9C-A3DA-E4FE7A8894D5}"/>
+              </a:ext>
+            </a:extLst>
+          </p:cNvPr>
+          <p:cNvSpPr/>
+          <p:nvPr/>
+        </p:nvSpPr>
+        <p:spPr>
+          <a:xfrm>
+            <a:off x="9222435" y="2777440"/>
+            <a:ext cx="2108719" cy="1009542"/>
+          </a:xfrm>
+          <a:prstGeom prst="rect">
+            <a:avLst/>
+          </a:prstGeom>
+          <a:ln>
+            <a:headEnd type="none" w="med" len="med"/>
+            <a:tailEnd type="none" w="med" len="med"/>
+          </a:ln>
+        </p:spPr>
+        <p:style>
+          <a:lnRef idx="1">
+            <a:schemeClr val="accent2"/>
+          </a:lnRef>
+          <a:fillRef idx="2">
+            <a:schemeClr val="accent2"/>
+          </a:fillRef>
+          <a:effectRef idx="1">
+            <a:schemeClr val="accent2"/>
+          </a:effectRef>
+          <a:fontRef idx="minor">
+            <a:schemeClr val="dk1"/>
+          </a:fontRef>
+        </p:style>
+        <p:txBody>
+          <a:bodyPr rtlCol="0" anchor="ctr"/>
+          <a:lstStyle/>
+          <a:p>
+            <a:pPr algn="ctr"/>
+            <a:r>
+              <a:rPr lang="en-US" sz="1400" dirty="0"/>
+              <a:t>Business Logic</a:t>
+            </a:r>
+          </a:p>
+        </p:txBody>
+      </p:sp>
+      <p:sp>
+        <p:nvSpPr>
+          <p:cNvPr id="12" name="Cylinder 11">
+            <a:extLst>
+              <a:ext uri="{FF2B5EF4-FFF2-40B4-BE49-F238E27FC236}">
+                <a16:creationId xmlns:a16="http://schemas.microsoft.com/office/drawing/2014/main" id="{973266DE-6CB1-4C9D-A47C-F0EC762A391D}"/>
+              </a:ext>
+            </a:extLst>
+          </p:cNvPr>
+          <p:cNvSpPr/>
+          <p:nvPr/>
+        </p:nvSpPr>
+        <p:spPr>
+          <a:xfrm>
+            <a:off x="5003055" y="3884831"/>
+            <a:ext cx="746449" cy="886408"/>
+          </a:xfrm>
+          <a:prstGeom prst="can">
+            <a:avLst/>
+          </a:prstGeom>
+          <a:solidFill>
+            <a:schemeClr val="dk1">
+              <a:alpha val="50000"/>
+            </a:schemeClr>
+          </a:solidFill>
+          <a:ln>
+            <a:noFill/>
+          </a:ln>
+        </p:spPr>
+        <p:style>
+          <a:lnRef idx="0">
+            <a:scrgbClr r="0" g="0" b="0"/>
+          </a:lnRef>
+          <a:fillRef idx="0">
+            <a:scrgbClr r="0" g="0" b="0"/>
+          </a:fillRef>
+          <a:effectRef idx="0">
+            <a:scrgbClr r="0" g="0" b="0"/>
+          </a:effectRef>
+          <a:fontRef idx="minor">
+            <a:schemeClr val="lt1"/>
+          </a:fontRef>
+        </p:style>
+        <p:txBody>
+          <a:bodyPr rtlCol="0" anchor="ctr"/>
+          <a:lstStyle/>
+          <a:p>
+            <a:pPr algn="ctr"/>
+            <a:endParaRPr lang="en-US"/>
+          </a:p>
+        </p:txBody>
+      </p:sp>
+      <p:sp>
+        <p:nvSpPr>
+          <p:cNvPr id="13" name="Cylinder 12">
+            <a:extLst>
+              <a:ext uri="{FF2B5EF4-FFF2-40B4-BE49-F238E27FC236}">
+                <a16:creationId xmlns:a16="http://schemas.microsoft.com/office/drawing/2014/main" id="{BEF0B81D-8B4E-44EA-B49F-38FCBE86BB02}"/>
+              </a:ext>
+            </a:extLst>
+          </p:cNvPr>
+          <p:cNvSpPr/>
+          <p:nvPr/>
+        </p:nvSpPr>
+        <p:spPr>
+          <a:xfrm>
+            <a:off x="7799322" y="3884831"/>
+            <a:ext cx="746449" cy="886408"/>
+          </a:xfrm>
+          <a:prstGeom prst="can">
+            <a:avLst/>
+          </a:prstGeom>
+          <a:solidFill>
+            <a:schemeClr val="dk1">
+              <a:alpha val="50000"/>
+            </a:schemeClr>
+          </a:solidFill>
+          <a:ln>
+            <a:noFill/>
+          </a:ln>
+        </p:spPr>
+        <p:style>
+          <a:lnRef idx="0">
+            <a:scrgbClr r="0" g="0" b="0"/>
+          </a:lnRef>
+          <a:fillRef idx="0">
+            <a:scrgbClr r="0" g="0" b="0"/>
+          </a:fillRef>
+          <a:effectRef idx="0">
+            <a:scrgbClr r="0" g="0" b="0"/>
+          </a:effectRef>
+          <a:fontRef idx="minor">
+            <a:schemeClr val="lt1"/>
+          </a:fontRef>
+        </p:style>
+        <p:txBody>
+          <a:bodyPr rtlCol="0" anchor="ctr"/>
+          <a:lstStyle/>
+          <a:p>
+            <a:pPr algn="ctr"/>
+            <a:endParaRPr lang="en-US"/>
+          </a:p>
+        </p:txBody>
+      </p:sp>
+      <p:sp>
+        <p:nvSpPr>
+          <p:cNvPr id="14" name="Cylinder 13">
+            <a:extLst>
+              <a:ext uri="{FF2B5EF4-FFF2-40B4-BE49-F238E27FC236}">
+                <a16:creationId xmlns:a16="http://schemas.microsoft.com/office/drawing/2014/main" id="{7FBD789D-4921-42FD-9B01-3EF99CB02E53}"/>
+              </a:ext>
+            </a:extLst>
+          </p:cNvPr>
+          <p:cNvSpPr/>
+          <p:nvPr/>
+        </p:nvSpPr>
+        <p:spPr>
+          <a:xfrm>
+            <a:off x="10590147" y="3884831"/>
+            <a:ext cx="746449" cy="886408"/>
+          </a:xfrm>
+          <a:prstGeom prst="can">
+            <a:avLst/>
+          </a:prstGeom>
+          <a:solidFill>
+            <a:schemeClr val="dk1">
+              <a:alpha val="50000"/>
+            </a:schemeClr>
+          </a:solidFill>
+          <a:ln>
+            <a:noFill/>
+          </a:ln>
+        </p:spPr>
+        <p:style>
+          <a:lnRef idx="0">
+            <a:scrgbClr r="0" g="0" b="0"/>
+          </a:lnRef>
+          <a:fillRef idx="0">
+            <a:scrgbClr r="0" g="0" b="0"/>
+          </a:fillRef>
+          <a:effectRef idx="0">
+            <a:scrgbClr r="0" g="0" b="0"/>
+          </a:effectRef>
+          <a:fontRef idx="minor">
+            <a:schemeClr val="lt1"/>
+          </a:fontRef>
+        </p:style>
+        <p:txBody>
+          <a:bodyPr rtlCol="0" anchor="ctr"/>
+          <a:lstStyle/>
+          <a:p>
+            <a:pPr algn="ctr"/>
+            <a:endParaRPr lang="en-US"/>
+          </a:p>
+        </p:txBody>
+      </p:sp>
+      <p:sp>
+        <p:nvSpPr>
+          <p:cNvPr id="17" name="Rectangle 16">
+            <a:extLst>
+              <a:ext uri="{FF2B5EF4-FFF2-40B4-BE49-F238E27FC236}">
+                <a16:creationId xmlns:a16="http://schemas.microsoft.com/office/drawing/2014/main" id="{A6457479-8EC7-48D6-A735-A2C336A8CD0B}"/>
+              </a:ext>
+            </a:extLst>
+          </p:cNvPr>
+          <p:cNvSpPr/>
+          <p:nvPr/>
+        </p:nvSpPr>
+        <p:spPr>
+          <a:xfrm>
+            <a:off x="597393" y="1325223"/>
+            <a:ext cx="11020424" cy="298580"/>
+          </a:xfrm>
+          <a:prstGeom prst="rect">
+            <a:avLst/>
+          </a:prstGeom>
+        </p:spPr>
+        <p:style>
+          <a:lnRef idx="0">
+            <a:schemeClr val="accent3"/>
+          </a:lnRef>
+          <a:fillRef idx="3">
+            <a:schemeClr val="accent3"/>
+          </a:fillRef>
+          <a:effectRef idx="3">
+            <a:schemeClr val="accent3"/>
+          </a:effectRef>
+          <a:fontRef idx="minor">
+            <a:schemeClr val="lt1"/>
+          </a:fontRef>
+        </p:style>
+        <p:txBody>
+          <a:bodyPr rtlCol="0" anchor="ctr"/>
+          <a:lstStyle/>
+          <a:p>
+            <a:pPr algn="ctr"/>
+            <a:r>
+              <a:rPr lang="en-US" sz="1600" dirty="0">
+                <a:solidFill>
+                  <a:schemeClr val="tx1"/>
+                </a:solidFill>
+              </a:rPr>
+              <a:t>Composite User Interface</a:t>
+            </a:r>
+          </a:p>
+        </p:txBody>
+      </p:sp>
+      <p:sp>
+        <p:nvSpPr>
+          <p:cNvPr id="18" name="Smiley Face 17">
+            <a:extLst>
+              <a:ext uri="{FF2B5EF4-FFF2-40B4-BE49-F238E27FC236}">
+                <a16:creationId xmlns:a16="http://schemas.microsoft.com/office/drawing/2014/main" id="{18B53565-F4E0-46EA-9866-B25B5B113FE4}"/>
+              </a:ext>
+            </a:extLst>
+          </p:cNvPr>
+          <p:cNvSpPr/>
+          <p:nvPr/>
+        </p:nvSpPr>
+        <p:spPr>
+          <a:xfrm>
+            <a:off x="855402" y="4080560"/>
+            <a:ext cx="494950" cy="494950"/>
+          </a:xfrm>
+          <a:prstGeom prst="smileyFace">
+            <a:avLst/>
+          </a:prstGeom>
+        </p:spPr>
+        <p:style>
+          <a:lnRef idx="1">
+            <a:schemeClr val="dk1"/>
+          </a:lnRef>
+          <a:fillRef idx="2">
+            <a:schemeClr val="dk1"/>
+          </a:fillRef>
+          <a:effectRef idx="1">
+            <a:schemeClr val="dk1"/>
+          </a:effectRef>
+          <a:fontRef idx="minor">
+            <a:schemeClr val="dk1"/>
+          </a:fontRef>
+        </p:style>
+        <p:txBody>
+          <a:bodyPr rtlCol="0" anchor="ctr"/>
+          <a:lstStyle/>
+          <a:p>
+            <a:pPr algn="ctr"/>
+            <a:endParaRPr lang="en-US"/>
+          </a:p>
+        </p:txBody>
+      </p:sp>
+      <p:sp>
+        <p:nvSpPr>
+          <p:cNvPr id="19" name="Smiley Face 18">
+            <a:extLst>
+              <a:ext uri="{FF2B5EF4-FFF2-40B4-BE49-F238E27FC236}">
+                <a16:creationId xmlns:a16="http://schemas.microsoft.com/office/drawing/2014/main" id="{1293D1E6-117A-4922-B30E-B95D2E615A3A}"/>
+              </a:ext>
+            </a:extLst>
+          </p:cNvPr>
+          <p:cNvSpPr/>
+          <p:nvPr/>
+        </p:nvSpPr>
+        <p:spPr>
+          <a:xfrm>
+            <a:off x="3692163" y="4080560"/>
+            <a:ext cx="494950" cy="494950"/>
+          </a:xfrm>
+          <a:prstGeom prst="smileyFace">
+            <a:avLst/>
+          </a:prstGeom>
+        </p:spPr>
+        <p:style>
+          <a:lnRef idx="1">
+            <a:schemeClr val="dk1"/>
+          </a:lnRef>
+          <a:fillRef idx="2">
+            <a:schemeClr val="dk1"/>
+          </a:fillRef>
+          <a:effectRef idx="1">
+            <a:schemeClr val="dk1"/>
+          </a:effectRef>
+          <a:fontRef idx="minor">
+            <a:schemeClr val="dk1"/>
+          </a:fontRef>
+        </p:style>
+        <p:txBody>
+          <a:bodyPr rtlCol="0" anchor="ctr"/>
+          <a:lstStyle/>
+          <a:p>
+            <a:pPr algn="ctr"/>
+            <a:endParaRPr lang="en-US"/>
+          </a:p>
+        </p:txBody>
+      </p:sp>
+      <p:sp>
+        <p:nvSpPr>
+          <p:cNvPr id="20" name="Smiley Face 19">
+            <a:extLst>
+              <a:ext uri="{FF2B5EF4-FFF2-40B4-BE49-F238E27FC236}">
+                <a16:creationId xmlns:a16="http://schemas.microsoft.com/office/drawing/2014/main" id="{7C1F6BA2-9121-441E-90AA-6D2CF82DEB63}"/>
+              </a:ext>
+            </a:extLst>
+          </p:cNvPr>
+          <p:cNvSpPr/>
+          <p:nvPr/>
+        </p:nvSpPr>
+        <p:spPr>
+          <a:xfrm>
+            <a:off x="6437052" y="4080560"/>
+            <a:ext cx="494950" cy="494950"/>
+          </a:xfrm>
+          <a:prstGeom prst="smileyFace">
+            <a:avLst/>
+          </a:prstGeom>
+        </p:spPr>
+        <p:style>
+          <a:lnRef idx="1">
+            <a:schemeClr val="dk1"/>
+          </a:lnRef>
+          <a:fillRef idx="2">
+            <a:schemeClr val="dk1"/>
+          </a:fillRef>
+          <a:effectRef idx="1">
+            <a:schemeClr val="dk1"/>
+          </a:effectRef>
+          <a:fontRef idx="minor">
+            <a:schemeClr val="dk1"/>
+          </a:fontRef>
+        </p:style>
+        <p:txBody>
+          <a:bodyPr rtlCol="0" anchor="ctr"/>
+          <a:lstStyle/>
+          <a:p>
+            <a:pPr algn="ctr"/>
+            <a:endParaRPr lang="en-US"/>
+          </a:p>
+        </p:txBody>
+      </p:sp>
+      <p:sp>
+        <p:nvSpPr>
+          <p:cNvPr id="21" name="Smiley Face 20">
+            <a:extLst>
+              <a:ext uri="{FF2B5EF4-FFF2-40B4-BE49-F238E27FC236}">
+                <a16:creationId xmlns:a16="http://schemas.microsoft.com/office/drawing/2014/main" id="{4B4D8073-C3FD-4E5D-B286-2E0B86F3181D}"/>
+              </a:ext>
+            </a:extLst>
+          </p:cNvPr>
+          <p:cNvSpPr/>
+          <p:nvPr/>
+        </p:nvSpPr>
+        <p:spPr>
+          <a:xfrm>
+            <a:off x="9227877" y="4080560"/>
+            <a:ext cx="494950" cy="494950"/>
+          </a:xfrm>
+          <a:prstGeom prst="smileyFace">
+            <a:avLst/>
+          </a:prstGeom>
+        </p:spPr>
+        <p:style>
+          <a:lnRef idx="1">
+            <a:schemeClr val="dk1"/>
+          </a:lnRef>
+          <a:fillRef idx="2">
+            <a:schemeClr val="dk1"/>
+          </a:fillRef>
+          <a:effectRef idx="1">
+            <a:schemeClr val="dk1"/>
+          </a:effectRef>
+          <a:fontRef idx="minor">
+            <a:schemeClr val="dk1"/>
+          </a:fontRef>
+        </p:style>
+        <p:txBody>
+          <a:bodyPr rtlCol="0" anchor="ctr"/>
+          <a:lstStyle/>
+          <a:p>
+            <a:pPr algn="ctr"/>
+            <a:endParaRPr lang="en-US"/>
+          </a:p>
+        </p:txBody>
+      </p:sp>
+      <p:sp>
+        <p:nvSpPr>
+          <p:cNvPr id="22" name="Rectangle 21">
+            <a:extLst>
+              <a:ext uri="{FF2B5EF4-FFF2-40B4-BE49-F238E27FC236}">
+                <a16:creationId xmlns:a16="http://schemas.microsoft.com/office/drawing/2014/main" id="{0B59FB74-54A9-435E-B05E-6A642EE3431F}"/>
+              </a:ext>
+            </a:extLst>
+          </p:cNvPr>
+          <p:cNvSpPr/>
+          <p:nvPr/>
+        </p:nvSpPr>
+        <p:spPr>
+          <a:xfrm>
+            <a:off x="838936" y="2405857"/>
+            <a:ext cx="2108719" cy="284037"/>
+          </a:xfrm>
+          <a:prstGeom prst="rect">
+            <a:avLst/>
+          </a:prstGeom>
+          <a:ln>
+            <a:headEnd type="none" w="med" len="med"/>
+            <a:tailEnd type="none" w="med" len="med"/>
+          </a:ln>
+        </p:spPr>
+        <p:style>
+          <a:lnRef idx="1">
+            <a:schemeClr val="accent6"/>
+          </a:lnRef>
+          <a:fillRef idx="2">
+            <a:schemeClr val="accent6"/>
+          </a:fillRef>
+          <a:effectRef idx="1">
+            <a:schemeClr val="accent6"/>
+          </a:effectRef>
+          <a:fontRef idx="minor">
+            <a:schemeClr val="dk1"/>
+          </a:fontRef>
+        </p:style>
+        <p:txBody>
+          <a:bodyPr rtlCol="0" anchor="ctr"/>
+          <a:lstStyle/>
+          <a:p>
+            <a:pPr algn="ctr"/>
+            <a:r>
+              <a:rPr lang="en-US" sz="1100" dirty="0"/>
+              <a:t>User Interface</a:t>
+            </a:r>
+          </a:p>
+        </p:txBody>
+      </p:sp>
+      <p:sp>
+        <p:nvSpPr>
+          <p:cNvPr id="23" name="Rectangle 22">
+            <a:extLst>
+              <a:ext uri="{FF2B5EF4-FFF2-40B4-BE49-F238E27FC236}">
+                <a16:creationId xmlns:a16="http://schemas.microsoft.com/office/drawing/2014/main" id="{138F1146-66D2-4FC4-A96E-2008957F461D}"/>
+              </a:ext>
+            </a:extLst>
+          </p:cNvPr>
+          <p:cNvSpPr/>
+          <p:nvPr/>
+        </p:nvSpPr>
+        <p:spPr>
+          <a:xfrm>
+            <a:off x="3640784" y="2405857"/>
+            <a:ext cx="2108719" cy="284037"/>
+          </a:xfrm>
+          <a:prstGeom prst="rect">
+            <a:avLst/>
+          </a:prstGeom>
+          <a:ln>
+            <a:headEnd type="none" w="med" len="med"/>
+            <a:tailEnd type="none" w="med" len="med"/>
+          </a:ln>
+        </p:spPr>
+        <p:style>
+          <a:lnRef idx="1">
+            <a:schemeClr val="accent5"/>
+          </a:lnRef>
+          <a:fillRef idx="2">
+            <a:schemeClr val="accent5"/>
+          </a:fillRef>
+          <a:effectRef idx="1">
+            <a:schemeClr val="accent5"/>
+          </a:effectRef>
+          <a:fontRef idx="minor">
+            <a:schemeClr val="dk1"/>
+          </a:fontRef>
+        </p:style>
+        <p:txBody>
+          <a:bodyPr rtlCol="0" anchor="ctr"/>
+          <a:lstStyle/>
+          <a:p>
+            <a:pPr algn="ctr"/>
+            <a:r>
+              <a:rPr lang="en-US" sz="1100" dirty="0"/>
+              <a:t>User Interface</a:t>
+            </a:r>
+          </a:p>
+        </p:txBody>
+      </p:sp>
+      <p:sp>
+        <p:nvSpPr>
+          <p:cNvPr id="24" name="Rectangle 23">
+            <a:extLst>
+              <a:ext uri="{FF2B5EF4-FFF2-40B4-BE49-F238E27FC236}">
+                <a16:creationId xmlns:a16="http://schemas.microsoft.com/office/drawing/2014/main" id="{F18FDA51-F7C2-476A-A0A4-3D2D3CF96FC9}"/>
+              </a:ext>
+            </a:extLst>
+          </p:cNvPr>
+          <p:cNvSpPr/>
+          <p:nvPr/>
+        </p:nvSpPr>
+        <p:spPr>
+          <a:xfrm>
+            <a:off x="6431609" y="2408545"/>
+            <a:ext cx="2108719" cy="284037"/>
+          </a:xfrm>
+          <a:prstGeom prst="rect">
+            <a:avLst/>
+          </a:prstGeom>
+          <a:ln>
+            <a:headEnd type="none" w="med" len="med"/>
+            <a:tailEnd type="none" w="med" len="med"/>
+          </a:ln>
+        </p:spPr>
+        <p:style>
+          <a:lnRef idx="1">
+            <a:schemeClr val="accent4"/>
+          </a:lnRef>
+          <a:fillRef idx="2">
+            <a:schemeClr val="accent4"/>
+          </a:fillRef>
+          <a:effectRef idx="1">
+            <a:schemeClr val="accent4"/>
+          </a:effectRef>
+          <a:fontRef idx="minor">
+            <a:schemeClr val="dk1"/>
+          </a:fontRef>
+        </p:style>
+        <p:txBody>
+          <a:bodyPr rtlCol="0" anchor="ctr"/>
+          <a:lstStyle/>
+          <a:p>
+            <a:pPr algn="ctr"/>
+            <a:r>
+              <a:rPr lang="en-US" sz="1100" dirty="0"/>
+              <a:t>User Interface</a:t>
+            </a:r>
+          </a:p>
+        </p:txBody>
+      </p:sp>
+      <p:sp>
+        <p:nvSpPr>
+          <p:cNvPr id="26" name="Rectangle 25">
+            <a:extLst>
+              <a:ext uri="{FF2B5EF4-FFF2-40B4-BE49-F238E27FC236}">
+                <a16:creationId xmlns:a16="http://schemas.microsoft.com/office/drawing/2014/main" id="{2EB8FE30-C49E-479E-94A3-1A78391EDB07}"/>
+              </a:ext>
+            </a:extLst>
+          </p:cNvPr>
+          <p:cNvSpPr/>
+          <p:nvPr/>
+        </p:nvSpPr>
+        <p:spPr>
+          <a:xfrm>
+            <a:off x="9222434" y="2405857"/>
+            <a:ext cx="2108719" cy="284037"/>
+          </a:xfrm>
+          <a:prstGeom prst="rect">
+            <a:avLst/>
+          </a:prstGeom>
+          <a:ln>
+            <a:headEnd type="none" w="med" len="med"/>
+            <a:tailEnd type="none" w="med" len="med"/>
+          </a:ln>
+        </p:spPr>
+        <p:style>
+          <a:lnRef idx="1">
+            <a:schemeClr val="accent2"/>
+          </a:lnRef>
+          <a:fillRef idx="2">
+            <a:schemeClr val="accent2"/>
+          </a:fillRef>
+          <a:effectRef idx="1">
+            <a:schemeClr val="accent2"/>
+          </a:effectRef>
+          <a:fontRef idx="minor">
+            <a:schemeClr val="dk1"/>
+          </a:fontRef>
+        </p:style>
+        <p:txBody>
+          <a:bodyPr rtlCol="0" anchor="ctr"/>
+          <a:lstStyle/>
+          <a:p>
+            <a:pPr algn="ctr"/>
+            <a:r>
+              <a:rPr lang="en-US" sz="1100" dirty="0"/>
+              <a:t>User Interface</a:t>
+            </a:r>
+          </a:p>
+        </p:txBody>
+      </p:sp>
+    </p:spTree>
+    <p:extLst>
+      <p:ext uri="{BB962C8B-B14F-4D97-AF65-F5344CB8AC3E}">
+        <p14:creationId xmlns:p14="http://schemas.microsoft.com/office/powerpoint/2010/main" val="540991887"/>
       </p:ext>
     </p:extLst>
   </p:cSld>

</xml_diff>

<commit_message>
Added report center example
</commit_message>
<xml_diff>
--- a/src/SingleResponsibilityPrinciple/images.pptx
+++ b/src/SingleResponsibilityPrinciple/images.pptx
@@ -4,6 +4,9 @@
   <p:sldMasterIdLst>
     <p:sldMasterId id="2147483648" r:id="rId1"/>
   </p:sldMasterIdLst>
+  <p:notesMasterIdLst>
+    <p:notesMasterId r:id="rId11"/>
+  </p:notesMasterIdLst>
   <p:sldIdLst>
     <p:sldId id="256" r:id="rId2"/>
     <p:sldId id="257" r:id="rId3"/>
@@ -11,7 +14,9 @@
     <p:sldId id="260" r:id="rId5"/>
     <p:sldId id="261" r:id="rId6"/>
     <p:sldId id="259" r:id="rId7"/>
-    <p:sldId id="262" r:id="rId8"/>
+    <p:sldId id="264" r:id="rId8"/>
+    <p:sldId id="263" r:id="rId9"/>
+    <p:sldId id="262" r:id="rId10"/>
   </p:sldIdLst>
   <p:sldSz cx="12192000" cy="6858000"/>
   <p:notesSz cx="6858000" cy="9144000"/>
@@ -15766,6 +15771,439 @@
 </dgm:styleDef>
 </file>
 
+<file path=ppt/notesMasters/notesMaster1.xml><?xml version="1.0" encoding="utf-8"?>
+<p:notesMaster xmlns:a="http://schemas.openxmlformats.org/drawingml/2006/main" xmlns:r="http://schemas.openxmlformats.org/officeDocument/2006/relationships" xmlns:p="http://schemas.openxmlformats.org/presentationml/2006/main">
+  <p:cSld>
+    <p:bg>
+      <p:bgRef idx="1001">
+        <a:schemeClr val="bg1"/>
+      </p:bgRef>
+    </p:bg>
+    <p:spTree>
+      <p:nvGrpSpPr>
+        <p:cNvPr id="1" name=""/>
+        <p:cNvGrpSpPr/>
+        <p:nvPr/>
+      </p:nvGrpSpPr>
+      <p:grpSpPr>
+        <a:xfrm>
+          <a:off x="0" y="0"/>
+          <a:ext cx="0" cy="0"/>
+          <a:chOff x="0" y="0"/>
+          <a:chExt cx="0" cy="0"/>
+        </a:xfrm>
+      </p:grpSpPr>
+      <p:sp>
+        <p:nvSpPr>
+          <p:cNvPr id="2" name="Header Placeholder 1"/>
+          <p:cNvSpPr>
+            <a:spLocks noGrp="1"/>
+          </p:cNvSpPr>
+          <p:nvPr>
+            <p:ph type="hdr" sz="quarter"/>
+          </p:nvPr>
+        </p:nvSpPr>
+        <p:spPr>
+          <a:xfrm>
+            <a:off x="0" y="0"/>
+            <a:ext cx="2971800" cy="458788"/>
+          </a:xfrm>
+          <a:prstGeom prst="rect">
+            <a:avLst/>
+          </a:prstGeom>
+        </p:spPr>
+        <p:txBody>
+          <a:bodyPr vert="horz" lIns="91440" tIns="45720" rIns="91440" bIns="45720" rtlCol="0"/>
+          <a:lstStyle>
+            <a:lvl1pPr algn="l">
+              <a:defRPr sz="1200"/>
+            </a:lvl1pPr>
+          </a:lstStyle>
+          <a:p>
+            <a:endParaRPr lang="en-US"/>
+          </a:p>
+        </p:txBody>
+      </p:sp>
+      <p:sp>
+        <p:nvSpPr>
+          <p:cNvPr id="3" name="Date Placeholder 2"/>
+          <p:cNvSpPr>
+            <a:spLocks noGrp="1"/>
+          </p:cNvSpPr>
+          <p:nvPr>
+            <p:ph type="dt" idx="1"/>
+          </p:nvPr>
+        </p:nvSpPr>
+        <p:spPr>
+          <a:xfrm>
+            <a:off x="3884613" y="0"/>
+            <a:ext cx="2971800" cy="458788"/>
+          </a:xfrm>
+          <a:prstGeom prst="rect">
+            <a:avLst/>
+          </a:prstGeom>
+        </p:spPr>
+        <p:txBody>
+          <a:bodyPr vert="horz" lIns="91440" tIns="45720" rIns="91440" bIns="45720" rtlCol="0"/>
+          <a:lstStyle>
+            <a:lvl1pPr algn="r">
+              <a:defRPr sz="1200"/>
+            </a:lvl1pPr>
+          </a:lstStyle>
+          <a:p>
+            <a:fld id="{0E95A006-DE61-43E6-8AA2-3D43426B7FB8}" type="datetimeFigureOut">
+              <a:rPr lang="en-US" smtClean="0"/>
+              <a:t>12/17/2018</a:t>
+            </a:fld>
+            <a:endParaRPr lang="en-US"/>
+          </a:p>
+        </p:txBody>
+      </p:sp>
+      <p:sp>
+        <p:nvSpPr>
+          <p:cNvPr id="4" name="Slide Image Placeholder 3"/>
+          <p:cNvSpPr>
+            <a:spLocks noGrp="1" noRot="1" noChangeAspect="1"/>
+          </p:cNvSpPr>
+          <p:nvPr>
+            <p:ph type="sldImg" idx="2"/>
+          </p:nvPr>
+        </p:nvSpPr>
+        <p:spPr>
+          <a:xfrm>
+            <a:off x="685800" y="1143000"/>
+            <a:ext cx="5486400" cy="3086100"/>
+          </a:xfrm>
+          <a:prstGeom prst="rect">
+            <a:avLst/>
+          </a:prstGeom>
+          <a:noFill/>
+          <a:ln w="12700">
+            <a:solidFill>
+              <a:prstClr val="black"/>
+            </a:solidFill>
+          </a:ln>
+        </p:spPr>
+        <p:txBody>
+          <a:bodyPr vert="horz" lIns="91440" tIns="45720" rIns="91440" bIns="45720" rtlCol="0" anchor="ctr"/>
+          <a:lstStyle/>
+          <a:p>
+            <a:endParaRPr lang="en-US"/>
+          </a:p>
+        </p:txBody>
+      </p:sp>
+      <p:sp>
+        <p:nvSpPr>
+          <p:cNvPr id="5" name="Notes Placeholder 4"/>
+          <p:cNvSpPr>
+            <a:spLocks noGrp="1"/>
+          </p:cNvSpPr>
+          <p:nvPr>
+            <p:ph type="body" sz="quarter" idx="3"/>
+          </p:nvPr>
+        </p:nvSpPr>
+        <p:spPr>
+          <a:xfrm>
+            <a:off x="685800" y="4400550"/>
+            <a:ext cx="5486400" cy="3600450"/>
+          </a:xfrm>
+          <a:prstGeom prst="rect">
+            <a:avLst/>
+          </a:prstGeom>
+        </p:spPr>
+        <p:txBody>
+          <a:bodyPr vert="horz" lIns="91440" tIns="45720" rIns="91440" bIns="45720" rtlCol="0"/>
+          <a:lstStyle/>
+          <a:p>
+            <a:pPr lvl="0"/>
+            <a:r>
+              <a:rPr lang="en-US"/>
+              <a:t>Edit Master text styles</a:t>
+            </a:r>
+          </a:p>
+          <a:p>
+            <a:pPr lvl="1"/>
+            <a:r>
+              <a:rPr lang="en-US"/>
+              <a:t>Second level</a:t>
+            </a:r>
+          </a:p>
+          <a:p>
+            <a:pPr lvl="2"/>
+            <a:r>
+              <a:rPr lang="en-US"/>
+              <a:t>Third level</a:t>
+            </a:r>
+          </a:p>
+          <a:p>
+            <a:pPr lvl="3"/>
+            <a:r>
+              <a:rPr lang="en-US"/>
+              <a:t>Fourth level</a:t>
+            </a:r>
+          </a:p>
+          <a:p>
+            <a:pPr lvl="4"/>
+            <a:r>
+              <a:rPr lang="en-US"/>
+              <a:t>Fifth level</a:t>
+            </a:r>
+          </a:p>
+        </p:txBody>
+      </p:sp>
+      <p:sp>
+        <p:nvSpPr>
+          <p:cNvPr id="6" name="Footer Placeholder 5"/>
+          <p:cNvSpPr>
+            <a:spLocks noGrp="1"/>
+          </p:cNvSpPr>
+          <p:nvPr>
+            <p:ph type="ftr" sz="quarter" idx="4"/>
+          </p:nvPr>
+        </p:nvSpPr>
+        <p:spPr>
+          <a:xfrm>
+            <a:off x="0" y="8685213"/>
+            <a:ext cx="2971800" cy="458787"/>
+          </a:xfrm>
+          <a:prstGeom prst="rect">
+            <a:avLst/>
+          </a:prstGeom>
+        </p:spPr>
+        <p:txBody>
+          <a:bodyPr vert="horz" lIns="91440" tIns="45720" rIns="91440" bIns="45720" rtlCol="0" anchor="b"/>
+          <a:lstStyle>
+            <a:lvl1pPr algn="l">
+              <a:defRPr sz="1200"/>
+            </a:lvl1pPr>
+          </a:lstStyle>
+          <a:p>
+            <a:endParaRPr lang="en-US"/>
+          </a:p>
+        </p:txBody>
+      </p:sp>
+      <p:sp>
+        <p:nvSpPr>
+          <p:cNvPr id="7" name="Slide Number Placeholder 6"/>
+          <p:cNvSpPr>
+            <a:spLocks noGrp="1"/>
+          </p:cNvSpPr>
+          <p:nvPr>
+            <p:ph type="sldNum" sz="quarter" idx="5"/>
+          </p:nvPr>
+        </p:nvSpPr>
+        <p:spPr>
+          <a:xfrm>
+            <a:off x="3884613" y="8685213"/>
+            <a:ext cx="2971800" cy="458787"/>
+          </a:xfrm>
+          <a:prstGeom prst="rect">
+            <a:avLst/>
+          </a:prstGeom>
+        </p:spPr>
+        <p:txBody>
+          <a:bodyPr vert="horz" lIns="91440" tIns="45720" rIns="91440" bIns="45720" rtlCol="0" anchor="b"/>
+          <a:lstStyle>
+            <a:lvl1pPr algn="r">
+              <a:defRPr sz="1200"/>
+            </a:lvl1pPr>
+          </a:lstStyle>
+          <a:p>
+            <a:fld id="{F9FE2B3D-2485-4476-BEC0-74B2B0B35CA7}" type="slidenum">
+              <a:rPr lang="en-US" smtClean="0"/>
+              <a:t>‹#›</a:t>
+            </a:fld>
+            <a:endParaRPr lang="en-US"/>
+          </a:p>
+        </p:txBody>
+      </p:sp>
+    </p:spTree>
+    <p:extLst>
+      <p:ext uri="{BB962C8B-B14F-4D97-AF65-F5344CB8AC3E}">
+        <p14:creationId xmlns:p14="http://schemas.microsoft.com/office/powerpoint/2010/main" val="2236641967"/>
+      </p:ext>
+    </p:extLst>
+  </p:cSld>
+  <p:clrMap bg1="lt1" tx1="dk1" bg2="lt2" tx2="dk2" accent1="accent1" accent2="accent2" accent3="accent3" accent4="accent4" accent5="accent5" accent6="accent6" hlink="hlink" folHlink="folHlink"/>
+  <p:notesStyle>
+    <a:lvl1pPr marL="0" algn="l" defTabSz="914400" rtl="0" eaLnBrk="1" latinLnBrk="0" hangingPunct="1">
+      <a:defRPr sz="1200" kern="1200">
+        <a:solidFill>
+          <a:schemeClr val="tx1"/>
+        </a:solidFill>
+        <a:latin typeface="+mn-lt"/>
+        <a:ea typeface="+mn-ea"/>
+        <a:cs typeface="+mn-cs"/>
+      </a:defRPr>
+    </a:lvl1pPr>
+    <a:lvl2pPr marL="457200" algn="l" defTabSz="914400" rtl="0" eaLnBrk="1" latinLnBrk="0" hangingPunct="1">
+      <a:defRPr sz="1200" kern="1200">
+        <a:solidFill>
+          <a:schemeClr val="tx1"/>
+        </a:solidFill>
+        <a:latin typeface="+mn-lt"/>
+        <a:ea typeface="+mn-ea"/>
+        <a:cs typeface="+mn-cs"/>
+      </a:defRPr>
+    </a:lvl2pPr>
+    <a:lvl3pPr marL="914400" algn="l" defTabSz="914400" rtl="0" eaLnBrk="1" latinLnBrk="0" hangingPunct="1">
+      <a:defRPr sz="1200" kern="1200">
+        <a:solidFill>
+          <a:schemeClr val="tx1"/>
+        </a:solidFill>
+        <a:latin typeface="+mn-lt"/>
+        <a:ea typeface="+mn-ea"/>
+        <a:cs typeface="+mn-cs"/>
+      </a:defRPr>
+    </a:lvl3pPr>
+    <a:lvl4pPr marL="1371600" algn="l" defTabSz="914400" rtl="0" eaLnBrk="1" latinLnBrk="0" hangingPunct="1">
+      <a:defRPr sz="1200" kern="1200">
+        <a:solidFill>
+          <a:schemeClr val="tx1"/>
+        </a:solidFill>
+        <a:latin typeface="+mn-lt"/>
+        <a:ea typeface="+mn-ea"/>
+        <a:cs typeface="+mn-cs"/>
+      </a:defRPr>
+    </a:lvl4pPr>
+    <a:lvl5pPr marL="1828800" algn="l" defTabSz="914400" rtl="0" eaLnBrk="1" latinLnBrk="0" hangingPunct="1">
+      <a:defRPr sz="1200" kern="1200">
+        <a:solidFill>
+          <a:schemeClr val="tx1"/>
+        </a:solidFill>
+        <a:latin typeface="+mn-lt"/>
+        <a:ea typeface="+mn-ea"/>
+        <a:cs typeface="+mn-cs"/>
+      </a:defRPr>
+    </a:lvl5pPr>
+    <a:lvl6pPr marL="2286000" algn="l" defTabSz="914400" rtl="0" eaLnBrk="1" latinLnBrk="0" hangingPunct="1">
+      <a:defRPr sz="1200" kern="1200">
+        <a:solidFill>
+          <a:schemeClr val="tx1"/>
+        </a:solidFill>
+        <a:latin typeface="+mn-lt"/>
+        <a:ea typeface="+mn-ea"/>
+        <a:cs typeface="+mn-cs"/>
+      </a:defRPr>
+    </a:lvl6pPr>
+    <a:lvl7pPr marL="2743200" algn="l" defTabSz="914400" rtl="0" eaLnBrk="1" latinLnBrk="0" hangingPunct="1">
+      <a:defRPr sz="1200" kern="1200">
+        <a:solidFill>
+          <a:schemeClr val="tx1"/>
+        </a:solidFill>
+        <a:latin typeface="+mn-lt"/>
+        <a:ea typeface="+mn-ea"/>
+        <a:cs typeface="+mn-cs"/>
+      </a:defRPr>
+    </a:lvl7pPr>
+    <a:lvl8pPr marL="3200400" algn="l" defTabSz="914400" rtl="0" eaLnBrk="1" latinLnBrk="0" hangingPunct="1">
+      <a:defRPr sz="1200" kern="1200">
+        <a:solidFill>
+          <a:schemeClr val="tx1"/>
+        </a:solidFill>
+        <a:latin typeface="+mn-lt"/>
+        <a:ea typeface="+mn-ea"/>
+        <a:cs typeface="+mn-cs"/>
+      </a:defRPr>
+    </a:lvl8pPr>
+    <a:lvl9pPr marL="3657600" algn="l" defTabSz="914400" rtl="0" eaLnBrk="1" latinLnBrk="0" hangingPunct="1">
+      <a:defRPr sz="1200" kern="1200">
+        <a:solidFill>
+          <a:schemeClr val="tx1"/>
+        </a:solidFill>
+        <a:latin typeface="+mn-lt"/>
+        <a:ea typeface="+mn-ea"/>
+        <a:cs typeface="+mn-cs"/>
+      </a:defRPr>
+    </a:lvl9pPr>
+  </p:notesStyle>
+</p:notesMaster>
+</file>
+
+<file path=ppt/notesSlides/notesSlide1.xml><?xml version="1.0" encoding="utf-8"?>
+<p:notes xmlns:a="http://schemas.openxmlformats.org/drawingml/2006/main" xmlns:r="http://schemas.openxmlformats.org/officeDocument/2006/relationships" xmlns:p="http://schemas.openxmlformats.org/presentationml/2006/main">
+  <p:cSld>
+    <p:spTree>
+      <p:nvGrpSpPr>
+        <p:cNvPr id="1" name=""/>
+        <p:cNvGrpSpPr/>
+        <p:nvPr/>
+      </p:nvGrpSpPr>
+      <p:grpSpPr>
+        <a:xfrm>
+          <a:off x="0" y="0"/>
+          <a:ext cx="0" cy="0"/>
+          <a:chOff x="0" y="0"/>
+          <a:chExt cx="0" cy="0"/>
+        </a:xfrm>
+      </p:grpSpPr>
+      <p:sp>
+        <p:nvSpPr>
+          <p:cNvPr id="2" name="Slide Image Placeholder 1"/>
+          <p:cNvSpPr>
+            <a:spLocks noGrp="1" noRot="1" noChangeAspect="1"/>
+          </p:cNvSpPr>
+          <p:nvPr>
+            <p:ph type="sldImg"/>
+          </p:nvPr>
+        </p:nvSpPr>
+        <p:spPr/>
+      </p:sp>
+      <p:sp>
+        <p:nvSpPr>
+          <p:cNvPr id="3" name="Notes Placeholder 2"/>
+          <p:cNvSpPr>
+            <a:spLocks noGrp="1"/>
+          </p:cNvSpPr>
+          <p:nvPr>
+            <p:ph type="body" idx="1"/>
+          </p:nvPr>
+        </p:nvSpPr>
+        <p:spPr/>
+        <p:txBody>
+          <a:bodyPr/>
+          <a:lstStyle/>
+          <a:p>
+            <a:endParaRPr lang="en-US" dirty="0"/>
+          </a:p>
+        </p:txBody>
+      </p:sp>
+      <p:sp>
+        <p:nvSpPr>
+          <p:cNvPr id="4" name="Slide Number Placeholder 3"/>
+          <p:cNvSpPr>
+            <a:spLocks noGrp="1"/>
+          </p:cNvSpPr>
+          <p:nvPr>
+            <p:ph type="sldNum" sz="quarter" idx="10"/>
+          </p:nvPr>
+        </p:nvSpPr>
+        <p:spPr/>
+        <p:txBody>
+          <a:bodyPr/>
+          <a:lstStyle/>
+          <a:p>
+            <a:fld id="{F9FE2B3D-2485-4476-BEC0-74B2B0B35CA7}" type="slidenum">
+              <a:rPr lang="en-US" smtClean="0"/>
+              <a:t>7</a:t>
+            </a:fld>
+            <a:endParaRPr lang="en-US"/>
+          </a:p>
+        </p:txBody>
+      </p:sp>
+    </p:spTree>
+    <p:extLst>
+      <p:ext uri="{BB962C8B-B14F-4D97-AF65-F5344CB8AC3E}">
+        <p14:creationId xmlns:p14="http://schemas.microsoft.com/office/powerpoint/2010/main" val="2086377260"/>
+      </p:ext>
+    </p:extLst>
+  </p:cSld>
+  <p:clrMapOvr>
+    <a:masterClrMapping/>
+  </p:clrMapOvr>
+</p:notes>
+</file>
+
 <file path=ppt/slideLayouts/slideLayout1.xml><?xml version="1.0" encoding="utf-8"?>
 <p:sldLayout xmlns:a="http://schemas.openxmlformats.org/drawingml/2006/main" xmlns:r="http://schemas.openxmlformats.org/officeDocument/2006/relationships" xmlns:p="http://schemas.openxmlformats.org/presentationml/2006/main" type="title" preserve="1">
   <p:cSld name="Title Slide">
@@ -15913,7 +16351,7 @@
           <a:p>
             <a:fld id="{90D4E0A7-C40C-472C-9687-D093D3F53AEA}" type="datetimeFigureOut">
               <a:rPr lang="en-US" smtClean="0"/>
-              <a:t>12/14/2018</a:t>
+              <a:t>12/17/2018</a:t>
             </a:fld>
             <a:endParaRPr lang="en-US"/>
           </a:p>
@@ -16111,7 +16549,7 @@
           <a:p>
             <a:fld id="{90D4E0A7-C40C-472C-9687-D093D3F53AEA}" type="datetimeFigureOut">
               <a:rPr lang="en-US" smtClean="0"/>
-              <a:t>12/14/2018</a:t>
+              <a:t>12/17/2018</a:t>
             </a:fld>
             <a:endParaRPr lang="en-US"/>
           </a:p>
@@ -16319,7 +16757,7 @@
           <a:p>
             <a:fld id="{90D4E0A7-C40C-472C-9687-D093D3F53AEA}" type="datetimeFigureOut">
               <a:rPr lang="en-US" smtClean="0"/>
-              <a:t>12/14/2018</a:t>
+              <a:t>12/17/2018</a:t>
             </a:fld>
             <a:endParaRPr lang="en-US"/>
           </a:p>
@@ -16517,7 +16955,7 @@
           <a:p>
             <a:fld id="{90D4E0A7-C40C-472C-9687-D093D3F53AEA}" type="datetimeFigureOut">
               <a:rPr lang="en-US" smtClean="0"/>
-              <a:t>12/14/2018</a:t>
+              <a:t>12/17/2018</a:t>
             </a:fld>
             <a:endParaRPr lang="en-US"/>
           </a:p>
@@ -16792,7 +17230,7 @@
           <a:p>
             <a:fld id="{90D4E0A7-C40C-472C-9687-D093D3F53AEA}" type="datetimeFigureOut">
               <a:rPr lang="en-US" smtClean="0"/>
-              <a:t>12/14/2018</a:t>
+              <a:t>12/17/2018</a:t>
             </a:fld>
             <a:endParaRPr lang="en-US"/>
           </a:p>
@@ -17057,7 +17495,7 @@
           <a:p>
             <a:fld id="{90D4E0A7-C40C-472C-9687-D093D3F53AEA}" type="datetimeFigureOut">
               <a:rPr lang="en-US" smtClean="0"/>
-              <a:t>12/14/2018</a:t>
+              <a:t>12/17/2018</a:t>
             </a:fld>
             <a:endParaRPr lang="en-US"/>
           </a:p>
@@ -17469,7 +17907,7 @@
           <a:p>
             <a:fld id="{90D4E0A7-C40C-472C-9687-D093D3F53AEA}" type="datetimeFigureOut">
               <a:rPr lang="en-US" smtClean="0"/>
-              <a:t>12/14/2018</a:t>
+              <a:t>12/17/2018</a:t>
             </a:fld>
             <a:endParaRPr lang="en-US"/>
           </a:p>
@@ -17610,7 +18048,7 @@
           <a:p>
             <a:fld id="{90D4E0A7-C40C-472C-9687-D093D3F53AEA}" type="datetimeFigureOut">
               <a:rPr lang="en-US" smtClean="0"/>
-              <a:t>12/14/2018</a:t>
+              <a:t>12/17/2018</a:t>
             </a:fld>
             <a:endParaRPr lang="en-US"/>
           </a:p>
@@ -17723,7 +18161,7 @@
           <a:p>
             <a:fld id="{90D4E0A7-C40C-472C-9687-D093D3F53AEA}" type="datetimeFigureOut">
               <a:rPr lang="en-US" smtClean="0"/>
-              <a:t>12/14/2018</a:t>
+              <a:t>12/17/2018</a:t>
             </a:fld>
             <a:endParaRPr lang="en-US"/>
           </a:p>
@@ -18034,7 +18472,7 @@
           <a:p>
             <a:fld id="{90D4E0A7-C40C-472C-9687-D093D3F53AEA}" type="datetimeFigureOut">
               <a:rPr lang="en-US" smtClean="0"/>
-              <a:t>12/14/2018</a:t>
+              <a:t>12/17/2018</a:t>
             </a:fld>
             <a:endParaRPr lang="en-US"/>
           </a:p>
@@ -18322,7 +18760,7 @@
           <a:p>
             <a:fld id="{90D4E0A7-C40C-472C-9687-D093D3F53AEA}" type="datetimeFigureOut">
               <a:rPr lang="en-US" smtClean="0"/>
-              <a:t>12/14/2018</a:t>
+              <a:t>12/17/2018</a:t>
             </a:fld>
             <a:endParaRPr lang="en-US"/>
           </a:p>
@@ -18563,7 +19001,7 @@
           <a:p>
             <a:fld id="{90D4E0A7-C40C-472C-9687-D093D3F53AEA}" type="datetimeFigureOut">
               <a:rPr lang="en-US" smtClean="0"/>
-              <a:t>12/14/2018</a:t>
+              <a:t>12/17/2018</a:t>
             </a:fld>
             <a:endParaRPr lang="en-US"/>
           </a:p>
@@ -21090,6 +21528,2811 @@
       </p:grpSpPr>
       <p:sp>
         <p:nvSpPr>
+          <p:cNvPr id="15" name="Rectangle 14">
+            <a:extLst>
+              <a:ext uri="{FF2B5EF4-FFF2-40B4-BE49-F238E27FC236}">
+                <a16:creationId xmlns:a16="http://schemas.microsoft.com/office/drawing/2014/main" id="{527C8F35-DC02-456A-A997-39FD7A02F176}"/>
+              </a:ext>
+            </a:extLst>
+          </p:cNvPr>
+          <p:cNvSpPr/>
+          <p:nvPr/>
+        </p:nvSpPr>
+        <p:spPr>
+          <a:xfrm>
+            <a:off x="469783" y="1468073"/>
+            <a:ext cx="11299971" cy="3736225"/>
+          </a:xfrm>
+          <a:prstGeom prst="rect">
+            <a:avLst/>
+          </a:prstGeom>
+          <a:ln/>
+        </p:spPr>
+        <p:style>
+          <a:lnRef idx="0">
+            <a:schemeClr val="dk1"/>
+          </a:lnRef>
+          <a:fillRef idx="3">
+            <a:schemeClr val="dk1"/>
+          </a:fillRef>
+          <a:effectRef idx="3">
+            <a:schemeClr val="dk1"/>
+          </a:effectRef>
+          <a:fontRef idx="minor">
+            <a:schemeClr val="lt1"/>
+          </a:fontRef>
+        </p:style>
+        <p:txBody>
+          <a:bodyPr rtlCol="0" anchor="ctr"/>
+          <a:lstStyle/>
+          <a:p>
+            <a:pPr algn="ctr"/>
+            <a:endParaRPr lang="en-US"/>
+          </a:p>
+        </p:txBody>
+      </p:sp>
+      <p:sp>
+        <p:nvSpPr>
+          <p:cNvPr id="4" name="Rectangle 3">
+            <a:extLst>
+              <a:ext uri="{FF2B5EF4-FFF2-40B4-BE49-F238E27FC236}">
+                <a16:creationId xmlns:a16="http://schemas.microsoft.com/office/drawing/2014/main" id="{85E86770-4990-4AE3-A8F8-4FE49F8985CD}"/>
+              </a:ext>
+            </a:extLst>
+          </p:cNvPr>
+          <p:cNvSpPr/>
+          <p:nvPr/>
+        </p:nvSpPr>
+        <p:spPr>
+          <a:xfrm>
+            <a:off x="585788" y="1995385"/>
+            <a:ext cx="2647949" cy="1433615"/>
+          </a:xfrm>
+          <a:prstGeom prst="rect">
+            <a:avLst/>
+          </a:prstGeom>
+        </p:spPr>
+        <p:style>
+          <a:lnRef idx="2">
+            <a:schemeClr val="accent6">
+              <a:shade val="50000"/>
+            </a:schemeClr>
+          </a:lnRef>
+          <a:fillRef idx="1">
+            <a:schemeClr val="accent6"/>
+          </a:fillRef>
+          <a:effectRef idx="0">
+            <a:schemeClr val="accent6"/>
+          </a:effectRef>
+          <a:fontRef idx="minor">
+            <a:schemeClr val="lt1"/>
+          </a:fontRef>
+        </p:style>
+        <p:txBody>
+          <a:bodyPr rtlCol="0" anchor="t"/>
+          <a:lstStyle/>
+          <a:p>
+            <a:r>
+              <a:rPr lang="en-US" dirty="0">
+                <a:solidFill>
+                  <a:schemeClr val="tx1"/>
+                </a:solidFill>
+              </a:rPr>
+              <a:t>Equity Chars</a:t>
+            </a:r>
+          </a:p>
+        </p:txBody>
+      </p:sp>
+      <p:sp>
+        <p:nvSpPr>
+          <p:cNvPr id="6" name="Rectangle 5">
+            <a:extLst>
+              <a:ext uri="{FF2B5EF4-FFF2-40B4-BE49-F238E27FC236}">
+                <a16:creationId xmlns:a16="http://schemas.microsoft.com/office/drawing/2014/main" id="{343BA7AA-C649-43E9-8980-EFF6B5CBD307}"/>
+              </a:ext>
+            </a:extLst>
+          </p:cNvPr>
+          <p:cNvSpPr/>
+          <p:nvPr/>
+        </p:nvSpPr>
+        <p:spPr>
+          <a:xfrm>
+            <a:off x="3376613" y="1995383"/>
+            <a:ext cx="2647949" cy="1433615"/>
+          </a:xfrm>
+          <a:prstGeom prst="rect">
+            <a:avLst/>
+          </a:prstGeom>
+        </p:spPr>
+        <p:style>
+          <a:lnRef idx="2">
+            <a:schemeClr val="accent1">
+              <a:shade val="50000"/>
+            </a:schemeClr>
+          </a:lnRef>
+          <a:fillRef idx="1">
+            <a:schemeClr val="accent1"/>
+          </a:fillRef>
+          <a:effectRef idx="0">
+            <a:schemeClr val="accent1"/>
+          </a:effectRef>
+          <a:fontRef idx="minor">
+            <a:schemeClr val="lt1"/>
+          </a:fontRef>
+        </p:style>
+        <p:txBody>
+          <a:bodyPr rtlCol="0" anchor="t"/>
+          <a:lstStyle/>
+          <a:p>
+            <a:r>
+              <a:rPr lang="en-US" dirty="0">
+                <a:solidFill>
+                  <a:schemeClr val="tx1"/>
+                </a:solidFill>
+              </a:rPr>
+              <a:t>Fixed Income Chars</a:t>
+            </a:r>
+          </a:p>
+          <a:p>
+            <a:endParaRPr lang="en-US" dirty="0"/>
+          </a:p>
+        </p:txBody>
+      </p:sp>
+      <p:sp>
+        <p:nvSpPr>
+          <p:cNvPr id="7" name="Rectangle 6">
+            <a:extLst>
+              <a:ext uri="{FF2B5EF4-FFF2-40B4-BE49-F238E27FC236}">
+                <a16:creationId xmlns:a16="http://schemas.microsoft.com/office/drawing/2014/main" id="{D268C448-08A7-4A37-A33C-C8795E19A0B7}"/>
+              </a:ext>
+            </a:extLst>
+          </p:cNvPr>
+          <p:cNvSpPr/>
+          <p:nvPr/>
+        </p:nvSpPr>
+        <p:spPr>
+          <a:xfrm>
+            <a:off x="6167438" y="1995383"/>
+            <a:ext cx="2647949" cy="1433615"/>
+          </a:xfrm>
+          <a:prstGeom prst="rect">
+            <a:avLst/>
+          </a:prstGeom>
+        </p:spPr>
+        <p:style>
+          <a:lnRef idx="2">
+            <a:schemeClr val="accent4">
+              <a:shade val="50000"/>
+            </a:schemeClr>
+          </a:lnRef>
+          <a:fillRef idx="1">
+            <a:schemeClr val="accent4"/>
+          </a:fillRef>
+          <a:effectRef idx="0">
+            <a:schemeClr val="accent4"/>
+          </a:effectRef>
+          <a:fontRef idx="minor">
+            <a:schemeClr val="lt1"/>
+          </a:fontRef>
+        </p:style>
+        <p:txBody>
+          <a:bodyPr rtlCol="0" anchor="t"/>
+          <a:lstStyle/>
+          <a:p>
+            <a:r>
+              <a:rPr lang="en-US" dirty="0">
+                <a:solidFill>
+                  <a:schemeClr val="tx1"/>
+                </a:solidFill>
+              </a:rPr>
+              <a:t>Returns</a:t>
+            </a:r>
+          </a:p>
+        </p:txBody>
+      </p:sp>
+      <p:sp>
+        <p:nvSpPr>
+          <p:cNvPr id="8" name="Rectangle 7">
+            <a:extLst>
+              <a:ext uri="{FF2B5EF4-FFF2-40B4-BE49-F238E27FC236}">
+                <a16:creationId xmlns:a16="http://schemas.microsoft.com/office/drawing/2014/main" id="{E907507F-E651-4DDF-947F-CA3D55D51CBA}"/>
+              </a:ext>
+            </a:extLst>
+          </p:cNvPr>
+          <p:cNvSpPr/>
+          <p:nvPr/>
+        </p:nvSpPr>
+        <p:spPr>
+          <a:xfrm>
+            <a:off x="8958263" y="1995383"/>
+            <a:ext cx="2647949" cy="1433615"/>
+          </a:xfrm>
+          <a:prstGeom prst="rect">
+            <a:avLst/>
+          </a:prstGeom>
+        </p:spPr>
+        <p:style>
+          <a:lnRef idx="2">
+            <a:schemeClr val="accent2">
+              <a:shade val="50000"/>
+            </a:schemeClr>
+          </a:lnRef>
+          <a:fillRef idx="1">
+            <a:schemeClr val="accent2"/>
+          </a:fillRef>
+          <a:effectRef idx="0">
+            <a:schemeClr val="accent2"/>
+          </a:effectRef>
+          <a:fontRef idx="minor">
+            <a:schemeClr val="lt1"/>
+          </a:fontRef>
+        </p:style>
+        <p:txBody>
+          <a:bodyPr rtlCol="0" anchor="t"/>
+          <a:lstStyle/>
+          <a:p>
+            <a:r>
+              <a:rPr lang="en-US" dirty="0">
+                <a:solidFill>
+                  <a:schemeClr val="tx1"/>
+                </a:solidFill>
+              </a:rPr>
+              <a:t>AUM</a:t>
+            </a:r>
+          </a:p>
+        </p:txBody>
+      </p:sp>
+      <p:sp>
+        <p:nvSpPr>
+          <p:cNvPr id="17" name="Rectangle 16">
+            <a:extLst>
+              <a:ext uri="{FF2B5EF4-FFF2-40B4-BE49-F238E27FC236}">
+                <a16:creationId xmlns:a16="http://schemas.microsoft.com/office/drawing/2014/main" id="{A6457479-8EC7-48D6-A735-A2C336A8CD0B}"/>
+              </a:ext>
+            </a:extLst>
+          </p:cNvPr>
+          <p:cNvSpPr/>
+          <p:nvPr/>
+        </p:nvSpPr>
+        <p:spPr>
+          <a:xfrm>
+            <a:off x="585788" y="1584836"/>
+            <a:ext cx="11020424" cy="298580"/>
+          </a:xfrm>
+          <a:prstGeom prst="rect">
+            <a:avLst/>
+          </a:prstGeom>
+        </p:spPr>
+        <p:style>
+          <a:lnRef idx="1">
+            <a:schemeClr val="accent3"/>
+          </a:lnRef>
+          <a:fillRef idx="2">
+            <a:schemeClr val="accent3"/>
+          </a:fillRef>
+          <a:effectRef idx="1">
+            <a:schemeClr val="accent3"/>
+          </a:effectRef>
+          <a:fontRef idx="minor">
+            <a:schemeClr val="dk1"/>
+          </a:fontRef>
+        </p:style>
+        <p:txBody>
+          <a:bodyPr rtlCol="0" anchor="ctr"/>
+          <a:lstStyle/>
+          <a:p>
+            <a:pPr algn="ctr"/>
+            <a:r>
+              <a:rPr lang="en-US" sz="1600" dirty="0">
+                <a:solidFill>
+                  <a:schemeClr val="tx1"/>
+                </a:solidFill>
+              </a:rPr>
+              <a:t>Data Delivery</a:t>
+            </a:r>
+          </a:p>
+        </p:txBody>
+      </p:sp>
+      <p:sp>
+        <p:nvSpPr>
+          <p:cNvPr id="18" name="Rectangle 17">
+            <a:extLst>
+              <a:ext uri="{FF2B5EF4-FFF2-40B4-BE49-F238E27FC236}">
+                <a16:creationId xmlns:a16="http://schemas.microsoft.com/office/drawing/2014/main" id="{3D0A15A2-D2AE-4DEA-832A-822F587AF834}"/>
+              </a:ext>
+            </a:extLst>
+          </p:cNvPr>
+          <p:cNvSpPr/>
+          <p:nvPr/>
+        </p:nvSpPr>
+        <p:spPr>
+          <a:xfrm>
+            <a:off x="585787" y="3576922"/>
+            <a:ext cx="2647949" cy="1433615"/>
+          </a:xfrm>
+          <a:prstGeom prst="rect">
+            <a:avLst/>
+          </a:prstGeom>
+        </p:spPr>
+        <p:style>
+          <a:lnRef idx="2">
+            <a:schemeClr val="accent3">
+              <a:shade val="50000"/>
+            </a:schemeClr>
+          </a:lnRef>
+          <a:fillRef idx="1">
+            <a:schemeClr val="accent3"/>
+          </a:fillRef>
+          <a:effectRef idx="0">
+            <a:schemeClr val="accent3"/>
+          </a:effectRef>
+          <a:fontRef idx="minor">
+            <a:schemeClr val="lt1"/>
+          </a:fontRef>
+        </p:style>
+        <p:txBody>
+          <a:bodyPr rtlCol="0" anchor="t"/>
+          <a:lstStyle/>
+          <a:p>
+            <a:r>
+              <a:rPr lang="en-US" dirty="0">
+                <a:solidFill>
+                  <a:schemeClr val="tx1"/>
+                </a:solidFill>
+              </a:rPr>
+              <a:t>Funds </a:t>
+            </a:r>
+            <a:r>
+              <a:rPr lang="en-US">
+                <a:solidFill>
+                  <a:schemeClr val="tx1"/>
+                </a:solidFill>
+              </a:rPr>
+              <a:t>w Benchmarks</a:t>
+            </a:r>
+            <a:endParaRPr lang="en-US" dirty="0">
+              <a:solidFill>
+                <a:schemeClr val="tx1"/>
+              </a:solidFill>
+            </a:endParaRPr>
+          </a:p>
+        </p:txBody>
+      </p:sp>
+    </p:spTree>
+    <p:extLst>
+      <p:ext uri="{BB962C8B-B14F-4D97-AF65-F5344CB8AC3E}">
+        <p14:creationId xmlns:p14="http://schemas.microsoft.com/office/powerpoint/2010/main" val="3022364614"/>
+      </p:ext>
+    </p:extLst>
+  </p:cSld>
+  <p:clrMapOvr>
+    <a:masterClrMapping/>
+  </p:clrMapOvr>
+</p:sld>
+</file>
+
+<file path=ppt/slides/slide8.xml><?xml version="1.0" encoding="utf-8"?>
+<p:sld xmlns:a="http://schemas.openxmlformats.org/drawingml/2006/main" xmlns:r="http://schemas.openxmlformats.org/officeDocument/2006/relationships" xmlns:p="http://schemas.openxmlformats.org/presentationml/2006/main">
+  <p:cSld>
+    <p:spTree>
+      <p:nvGrpSpPr>
+        <p:cNvPr id="1" name=""/>
+        <p:cNvGrpSpPr/>
+        <p:nvPr/>
+      </p:nvGrpSpPr>
+      <p:grpSpPr>
+        <a:xfrm>
+          <a:off x="0" y="0"/>
+          <a:ext cx="0" cy="0"/>
+          <a:chOff x="0" y="0"/>
+          <a:chExt cx="0" cy="0"/>
+        </a:xfrm>
+      </p:grpSpPr>
+      <p:grpSp>
+        <p:nvGrpSpPr>
+          <p:cNvPr id="5" name="Group 4">
+            <a:extLst>
+              <a:ext uri="{FF2B5EF4-FFF2-40B4-BE49-F238E27FC236}">
+                <a16:creationId xmlns:a16="http://schemas.microsoft.com/office/drawing/2014/main" id="{5D50D5AE-4973-4182-8B63-071912DC9D18}"/>
+              </a:ext>
+            </a:extLst>
+          </p:cNvPr>
+          <p:cNvGrpSpPr/>
+          <p:nvPr/>
+        </p:nvGrpSpPr>
+        <p:grpSpPr>
+          <a:xfrm>
+            <a:off x="761612" y="1147061"/>
+            <a:ext cx="6779983" cy="2486497"/>
+            <a:chOff x="469783" y="1468073"/>
+            <a:chExt cx="11299971" cy="4144162"/>
+          </a:xfrm>
+        </p:grpSpPr>
+        <p:sp>
+          <p:nvSpPr>
+            <p:cNvPr id="15" name="Rectangle 14">
+              <a:extLst>
+                <a:ext uri="{FF2B5EF4-FFF2-40B4-BE49-F238E27FC236}">
+                  <a16:creationId xmlns:a16="http://schemas.microsoft.com/office/drawing/2014/main" id="{527C8F35-DC02-456A-A997-39FD7A02F176}"/>
+                </a:ext>
+              </a:extLst>
+            </p:cNvPr>
+            <p:cNvSpPr/>
+            <p:nvPr/>
+          </p:nvSpPr>
+          <p:spPr>
+            <a:xfrm>
+              <a:off x="469783" y="1468073"/>
+              <a:ext cx="11299971" cy="4144162"/>
+            </a:xfrm>
+            <a:prstGeom prst="rect">
+              <a:avLst/>
+            </a:prstGeom>
+            <a:ln/>
+          </p:spPr>
+          <p:style>
+            <a:lnRef idx="0">
+              <a:schemeClr val="dk1"/>
+            </a:lnRef>
+            <a:fillRef idx="3">
+              <a:schemeClr val="dk1"/>
+            </a:fillRef>
+            <a:effectRef idx="3">
+              <a:schemeClr val="dk1"/>
+            </a:effectRef>
+            <a:fontRef idx="minor">
+              <a:schemeClr val="lt1"/>
+            </a:fontRef>
+          </p:style>
+          <p:txBody>
+            <a:bodyPr rtlCol="0" anchor="ctr"/>
+            <a:lstStyle/>
+            <a:p>
+              <a:pPr algn="ctr"/>
+              <a:endParaRPr lang="en-US"/>
+            </a:p>
+          </p:txBody>
+        </p:sp>
+        <p:sp>
+          <p:nvSpPr>
+            <p:cNvPr id="4" name="Rectangle 3">
+              <a:extLst>
+                <a:ext uri="{FF2B5EF4-FFF2-40B4-BE49-F238E27FC236}">
+                  <a16:creationId xmlns:a16="http://schemas.microsoft.com/office/drawing/2014/main" id="{85E86770-4990-4AE3-A8F8-4FE49F8985CD}"/>
+                </a:ext>
+              </a:extLst>
+            </p:cNvPr>
+            <p:cNvSpPr/>
+            <p:nvPr/>
+          </p:nvSpPr>
+          <p:spPr>
+            <a:xfrm>
+              <a:off x="585788" y="1995385"/>
+              <a:ext cx="2647949" cy="3051110"/>
+            </a:xfrm>
+            <a:prstGeom prst="rect">
+              <a:avLst/>
+            </a:prstGeom>
+          </p:spPr>
+          <p:style>
+            <a:lnRef idx="2">
+              <a:schemeClr val="accent6">
+                <a:shade val="50000"/>
+              </a:schemeClr>
+            </a:lnRef>
+            <a:fillRef idx="1">
+              <a:schemeClr val="accent6"/>
+            </a:fillRef>
+            <a:effectRef idx="0">
+              <a:schemeClr val="accent6"/>
+            </a:effectRef>
+            <a:fontRef idx="minor">
+              <a:schemeClr val="lt1"/>
+            </a:fontRef>
+          </p:style>
+          <p:txBody>
+            <a:bodyPr rtlCol="0" anchor="t"/>
+            <a:lstStyle/>
+            <a:p>
+              <a:r>
+                <a:rPr lang="en-US" sz="1200" dirty="0">
+                  <a:solidFill>
+                    <a:schemeClr val="tx1"/>
+                  </a:solidFill>
+                </a:rPr>
+                <a:t>Bounded Context 1</a:t>
+              </a:r>
+            </a:p>
+          </p:txBody>
+        </p:sp>
+        <p:sp>
+          <p:nvSpPr>
+            <p:cNvPr id="6" name="Rectangle 5">
+              <a:extLst>
+                <a:ext uri="{FF2B5EF4-FFF2-40B4-BE49-F238E27FC236}">
+                  <a16:creationId xmlns:a16="http://schemas.microsoft.com/office/drawing/2014/main" id="{343BA7AA-C649-43E9-8980-EFF6B5CBD307}"/>
+                </a:ext>
+              </a:extLst>
+            </p:cNvPr>
+            <p:cNvSpPr/>
+            <p:nvPr/>
+          </p:nvSpPr>
+          <p:spPr>
+            <a:xfrm>
+              <a:off x="3376613" y="1995383"/>
+              <a:ext cx="2647949" cy="3051110"/>
+            </a:xfrm>
+            <a:prstGeom prst="rect">
+              <a:avLst/>
+            </a:prstGeom>
+          </p:spPr>
+          <p:style>
+            <a:lnRef idx="2">
+              <a:schemeClr val="accent3">
+                <a:shade val="50000"/>
+              </a:schemeClr>
+            </a:lnRef>
+            <a:fillRef idx="1">
+              <a:schemeClr val="accent3"/>
+            </a:fillRef>
+            <a:effectRef idx="0">
+              <a:schemeClr val="accent3"/>
+            </a:effectRef>
+            <a:fontRef idx="minor">
+              <a:schemeClr val="lt1"/>
+            </a:fontRef>
+          </p:style>
+          <p:txBody>
+            <a:bodyPr rtlCol="0" anchor="t"/>
+            <a:lstStyle/>
+            <a:p>
+              <a:r>
+                <a:rPr lang="en-US" sz="1200" dirty="0">
+                  <a:solidFill>
+                    <a:schemeClr val="tx1"/>
+                  </a:solidFill>
+                </a:rPr>
+                <a:t>Bounded Context 2</a:t>
+              </a:r>
+            </a:p>
+            <a:p>
+              <a:endParaRPr lang="en-US" sz="1200" dirty="0"/>
+            </a:p>
+          </p:txBody>
+        </p:sp>
+        <p:sp>
+          <p:nvSpPr>
+            <p:cNvPr id="7" name="Rectangle 6">
+              <a:extLst>
+                <a:ext uri="{FF2B5EF4-FFF2-40B4-BE49-F238E27FC236}">
+                  <a16:creationId xmlns:a16="http://schemas.microsoft.com/office/drawing/2014/main" id="{D268C448-08A7-4A37-A33C-C8795E19A0B7}"/>
+                </a:ext>
+              </a:extLst>
+            </p:cNvPr>
+            <p:cNvSpPr/>
+            <p:nvPr/>
+          </p:nvSpPr>
+          <p:spPr>
+            <a:xfrm>
+              <a:off x="6167438" y="1995383"/>
+              <a:ext cx="2647949" cy="3051110"/>
+            </a:xfrm>
+            <a:prstGeom prst="rect">
+              <a:avLst/>
+            </a:prstGeom>
+          </p:spPr>
+          <p:style>
+            <a:lnRef idx="2">
+              <a:schemeClr val="accent4">
+                <a:shade val="50000"/>
+              </a:schemeClr>
+            </a:lnRef>
+            <a:fillRef idx="1">
+              <a:schemeClr val="accent4"/>
+            </a:fillRef>
+            <a:effectRef idx="0">
+              <a:schemeClr val="accent4"/>
+            </a:effectRef>
+            <a:fontRef idx="minor">
+              <a:schemeClr val="lt1"/>
+            </a:fontRef>
+          </p:style>
+          <p:txBody>
+            <a:bodyPr rtlCol="0" anchor="t"/>
+            <a:lstStyle/>
+            <a:p>
+              <a:r>
+                <a:rPr lang="en-US" sz="1200" dirty="0">
+                  <a:solidFill>
+                    <a:schemeClr val="tx1"/>
+                  </a:solidFill>
+                </a:rPr>
+                <a:t>Bounded Context 3</a:t>
+              </a:r>
+            </a:p>
+          </p:txBody>
+        </p:sp>
+        <p:sp>
+          <p:nvSpPr>
+            <p:cNvPr id="8" name="Rectangle 7">
+              <a:extLst>
+                <a:ext uri="{FF2B5EF4-FFF2-40B4-BE49-F238E27FC236}">
+                  <a16:creationId xmlns:a16="http://schemas.microsoft.com/office/drawing/2014/main" id="{E907507F-E651-4DDF-947F-CA3D55D51CBA}"/>
+                </a:ext>
+              </a:extLst>
+            </p:cNvPr>
+            <p:cNvSpPr/>
+            <p:nvPr/>
+          </p:nvSpPr>
+          <p:spPr>
+            <a:xfrm>
+              <a:off x="8958263" y="1995383"/>
+              <a:ext cx="2647949" cy="3051110"/>
+            </a:xfrm>
+            <a:prstGeom prst="rect">
+              <a:avLst/>
+            </a:prstGeom>
+          </p:spPr>
+          <p:style>
+            <a:lnRef idx="2">
+              <a:schemeClr val="accent3">
+                <a:shade val="50000"/>
+              </a:schemeClr>
+            </a:lnRef>
+            <a:fillRef idx="1">
+              <a:schemeClr val="accent3"/>
+            </a:fillRef>
+            <a:effectRef idx="0">
+              <a:schemeClr val="accent3"/>
+            </a:effectRef>
+            <a:fontRef idx="minor">
+              <a:schemeClr val="lt1"/>
+            </a:fontRef>
+          </p:style>
+          <p:txBody>
+            <a:bodyPr rtlCol="0" anchor="t"/>
+            <a:lstStyle/>
+            <a:p>
+              <a:r>
+                <a:rPr lang="en-US" sz="1200" dirty="0">
+                  <a:solidFill>
+                    <a:schemeClr val="tx1"/>
+                  </a:solidFill>
+                </a:rPr>
+                <a:t>Bounded Context 4</a:t>
+              </a:r>
+            </a:p>
+          </p:txBody>
+        </p:sp>
+        <p:sp>
+          <p:nvSpPr>
+            <p:cNvPr id="2" name="Rectangle 1">
+              <a:extLst>
+                <a:ext uri="{FF2B5EF4-FFF2-40B4-BE49-F238E27FC236}">
+                  <a16:creationId xmlns:a16="http://schemas.microsoft.com/office/drawing/2014/main" id="{D3374E5E-A9F1-49B5-8CAB-913EC56AAF32}"/>
+                </a:ext>
+              </a:extLst>
+            </p:cNvPr>
+            <p:cNvSpPr/>
+            <p:nvPr/>
+          </p:nvSpPr>
+          <p:spPr>
+            <a:xfrm>
+              <a:off x="855402" y="2506976"/>
+              <a:ext cx="2108719" cy="1129004"/>
+            </a:xfrm>
+            <a:prstGeom prst="rect">
+              <a:avLst/>
+            </a:prstGeom>
+            <a:ln>
+              <a:headEnd type="none" w="med" len="med"/>
+              <a:tailEnd type="none" w="med" len="med"/>
+            </a:ln>
+          </p:spPr>
+          <p:style>
+            <a:lnRef idx="1">
+              <a:schemeClr val="accent6"/>
+            </a:lnRef>
+            <a:fillRef idx="2">
+              <a:schemeClr val="accent6"/>
+            </a:fillRef>
+            <a:effectRef idx="1">
+              <a:schemeClr val="accent6"/>
+            </a:effectRef>
+            <a:fontRef idx="minor">
+              <a:schemeClr val="dk1"/>
+            </a:fontRef>
+          </p:style>
+          <p:txBody>
+            <a:bodyPr rtlCol="0" anchor="ctr"/>
+            <a:lstStyle/>
+            <a:p>
+              <a:pPr algn="ctr"/>
+              <a:r>
+                <a:rPr lang="en-US" sz="1000" dirty="0"/>
+                <a:t>Business Logic</a:t>
+              </a:r>
+            </a:p>
+          </p:txBody>
+        </p:sp>
+        <p:sp>
+          <p:nvSpPr>
+            <p:cNvPr id="3" name="Cylinder 2">
+              <a:extLst>
+                <a:ext uri="{FF2B5EF4-FFF2-40B4-BE49-F238E27FC236}">
+                  <a16:creationId xmlns:a16="http://schemas.microsoft.com/office/drawing/2014/main" id="{8F03E13F-DDDF-4C13-B245-A90B316C0ADF}"/>
+                </a:ext>
+              </a:extLst>
+            </p:cNvPr>
+            <p:cNvSpPr/>
+            <p:nvPr/>
+          </p:nvSpPr>
+          <p:spPr>
+            <a:xfrm>
+              <a:off x="2217672" y="3884831"/>
+              <a:ext cx="746449" cy="886408"/>
+            </a:xfrm>
+            <a:prstGeom prst="can">
+              <a:avLst/>
+            </a:prstGeom>
+            <a:solidFill>
+              <a:schemeClr val="dk1">
+                <a:alpha val="50000"/>
+              </a:schemeClr>
+            </a:solidFill>
+            <a:ln>
+              <a:noFill/>
+            </a:ln>
+          </p:spPr>
+          <p:style>
+            <a:lnRef idx="0">
+              <a:scrgbClr r="0" g="0" b="0"/>
+            </a:lnRef>
+            <a:fillRef idx="0">
+              <a:scrgbClr r="0" g="0" b="0"/>
+            </a:fillRef>
+            <a:effectRef idx="0">
+              <a:scrgbClr r="0" g="0" b="0"/>
+            </a:effectRef>
+            <a:fontRef idx="minor">
+              <a:schemeClr val="lt1"/>
+            </a:fontRef>
+          </p:style>
+          <p:txBody>
+            <a:bodyPr rtlCol="0" anchor="ctr"/>
+            <a:lstStyle/>
+            <a:p>
+              <a:pPr algn="ctr"/>
+              <a:endParaRPr lang="en-US"/>
+            </a:p>
+          </p:txBody>
+        </p:sp>
+        <p:sp>
+          <p:nvSpPr>
+            <p:cNvPr id="9" name="Rectangle 8">
+              <a:extLst>
+                <a:ext uri="{FF2B5EF4-FFF2-40B4-BE49-F238E27FC236}">
+                  <a16:creationId xmlns:a16="http://schemas.microsoft.com/office/drawing/2014/main" id="{4E2B55EF-9362-4D96-897C-B9CE5E84AB99}"/>
+                </a:ext>
+              </a:extLst>
+            </p:cNvPr>
+            <p:cNvSpPr/>
+            <p:nvPr/>
+          </p:nvSpPr>
+          <p:spPr>
+            <a:xfrm>
+              <a:off x="3646227" y="2506976"/>
+              <a:ext cx="2108719" cy="1129004"/>
+            </a:xfrm>
+            <a:prstGeom prst="rect">
+              <a:avLst/>
+            </a:prstGeom>
+            <a:ln>
+              <a:headEnd type="none" w="med" len="med"/>
+              <a:tailEnd type="none" w="med" len="med"/>
+            </a:ln>
+          </p:spPr>
+          <p:style>
+            <a:lnRef idx="1">
+              <a:schemeClr val="accent3"/>
+            </a:lnRef>
+            <a:fillRef idx="2">
+              <a:schemeClr val="accent3"/>
+            </a:fillRef>
+            <a:effectRef idx="1">
+              <a:schemeClr val="accent3"/>
+            </a:effectRef>
+            <a:fontRef idx="minor">
+              <a:schemeClr val="dk1"/>
+            </a:fontRef>
+          </p:style>
+          <p:txBody>
+            <a:bodyPr rtlCol="0" anchor="ctr"/>
+            <a:lstStyle/>
+            <a:p>
+              <a:pPr algn="ctr"/>
+              <a:r>
+                <a:rPr lang="en-US" sz="1000" dirty="0"/>
+                <a:t>Business Logic</a:t>
+              </a:r>
+            </a:p>
+          </p:txBody>
+        </p:sp>
+        <p:sp>
+          <p:nvSpPr>
+            <p:cNvPr id="10" name="Rectangle 9">
+              <a:extLst>
+                <a:ext uri="{FF2B5EF4-FFF2-40B4-BE49-F238E27FC236}">
+                  <a16:creationId xmlns:a16="http://schemas.microsoft.com/office/drawing/2014/main" id="{0BA22D8B-DC3C-4A49-90F9-A32CB051BB47}"/>
+                </a:ext>
+              </a:extLst>
+            </p:cNvPr>
+            <p:cNvSpPr/>
+            <p:nvPr/>
+          </p:nvSpPr>
+          <p:spPr>
+            <a:xfrm>
+              <a:off x="6437052" y="2506976"/>
+              <a:ext cx="2108719" cy="1129004"/>
+            </a:xfrm>
+            <a:prstGeom prst="rect">
+              <a:avLst/>
+            </a:prstGeom>
+            <a:ln>
+              <a:headEnd type="none" w="med" len="med"/>
+              <a:tailEnd type="none" w="med" len="med"/>
+            </a:ln>
+          </p:spPr>
+          <p:style>
+            <a:lnRef idx="1">
+              <a:schemeClr val="accent4"/>
+            </a:lnRef>
+            <a:fillRef idx="2">
+              <a:schemeClr val="accent4"/>
+            </a:fillRef>
+            <a:effectRef idx="1">
+              <a:schemeClr val="accent4"/>
+            </a:effectRef>
+            <a:fontRef idx="minor">
+              <a:schemeClr val="dk1"/>
+            </a:fontRef>
+          </p:style>
+          <p:txBody>
+            <a:bodyPr rtlCol="0" anchor="ctr"/>
+            <a:lstStyle/>
+            <a:p>
+              <a:pPr algn="ctr"/>
+              <a:r>
+                <a:rPr lang="en-US" sz="1000" dirty="0"/>
+                <a:t>Business Logic</a:t>
+              </a:r>
+            </a:p>
+          </p:txBody>
+        </p:sp>
+        <p:sp>
+          <p:nvSpPr>
+            <p:cNvPr id="11" name="Rectangle 10">
+              <a:extLst>
+                <a:ext uri="{FF2B5EF4-FFF2-40B4-BE49-F238E27FC236}">
+                  <a16:creationId xmlns:a16="http://schemas.microsoft.com/office/drawing/2014/main" id="{03056D2E-EB75-4C9C-A3DA-E4FE7A8894D5}"/>
+                </a:ext>
+              </a:extLst>
+            </p:cNvPr>
+            <p:cNvSpPr/>
+            <p:nvPr/>
+          </p:nvSpPr>
+          <p:spPr>
+            <a:xfrm>
+              <a:off x="9227877" y="2506976"/>
+              <a:ext cx="2108719" cy="1129004"/>
+            </a:xfrm>
+            <a:prstGeom prst="rect">
+              <a:avLst/>
+            </a:prstGeom>
+            <a:ln>
+              <a:headEnd type="none" w="med" len="med"/>
+              <a:tailEnd type="none" w="med" len="med"/>
+            </a:ln>
+          </p:spPr>
+          <p:style>
+            <a:lnRef idx="1">
+              <a:schemeClr val="accent3"/>
+            </a:lnRef>
+            <a:fillRef idx="2">
+              <a:schemeClr val="accent3"/>
+            </a:fillRef>
+            <a:effectRef idx="1">
+              <a:schemeClr val="accent3"/>
+            </a:effectRef>
+            <a:fontRef idx="minor">
+              <a:schemeClr val="dk1"/>
+            </a:fontRef>
+          </p:style>
+          <p:txBody>
+            <a:bodyPr rtlCol="0" anchor="ctr"/>
+            <a:lstStyle/>
+            <a:p>
+              <a:pPr algn="ctr"/>
+              <a:r>
+                <a:rPr lang="en-US" sz="1000" dirty="0"/>
+                <a:t>Business Logic</a:t>
+              </a:r>
+            </a:p>
+          </p:txBody>
+        </p:sp>
+        <p:sp>
+          <p:nvSpPr>
+            <p:cNvPr id="12" name="Cylinder 11">
+              <a:extLst>
+                <a:ext uri="{FF2B5EF4-FFF2-40B4-BE49-F238E27FC236}">
+                  <a16:creationId xmlns:a16="http://schemas.microsoft.com/office/drawing/2014/main" id="{973266DE-6CB1-4C9D-A47C-F0EC762A391D}"/>
+                </a:ext>
+              </a:extLst>
+            </p:cNvPr>
+            <p:cNvSpPr/>
+            <p:nvPr/>
+          </p:nvSpPr>
+          <p:spPr>
+            <a:xfrm>
+              <a:off x="5003055" y="3884831"/>
+              <a:ext cx="746449" cy="886408"/>
+            </a:xfrm>
+            <a:prstGeom prst="can">
+              <a:avLst/>
+            </a:prstGeom>
+            <a:solidFill>
+              <a:schemeClr val="dk1">
+                <a:alpha val="50000"/>
+              </a:schemeClr>
+            </a:solidFill>
+            <a:ln>
+              <a:noFill/>
+            </a:ln>
+          </p:spPr>
+          <p:style>
+            <a:lnRef idx="0">
+              <a:scrgbClr r="0" g="0" b="0"/>
+            </a:lnRef>
+            <a:fillRef idx="0">
+              <a:scrgbClr r="0" g="0" b="0"/>
+            </a:fillRef>
+            <a:effectRef idx="0">
+              <a:scrgbClr r="0" g="0" b="0"/>
+            </a:effectRef>
+            <a:fontRef idx="minor">
+              <a:schemeClr val="lt1"/>
+            </a:fontRef>
+          </p:style>
+          <p:txBody>
+            <a:bodyPr rtlCol="0" anchor="ctr"/>
+            <a:lstStyle/>
+            <a:p>
+              <a:pPr algn="ctr"/>
+              <a:endParaRPr lang="en-US"/>
+            </a:p>
+          </p:txBody>
+        </p:sp>
+        <p:sp>
+          <p:nvSpPr>
+            <p:cNvPr id="13" name="Cylinder 12">
+              <a:extLst>
+                <a:ext uri="{FF2B5EF4-FFF2-40B4-BE49-F238E27FC236}">
+                  <a16:creationId xmlns:a16="http://schemas.microsoft.com/office/drawing/2014/main" id="{BEF0B81D-8B4E-44EA-B49F-38FCBE86BB02}"/>
+                </a:ext>
+              </a:extLst>
+            </p:cNvPr>
+            <p:cNvSpPr/>
+            <p:nvPr/>
+          </p:nvSpPr>
+          <p:spPr>
+            <a:xfrm>
+              <a:off x="7799322" y="3884831"/>
+              <a:ext cx="746449" cy="886408"/>
+            </a:xfrm>
+            <a:prstGeom prst="can">
+              <a:avLst/>
+            </a:prstGeom>
+            <a:solidFill>
+              <a:schemeClr val="dk1">
+                <a:alpha val="50000"/>
+              </a:schemeClr>
+            </a:solidFill>
+            <a:ln>
+              <a:noFill/>
+            </a:ln>
+          </p:spPr>
+          <p:style>
+            <a:lnRef idx="0">
+              <a:scrgbClr r="0" g="0" b="0"/>
+            </a:lnRef>
+            <a:fillRef idx="0">
+              <a:scrgbClr r="0" g="0" b="0"/>
+            </a:fillRef>
+            <a:effectRef idx="0">
+              <a:scrgbClr r="0" g="0" b="0"/>
+            </a:effectRef>
+            <a:fontRef idx="minor">
+              <a:schemeClr val="lt1"/>
+            </a:fontRef>
+          </p:style>
+          <p:txBody>
+            <a:bodyPr rtlCol="0" anchor="ctr"/>
+            <a:lstStyle/>
+            <a:p>
+              <a:pPr algn="ctr"/>
+              <a:endParaRPr lang="en-US"/>
+            </a:p>
+          </p:txBody>
+        </p:sp>
+        <p:sp>
+          <p:nvSpPr>
+            <p:cNvPr id="14" name="Cylinder 13">
+              <a:extLst>
+                <a:ext uri="{FF2B5EF4-FFF2-40B4-BE49-F238E27FC236}">
+                  <a16:creationId xmlns:a16="http://schemas.microsoft.com/office/drawing/2014/main" id="{7FBD789D-4921-42FD-9B01-3EF99CB02E53}"/>
+                </a:ext>
+              </a:extLst>
+            </p:cNvPr>
+            <p:cNvSpPr/>
+            <p:nvPr/>
+          </p:nvSpPr>
+          <p:spPr>
+            <a:xfrm>
+              <a:off x="10590147" y="3884831"/>
+              <a:ext cx="746449" cy="886408"/>
+            </a:xfrm>
+            <a:prstGeom prst="can">
+              <a:avLst/>
+            </a:prstGeom>
+            <a:solidFill>
+              <a:schemeClr val="dk1">
+                <a:alpha val="50000"/>
+              </a:schemeClr>
+            </a:solidFill>
+            <a:ln>
+              <a:noFill/>
+            </a:ln>
+          </p:spPr>
+          <p:style>
+            <a:lnRef idx="0">
+              <a:scrgbClr r="0" g="0" b="0"/>
+            </a:lnRef>
+            <a:fillRef idx="0">
+              <a:scrgbClr r="0" g="0" b="0"/>
+            </a:fillRef>
+            <a:effectRef idx="0">
+              <a:scrgbClr r="0" g="0" b="0"/>
+            </a:effectRef>
+            <a:fontRef idx="minor">
+              <a:schemeClr val="lt1"/>
+            </a:fontRef>
+          </p:style>
+          <p:txBody>
+            <a:bodyPr rtlCol="0" anchor="ctr"/>
+            <a:lstStyle/>
+            <a:p>
+              <a:pPr algn="ctr"/>
+              <a:endParaRPr lang="en-US"/>
+            </a:p>
+          </p:txBody>
+        </p:sp>
+        <p:sp>
+          <p:nvSpPr>
+            <p:cNvPr id="16" name="Rectangle 15">
+              <a:extLst>
+                <a:ext uri="{FF2B5EF4-FFF2-40B4-BE49-F238E27FC236}">
+                  <a16:creationId xmlns:a16="http://schemas.microsoft.com/office/drawing/2014/main" id="{C26BE414-1F37-4378-9190-56404DB2264C}"/>
+                </a:ext>
+              </a:extLst>
+            </p:cNvPr>
+            <p:cNvSpPr/>
+            <p:nvPr/>
+          </p:nvSpPr>
+          <p:spPr>
+            <a:xfrm>
+              <a:off x="585788" y="5158460"/>
+              <a:ext cx="11020424" cy="298580"/>
+            </a:xfrm>
+            <a:prstGeom prst="rect">
+              <a:avLst/>
+            </a:prstGeom>
+          </p:spPr>
+          <p:style>
+            <a:lnRef idx="1">
+              <a:schemeClr val="accent3"/>
+            </a:lnRef>
+            <a:fillRef idx="2">
+              <a:schemeClr val="accent3"/>
+            </a:fillRef>
+            <a:effectRef idx="1">
+              <a:schemeClr val="accent3"/>
+            </a:effectRef>
+            <a:fontRef idx="minor">
+              <a:schemeClr val="dk1"/>
+            </a:fontRef>
+          </p:style>
+          <p:txBody>
+            <a:bodyPr rtlCol="0" anchor="ctr"/>
+            <a:lstStyle/>
+            <a:p>
+              <a:pPr algn="ctr"/>
+              <a:r>
+                <a:rPr lang="en-US" sz="1200" dirty="0">
+                  <a:solidFill>
+                    <a:schemeClr val="tx1"/>
+                  </a:solidFill>
+                </a:rPr>
+                <a:t>Shared Code</a:t>
+              </a:r>
+            </a:p>
+          </p:txBody>
+        </p:sp>
+        <p:sp>
+          <p:nvSpPr>
+            <p:cNvPr id="17" name="Rectangle 16">
+              <a:extLst>
+                <a:ext uri="{FF2B5EF4-FFF2-40B4-BE49-F238E27FC236}">
+                  <a16:creationId xmlns:a16="http://schemas.microsoft.com/office/drawing/2014/main" id="{A6457479-8EC7-48D6-A735-A2C336A8CD0B}"/>
+                </a:ext>
+              </a:extLst>
+            </p:cNvPr>
+            <p:cNvSpPr/>
+            <p:nvPr/>
+          </p:nvSpPr>
+          <p:spPr>
+            <a:xfrm>
+              <a:off x="585788" y="1584836"/>
+              <a:ext cx="11020424" cy="298580"/>
+            </a:xfrm>
+            <a:prstGeom prst="rect">
+              <a:avLst/>
+            </a:prstGeom>
+          </p:spPr>
+          <p:style>
+            <a:lnRef idx="1">
+              <a:schemeClr val="accent3"/>
+            </a:lnRef>
+            <a:fillRef idx="2">
+              <a:schemeClr val="accent3"/>
+            </a:fillRef>
+            <a:effectRef idx="1">
+              <a:schemeClr val="accent3"/>
+            </a:effectRef>
+            <a:fontRef idx="minor">
+              <a:schemeClr val="dk1"/>
+            </a:fontRef>
+          </p:style>
+          <p:txBody>
+            <a:bodyPr rtlCol="0" anchor="ctr"/>
+            <a:lstStyle/>
+            <a:p>
+              <a:pPr algn="ctr"/>
+              <a:r>
+                <a:rPr lang="en-US" sz="1100" dirty="0">
+                  <a:solidFill>
+                    <a:schemeClr val="tx1"/>
+                  </a:solidFill>
+                </a:rPr>
+                <a:t>Data Delivery</a:t>
+              </a:r>
+            </a:p>
+          </p:txBody>
+        </p:sp>
+      </p:grpSp>
+      <p:grpSp>
+        <p:nvGrpSpPr>
+          <p:cNvPr id="18" name="Group 17">
+            <a:extLst>
+              <a:ext uri="{FF2B5EF4-FFF2-40B4-BE49-F238E27FC236}">
+                <a16:creationId xmlns:a16="http://schemas.microsoft.com/office/drawing/2014/main" id="{0FD02AD1-D1EA-4995-A2D9-7C6C111C27F8}"/>
+              </a:ext>
+            </a:extLst>
+          </p:cNvPr>
+          <p:cNvGrpSpPr/>
+          <p:nvPr/>
+        </p:nvGrpSpPr>
+        <p:grpSpPr>
+          <a:xfrm>
+            <a:off x="2034279" y="2167700"/>
+            <a:ext cx="6779983" cy="2486497"/>
+            <a:chOff x="469783" y="1468073"/>
+            <a:chExt cx="11299971" cy="4144162"/>
+          </a:xfrm>
+        </p:grpSpPr>
+        <p:sp>
+          <p:nvSpPr>
+            <p:cNvPr id="19" name="Rectangle 18">
+              <a:extLst>
+                <a:ext uri="{FF2B5EF4-FFF2-40B4-BE49-F238E27FC236}">
+                  <a16:creationId xmlns:a16="http://schemas.microsoft.com/office/drawing/2014/main" id="{AEE2AF9D-1B6A-4BE0-BD23-D695EC66432D}"/>
+                </a:ext>
+              </a:extLst>
+            </p:cNvPr>
+            <p:cNvSpPr/>
+            <p:nvPr/>
+          </p:nvSpPr>
+          <p:spPr>
+            <a:xfrm>
+              <a:off x="469783" y="1468073"/>
+              <a:ext cx="11299971" cy="4144162"/>
+            </a:xfrm>
+            <a:prstGeom prst="rect">
+              <a:avLst/>
+            </a:prstGeom>
+            <a:ln/>
+          </p:spPr>
+          <p:style>
+            <a:lnRef idx="0">
+              <a:schemeClr val="dk1"/>
+            </a:lnRef>
+            <a:fillRef idx="3">
+              <a:schemeClr val="dk1"/>
+            </a:fillRef>
+            <a:effectRef idx="3">
+              <a:schemeClr val="dk1"/>
+            </a:effectRef>
+            <a:fontRef idx="minor">
+              <a:schemeClr val="lt1"/>
+            </a:fontRef>
+          </p:style>
+          <p:txBody>
+            <a:bodyPr rtlCol="0" anchor="ctr"/>
+            <a:lstStyle/>
+            <a:p>
+              <a:pPr algn="ctr"/>
+              <a:endParaRPr lang="en-US"/>
+            </a:p>
+          </p:txBody>
+        </p:sp>
+        <p:sp>
+          <p:nvSpPr>
+            <p:cNvPr id="20" name="Rectangle 19">
+              <a:extLst>
+                <a:ext uri="{FF2B5EF4-FFF2-40B4-BE49-F238E27FC236}">
+                  <a16:creationId xmlns:a16="http://schemas.microsoft.com/office/drawing/2014/main" id="{C5A03257-31BC-4F03-8BD6-5BD47B0C1342}"/>
+                </a:ext>
+              </a:extLst>
+            </p:cNvPr>
+            <p:cNvSpPr/>
+            <p:nvPr/>
+          </p:nvSpPr>
+          <p:spPr>
+            <a:xfrm>
+              <a:off x="585788" y="1995385"/>
+              <a:ext cx="2647949" cy="3051110"/>
+            </a:xfrm>
+            <a:prstGeom prst="rect">
+              <a:avLst/>
+            </a:prstGeom>
+          </p:spPr>
+          <p:style>
+            <a:lnRef idx="2">
+              <a:schemeClr val="accent3">
+                <a:shade val="50000"/>
+              </a:schemeClr>
+            </a:lnRef>
+            <a:fillRef idx="1">
+              <a:schemeClr val="accent3"/>
+            </a:fillRef>
+            <a:effectRef idx="0">
+              <a:schemeClr val="accent3"/>
+            </a:effectRef>
+            <a:fontRef idx="minor">
+              <a:schemeClr val="lt1"/>
+            </a:fontRef>
+          </p:style>
+          <p:txBody>
+            <a:bodyPr rtlCol="0" anchor="t"/>
+            <a:lstStyle/>
+            <a:p>
+              <a:r>
+                <a:rPr lang="en-US" sz="1200" dirty="0">
+                  <a:solidFill>
+                    <a:schemeClr val="tx1"/>
+                  </a:solidFill>
+                </a:rPr>
+                <a:t>Bounded Context 1</a:t>
+              </a:r>
+            </a:p>
+          </p:txBody>
+        </p:sp>
+        <p:sp>
+          <p:nvSpPr>
+            <p:cNvPr id="21" name="Rectangle 20">
+              <a:extLst>
+                <a:ext uri="{FF2B5EF4-FFF2-40B4-BE49-F238E27FC236}">
+                  <a16:creationId xmlns:a16="http://schemas.microsoft.com/office/drawing/2014/main" id="{B2CF17B7-7A11-4747-BD6E-289EE3258536}"/>
+                </a:ext>
+              </a:extLst>
+            </p:cNvPr>
+            <p:cNvSpPr/>
+            <p:nvPr/>
+          </p:nvSpPr>
+          <p:spPr>
+            <a:xfrm>
+              <a:off x="3376613" y="1995383"/>
+              <a:ext cx="2647949" cy="3051110"/>
+            </a:xfrm>
+            <a:prstGeom prst="rect">
+              <a:avLst/>
+            </a:prstGeom>
+          </p:spPr>
+          <p:style>
+            <a:lnRef idx="2">
+              <a:schemeClr val="accent1">
+                <a:shade val="50000"/>
+              </a:schemeClr>
+            </a:lnRef>
+            <a:fillRef idx="1">
+              <a:schemeClr val="accent1"/>
+            </a:fillRef>
+            <a:effectRef idx="0">
+              <a:schemeClr val="accent1"/>
+            </a:effectRef>
+            <a:fontRef idx="minor">
+              <a:schemeClr val="lt1"/>
+            </a:fontRef>
+          </p:style>
+          <p:txBody>
+            <a:bodyPr rtlCol="0" anchor="t"/>
+            <a:lstStyle/>
+            <a:p>
+              <a:r>
+                <a:rPr lang="en-US" sz="1200" dirty="0">
+                  <a:solidFill>
+                    <a:schemeClr val="tx1"/>
+                  </a:solidFill>
+                </a:rPr>
+                <a:t>Bounded Context 2</a:t>
+              </a:r>
+            </a:p>
+            <a:p>
+              <a:endParaRPr lang="en-US" sz="1200" dirty="0"/>
+            </a:p>
+          </p:txBody>
+        </p:sp>
+        <p:sp>
+          <p:nvSpPr>
+            <p:cNvPr id="22" name="Rectangle 21">
+              <a:extLst>
+                <a:ext uri="{FF2B5EF4-FFF2-40B4-BE49-F238E27FC236}">
+                  <a16:creationId xmlns:a16="http://schemas.microsoft.com/office/drawing/2014/main" id="{72295C69-4640-482B-AA1F-FBFAB0F2A74B}"/>
+                </a:ext>
+              </a:extLst>
+            </p:cNvPr>
+            <p:cNvSpPr/>
+            <p:nvPr/>
+          </p:nvSpPr>
+          <p:spPr>
+            <a:xfrm>
+              <a:off x="6167438" y="1995383"/>
+              <a:ext cx="2647949" cy="3051110"/>
+            </a:xfrm>
+            <a:prstGeom prst="rect">
+              <a:avLst/>
+            </a:prstGeom>
+          </p:spPr>
+          <p:style>
+            <a:lnRef idx="2">
+              <a:schemeClr val="accent3">
+                <a:shade val="50000"/>
+              </a:schemeClr>
+            </a:lnRef>
+            <a:fillRef idx="1">
+              <a:schemeClr val="accent3"/>
+            </a:fillRef>
+            <a:effectRef idx="0">
+              <a:schemeClr val="accent3"/>
+            </a:effectRef>
+            <a:fontRef idx="minor">
+              <a:schemeClr val="lt1"/>
+            </a:fontRef>
+          </p:style>
+          <p:txBody>
+            <a:bodyPr rtlCol="0" anchor="t"/>
+            <a:lstStyle/>
+            <a:p>
+              <a:r>
+                <a:rPr lang="en-US" sz="1200" dirty="0">
+                  <a:solidFill>
+                    <a:schemeClr val="tx1"/>
+                  </a:solidFill>
+                </a:rPr>
+                <a:t>Bounded Context 3</a:t>
+              </a:r>
+            </a:p>
+          </p:txBody>
+        </p:sp>
+        <p:sp>
+          <p:nvSpPr>
+            <p:cNvPr id="23" name="Rectangle 22">
+              <a:extLst>
+                <a:ext uri="{FF2B5EF4-FFF2-40B4-BE49-F238E27FC236}">
+                  <a16:creationId xmlns:a16="http://schemas.microsoft.com/office/drawing/2014/main" id="{66263EDB-9A6A-4311-8538-522AFCF8656C}"/>
+                </a:ext>
+              </a:extLst>
+            </p:cNvPr>
+            <p:cNvSpPr/>
+            <p:nvPr/>
+          </p:nvSpPr>
+          <p:spPr>
+            <a:xfrm>
+              <a:off x="8958263" y="1995383"/>
+              <a:ext cx="2647949" cy="3051110"/>
+            </a:xfrm>
+            <a:prstGeom prst="rect">
+              <a:avLst/>
+            </a:prstGeom>
+          </p:spPr>
+          <p:style>
+            <a:lnRef idx="2">
+              <a:schemeClr val="accent2">
+                <a:shade val="50000"/>
+              </a:schemeClr>
+            </a:lnRef>
+            <a:fillRef idx="1">
+              <a:schemeClr val="accent2"/>
+            </a:fillRef>
+            <a:effectRef idx="0">
+              <a:schemeClr val="accent2"/>
+            </a:effectRef>
+            <a:fontRef idx="minor">
+              <a:schemeClr val="lt1"/>
+            </a:fontRef>
+          </p:style>
+          <p:txBody>
+            <a:bodyPr rtlCol="0" anchor="t"/>
+            <a:lstStyle/>
+            <a:p>
+              <a:r>
+                <a:rPr lang="en-US" sz="1200" dirty="0">
+                  <a:solidFill>
+                    <a:schemeClr val="tx1"/>
+                  </a:solidFill>
+                </a:rPr>
+                <a:t>Bounded Context 4</a:t>
+              </a:r>
+            </a:p>
+          </p:txBody>
+        </p:sp>
+        <p:sp>
+          <p:nvSpPr>
+            <p:cNvPr id="24" name="Rectangle 23">
+              <a:extLst>
+                <a:ext uri="{FF2B5EF4-FFF2-40B4-BE49-F238E27FC236}">
+                  <a16:creationId xmlns:a16="http://schemas.microsoft.com/office/drawing/2014/main" id="{DD77F28C-881C-423E-B510-152C3B14C4EE}"/>
+                </a:ext>
+              </a:extLst>
+            </p:cNvPr>
+            <p:cNvSpPr/>
+            <p:nvPr/>
+          </p:nvSpPr>
+          <p:spPr>
+            <a:xfrm>
+              <a:off x="855402" y="2506976"/>
+              <a:ext cx="2108719" cy="1129004"/>
+            </a:xfrm>
+            <a:prstGeom prst="rect">
+              <a:avLst/>
+            </a:prstGeom>
+            <a:ln>
+              <a:headEnd type="none" w="med" len="med"/>
+              <a:tailEnd type="none" w="med" len="med"/>
+            </a:ln>
+          </p:spPr>
+          <p:style>
+            <a:lnRef idx="1">
+              <a:schemeClr val="accent3"/>
+            </a:lnRef>
+            <a:fillRef idx="2">
+              <a:schemeClr val="accent3"/>
+            </a:fillRef>
+            <a:effectRef idx="1">
+              <a:schemeClr val="accent3"/>
+            </a:effectRef>
+            <a:fontRef idx="minor">
+              <a:schemeClr val="dk1"/>
+            </a:fontRef>
+          </p:style>
+          <p:txBody>
+            <a:bodyPr rtlCol="0" anchor="ctr"/>
+            <a:lstStyle/>
+            <a:p>
+              <a:pPr algn="ctr"/>
+              <a:r>
+                <a:rPr lang="en-US" sz="1000" dirty="0"/>
+                <a:t>Business Logic</a:t>
+              </a:r>
+            </a:p>
+          </p:txBody>
+        </p:sp>
+        <p:sp>
+          <p:nvSpPr>
+            <p:cNvPr id="25" name="Cylinder 24">
+              <a:extLst>
+                <a:ext uri="{FF2B5EF4-FFF2-40B4-BE49-F238E27FC236}">
+                  <a16:creationId xmlns:a16="http://schemas.microsoft.com/office/drawing/2014/main" id="{772D2D48-4FE4-4AF7-8C65-C01CABBEF8FB}"/>
+                </a:ext>
+              </a:extLst>
+            </p:cNvPr>
+            <p:cNvSpPr/>
+            <p:nvPr/>
+          </p:nvSpPr>
+          <p:spPr>
+            <a:xfrm>
+              <a:off x="2217672" y="3884831"/>
+              <a:ext cx="746449" cy="886408"/>
+            </a:xfrm>
+            <a:prstGeom prst="can">
+              <a:avLst/>
+            </a:prstGeom>
+            <a:solidFill>
+              <a:schemeClr val="dk1">
+                <a:alpha val="50000"/>
+              </a:schemeClr>
+            </a:solidFill>
+            <a:ln>
+              <a:noFill/>
+            </a:ln>
+          </p:spPr>
+          <p:style>
+            <a:lnRef idx="0">
+              <a:scrgbClr r="0" g="0" b="0"/>
+            </a:lnRef>
+            <a:fillRef idx="0">
+              <a:scrgbClr r="0" g="0" b="0"/>
+            </a:fillRef>
+            <a:effectRef idx="0">
+              <a:scrgbClr r="0" g="0" b="0"/>
+            </a:effectRef>
+            <a:fontRef idx="minor">
+              <a:schemeClr val="lt1"/>
+            </a:fontRef>
+          </p:style>
+          <p:txBody>
+            <a:bodyPr rtlCol="0" anchor="ctr"/>
+            <a:lstStyle/>
+            <a:p>
+              <a:pPr algn="ctr"/>
+              <a:endParaRPr lang="en-US"/>
+            </a:p>
+          </p:txBody>
+        </p:sp>
+        <p:sp>
+          <p:nvSpPr>
+            <p:cNvPr id="26" name="Rectangle 25">
+              <a:extLst>
+                <a:ext uri="{FF2B5EF4-FFF2-40B4-BE49-F238E27FC236}">
+                  <a16:creationId xmlns:a16="http://schemas.microsoft.com/office/drawing/2014/main" id="{409BDED2-8826-4245-8842-B7994791DAB2}"/>
+                </a:ext>
+              </a:extLst>
+            </p:cNvPr>
+            <p:cNvSpPr/>
+            <p:nvPr/>
+          </p:nvSpPr>
+          <p:spPr>
+            <a:xfrm>
+              <a:off x="3646227" y="2506976"/>
+              <a:ext cx="2108719" cy="1129004"/>
+            </a:xfrm>
+            <a:prstGeom prst="rect">
+              <a:avLst/>
+            </a:prstGeom>
+            <a:ln>
+              <a:headEnd type="none" w="med" len="med"/>
+              <a:tailEnd type="none" w="med" len="med"/>
+            </a:ln>
+          </p:spPr>
+          <p:style>
+            <a:lnRef idx="1">
+              <a:schemeClr val="accent5"/>
+            </a:lnRef>
+            <a:fillRef idx="2">
+              <a:schemeClr val="accent5"/>
+            </a:fillRef>
+            <a:effectRef idx="1">
+              <a:schemeClr val="accent5"/>
+            </a:effectRef>
+            <a:fontRef idx="minor">
+              <a:schemeClr val="dk1"/>
+            </a:fontRef>
+          </p:style>
+          <p:txBody>
+            <a:bodyPr rtlCol="0" anchor="ctr"/>
+            <a:lstStyle/>
+            <a:p>
+              <a:pPr algn="ctr"/>
+              <a:r>
+                <a:rPr lang="en-US" sz="1000" dirty="0"/>
+                <a:t>Business Logic</a:t>
+              </a:r>
+            </a:p>
+          </p:txBody>
+        </p:sp>
+        <p:sp>
+          <p:nvSpPr>
+            <p:cNvPr id="27" name="Rectangle 26">
+              <a:extLst>
+                <a:ext uri="{FF2B5EF4-FFF2-40B4-BE49-F238E27FC236}">
+                  <a16:creationId xmlns:a16="http://schemas.microsoft.com/office/drawing/2014/main" id="{EB5AFDBD-F1A4-48FF-BAC2-1A5757B8D4FC}"/>
+                </a:ext>
+              </a:extLst>
+            </p:cNvPr>
+            <p:cNvSpPr/>
+            <p:nvPr/>
+          </p:nvSpPr>
+          <p:spPr>
+            <a:xfrm>
+              <a:off x="6437052" y="2506976"/>
+              <a:ext cx="2108719" cy="1129004"/>
+            </a:xfrm>
+            <a:prstGeom prst="rect">
+              <a:avLst/>
+            </a:prstGeom>
+            <a:ln>
+              <a:headEnd type="none" w="med" len="med"/>
+              <a:tailEnd type="none" w="med" len="med"/>
+            </a:ln>
+          </p:spPr>
+          <p:style>
+            <a:lnRef idx="1">
+              <a:schemeClr val="accent3"/>
+            </a:lnRef>
+            <a:fillRef idx="2">
+              <a:schemeClr val="accent3"/>
+            </a:fillRef>
+            <a:effectRef idx="1">
+              <a:schemeClr val="accent3"/>
+            </a:effectRef>
+            <a:fontRef idx="minor">
+              <a:schemeClr val="dk1"/>
+            </a:fontRef>
+          </p:style>
+          <p:txBody>
+            <a:bodyPr rtlCol="0" anchor="ctr"/>
+            <a:lstStyle/>
+            <a:p>
+              <a:pPr algn="ctr"/>
+              <a:r>
+                <a:rPr lang="en-US" sz="1000" dirty="0"/>
+                <a:t>Business Logic</a:t>
+              </a:r>
+            </a:p>
+          </p:txBody>
+        </p:sp>
+        <p:sp>
+          <p:nvSpPr>
+            <p:cNvPr id="28" name="Rectangle 27">
+              <a:extLst>
+                <a:ext uri="{FF2B5EF4-FFF2-40B4-BE49-F238E27FC236}">
+                  <a16:creationId xmlns:a16="http://schemas.microsoft.com/office/drawing/2014/main" id="{78E7B025-9543-46BB-8696-2D25C32D4F8F}"/>
+                </a:ext>
+              </a:extLst>
+            </p:cNvPr>
+            <p:cNvSpPr/>
+            <p:nvPr/>
+          </p:nvSpPr>
+          <p:spPr>
+            <a:xfrm>
+              <a:off x="9227877" y="2506976"/>
+              <a:ext cx="2108719" cy="1129004"/>
+            </a:xfrm>
+            <a:prstGeom prst="rect">
+              <a:avLst/>
+            </a:prstGeom>
+            <a:ln>
+              <a:headEnd type="none" w="med" len="med"/>
+              <a:tailEnd type="none" w="med" len="med"/>
+            </a:ln>
+          </p:spPr>
+          <p:style>
+            <a:lnRef idx="1">
+              <a:schemeClr val="accent2"/>
+            </a:lnRef>
+            <a:fillRef idx="2">
+              <a:schemeClr val="accent2"/>
+            </a:fillRef>
+            <a:effectRef idx="1">
+              <a:schemeClr val="accent2"/>
+            </a:effectRef>
+            <a:fontRef idx="minor">
+              <a:schemeClr val="dk1"/>
+            </a:fontRef>
+          </p:style>
+          <p:txBody>
+            <a:bodyPr rtlCol="0" anchor="ctr"/>
+            <a:lstStyle/>
+            <a:p>
+              <a:pPr algn="ctr"/>
+              <a:r>
+                <a:rPr lang="en-US" sz="1000" dirty="0"/>
+                <a:t>Business Logic</a:t>
+              </a:r>
+            </a:p>
+          </p:txBody>
+        </p:sp>
+        <p:sp>
+          <p:nvSpPr>
+            <p:cNvPr id="29" name="Cylinder 28">
+              <a:extLst>
+                <a:ext uri="{FF2B5EF4-FFF2-40B4-BE49-F238E27FC236}">
+                  <a16:creationId xmlns:a16="http://schemas.microsoft.com/office/drawing/2014/main" id="{4D216B8A-58ED-4448-922A-AE226FDFB3F1}"/>
+                </a:ext>
+              </a:extLst>
+            </p:cNvPr>
+            <p:cNvSpPr/>
+            <p:nvPr/>
+          </p:nvSpPr>
+          <p:spPr>
+            <a:xfrm>
+              <a:off x="5003055" y="3884831"/>
+              <a:ext cx="746449" cy="886408"/>
+            </a:xfrm>
+            <a:prstGeom prst="can">
+              <a:avLst/>
+            </a:prstGeom>
+            <a:solidFill>
+              <a:schemeClr val="dk1">
+                <a:alpha val="50000"/>
+              </a:schemeClr>
+            </a:solidFill>
+            <a:ln>
+              <a:noFill/>
+            </a:ln>
+          </p:spPr>
+          <p:style>
+            <a:lnRef idx="0">
+              <a:scrgbClr r="0" g="0" b="0"/>
+            </a:lnRef>
+            <a:fillRef idx="0">
+              <a:scrgbClr r="0" g="0" b="0"/>
+            </a:fillRef>
+            <a:effectRef idx="0">
+              <a:scrgbClr r="0" g="0" b="0"/>
+            </a:effectRef>
+            <a:fontRef idx="minor">
+              <a:schemeClr val="lt1"/>
+            </a:fontRef>
+          </p:style>
+          <p:txBody>
+            <a:bodyPr rtlCol="0" anchor="ctr"/>
+            <a:lstStyle/>
+            <a:p>
+              <a:pPr algn="ctr"/>
+              <a:endParaRPr lang="en-US"/>
+            </a:p>
+          </p:txBody>
+        </p:sp>
+        <p:sp>
+          <p:nvSpPr>
+            <p:cNvPr id="30" name="Cylinder 29">
+              <a:extLst>
+                <a:ext uri="{FF2B5EF4-FFF2-40B4-BE49-F238E27FC236}">
+                  <a16:creationId xmlns:a16="http://schemas.microsoft.com/office/drawing/2014/main" id="{5B59BA5A-897F-4842-8B4A-D08D668937C8}"/>
+                </a:ext>
+              </a:extLst>
+            </p:cNvPr>
+            <p:cNvSpPr/>
+            <p:nvPr/>
+          </p:nvSpPr>
+          <p:spPr>
+            <a:xfrm>
+              <a:off x="7799322" y="3884831"/>
+              <a:ext cx="746449" cy="886408"/>
+            </a:xfrm>
+            <a:prstGeom prst="can">
+              <a:avLst/>
+            </a:prstGeom>
+            <a:solidFill>
+              <a:schemeClr val="dk1">
+                <a:alpha val="50000"/>
+              </a:schemeClr>
+            </a:solidFill>
+            <a:ln>
+              <a:noFill/>
+            </a:ln>
+          </p:spPr>
+          <p:style>
+            <a:lnRef idx="0">
+              <a:scrgbClr r="0" g="0" b="0"/>
+            </a:lnRef>
+            <a:fillRef idx="0">
+              <a:scrgbClr r="0" g="0" b="0"/>
+            </a:fillRef>
+            <a:effectRef idx="0">
+              <a:scrgbClr r="0" g="0" b="0"/>
+            </a:effectRef>
+            <a:fontRef idx="minor">
+              <a:schemeClr val="lt1"/>
+            </a:fontRef>
+          </p:style>
+          <p:txBody>
+            <a:bodyPr rtlCol="0" anchor="ctr"/>
+            <a:lstStyle/>
+            <a:p>
+              <a:pPr algn="ctr"/>
+              <a:endParaRPr lang="en-US"/>
+            </a:p>
+          </p:txBody>
+        </p:sp>
+        <p:sp>
+          <p:nvSpPr>
+            <p:cNvPr id="31" name="Cylinder 30">
+              <a:extLst>
+                <a:ext uri="{FF2B5EF4-FFF2-40B4-BE49-F238E27FC236}">
+                  <a16:creationId xmlns:a16="http://schemas.microsoft.com/office/drawing/2014/main" id="{512BB0BA-A10E-4504-A819-AB4F90BDFC28}"/>
+                </a:ext>
+              </a:extLst>
+            </p:cNvPr>
+            <p:cNvSpPr/>
+            <p:nvPr/>
+          </p:nvSpPr>
+          <p:spPr>
+            <a:xfrm>
+              <a:off x="10590147" y="3884831"/>
+              <a:ext cx="746449" cy="886408"/>
+            </a:xfrm>
+            <a:prstGeom prst="can">
+              <a:avLst/>
+            </a:prstGeom>
+            <a:solidFill>
+              <a:schemeClr val="dk1">
+                <a:alpha val="50000"/>
+              </a:schemeClr>
+            </a:solidFill>
+            <a:ln>
+              <a:noFill/>
+            </a:ln>
+          </p:spPr>
+          <p:style>
+            <a:lnRef idx="0">
+              <a:scrgbClr r="0" g="0" b="0"/>
+            </a:lnRef>
+            <a:fillRef idx="0">
+              <a:scrgbClr r="0" g="0" b="0"/>
+            </a:fillRef>
+            <a:effectRef idx="0">
+              <a:scrgbClr r="0" g="0" b="0"/>
+            </a:effectRef>
+            <a:fontRef idx="minor">
+              <a:schemeClr val="lt1"/>
+            </a:fontRef>
+          </p:style>
+          <p:txBody>
+            <a:bodyPr rtlCol="0" anchor="ctr"/>
+            <a:lstStyle/>
+            <a:p>
+              <a:pPr algn="ctr"/>
+              <a:endParaRPr lang="en-US"/>
+            </a:p>
+          </p:txBody>
+        </p:sp>
+        <p:sp>
+          <p:nvSpPr>
+            <p:cNvPr id="32" name="Rectangle 31">
+              <a:extLst>
+                <a:ext uri="{FF2B5EF4-FFF2-40B4-BE49-F238E27FC236}">
+                  <a16:creationId xmlns:a16="http://schemas.microsoft.com/office/drawing/2014/main" id="{DCE051A8-54D6-4E78-BF51-5B11F804F71E}"/>
+                </a:ext>
+              </a:extLst>
+            </p:cNvPr>
+            <p:cNvSpPr/>
+            <p:nvPr/>
+          </p:nvSpPr>
+          <p:spPr>
+            <a:xfrm>
+              <a:off x="585788" y="5158460"/>
+              <a:ext cx="11020424" cy="298580"/>
+            </a:xfrm>
+            <a:prstGeom prst="rect">
+              <a:avLst/>
+            </a:prstGeom>
+          </p:spPr>
+          <p:style>
+            <a:lnRef idx="1">
+              <a:schemeClr val="accent3"/>
+            </a:lnRef>
+            <a:fillRef idx="2">
+              <a:schemeClr val="accent3"/>
+            </a:fillRef>
+            <a:effectRef idx="1">
+              <a:schemeClr val="accent3"/>
+            </a:effectRef>
+            <a:fontRef idx="minor">
+              <a:schemeClr val="dk1"/>
+            </a:fontRef>
+          </p:style>
+          <p:txBody>
+            <a:bodyPr rtlCol="0" anchor="ctr"/>
+            <a:lstStyle/>
+            <a:p>
+              <a:pPr algn="ctr"/>
+              <a:r>
+                <a:rPr lang="en-US" sz="1200" dirty="0">
+                  <a:solidFill>
+                    <a:schemeClr val="tx1"/>
+                  </a:solidFill>
+                </a:rPr>
+                <a:t>Shared Code</a:t>
+              </a:r>
+            </a:p>
+          </p:txBody>
+        </p:sp>
+        <p:sp>
+          <p:nvSpPr>
+            <p:cNvPr id="33" name="Rectangle 32">
+              <a:extLst>
+                <a:ext uri="{FF2B5EF4-FFF2-40B4-BE49-F238E27FC236}">
+                  <a16:creationId xmlns:a16="http://schemas.microsoft.com/office/drawing/2014/main" id="{7ACCF27D-2EFE-46BF-9A03-EF063348CEDF}"/>
+                </a:ext>
+              </a:extLst>
+            </p:cNvPr>
+            <p:cNvSpPr/>
+            <p:nvPr/>
+          </p:nvSpPr>
+          <p:spPr>
+            <a:xfrm>
+              <a:off x="585788" y="1584836"/>
+              <a:ext cx="11020424" cy="298580"/>
+            </a:xfrm>
+            <a:prstGeom prst="rect">
+              <a:avLst/>
+            </a:prstGeom>
+          </p:spPr>
+          <p:style>
+            <a:lnRef idx="1">
+              <a:schemeClr val="accent3"/>
+            </a:lnRef>
+            <a:fillRef idx="2">
+              <a:schemeClr val="accent3"/>
+            </a:fillRef>
+            <a:effectRef idx="1">
+              <a:schemeClr val="accent3"/>
+            </a:effectRef>
+            <a:fontRef idx="minor">
+              <a:schemeClr val="dk1"/>
+            </a:fontRef>
+          </p:style>
+          <p:txBody>
+            <a:bodyPr rtlCol="0" anchor="ctr"/>
+            <a:lstStyle/>
+            <a:p>
+              <a:pPr algn="ctr"/>
+              <a:r>
+                <a:rPr lang="en-US" sz="1100" dirty="0">
+                  <a:solidFill>
+                    <a:schemeClr val="tx1"/>
+                  </a:solidFill>
+                </a:rPr>
+                <a:t>Data Delivery</a:t>
+              </a:r>
+            </a:p>
+          </p:txBody>
+        </p:sp>
+      </p:grpSp>
+      <p:grpSp>
+        <p:nvGrpSpPr>
+          <p:cNvPr id="34" name="Group 33">
+            <a:extLst>
+              <a:ext uri="{FF2B5EF4-FFF2-40B4-BE49-F238E27FC236}">
+                <a16:creationId xmlns:a16="http://schemas.microsoft.com/office/drawing/2014/main" id="{B06FFEC2-6DDC-4BF5-A3BC-EA525F31531A}"/>
+              </a:ext>
+            </a:extLst>
+          </p:cNvPr>
+          <p:cNvGrpSpPr/>
+          <p:nvPr/>
+        </p:nvGrpSpPr>
+        <p:grpSpPr>
+          <a:xfrm>
+            <a:off x="3306946" y="3182186"/>
+            <a:ext cx="6779983" cy="2486497"/>
+            <a:chOff x="469783" y="1468073"/>
+            <a:chExt cx="11299971" cy="4144162"/>
+          </a:xfrm>
+        </p:grpSpPr>
+        <p:sp>
+          <p:nvSpPr>
+            <p:cNvPr id="35" name="Rectangle 34">
+              <a:extLst>
+                <a:ext uri="{FF2B5EF4-FFF2-40B4-BE49-F238E27FC236}">
+                  <a16:creationId xmlns:a16="http://schemas.microsoft.com/office/drawing/2014/main" id="{100AAF42-E42F-4DB0-9287-A8678C97593C}"/>
+                </a:ext>
+              </a:extLst>
+            </p:cNvPr>
+            <p:cNvSpPr/>
+            <p:nvPr/>
+          </p:nvSpPr>
+          <p:spPr>
+            <a:xfrm>
+              <a:off x="469783" y="1468073"/>
+              <a:ext cx="11299971" cy="4144162"/>
+            </a:xfrm>
+            <a:prstGeom prst="rect">
+              <a:avLst/>
+            </a:prstGeom>
+            <a:ln/>
+          </p:spPr>
+          <p:style>
+            <a:lnRef idx="0">
+              <a:schemeClr val="dk1"/>
+            </a:lnRef>
+            <a:fillRef idx="3">
+              <a:schemeClr val="dk1"/>
+            </a:fillRef>
+            <a:effectRef idx="3">
+              <a:schemeClr val="dk1"/>
+            </a:effectRef>
+            <a:fontRef idx="minor">
+              <a:schemeClr val="lt1"/>
+            </a:fontRef>
+          </p:style>
+          <p:txBody>
+            <a:bodyPr rtlCol="0" anchor="ctr"/>
+            <a:lstStyle/>
+            <a:p>
+              <a:pPr algn="ctr"/>
+              <a:endParaRPr lang="en-US"/>
+            </a:p>
+          </p:txBody>
+        </p:sp>
+        <p:sp>
+          <p:nvSpPr>
+            <p:cNvPr id="36" name="Rectangle 35">
+              <a:extLst>
+                <a:ext uri="{FF2B5EF4-FFF2-40B4-BE49-F238E27FC236}">
+                  <a16:creationId xmlns:a16="http://schemas.microsoft.com/office/drawing/2014/main" id="{2BC2AA07-10D3-4256-B514-9508CFEA902F}"/>
+                </a:ext>
+              </a:extLst>
+            </p:cNvPr>
+            <p:cNvSpPr/>
+            <p:nvPr/>
+          </p:nvSpPr>
+          <p:spPr>
+            <a:xfrm>
+              <a:off x="585788" y="1995385"/>
+              <a:ext cx="2647949" cy="3051110"/>
+            </a:xfrm>
+            <a:prstGeom prst="rect">
+              <a:avLst/>
+            </a:prstGeom>
+          </p:spPr>
+          <p:style>
+            <a:lnRef idx="2">
+              <a:schemeClr val="accent6">
+                <a:shade val="50000"/>
+              </a:schemeClr>
+            </a:lnRef>
+            <a:fillRef idx="1">
+              <a:schemeClr val="accent6"/>
+            </a:fillRef>
+            <a:effectRef idx="0">
+              <a:schemeClr val="accent6"/>
+            </a:effectRef>
+            <a:fontRef idx="minor">
+              <a:schemeClr val="lt1"/>
+            </a:fontRef>
+          </p:style>
+          <p:txBody>
+            <a:bodyPr rtlCol="0" anchor="t"/>
+            <a:lstStyle/>
+            <a:p>
+              <a:r>
+                <a:rPr lang="en-US" sz="1200" dirty="0">
+                  <a:solidFill>
+                    <a:schemeClr val="tx1"/>
+                  </a:solidFill>
+                </a:rPr>
+                <a:t>Bounded Context 1</a:t>
+              </a:r>
+            </a:p>
+          </p:txBody>
+        </p:sp>
+        <p:sp>
+          <p:nvSpPr>
+            <p:cNvPr id="37" name="Rectangle 36">
+              <a:extLst>
+                <a:ext uri="{FF2B5EF4-FFF2-40B4-BE49-F238E27FC236}">
+                  <a16:creationId xmlns:a16="http://schemas.microsoft.com/office/drawing/2014/main" id="{A2BE8713-2A9A-48FA-8E63-169B187B04A3}"/>
+                </a:ext>
+              </a:extLst>
+            </p:cNvPr>
+            <p:cNvSpPr/>
+            <p:nvPr/>
+          </p:nvSpPr>
+          <p:spPr>
+            <a:xfrm>
+              <a:off x="3376613" y="1995383"/>
+              <a:ext cx="2647949" cy="3051110"/>
+            </a:xfrm>
+            <a:prstGeom prst="rect">
+              <a:avLst/>
+            </a:prstGeom>
+          </p:spPr>
+          <p:style>
+            <a:lnRef idx="2">
+              <a:schemeClr val="accent1">
+                <a:shade val="50000"/>
+              </a:schemeClr>
+            </a:lnRef>
+            <a:fillRef idx="1">
+              <a:schemeClr val="accent1"/>
+            </a:fillRef>
+            <a:effectRef idx="0">
+              <a:schemeClr val="accent1"/>
+            </a:effectRef>
+            <a:fontRef idx="minor">
+              <a:schemeClr val="lt1"/>
+            </a:fontRef>
+          </p:style>
+          <p:txBody>
+            <a:bodyPr rtlCol="0" anchor="t"/>
+            <a:lstStyle/>
+            <a:p>
+              <a:r>
+                <a:rPr lang="en-US" sz="1200" dirty="0">
+                  <a:solidFill>
+                    <a:schemeClr val="tx1"/>
+                  </a:solidFill>
+                </a:rPr>
+                <a:t>Bounded Context 2</a:t>
+              </a:r>
+            </a:p>
+            <a:p>
+              <a:endParaRPr lang="en-US" sz="1200" dirty="0"/>
+            </a:p>
+          </p:txBody>
+        </p:sp>
+        <p:sp>
+          <p:nvSpPr>
+            <p:cNvPr id="38" name="Rectangle 37">
+              <a:extLst>
+                <a:ext uri="{FF2B5EF4-FFF2-40B4-BE49-F238E27FC236}">
+                  <a16:creationId xmlns:a16="http://schemas.microsoft.com/office/drawing/2014/main" id="{ADE96C9B-858B-4CCB-BDA1-2C4E0B41E0B8}"/>
+                </a:ext>
+              </a:extLst>
+            </p:cNvPr>
+            <p:cNvSpPr/>
+            <p:nvPr/>
+          </p:nvSpPr>
+          <p:spPr>
+            <a:xfrm>
+              <a:off x="6167438" y="1995383"/>
+              <a:ext cx="2647949" cy="3051110"/>
+            </a:xfrm>
+            <a:prstGeom prst="rect">
+              <a:avLst/>
+            </a:prstGeom>
+          </p:spPr>
+          <p:style>
+            <a:lnRef idx="2">
+              <a:schemeClr val="accent4">
+                <a:shade val="50000"/>
+              </a:schemeClr>
+            </a:lnRef>
+            <a:fillRef idx="1">
+              <a:schemeClr val="accent4"/>
+            </a:fillRef>
+            <a:effectRef idx="0">
+              <a:schemeClr val="accent4"/>
+            </a:effectRef>
+            <a:fontRef idx="minor">
+              <a:schemeClr val="lt1"/>
+            </a:fontRef>
+          </p:style>
+          <p:txBody>
+            <a:bodyPr rtlCol="0" anchor="t"/>
+            <a:lstStyle/>
+            <a:p>
+              <a:r>
+                <a:rPr lang="en-US" sz="1200" dirty="0">
+                  <a:solidFill>
+                    <a:schemeClr val="tx1"/>
+                  </a:solidFill>
+                </a:rPr>
+                <a:t>Bounded Context 3</a:t>
+              </a:r>
+            </a:p>
+          </p:txBody>
+        </p:sp>
+        <p:sp>
+          <p:nvSpPr>
+            <p:cNvPr id="39" name="Rectangle 38">
+              <a:extLst>
+                <a:ext uri="{FF2B5EF4-FFF2-40B4-BE49-F238E27FC236}">
+                  <a16:creationId xmlns:a16="http://schemas.microsoft.com/office/drawing/2014/main" id="{9B4ED3DE-E518-418E-8F38-C9DC278F532F}"/>
+                </a:ext>
+              </a:extLst>
+            </p:cNvPr>
+            <p:cNvSpPr/>
+            <p:nvPr/>
+          </p:nvSpPr>
+          <p:spPr>
+            <a:xfrm>
+              <a:off x="8958263" y="1995383"/>
+              <a:ext cx="2647949" cy="3051110"/>
+            </a:xfrm>
+            <a:prstGeom prst="rect">
+              <a:avLst/>
+            </a:prstGeom>
+          </p:spPr>
+          <p:style>
+            <a:lnRef idx="2">
+              <a:schemeClr val="accent2">
+                <a:shade val="50000"/>
+              </a:schemeClr>
+            </a:lnRef>
+            <a:fillRef idx="1">
+              <a:schemeClr val="accent2"/>
+            </a:fillRef>
+            <a:effectRef idx="0">
+              <a:schemeClr val="accent2"/>
+            </a:effectRef>
+            <a:fontRef idx="minor">
+              <a:schemeClr val="lt1"/>
+            </a:fontRef>
+          </p:style>
+          <p:txBody>
+            <a:bodyPr rtlCol="0" anchor="t"/>
+            <a:lstStyle/>
+            <a:p>
+              <a:r>
+                <a:rPr lang="en-US" sz="1200" dirty="0">
+                  <a:solidFill>
+                    <a:schemeClr val="tx1"/>
+                  </a:solidFill>
+                </a:rPr>
+                <a:t>Bounded Context 4</a:t>
+              </a:r>
+            </a:p>
+          </p:txBody>
+        </p:sp>
+        <p:sp>
+          <p:nvSpPr>
+            <p:cNvPr id="40" name="Rectangle 39">
+              <a:extLst>
+                <a:ext uri="{FF2B5EF4-FFF2-40B4-BE49-F238E27FC236}">
+                  <a16:creationId xmlns:a16="http://schemas.microsoft.com/office/drawing/2014/main" id="{41120779-0B64-45F0-A4CA-01E835EA1A0A}"/>
+                </a:ext>
+              </a:extLst>
+            </p:cNvPr>
+            <p:cNvSpPr/>
+            <p:nvPr/>
+          </p:nvSpPr>
+          <p:spPr>
+            <a:xfrm>
+              <a:off x="855402" y="2506976"/>
+              <a:ext cx="2108719" cy="1129004"/>
+            </a:xfrm>
+            <a:prstGeom prst="rect">
+              <a:avLst/>
+            </a:prstGeom>
+            <a:ln>
+              <a:headEnd type="none" w="med" len="med"/>
+              <a:tailEnd type="none" w="med" len="med"/>
+            </a:ln>
+          </p:spPr>
+          <p:style>
+            <a:lnRef idx="1">
+              <a:schemeClr val="accent6"/>
+            </a:lnRef>
+            <a:fillRef idx="2">
+              <a:schemeClr val="accent6"/>
+            </a:fillRef>
+            <a:effectRef idx="1">
+              <a:schemeClr val="accent6"/>
+            </a:effectRef>
+            <a:fontRef idx="minor">
+              <a:schemeClr val="dk1"/>
+            </a:fontRef>
+          </p:style>
+          <p:txBody>
+            <a:bodyPr rtlCol="0" anchor="ctr"/>
+            <a:lstStyle/>
+            <a:p>
+              <a:pPr algn="ctr"/>
+              <a:r>
+                <a:rPr lang="en-US" sz="1000" dirty="0"/>
+                <a:t>Business Logic</a:t>
+              </a:r>
+            </a:p>
+          </p:txBody>
+        </p:sp>
+        <p:sp>
+          <p:nvSpPr>
+            <p:cNvPr id="41" name="Cylinder 40">
+              <a:extLst>
+                <a:ext uri="{FF2B5EF4-FFF2-40B4-BE49-F238E27FC236}">
+                  <a16:creationId xmlns:a16="http://schemas.microsoft.com/office/drawing/2014/main" id="{88CD75C0-BE57-42AD-A0DD-D6E4999F50AE}"/>
+                </a:ext>
+              </a:extLst>
+            </p:cNvPr>
+            <p:cNvSpPr/>
+            <p:nvPr/>
+          </p:nvSpPr>
+          <p:spPr>
+            <a:xfrm>
+              <a:off x="2217672" y="3884831"/>
+              <a:ext cx="746449" cy="886408"/>
+            </a:xfrm>
+            <a:prstGeom prst="can">
+              <a:avLst/>
+            </a:prstGeom>
+            <a:solidFill>
+              <a:schemeClr val="dk1">
+                <a:alpha val="50000"/>
+              </a:schemeClr>
+            </a:solidFill>
+            <a:ln>
+              <a:noFill/>
+            </a:ln>
+          </p:spPr>
+          <p:style>
+            <a:lnRef idx="0">
+              <a:scrgbClr r="0" g="0" b="0"/>
+            </a:lnRef>
+            <a:fillRef idx="0">
+              <a:scrgbClr r="0" g="0" b="0"/>
+            </a:fillRef>
+            <a:effectRef idx="0">
+              <a:scrgbClr r="0" g="0" b="0"/>
+            </a:effectRef>
+            <a:fontRef idx="minor">
+              <a:schemeClr val="lt1"/>
+            </a:fontRef>
+          </p:style>
+          <p:txBody>
+            <a:bodyPr rtlCol="0" anchor="ctr"/>
+            <a:lstStyle/>
+            <a:p>
+              <a:pPr algn="ctr"/>
+              <a:endParaRPr lang="en-US"/>
+            </a:p>
+          </p:txBody>
+        </p:sp>
+        <p:sp>
+          <p:nvSpPr>
+            <p:cNvPr id="42" name="Rectangle 41">
+              <a:extLst>
+                <a:ext uri="{FF2B5EF4-FFF2-40B4-BE49-F238E27FC236}">
+                  <a16:creationId xmlns:a16="http://schemas.microsoft.com/office/drawing/2014/main" id="{0DDD1533-5444-48A9-BFDB-BD1C13252D02}"/>
+                </a:ext>
+              </a:extLst>
+            </p:cNvPr>
+            <p:cNvSpPr/>
+            <p:nvPr/>
+          </p:nvSpPr>
+          <p:spPr>
+            <a:xfrm>
+              <a:off x="3646227" y="2506976"/>
+              <a:ext cx="2108719" cy="1129004"/>
+            </a:xfrm>
+            <a:prstGeom prst="rect">
+              <a:avLst/>
+            </a:prstGeom>
+            <a:ln>
+              <a:headEnd type="none" w="med" len="med"/>
+              <a:tailEnd type="none" w="med" len="med"/>
+            </a:ln>
+          </p:spPr>
+          <p:style>
+            <a:lnRef idx="1">
+              <a:schemeClr val="accent5"/>
+            </a:lnRef>
+            <a:fillRef idx="2">
+              <a:schemeClr val="accent5"/>
+            </a:fillRef>
+            <a:effectRef idx="1">
+              <a:schemeClr val="accent5"/>
+            </a:effectRef>
+            <a:fontRef idx="minor">
+              <a:schemeClr val="dk1"/>
+            </a:fontRef>
+          </p:style>
+          <p:txBody>
+            <a:bodyPr rtlCol="0" anchor="ctr"/>
+            <a:lstStyle/>
+            <a:p>
+              <a:pPr algn="ctr"/>
+              <a:r>
+                <a:rPr lang="en-US" sz="1000" dirty="0"/>
+                <a:t>Business Logic</a:t>
+              </a:r>
+            </a:p>
+          </p:txBody>
+        </p:sp>
+        <p:sp>
+          <p:nvSpPr>
+            <p:cNvPr id="43" name="Rectangle 42">
+              <a:extLst>
+                <a:ext uri="{FF2B5EF4-FFF2-40B4-BE49-F238E27FC236}">
+                  <a16:creationId xmlns:a16="http://schemas.microsoft.com/office/drawing/2014/main" id="{0A661F77-BD8F-4552-B64E-7568163AD698}"/>
+                </a:ext>
+              </a:extLst>
+            </p:cNvPr>
+            <p:cNvSpPr/>
+            <p:nvPr/>
+          </p:nvSpPr>
+          <p:spPr>
+            <a:xfrm>
+              <a:off x="6437052" y="2506976"/>
+              <a:ext cx="2108719" cy="1129004"/>
+            </a:xfrm>
+            <a:prstGeom prst="rect">
+              <a:avLst/>
+            </a:prstGeom>
+            <a:ln>
+              <a:headEnd type="none" w="med" len="med"/>
+              <a:tailEnd type="none" w="med" len="med"/>
+            </a:ln>
+          </p:spPr>
+          <p:style>
+            <a:lnRef idx="1">
+              <a:schemeClr val="accent4"/>
+            </a:lnRef>
+            <a:fillRef idx="2">
+              <a:schemeClr val="accent4"/>
+            </a:fillRef>
+            <a:effectRef idx="1">
+              <a:schemeClr val="accent4"/>
+            </a:effectRef>
+            <a:fontRef idx="minor">
+              <a:schemeClr val="dk1"/>
+            </a:fontRef>
+          </p:style>
+          <p:txBody>
+            <a:bodyPr rtlCol="0" anchor="ctr"/>
+            <a:lstStyle/>
+            <a:p>
+              <a:pPr algn="ctr"/>
+              <a:r>
+                <a:rPr lang="en-US" sz="1000" dirty="0"/>
+                <a:t>Business Logic</a:t>
+              </a:r>
+            </a:p>
+          </p:txBody>
+        </p:sp>
+        <p:sp>
+          <p:nvSpPr>
+            <p:cNvPr id="44" name="Rectangle 43">
+              <a:extLst>
+                <a:ext uri="{FF2B5EF4-FFF2-40B4-BE49-F238E27FC236}">
+                  <a16:creationId xmlns:a16="http://schemas.microsoft.com/office/drawing/2014/main" id="{A3AC1460-6972-46A7-8E84-CE337DD8E6CA}"/>
+                </a:ext>
+              </a:extLst>
+            </p:cNvPr>
+            <p:cNvSpPr/>
+            <p:nvPr/>
+          </p:nvSpPr>
+          <p:spPr>
+            <a:xfrm>
+              <a:off x="9227877" y="2506976"/>
+              <a:ext cx="2108719" cy="1129004"/>
+            </a:xfrm>
+            <a:prstGeom prst="rect">
+              <a:avLst/>
+            </a:prstGeom>
+            <a:ln>
+              <a:headEnd type="none" w="med" len="med"/>
+              <a:tailEnd type="none" w="med" len="med"/>
+            </a:ln>
+          </p:spPr>
+          <p:style>
+            <a:lnRef idx="1">
+              <a:schemeClr val="accent2"/>
+            </a:lnRef>
+            <a:fillRef idx="2">
+              <a:schemeClr val="accent2"/>
+            </a:fillRef>
+            <a:effectRef idx="1">
+              <a:schemeClr val="accent2"/>
+            </a:effectRef>
+            <a:fontRef idx="minor">
+              <a:schemeClr val="dk1"/>
+            </a:fontRef>
+          </p:style>
+          <p:txBody>
+            <a:bodyPr rtlCol="0" anchor="ctr"/>
+            <a:lstStyle/>
+            <a:p>
+              <a:pPr algn="ctr"/>
+              <a:r>
+                <a:rPr lang="en-US" sz="1000" dirty="0"/>
+                <a:t>Business Logic</a:t>
+              </a:r>
+            </a:p>
+          </p:txBody>
+        </p:sp>
+        <p:sp>
+          <p:nvSpPr>
+            <p:cNvPr id="45" name="Cylinder 44">
+              <a:extLst>
+                <a:ext uri="{FF2B5EF4-FFF2-40B4-BE49-F238E27FC236}">
+                  <a16:creationId xmlns:a16="http://schemas.microsoft.com/office/drawing/2014/main" id="{DCCDD814-1A1E-4E23-8C1A-541267EB63DF}"/>
+                </a:ext>
+              </a:extLst>
+            </p:cNvPr>
+            <p:cNvSpPr/>
+            <p:nvPr/>
+          </p:nvSpPr>
+          <p:spPr>
+            <a:xfrm>
+              <a:off x="5003055" y="3884831"/>
+              <a:ext cx="746449" cy="886408"/>
+            </a:xfrm>
+            <a:prstGeom prst="can">
+              <a:avLst/>
+            </a:prstGeom>
+            <a:solidFill>
+              <a:schemeClr val="dk1">
+                <a:alpha val="50000"/>
+              </a:schemeClr>
+            </a:solidFill>
+            <a:ln>
+              <a:noFill/>
+            </a:ln>
+          </p:spPr>
+          <p:style>
+            <a:lnRef idx="0">
+              <a:scrgbClr r="0" g="0" b="0"/>
+            </a:lnRef>
+            <a:fillRef idx="0">
+              <a:scrgbClr r="0" g="0" b="0"/>
+            </a:fillRef>
+            <a:effectRef idx="0">
+              <a:scrgbClr r="0" g="0" b="0"/>
+            </a:effectRef>
+            <a:fontRef idx="minor">
+              <a:schemeClr val="lt1"/>
+            </a:fontRef>
+          </p:style>
+          <p:txBody>
+            <a:bodyPr rtlCol="0" anchor="ctr"/>
+            <a:lstStyle/>
+            <a:p>
+              <a:pPr algn="ctr"/>
+              <a:endParaRPr lang="en-US"/>
+            </a:p>
+          </p:txBody>
+        </p:sp>
+        <p:sp>
+          <p:nvSpPr>
+            <p:cNvPr id="46" name="Cylinder 45">
+              <a:extLst>
+                <a:ext uri="{FF2B5EF4-FFF2-40B4-BE49-F238E27FC236}">
+                  <a16:creationId xmlns:a16="http://schemas.microsoft.com/office/drawing/2014/main" id="{36DEE173-6A41-4B69-AC7C-70C669D20350}"/>
+                </a:ext>
+              </a:extLst>
+            </p:cNvPr>
+            <p:cNvSpPr/>
+            <p:nvPr/>
+          </p:nvSpPr>
+          <p:spPr>
+            <a:xfrm>
+              <a:off x="7799322" y="3884831"/>
+              <a:ext cx="746449" cy="886408"/>
+            </a:xfrm>
+            <a:prstGeom prst="can">
+              <a:avLst/>
+            </a:prstGeom>
+            <a:solidFill>
+              <a:schemeClr val="dk1">
+                <a:alpha val="50000"/>
+              </a:schemeClr>
+            </a:solidFill>
+            <a:ln>
+              <a:noFill/>
+            </a:ln>
+          </p:spPr>
+          <p:style>
+            <a:lnRef idx="0">
+              <a:scrgbClr r="0" g="0" b="0"/>
+            </a:lnRef>
+            <a:fillRef idx="0">
+              <a:scrgbClr r="0" g="0" b="0"/>
+            </a:fillRef>
+            <a:effectRef idx="0">
+              <a:scrgbClr r="0" g="0" b="0"/>
+            </a:effectRef>
+            <a:fontRef idx="minor">
+              <a:schemeClr val="lt1"/>
+            </a:fontRef>
+          </p:style>
+          <p:txBody>
+            <a:bodyPr rtlCol="0" anchor="ctr"/>
+            <a:lstStyle/>
+            <a:p>
+              <a:pPr algn="ctr"/>
+              <a:endParaRPr lang="en-US"/>
+            </a:p>
+          </p:txBody>
+        </p:sp>
+        <p:sp>
+          <p:nvSpPr>
+            <p:cNvPr id="47" name="Cylinder 46">
+              <a:extLst>
+                <a:ext uri="{FF2B5EF4-FFF2-40B4-BE49-F238E27FC236}">
+                  <a16:creationId xmlns:a16="http://schemas.microsoft.com/office/drawing/2014/main" id="{A9DC76F4-671F-47D4-B9C0-8FFEA8DAE726}"/>
+                </a:ext>
+              </a:extLst>
+            </p:cNvPr>
+            <p:cNvSpPr/>
+            <p:nvPr/>
+          </p:nvSpPr>
+          <p:spPr>
+            <a:xfrm>
+              <a:off x="10590147" y="3884831"/>
+              <a:ext cx="746449" cy="886408"/>
+            </a:xfrm>
+            <a:prstGeom prst="can">
+              <a:avLst/>
+            </a:prstGeom>
+            <a:solidFill>
+              <a:schemeClr val="dk1">
+                <a:alpha val="50000"/>
+              </a:schemeClr>
+            </a:solidFill>
+            <a:ln>
+              <a:noFill/>
+            </a:ln>
+          </p:spPr>
+          <p:style>
+            <a:lnRef idx="0">
+              <a:scrgbClr r="0" g="0" b="0"/>
+            </a:lnRef>
+            <a:fillRef idx="0">
+              <a:scrgbClr r="0" g="0" b="0"/>
+            </a:fillRef>
+            <a:effectRef idx="0">
+              <a:scrgbClr r="0" g="0" b="0"/>
+            </a:effectRef>
+            <a:fontRef idx="minor">
+              <a:schemeClr val="lt1"/>
+            </a:fontRef>
+          </p:style>
+          <p:txBody>
+            <a:bodyPr rtlCol="0" anchor="ctr"/>
+            <a:lstStyle/>
+            <a:p>
+              <a:pPr algn="ctr"/>
+              <a:endParaRPr lang="en-US"/>
+            </a:p>
+          </p:txBody>
+        </p:sp>
+        <p:sp>
+          <p:nvSpPr>
+            <p:cNvPr id="48" name="Rectangle 47">
+              <a:extLst>
+                <a:ext uri="{FF2B5EF4-FFF2-40B4-BE49-F238E27FC236}">
+                  <a16:creationId xmlns:a16="http://schemas.microsoft.com/office/drawing/2014/main" id="{904100D7-0227-44F5-958C-6D78A04467E0}"/>
+                </a:ext>
+              </a:extLst>
+            </p:cNvPr>
+            <p:cNvSpPr/>
+            <p:nvPr/>
+          </p:nvSpPr>
+          <p:spPr>
+            <a:xfrm>
+              <a:off x="585788" y="5158460"/>
+              <a:ext cx="11020424" cy="298580"/>
+            </a:xfrm>
+            <a:prstGeom prst="rect">
+              <a:avLst/>
+            </a:prstGeom>
+          </p:spPr>
+          <p:style>
+            <a:lnRef idx="1">
+              <a:schemeClr val="accent3"/>
+            </a:lnRef>
+            <a:fillRef idx="2">
+              <a:schemeClr val="accent3"/>
+            </a:fillRef>
+            <a:effectRef idx="1">
+              <a:schemeClr val="accent3"/>
+            </a:effectRef>
+            <a:fontRef idx="minor">
+              <a:schemeClr val="dk1"/>
+            </a:fontRef>
+          </p:style>
+          <p:txBody>
+            <a:bodyPr rtlCol="0" anchor="ctr"/>
+            <a:lstStyle/>
+            <a:p>
+              <a:pPr algn="ctr"/>
+              <a:r>
+                <a:rPr lang="en-US" sz="1200" dirty="0">
+                  <a:solidFill>
+                    <a:schemeClr val="tx1"/>
+                  </a:solidFill>
+                </a:rPr>
+                <a:t>Shared Code</a:t>
+              </a:r>
+            </a:p>
+          </p:txBody>
+        </p:sp>
+        <p:sp>
+          <p:nvSpPr>
+            <p:cNvPr id="49" name="Rectangle 48">
+              <a:extLst>
+                <a:ext uri="{FF2B5EF4-FFF2-40B4-BE49-F238E27FC236}">
+                  <a16:creationId xmlns:a16="http://schemas.microsoft.com/office/drawing/2014/main" id="{93388763-7EBA-469A-B6D3-AFD62E4E3EA5}"/>
+                </a:ext>
+              </a:extLst>
+            </p:cNvPr>
+            <p:cNvSpPr/>
+            <p:nvPr/>
+          </p:nvSpPr>
+          <p:spPr>
+            <a:xfrm>
+              <a:off x="585788" y="1584836"/>
+              <a:ext cx="11020424" cy="298580"/>
+            </a:xfrm>
+            <a:prstGeom prst="rect">
+              <a:avLst/>
+            </a:prstGeom>
+          </p:spPr>
+          <p:style>
+            <a:lnRef idx="1">
+              <a:schemeClr val="accent3"/>
+            </a:lnRef>
+            <a:fillRef idx="2">
+              <a:schemeClr val="accent3"/>
+            </a:fillRef>
+            <a:effectRef idx="1">
+              <a:schemeClr val="accent3"/>
+            </a:effectRef>
+            <a:fontRef idx="minor">
+              <a:schemeClr val="dk1"/>
+            </a:fontRef>
+          </p:style>
+          <p:txBody>
+            <a:bodyPr rtlCol="0" anchor="ctr"/>
+            <a:lstStyle/>
+            <a:p>
+              <a:pPr algn="ctr"/>
+              <a:r>
+                <a:rPr lang="en-US" sz="1100" dirty="0">
+                  <a:solidFill>
+                    <a:schemeClr val="tx1"/>
+                  </a:solidFill>
+                </a:rPr>
+                <a:t>Data Delivery</a:t>
+              </a:r>
+            </a:p>
+          </p:txBody>
+        </p:sp>
+      </p:grpSp>
+    </p:spTree>
+    <p:extLst>
+      <p:ext uri="{BB962C8B-B14F-4D97-AF65-F5344CB8AC3E}">
+        <p14:creationId xmlns:p14="http://schemas.microsoft.com/office/powerpoint/2010/main" val="2727170026"/>
+      </p:ext>
+    </p:extLst>
+  </p:cSld>
+  <p:clrMapOvr>
+    <a:masterClrMapping/>
+  </p:clrMapOvr>
+</p:sld>
+</file>
+
+<file path=ppt/slides/slide9.xml><?xml version="1.0" encoding="utf-8"?>
+<p:sld xmlns:a="http://schemas.openxmlformats.org/drawingml/2006/main" xmlns:r="http://schemas.openxmlformats.org/officeDocument/2006/relationships" xmlns:p="http://schemas.openxmlformats.org/presentationml/2006/main">
+  <p:cSld>
+    <p:spTree>
+      <p:nvGrpSpPr>
+        <p:cNvPr id="1" name=""/>
+        <p:cNvGrpSpPr/>
+        <p:nvPr/>
+      </p:nvGrpSpPr>
+      <p:grpSpPr>
+        <a:xfrm>
+          <a:off x="0" y="0"/>
+          <a:ext cx="0" cy="0"/>
+          <a:chOff x="0" y="0"/>
+          <a:chExt cx="0" cy="0"/>
+        </a:xfrm>
+      </p:grpSpPr>
+      <p:sp>
+        <p:nvSpPr>
           <p:cNvPr id="4" name="Rectangle 3">
             <a:extLst>
               <a:ext uri="{FF2B5EF4-FFF2-40B4-BE49-F238E27FC236}">
@@ -22440,4 +25683,299 @@
     </a:ext>
   </a:extLst>
 </a:theme>
+</file>
+
+<file path=ppt/theme/theme2.xml><?xml version="1.0" encoding="utf-8"?>
+<a:theme xmlns:a="http://schemas.openxmlformats.org/drawingml/2006/main" name="Office Theme">
+  <a:themeElements>
+    <a:clrScheme name="Office">
+      <a:dk1>
+        <a:sysClr val="windowText" lastClr="000000"/>
+      </a:dk1>
+      <a:lt1>
+        <a:sysClr val="window" lastClr="FFFFFF"/>
+      </a:lt1>
+      <a:dk2>
+        <a:srgbClr val="44546A"/>
+      </a:dk2>
+      <a:lt2>
+        <a:srgbClr val="E7E6E6"/>
+      </a:lt2>
+      <a:accent1>
+        <a:srgbClr val="4472C4"/>
+      </a:accent1>
+      <a:accent2>
+        <a:srgbClr val="ED7D31"/>
+      </a:accent2>
+      <a:accent3>
+        <a:srgbClr val="A5A5A5"/>
+      </a:accent3>
+      <a:accent4>
+        <a:srgbClr val="FFC000"/>
+      </a:accent4>
+      <a:accent5>
+        <a:srgbClr val="5B9BD5"/>
+      </a:accent5>
+      <a:accent6>
+        <a:srgbClr val="70AD47"/>
+      </a:accent6>
+      <a:hlink>
+        <a:srgbClr val="0563C1"/>
+      </a:hlink>
+      <a:folHlink>
+        <a:srgbClr val="954F72"/>
+      </a:folHlink>
+    </a:clrScheme>
+    <a:fontScheme name="Office">
+      <a:majorFont>
+        <a:latin typeface="Calibri Light" panose="020F0302020204030204"/>
+        <a:ea typeface=""/>
+        <a:cs typeface=""/>
+        <a:font script="Jpan" typeface="游ゴシック Light"/>
+        <a:font script="Hang" typeface="맑은 고딕"/>
+        <a:font script="Hans" typeface="等线 Light"/>
+        <a:font script="Hant" typeface="新細明體"/>
+        <a:font script="Arab" typeface="Times New Roman"/>
+        <a:font script="Hebr" typeface="Times New Roman"/>
+        <a:font script="Thai" typeface="Angsana New"/>
+        <a:font script="Ethi" typeface="Nyala"/>
+        <a:font script="Beng" typeface="Vrinda"/>
+        <a:font script="Gujr" typeface="Shruti"/>
+        <a:font script="Khmr" typeface="MoolBoran"/>
+        <a:font script="Knda" typeface="Tunga"/>
+        <a:font script="Guru" typeface="Raavi"/>
+        <a:font script="Cans" typeface="Euphemia"/>
+        <a:font script="Cher" typeface="Plantagenet Cherokee"/>
+        <a:font script="Yiii" typeface="Microsoft Yi Baiti"/>
+        <a:font script="Tibt" typeface="Microsoft Himalaya"/>
+        <a:font script="Thaa" typeface="MV Boli"/>
+        <a:font script="Deva" typeface="Mangal"/>
+        <a:font script="Telu" typeface="Gautami"/>
+        <a:font script="Taml" typeface="Latha"/>
+        <a:font script="Syrc" typeface="Estrangelo Edessa"/>
+        <a:font script="Orya" typeface="Kalinga"/>
+        <a:font script="Mlym" typeface="Kartika"/>
+        <a:font script="Laoo" typeface="DokChampa"/>
+        <a:font script="Sinh" typeface="Iskoola Pota"/>
+        <a:font script="Mong" typeface="Mongolian Baiti"/>
+        <a:font script="Viet" typeface="Times New Roman"/>
+        <a:font script="Uigh" typeface="Microsoft Uighur"/>
+        <a:font script="Geor" typeface="Sylfaen"/>
+        <a:font script="Armn" typeface="Arial"/>
+        <a:font script="Bugi" typeface="Leelawadee UI"/>
+        <a:font script="Bopo" typeface="Microsoft JhengHei"/>
+        <a:font script="Java" typeface="Javanese Text"/>
+        <a:font script="Lisu" typeface="Segoe UI"/>
+        <a:font script="Mymr" typeface="Myanmar Text"/>
+        <a:font script="Nkoo" typeface="Ebrima"/>
+        <a:font script="Olck" typeface="Nirmala UI"/>
+        <a:font script="Osma" typeface="Ebrima"/>
+        <a:font script="Phag" typeface="Phagspa"/>
+        <a:font script="Syrn" typeface="Estrangelo Edessa"/>
+        <a:font script="Syrj" typeface="Estrangelo Edessa"/>
+        <a:font script="Syre" typeface="Estrangelo Edessa"/>
+        <a:font script="Sora" typeface="Nirmala UI"/>
+        <a:font script="Tale" typeface="Microsoft Tai Le"/>
+        <a:font script="Talu" typeface="Microsoft New Tai Lue"/>
+        <a:font script="Tfng" typeface="Ebrima"/>
+      </a:majorFont>
+      <a:minorFont>
+        <a:latin typeface="Calibri" panose="020F0502020204030204"/>
+        <a:ea typeface=""/>
+        <a:cs typeface=""/>
+        <a:font script="Jpan" typeface="游ゴシック"/>
+        <a:font script="Hang" typeface="맑은 고딕"/>
+        <a:font script="Hans" typeface="等线"/>
+        <a:font script="Hant" typeface="新細明體"/>
+        <a:font script="Arab" typeface="Arial"/>
+        <a:font script="Hebr" typeface="Arial"/>
+        <a:font script="Thai" typeface="Cordia New"/>
+        <a:font script="Ethi" typeface="Nyala"/>
+        <a:font script="Beng" typeface="Vrinda"/>
+        <a:font script="Gujr" typeface="Shruti"/>
+        <a:font script="Khmr" typeface="DaunPenh"/>
+        <a:font script="Knda" typeface="Tunga"/>
+        <a:font script="Guru" typeface="Raavi"/>
+        <a:font script="Cans" typeface="Euphemia"/>
+        <a:font script="Cher" typeface="Plantagenet Cherokee"/>
+        <a:font script="Yiii" typeface="Microsoft Yi Baiti"/>
+        <a:font script="Tibt" typeface="Microsoft Himalaya"/>
+        <a:font script="Thaa" typeface="MV Boli"/>
+        <a:font script="Deva" typeface="Mangal"/>
+        <a:font script="Telu" typeface="Gautami"/>
+        <a:font script="Taml" typeface="Latha"/>
+        <a:font script="Syrc" typeface="Estrangelo Edessa"/>
+        <a:font script="Orya" typeface="Kalinga"/>
+        <a:font script="Mlym" typeface="Kartika"/>
+        <a:font script="Laoo" typeface="DokChampa"/>
+        <a:font script="Sinh" typeface="Iskoola Pota"/>
+        <a:font script="Mong" typeface="Mongolian Baiti"/>
+        <a:font script="Viet" typeface="Arial"/>
+        <a:font script="Uigh" typeface="Microsoft Uighur"/>
+        <a:font script="Geor" typeface="Sylfaen"/>
+        <a:font script="Armn" typeface="Arial"/>
+        <a:font script="Bugi" typeface="Leelawadee UI"/>
+        <a:font script="Bopo" typeface="Microsoft JhengHei"/>
+        <a:font script="Java" typeface="Javanese Text"/>
+        <a:font script="Lisu" typeface="Segoe UI"/>
+        <a:font script="Mymr" typeface="Myanmar Text"/>
+        <a:font script="Nkoo" typeface="Ebrima"/>
+        <a:font script="Olck" typeface="Nirmala UI"/>
+        <a:font script="Osma" typeface="Ebrima"/>
+        <a:font script="Phag" typeface="Phagspa"/>
+        <a:font script="Syrn" typeface="Estrangelo Edessa"/>
+        <a:font script="Syrj" typeface="Estrangelo Edessa"/>
+        <a:font script="Syre" typeface="Estrangelo Edessa"/>
+        <a:font script="Sora" typeface="Nirmala UI"/>
+        <a:font script="Tale" typeface="Microsoft Tai Le"/>
+        <a:font script="Talu" typeface="Microsoft New Tai Lue"/>
+        <a:font script="Tfng" typeface="Ebrima"/>
+      </a:minorFont>
+    </a:fontScheme>
+    <a:fmtScheme name="Office">
+      <a:fillStyleLst>
+        <a:solidFill>
+          <a:schemeClr val="phClr"/>
+        </a:solidFill>
+        <a:gradFill rotWithShape="1">
+          <a:gsLst>
+            <a:gs pos="0">
+              <a:schemeClr val="phClr">
+                <a:lumMod val="110000"/>
+                <a:satMod val="105000"/>
+                <a:tint val="67000"/>
+              </a:schemeClr>
+            </a:gs>
+            <a:gs pos="50000">
+              <a:schemeClr val="phClr">
+                <a:lumMod val="105000"/>
+                <a:satMod val="103000"/>
+                <a:tint val="73000"/>
+              </a:schemeClr>
+            </a:gs>
+            <a:gs pos="100000">
+              <a:schemeClr val="phClr">
+                <a:lumMod val="105000"/>
+                <a:satMod val="109000"/>
+                <a:tint val="81000"/>
+              </a:schemeClr>
+            </a:gs>
+          </a:gsLst>
+          <a:lin ang="5400000" scaled="0"/>
+        </a:gradFill>
+        <a:gradFill rotWithShape="1">
+          <a:gsLst>
+            <a:gs pos="0">
+              <a:schemeClr val="phClr">
+                <a:satMod val="103000"/>
+                <a:lumMod val="102000"/>
+                <a:tint val="94000"/>
+              </a:schemeClr>
+            </a:gs>
+            <a:gs pos="50000">
+              <a:schemeClr val="phClr">
+                <a:satMod val="110000"/>
+                <a:lumMod val="100000"/>
+                <a:shade val="100000"/>
+              </a:schemeClr>
+            </a:gs>
+            <a:gs pos="100000">
+              <a:schemeClr val="phClr">
+                <a:lumMod val="99000"/>
+                <a:satMod val="120000"/>
+                <a:shade val="78000"/>
+              </a:schemeClr>
+            </a:gs>
+          </a:gsLst>
+          <a:lin ang="5400000" scaled="0"/>
+        </a:gradFill>
+      </a:fillStyleLst>
+      <a:lnStyleLst>
+        <a:ln w="6350" cap="flat" cmpd="sng" algn="ctr">
+          <a:solidFill>
+            <a:schemeClr val="phClr"/>
+          </a:solidFill>
+          <a:prstDash val="solid"/>
+          <a:miter lim="800000"/>
+        </a:ln>
+        <a:ln w="12700" cap="flat" cmpd="sng" algn="ctr">
+          <a:solidFill>
+            <a:schemeClr val="phClr"/>
+          </a:solidFill>
+          <a:prstDash val="solid"/>
+          <a:miter lim="800000"/>
+        </a:ln>
+        <a:ln w="19050" cap="flat" cmpd="sng" algn="ctr">
+          <a:solidFill>
+            <a:schemeClr val="phClr"/>
+          </a:solidFill>
+          <a:prstDash val="solid"/>
+          <a:miter lim="800000"/>
+        </a:ln>
+      </a:lnStyleLst>
+      <a:effectStyleLst>
+        <a:effectStyle>
+          <a:effectLst/>
+        </a:effectStyle>
+        <a:effectStyle>
+          <a:effectLst/>
+        </a:effectStyle>
+        <a:effectStyle>
+          <a:effectLst>
+            <a:outerShdw blurRad="57150" dist="19050" dir="5400000" algn="ctr" rotWithShape="0">
+              <a:srgbClr val="000000">
+                <a:alpha val="63000"/>
+              </a:srgbClr>
+            </a:outerShdw>
+          </a:effectLst>
+        </a:effectStyle>
+      </a:effectStyleLst>
+      <a:bgFillStyleLst>
+        <a:solidFill>
+          <a:schemeClr val="phClr"/>
+        </a:solidFill>
+        <a:solidFill>
+          <a:schemeClr val="phClr">
+            <a:tint val="95000"/>
+            <a:satMod val="170000"/>
+          </a:schemeClr>
+        </a:solidFill>
+        <a:gradFill rotWithShape="1">
+          <a:gsLst>
+            <a:gs pos="0">
+              <a:schemeClr val="phClr">
+                <a:tint val="93000"/>
+                <a:satMod val="150000"/>
+                <a:shade val="98000"/>
+                <a:lumMod val="102000"/>
+              </a:schemeClr>
+            </a:gs>
+            <a:gs pos="50000">
+              <a:schemeClr val="phClr">
+                <a:tint val="98000"/>
+                <a:satMod val="130000"/>
+                <a:shade val="90000"/>
+                <a:lumMod val="103000"/>
+              </a:schemeClr>
+            </a:gs>
+            <a:gs pos="100000">
+              <a:schemeClr val="phClr">
+                <a:shade val="63000"/>
+                <a:satMod val="120000"/>
+              </a:schemeClr>
+            </a:gs>
+          </a:gsLst>
+          <a:lin ang="5400000" scaled="0"/>
+        </a:gradFill>
+      </a:bgFillStyleLst>
+    </a:fmtScheme>
+  </a:themeElements>
+  <a:objectDefaults/>
+  <a:extraClrSchemeLst/>
+  <a:extLst>
+    <a:ext uri="{05A4C25C-085E-4340-85A3-A5531E510DB2}">
+      <thm15:themeFamily xmlns:thm15="http://schemas.microsoft.com/office/thememl/2012/main" name="Office Theme" id="{62F939B6-93AF-4DB8-9C6B-D6C7DFDC589F}" vid="{4A3C46E8-61CC-4603-A589-7422A47A8E4A}"/>
+    </a:ext>
+  </a:extLst>
+</a:theme>
 </file>
</xml_diff>

<commit_message>
Removed single line of code
</commit_message>
<xml_diff>
--- a/src/SingleResponsibilityPrinciple/images.pptx
+++ b/src/SingleResponsibilityPrinciple/images.pptx
@@ -4220,42 +4220,6 @@
     <dgm:pt modelId="{0D6D97D4-7176-479F-99E4-9A1AA28ECD42}" type="doc">
       <dgm:prSet loTypeId="urn:microsoft.com/office/officeart/2005/8/layout/pyramid1" loCatId="pyramid" qsTypeId="urn:microsoft.com/office/officeart/2005/8/quickstyle/simple5" qsCatId="simple" csTypeId="urn:microsoft.com/office/officeart/2005/8/colors/colorful1" csCatId="colorful" phldr="1"/>
       <dgm:spPr/>
-    </dgm:pt>
-    <dgm:pt modelId="{D267FA31-9F49-4C85-A923-EDBAFC349F0B}">
-      <dgm:prSet phldrT="[Text]" custT="1"/>
-      <dgm:spPr/>
-      <dgm:t>
-        <a:bodyPr/>
-        <a:lstStyle/>
-        <a:p>
-          <a:r>
-            <a:rPr lang="en-US" sz="2000" dirty="0"/>
-            <a:t>Line of Code</a:t>
-          </a:r>
-        </a:p>
-      </dgm:t>
-    </dgm:pt>
-    <dgm:pt modelId="{3DCC7169-D419-4219-8B6C-0E2A3DB3DCDE}" type="parTrans" cxnId="{00302108-45E6-4E68-BBDA-F8F20F64C868}">
-      <dgm:prSet/>
-      <dgm:spPr/>
-      <dgm:t>
-        <a:bodyPr/>
-        <a:lstStyle/>
-        <a:p>
-          <a:endParaRPr lang="en-US"/>
-        </a:p>
-      </dgm:t>
-    </dgm:pt>
-    <dgm:pt modelId="{3308A16B-4C0F-4A6D-93A5-4B000F61351C}" type="sibTrans" cxnId="{00302108-45E6-4E68-BBDA-F8F20F64C868}">
-      <dgm:prSet/>
-      <dgm:spPr/>
-      <dgm:t>
-        <a:bodyPr/>
-        <a:lstStyle/>
-        <a:p>
-          <a:endParaRPr lang="en-US"/>
-        </a:p>
-      </dgm:t>
     </dgm:pt>
     <dgm:pt modelId="{83E1DF88-2C61-4260-A124-D209A0329B00}">
       <dgm:prSet phldrT="[Text]"/>
@@ -4447,34 +4411,12 @@
       </dgm:prSet>
       <dgm:spPr/>
     </dgm:pt>
-    <dgm:pt modelId="{92026BDA-20F7-4201-8B4A-FE688DB99AC8}" type="pres">
-      <dgm:prSet presAssocID="{D267FA31-9F49-4C85-A923-EDBAFC349F0B}" presName="Name8" presStyleCnt="0"/>
-      <dgm:spPr/>
-    </dgm:pt>
-    <dgm:pt modelId="{F1F06831-28B1-4F65-9FDB-6D7F5F1FABCE}" type="pres">
-      <dgm:prSet presAssocID="{D267FA31-9F49-4C85-A923-EDBAFC349F0B}" presName="level" presStyleLbl="node1" presStyleIdx="0" presStyleCnt="6">
-        <dgm:presLayoutVars>
-          <dgm:chMax val="1"/>
-          <dgm:bulletEnabled val="1"/>
-        </dgm:presLayoutVars>
-      </dgm:prSet>
-      <dgm:spPr/>
-    </dgm:pt>
-    <dgm:pt modelId="{3A486D65-40EC-496B-B842-1BEBD2DBDAC6}" type="pres">
-      <dgm:prSet presAssocID="{D267FA31-9F49-4C85-A923-EDBAFC349F0B}" presName="levelTx" presStyleLbl="revTx" presStyleIdx="0" presStyleCnt="0">
-        <dgm:presLayoutVars>
-          <dgm:chMax val="1"/>
-          <dgm:bulletEnabled val="1"/>
-        </dgm:presLayoutVars>
-      </dgm:prSet>
-      <dgm:spPr/>
-    </dgm:pt>
     <dgm:pt modelId="{19946BBC-B852-4C58-92E9-FCA0C75F8477}" type="pres">
       <dgm:prSet presAssocID="{83E1DF88-2C61-4260-A124-D209A0329B00}" presName="Name8" presStyleCnt="0"/>
       <dgm:spPr/>
     </dgm:pt>
     <dgm:pt modelId="{3FDA3BE9-5EE3-4E0B-9F00-391C0226385D}" type="pres">
-      <dgm:prSet presAssocID="{83E1DF88-2C61-4260-A124-D209A0329B00}" presName="level" presStyleLbl="node1" presStyleIdx="1" presStyleCnt="6">
+      <dgm:prSet presAssocID="{83E1DF88-2C61-4260-A124-D209A0329B00}" presName="level" presStyleLbl="node1" presStyleIdx="0" presStyleCnt="5">
         <dgm:presLayoutVars>
           <dgm:chMax val="1"/>
           <dgm:bulletEnabled val="1"/>
@@ -4496,7 +4438,7 @@
       <dgm:spPr/>
     </dgm:pt>
     <dgm:pt modelId="{C76393F4-EA78-4A10-BB6C-4E1743A200B5}" type="pres">
-      <dgm:prSet presAssocID="{E9C53971-026B-4A67-9D14-8CAEAD9147DC}" presName="level" presStyleLbl="node1" presStyleIdx="2" presStyleCnt="6">
+      <dgm:prSet presAssocID="{E9C53971-026B-4A67-9D14-8CAEAD9147DC}" presName="level" presStyleLbl="node1" presStyleIdx="1" presStyleCnt="5">
         <dgm:presLayoutVars>
           <dgm:chMax val="1"/>
           <dgm:bulletEnabled val="1"/>
@@ -4518,7 +4460,7 @@
       <dgm:spPr/>
     </dgm:pt>
     <dgm:pt modelId="{45987F3A-BA56-469C-9296-B9459609ED74}" type="pres">
-      <dgm:prSet presAssocID="{F5B489B6-8A56-462B-A0B5-2353E1367493}" presName="level" presStyleLbl="node1" presStyleIdx="3" presStyleCnt="6">
+      <dgm:prSet presAssocID="{F5B489B6-8A56-462B-A0B5-2353E1367493}" presName="level" presStyleLbl="node1" presStyleIdx="2" presStyleCnt="5">
         <dgm:presLayoutVars>
           <dgm:chMax val="1"/>
           <dgm:bulletEnabled val="1"/>
@@ -4540,7 +4482,7 @@
       <dgm:spPr/>
     </dgm:pt>
     <dgm:pt modelId="{44F29116-7FC2-45EF-9D6F-3F252B4A84DD}" type="pres">
-      <dgm:prSet presAssocID="{B1126918-F52F-44A7-85C0-6EE483F4BCF5}" presName="level" presStyleLbl="node1" presStyleIdx="4" presStyleCnt="6">
+      <dgm:prSet presAssocID="{B1126918-F52F-44A7-85C0-6EE483F4BCF5}" presName="level" presStyleLbl="node1" presStyleIdx="3" presStyleCnt="5">
         <dgm:presLayoutVars>
           <dgm:chMax val="1"/>
           <dgm:bulletEnabled val="1"/>
@@ -4562,7 +4504,7 @@
       <dgm:spPr/>
     </dgm:pt>
     <dgm:pt modelId="{063F4755-9190-41F6-A154-E1F86298BB3E}" type="pres">
-      <dgm:prSet presAssocID="{84A82EDE-72A6-41F9-A8B2-8A559CD91DAC}" presName="level" presStyleLbl="node1" presStyleIdx="5" presStyleCnt="6">
+      <dgm:prSet presAssocID="{84A82EDE-72A6-41F9-A8B2-8A559CD91DAC}" presName="level" presStyleLbl="node1" presStyleIdx="4" presStyleCnt="5">
         <dgm:presLayoutVars>
           <dgm:chMax val="1"/>
           <dgm:bulletEnabled val="1"/>
@@ -4582,40 +4524,34 @@
   </dgm:ptLst>
   <dgm:cxnLst>
     <dgm:cxn modelId="{71C1E105-2C5E-42A4-9594-4CF43B3C9E14}" type="presOf" srcId="{F5B489B6-8A56-462B-A0B5-2353E1367493}" destId="{45987F3A-BA56-469C-9296-B9459609ED74}" srcOrd="0" destOrd="0" presId="urn:microsoft.com/office/officeart/2005/8/layout/pyramid1"/>
-    <dgm:cxn modelId="{00302108-45E6-4E68-BBDA-F8F20F64C868}" srcId="{0D6D97D4-7176-479F-99E4-9A1AA28ECD42}" destId="{D267FA31-9F49-4C85-A923-EDBAFC349F0B}" srcOrd="0" destOrd="0" parTransId="{3DCC7169-D419-4219-8B6C-0E2A3DB3DCDE}" sibTransId="{3308A16B-4C0F-4A6D-93A5-4B000F61351C}"/>
     <dgm:cxn modelId="{F49B3916-8B57-42E5-89CC-A4D3FEF072E3}" type="presOf" srcId="{B1126918-F52F-44A7-85C0-6EE483F4BCF5}" destId="{DC6B3CF3-3F6E-447D-AE23-9C1BD01DB9E4}" srcOrd="1" destOrd="0" presId="urn:microsoft.com/office/officeart/2005/8/layout/pyramid1"/>
     <dgm:cxn modelId="{54AFE42E-1673-4D7C-831C-407B2E8DA841}" type="presOf" srcId="{B1126918-F52F-44A7-85C0-6EE483F4BCF5}" destId="{44F29116-7FC2-45EF-9D6F-3F252B4A84DD}" srcOrd="0" destOrd="0" presId="urn:microsoft.com/office/officeart/2005/8/layout/pyramid1"/>
-    <dgm:cxn modelId="{4819715D-7C88-4033-B582-BD503EDAA390}" type="presOf" srcId="{D267FA31-9F49-4C85-A923-EDBAFC349F0B}" destId="{3A486D65-40EC-496B-B842-1BEBD2DBDAC6}" srcOrd="1" destOrd="0" presId="urn:microsoft.com/office/officeart/2005/8/layout/pyramid1"/>
-    <dgm:cxn modelId="{F743A85E-3FD0-440C-9236-FA05374F502F}" srcId="{0D6D97D4-7176-479F-99E4-9A1AA28ECD42}" destId="{E9C53971-026B-4A67-9D14-8CAEAD9147DC}" srcOrd="2" destOrd="0" parTransId="{0F5C65CD-AA37-4C86-BBAB-6DB966B269BE}" sibTransId="{4746F71A-E2B9-4D91-B357-7604F6B32331}"/>
+    <dgm:cxn modelId="{F743A85E-3FD0-440C-9236-FA05374F502F}" srcId="{0D6D97D4-7176-479F-99E4-9A1AA28ECD42}" destId="{E9C53971-026B-4A67-9D14-8CAEAD9147DC}" srcOrd="1" destOrd="0" parTransId="{0F5C65CD-AA37-4C86-BBAB-6DB966B269BE}" sibTransId="{4746F71A-E2B9-4D91-B357-7604F6B32331}"/>
     <dgm:cxn modelId="{98AB4479-A020-49DD-93B6-FDE02D0CFDF8}" type="presOf" srcId="{0D6D97D4-7176-479F-99E4-9A1AA28ECD42}" destId="{09074F8B-C752-46C4-94E3-DE6B4D94CB0E}" srcOrd="0" destOrd="0" presId="urn:microsoft.com/office/officeart/2005/8/layout/pyramid1"/>
-    <dgm:cxn modelId="{D3904E59-1E78-4EDE-9381-1AE36DD5557A}" srcId="{0D6D97D4-7176-479F-99E4-9A1AA28ECD42}" destId="{84A82EDE-72A6-41F9-A8B2-8A559CD91DAC}" srcOrd="5" destOrd="0" parTransId="{9D604377-FCE7-42D5-B818-3877A5E91779}" sibTransId="{C1B39AF6-E58A-492E-95D0-E138F13EC671}"/>
+    <dgm:cxn modelId="{D3904E59-1E78-4EDE-9381-1AE36DD5557A}" srcId="{0D6D97D4-7176-479F-99E4-9A1AA28ECD42}" destId="{84A82EDE-72A6-41F9-A8B2-8A559CD91DAC}" srcOrd="4" destOrd="0" parTransId="{9D604377-FCE7-42D5-B818-3877A5E91779}" sibTransId="{C1B39AF6-E58A-492E-95D0-E138F13EC671}"/>
     <dgm:cxn modelId="{C5B2BA7F-901D-4F8C-88BD-7B1F4BEE5EA3}" type="presOf" srcId="{84A82EDE-72A6-41F9-A8B2-8A559CD91DAC}" destId="{5C8F28DC-AEA3-419A-9FCB-E40C77F52158}" srcOrd="1" destOrd="0" presId="urn:microsoft.com/office/officeart/2005/8/layout/pyramid1"/>
-    <dgm:cxn modelId="{2FAD5595-A71D-48E1-AC3A-BAA99226BF0A}" srcId="{0D6D97D4-7176-479F-99E4-9A1AA28ECD42}" destId="{83E1DF88-2C61-4260-A124-D209A0329B00}" srcOrd="1" destOrd="0" parTransId="{799389C2-3551-4B0D-AB36-B9EE2BB2ABE1}" sibTransId="{ACD2919B-DF5D-4E5C-85C9-C597841FD585}"/>
-    <dgm:cxn modelId="{FB0E5FA9-F9FC-4A77-9544-7E260A129EBE}" srcId="{0D6D97D4-7176-479F-99E4-9A1AA28ECD42}" destId="{F5B489B6-8A56-462B-A0B5-2353E1367493}" srcOrd="3" destOrd="0" parTransId="{CFA6E4CF-4AE3-4DDB-92B9-B2D634C1A52C}" sibTransId="{D1827250-61CB-4B2B-AF5A-5A14FF970ACF}"/>
+    <dgm:cxn modelId="{2FAD5595-A71D-48E1-AC3A-BAA99226BF0A}" srcId="{0D6D97D4-7176-479F-99E4-9A1AA28ECD42}" destId="{83E1DF88-2C61-4260-A124-D209A0329B00}" srcOrd="0" destOrd="0" parTransId="{799389C2-3551-4B0D-AB36-B9EE2BB2ABE1}" sibTransId="{ACD2919B-DF5D-4E5C-85C9-C597841FD585}"/>
+    <dgm:cxn modelId="{FB0E5FA9-F9FC-4A77-9544-7E260A129EBE}" srcId="{0D6D97D4-7176-479F-99E4-9A1AA28ECD42}" destId="{F5B489B6-8A56-462B-A0B5-2353E1367493}" srcOrd="2" destOrd="0" parTransId="{CFA6E4CF-4AE3-4DDB-92B9-B2D634C1A52C}" sibTransId="{D1827250-61CB-4B2B-AF5A-5A14FF970ACF}"/>
     <dgm:cxn modelId="{92666FA9-C12E-4702-BCFC-EC9759A93760}" type="presOf" srcId="{83E1DF88-2C61-4260-A124-D209A0329B00}" destId="{91C05F1F-037F-4608-8265-EF288C0F517C}" srcOrd="1" destOrd="0" presId="urn:microsoft.com/office/officeart/2005/8/layout/pyramid1"/>
-    <dgm:cxn modelId="{D64E92C7-AB94-4441-BF65-069AB38F89CE}" srcId="{0D6D97D4-7176-479F-99E4-9A1AA28ECD42}" destId="{B1126918-F52F-44A7-85C0-6EE483F4BCF5}" srcOrd="4" destOrd="0" parTransId="{CE604C33-905A-471D-A0A4-1E6A4DB4C032}" sibTransId="{C1B0AC3C-2C20-4CCE-A8F8-5726F60C5FD1}"/>
+    <dgm:cxn modelId="{D64E92C7-AB94-4441-BF65-069AB38F89CE}" srcId="{0D6D97D4-7176-479F-99E4-9A1AA28ECD42}" destId="{B1126918-F52F-44A7-85C0-6EE483F4BCF5}" srcOrd="3" destOrd="0" parTransId="{CE604C33-905A-471D-A0A4-1E6A4DB4C032}" sibTransId="{C1B0AC3C-2C20-4CCE-A8F8-5726F60C5FD1}"/>
     <dgm:cxn modelId="{5F7AD5C9-0A2A-4437-9F29-66BD9EC8D632}" type="presOf" srcId="{E9C53971-026B-4A67-9D14-8CAEAD9147DC}" destId="{C76393F4-EA78-4A10-BB6C-4E1743A200B5}" srcOrd="0" destOrd="0" presId="urn:microsoft.com/office/officeart/2005/8/layout/pyramid1"/>
     <dgm:cxn modelId="{D37ACFD5-C24E-41F1-890B-C5D1C265819F}" type="presOf" srcId="{83E1DF88-2C61-4260-A124-D209A0329B00}" destId="{3FDA3BE9-5EE3-4E0B-9F00-391C0226385D}" srcOrd="0" destOrd="0" presId="urn:microsoft.com/office/officeart/2005/8/layout/pyramid1"/>
-    <dgm:cxn modelId="{2E5278D6-81A8-4C35-87F2-7A5978D68215}" type="presOf" srcId="{D267FA31-9F49-4C85-A923-EDBAFC349F0B}" destId="{F1F06831-28B1-4F65-9FDB-6D7F5F1FABCE}" srcOrd="0" destOrd="0" presId="urn:microsoft.com/office/officeart/2005/8/layout/pyramid1"/>
     <dgm:cxn modelId="{D8CF35F7-C717-47C3-B663-752E556BC938}" type="presOf" srcId="{84A82EDE-72A6-41F9-A8B2-8A559CD91DAC}" destId="{063F4755-9190-41F6-A154-E1F86298BB3E}" srcOrd="0" destOrd="0" presId="urn:microsoft.com/office/officeart/2005/8/layout/pyramid1"/>
     <dgm:cxn modelId="{C63AD4F7-A82C-4A35-855D-064D858CBC55}" type="presOf" srcId="{E9C53971-026B-4A67-9D14-8CAEAD9147DC}" destId="{6734EB2A-D197-492F-A0E3-CB702792152D}" srcOrd="1" destOrd="0" presId="urn:microsoft.com/office/officeart/2005/8/layout/pyramid1"/>
     <dgm:cxn modelId="{1F1AC7FC-E31A-4764-8604-E8F88A49B352}" type="presOf" srcId="{F5B489B6-8A56-462B-A0B5-2353E1367493}" destId="{75F9C3F1-C2B1-4182-84D8-31E24CD74A7A}" srcOrd="1" destOrd="0" presId="urn:microsoft.com/office/officeart/2005/8/layout/pyramid1"/>
-    <dgm:cxn modelId="{EDD9591D-7855-4A84-B0FC-E8B56088A1EA}" type="presParOf" srcId="{09074F8B-C752-46C4-94E3-DE6B4D94CB0E}" destId="{92026BDA-20F7-4201-8B4A-FE688DB99AC8}" srcOrd="0" destOrd="0" presId="urn:microsoft.com/office/officeart/2005/8/layout/pyramid1"/>
-    <dgm:cxn modelId="{8D973C2E-A48B-48AB-A1C8-2218D5208919}" type="presParOf" srcId="{92026BDA-20F7-4201-8B4A-FE688DB99AC8}" destId="{F1F06831-28B1-4F65-9FDB-6D7F5F1FABCE}" srcOrd="0" destOrd="0" presId="urn:microsoft.com/office/officeart/2005/8/layout/pyramid1"/>
-    <dgm:cxn modelId="{EF68A233-D067-407C-9F97-3443EEB159FD}" type="presParOf" srcId="{92026BDA-20F7-4201-8B4A-FE688DB99AC8}" destId="{3A486D65-40EC-496B-B842-1BEBD2DBDAC6}" srcOrd="1" destOrd="0" presId="urn:microsoft.com/office/officeart/2005/8/layout/pyramid1"/>
-    <dgm:cxn modelId="{ED5D7414-42B2-4FAC-8294-E299F6EBDE27}" type="presParOf" srcId="{09074F8B-C752-46C4-94E3-DE6B4D94CB0E}" destId="{19946BBC-B852-4C58-92E9-FCA0C75F8477}" srcOrd="1" destOrd="0" presId="urn:microsoft.com/office/officeart/2005/8/layout/pyramid1"/>
+    <dgm:cxn modelId="{ED5D7414-42B2-4FAC-8294-E299F6EBDE27}" type="presParOf" srcId="{09074F8B-C752-46C4-94E3-DE6B4D94CB0E}" destId="{19946BBC-B852-4C58-92E9-FCA0C75F8477}" srcOrd="0" destOrd="0" presId="urn:microsoft.com/office/officeart/2005/8/layout/pyramid1"/>
     <dgm:cxn modelId="{843E3622-0636-4C5D-AA05-18F42DE9E94D}" type="presParOf" srcId="{19946BBC-B852-4C58-92E9-FCA0C75F8477}" destId="{3FDA3BE9-5EE3-4E0B-9F00-391C0226385D}" srcOrd="0" destOrd="0" presId="urn:microsoft.com/office/officeart/2005/8/layout/pyramid1"/>
     <dgm:cxn modelId="{2EBE5CFB-90E0-40F0-B0C3-138FF69EB7C0}" type="presParOf" srcId="{19946BBC-B852-4C58-92E9-FCA0C75F8477}" destId="{91C05F1F-037F-4608-8265-EF288C0F517C}" srcOrd="1" destOrd="0" presId="urn:microsoft.com/office/officeart/2005/8/layout/pyramid1"/>
-    <dgm:cxn modelId="{E16689F9-06DE-4005-852D-F4652907C7F6}" type="presParOf" srcId="{09074F8B-C752-46C4-94E3-DE6B4D94CB0E}" destId="{E297D768-E0E7-49AD-99CE-760D0762F635}" srcOrd="2" destOrd="0" presId="urn:microsoft.com/office/officeart/2005/8/layout/pyramid1"/>
+    <dgm:cxn modelId="{E16689F9-06DE-4005-852D-F4652907C7F6}" type="presParOf" srcId="{09074F8B-C752-46C4-94E3-DE6B4D94CB0E}" destId="{E297D768-E0E7-49AD-99CE-760D0762F635}" srcOrd="1" destOrd="0" presId="urn:microsoft.com/office/officeart/2005/8/layout/pyramid1"/>
     <dgm:cxn modelId="{7D8D3144-92D2-4F29-B6C6-08098DA463BB}" type="presParOf" srcId="{E297D768-E0E7-49AD-99CE-760D0762F635}" destId="{C76393F4-EA78-4A10-BB6C-4E1743A200B5}" srcOrd="0" destOrd="0" presId="urn:microsoft.com/office/officeart/2005/8/layout/pyramid1"/>
     <dgm:cxn modelId="{8D6C7343-CF3B-4ABB-85B2-61AF7FE798EF}" type="presParOf" srcId="{E297D768-E0E7-49AD-99CE-760D0762F635}" destId="{6734EB2A-D197-492F-A0E3-CB702792152D}" srcOrd="1" destOrd="0" presId="urn:microsoft.com/office/officeart/2005/8/layout/pyramid1"/>
-    <dgm:cxn modelId="{8459EB60-099B-4BC7-B588-275FB0B433FC}" type="presParOf" srcId="{09074F8B-C752-46C4-94E3-DE6B4D94CB0E}" destId="{F0C1A6F6-D543-4EBF-922B-A1B4571166C3}" srcOrd="3" destOrd="0" presId="urn:microsoft.com/office/officeart/2005/8/layout/pyramid1"/>
+    <dgm:cxn modelId="{8459EB60-099B-4BC7-B588-275FB0B433FC}" type="presParOf" srcId="{09074F8B-C752-46C4-94E3-DE6B4D94CB0E}" destId="{F0C1A6F6-D543-4EBF-922B-A1B4571166C3}" srcOrd="2" destOrd="0" presId="urn:microsoft.com/office/officeart/2005/8/layout/pyramid1"/>
     <dgm:cxn modelId="{718E8B16-7C4E-41D6-9A17-91EE2F2C6F57}" type="presParOf" srcId="{F0C1A6F6-D543-4EBF-922B-A1B4571166C3}" destId="{45987F3A-BA56-469C-9296-B9459609ED74}" srcOrd="0" destOrd="0" presId="urn:microsoft.com/office/officeart/2005/8/layout/pyramid1"/>
     <dgm:cxn modelId="{3FFD408D-D621-4788-81DB-E69A5158A5E9}" type="presParOf" srcId="{F0C1A6F6-D543-4EBF-922B-A1B4571166C3}" destId="{75F9C3F1-C2B1-4182-84D8-31E24CD74A7A}" srcOrd="1" destOrd="0" presId="urn:microsoft.com/office/officeart/2005/8/layout/pyramid1"/>
-    <dgm:cxn modelId="{02DC21B3-3B7D-4EA3-B411-DC5B9FF25954}" type="presParOf" srcId="{09074F8B-C752-46C4-94E3-DE6B4D94CB0E}" destId="{89B330A5-AF3B-4460-96EB-29F9A911B6F8}" srcOrd="4" destOrd="0" presId="urn:microsoft.com/office/officeart/2005/8/layout/pyramid1"/>
+    <dgm:cxn modelId="{02DC21B3-3B7D-4EA3-B411-DC5B9FF25954}" type="presParOf" srcId="{09074F8B-C752-46C4-94E3-DE6B4D94CB0E}" destId="{89B330A5-AF3B-4460-96EB-29F9A911B6F8}" srcOrd="3" destOrd="0" presId="urn:microsoft.com/office/officeart/2005/8/layout/pyramid1"/>
     <dgm:cxn modelId="{D26AD047-628A-4CCA-A1BA-DB8BFC172FF7}" type="presParOf" srcId="{89B330A5-AF3B-4460-96EB-29F9A911B6F8}" destId="{44F29116-7FC2-45EF-9D6F-3F252B4A84DD}" srcOrd="0" destOrd="0" presId="urn:microsoft.com/office/officeart/2005/8/layout/pyramid1"/>
     <dgm:cxn modelId="{35B02F0E-7186-4260-986A-7C86CF5B2111}" type="presParOf" srcId="{89B330A5-AF3B-4460-96EB-29F9A911B6F8}" destId="{DC6B3CF3-3F6E-447D-AE23-9C1BD01DB9E4}" srcOrd="1" destOrd="0" presId="urn:microsoft.com/office/officeart/2005/8/layout/pyramid1"/>
-    <dgm:cxn modelId="{C6E00FFA-0726-4744-BBB6-BB1C76872E27}" type="presParOf" srcId="{09074F8B-C752-46C4-94E3-DE6B4D94CB0E}" destId="{AEDAFD57-6918-40E4-87B8-E6C038C4724E}" srcOrd="5" destOrd="0" presId="urn:microsoft.com/office/officeart/2005/8/layout/pyramid1"/>
+    <dgm:cxn modelId="{C6E00FFA-0726-4744-BBB6-BB1C76872E27}" type="presParOf" srcId="{09074F8B-C752-46C4-94E3-DE6B4D94CB0E}" destId="{AEDAFD57-6918-40E4-87B8-E6C038C4724E}" srcOrd="4" destOrd="0" presId="urn:microsoft.com/office/officeart/2005/8/layout/pyramid1"/>
     <dgm:cxn modelId="{1E3F5D86-B4E0-4C7C-95D8-FD4185AC78B4}" type="presParOf" srcId="{AEDAFD57-6918-40E4-87B8-E6C038C4724E}" destId="{063F4755-9190-41F6-A154-E1F86298BB3E}" srcOrd="0" destOrd="0" presId="urn:microsoft.com/office/officeart/2005/8/layout/pyramid1"/>
     <dgm:cxn modelId="{646D131D-94AD-4E3E-9B9A-8CFFE8D479FE}" type="presParOf" srcId="{AEDAFD57-6918-40E4-87B8-E6C038C4724E}" destId="{5C8F28DC-AEA3-419A-9FCB-E40C77F52158}" srcOrd="1" destOrd="0" presId="urn:microsoft.com/office/officeart/2005/8/layout/pyramid1"/>
   </dgm:cxnLst>
@@ -5812,15 +5748,15 @@
       <dsp:cNvGrpSpPr/>
     </dsp:nvGrpSpPr>
     <dsp:grpSpPr/>
-    <dsp:sp modelId="{F1F06831-28B1-4F65-9FDB-6D7F5F1FABCE}">
+    <dsp:sp modelId="{3FDA3BE9-5EE3-4E0B-9F00-391C0226385D}">
       <dsp:nvSpPr>
         <dsp:cNvPr id="0" name=""/>
         <dsp:cNvSpPr/>
       </dsp:nvSpPr>
       <dsp:spPr>
         <a:xfrm>
-          <a:off x="3386666" y="0"/>
-          <a:ext cx="1354666" cy="903111"/>
+          <a:off x="3251199" y="0"/>
+          <a:ext cx="1625599" cy="1083733"/>
         </a:xfrm>
         <a:prstGeom prst="trapezoid">
           <a:avLst>
@@ -5891,12 +5827,12 @@
         </a:fontRef>
       </dsp:style>
       <dsp:txBody>
-        <a:bodyPr spcFirstLastPara="0" vert="horz" wrap="square" lIns="25400" tIns="25400" rIns="25400" bIns="25400" numCol="1" spcCol="1270" anchor="ctr" anchorCtr="0">
+        <a:bodyPr spcFirstLastPara="0" vert="horz" wrap="square" lIns="43180" tIns="43180" rIns="43180" bIns="43180" numCol="1" spcCol="1270" anchor="ctr" anchorCtr="0">
           <a:noAutofit/>
         </a:bodyPr>
         <a:lstStyle/>
         <a:p>
-          <a:pPr marL="0" lvl="0" indent="0" algn="ctr" defTabSz="889000">
+          <a:pPr marL="0" lvl="0" indent="0" algn="ctr" defTabSz="1511300">
             <a:lnSpc>
               <a:spcPct val="90000"/>
             </a:lnSpc>
@@ -5909,25 +5845,25 @@
             <a:buNone/>
           </a:pPr>
           <a:r>
-            <a:rPr lang="en-US" sz="2000" kern="1200" dirty="0"/>
-            <a:t>Line of Code</a:t>
+            <a:rPr lang="en-US" sz="3400" kern="1200" dirty="0"/>
+            <a:t>Function</a:t>
           </a:r>
         </a:p>
       </dsp:txBody>
       <dsp:txXfrm>
-        <a:off x="3386666" y="0"/>
-        <a:ext cx="1354666" cy="903111"/>
+        <a:off x="3251199" y="0"/>
+        <a:ext cx="1625599" cy="1083733"/>
       </dsp:txXfrm>
     </dsp:sp>
-    <dsp:sp modelId="{3FDA3BE9-5EE3-4E0B-9F00-391C0226385D}">
+    <dsp:sp modelId="{C76393F4-EA78-4A10-BB6C-4E1743A200B5}">
       <dsp:nvSpPr>
         <dsp:cNvPr id="0" name=""/>
         <dsp:cNvSpPr/>
       </dsp:nvSpPr>
       <dsp:spPr>
         <a:xfrm>
-          <a:off x="2709333" y="903111"/>
-          <a:ext cx="2709333" cy="903111"/>
+          <a:off x="2438400" y="1083733"/>
+          <a:ext cx="3251199" cy="1083733"/>
         </a:xfrm>
         <a:prstGeom prst="trapezoid">
           <a:avLst>
@@ -5998,12 +5934,12 @@
         </a:fontRef>
       </dsp:style>
       <dsp:txBody>
-        <a:bodyPr spcFirstLastPara="0" vert="horz" wrap="square" lIns="45720" tIns="45720" rIns="45720" bIns="45720" numCol="1" spcCol="1270" anchor="ctr" anchorCtr="0">
+        <a:bodyPr spcFirstLastPara="0" vert="horz" wrap="square" lIns="43180" tIns="43180" rIns="43180" bIns="43180" numCol="1" spcCol="1270" anchor="ctr" anchorCtr="0">
           <a:noAutofit/>
         </a:bodyPr>
         <a:lstStyle/>
         <a:p>
-          <a:pPr marL="0" lvl="0" indent="0" algn="ctr" defTabSz="1600200">
+          <a:pPr marL="0" lvl="0" indent="0" algn="ctr" defTabSz="1511300">
             <a:lnSpc>
               <a:spcPct val="90000"/>
             </a:lnSpc>
@@ -6016,25 +5952,25 @@
             <a:buNone/>
           </a:pPr>
           <a:r>
-            <a:rPr lang="en-US" sz="3600" kern="1200" dirty="0"/>
-            <a:t>Function</a:t>
+            <a:rPr lang="en-US" sz="3400" kern="1200" dirty="0"/>
+            <a:t>Class</a:t>
           </a:r>
         </a:p>
       </dsp:txBody>
       <dsp:txXfrm>
-        <a:off x="3183466" y="903111"/>
-        <a:ext cx="1761066" cy="903111"/>
+        <a:off x="3007360" y="1083733"/>
+        <a:ext cx="2113280" cy="1083733"/>
       </dsp:txXfrm>
     </dsp:sp>
-    <dsp:sp modelId="{C76393F4-EA78-4A10-BB6C-4E1743A200B5}">
+    <dsp:sp modelId="{45987F3A-BA56-469C-9296-B9459609ED74}">
       <dsp:nvSpPr>
         <dsp:cNvPr id="0" name=""/>
         <dsp:cNvSpPr/>
       </dsp:nvSpPr>
       <dsp:spPr>
         <a:xfrm>
-          <a:off x="2032000" y="1806222"/>
-          <a:ext cx="4064000" cy="903111"/>
+          <a:off x="1625600" y="2167466"/>
+          <a:ext cx="4876799" cy="1083733"/>
         </a:xfrm>
         <a:prstGeom prst="trapezoid">
           <a:avLst>
@@ -6105,12 +6041,12 @@
         </a:fontRef>
       </dsp:style>
       <dsp:txBody>
-        <a:bodyPr spcFirstLastPara="0" vert="horz" wrap="square" lIns="45720" tIns="45720" rIns="45720" bIns="45720" numCol="1" spcCol="1270" anchor="ctr" anchorCtr="0">
+        <a:bodyPr spcFirstLastPara="0" vert="horz" wrap="square" lIns="43180" tIns="43180" rIns="43180" bIns="43180" numCol="1" spcCol="1270" anchor="ctr" anchorCtr="0">
           <a:noAutofit/>
         </a:bodyPr>
         <a:lstStyle/>
         <a:p>
-          <a:pPr marL="0" lvl="0" indent="0" algn="ctr" defTabSz="1600200">
+          <a:pPr marL="0" lvl="0" indent="0" algn="ctr" defTabSz="1511300">
             <a:lnSpc>
               <a:spcPct val="90000"/>
             </a:lnSpc>
@@ -6123,25 +6059,25 @@
             <a:buNone/>
           </a:pPr>
           <a:r>
-            <a:rPr lang="en-US" sz="3600" kern="1200" dirty="0"/>
-            <a:t>Class</a:t>
+            <a:rPr lang="en-US" sz="3400" kern="1200" dirty="0"/>
+            <a:t>Module</a:t>
           </a:r>
         </a:p>
       </dsp:txBody>
       <dsp:txXfrm>
-        <a:off x="2743199" y="1806222"/>
-        <a:ext cx="2641600" cy="903111"/>
+        <a:off x="2479039" y="2167466"/>
+        <a:ext cx="3169919" cy="1083733"/>
       </dsp:txXfrm>
     </dsp:sp>
-    <dsp:sp modelId="{45987F3A-BA56-469C-9296-B9459609ED74}">
+    <dsp:sp modelId="{44F29116-7FC2-45EF-9D6F-3F252B4A84DD}">
       <dsp:nvSpPr>
         <dsp:cNvPr id="0" name=""/>
         <dsp:cNvSpPr/>
       </dsp:nvSpPr>
       <dsp:spPr>
         <a:xfrm>
-          <a:off x="1354666" y="2709333"/>
-          <a:ext cx="5418666" cy="903111"/>
+          <a:off x="812800" y="3251200"/>
+          <a:ext cx="6502399" cy="1083733"/>
         </a:xfrm>
         <a:prstGeom prst="trapezoid">
           <a:avLst>
@@ -6212,12 +6148,12 @@
         </a:fontRef>
       </dsp:style>
       <dsp:txBody>
-        <a:bodyPr spcFirstLastPara="0" vert="horz" wrap="square" lIns="45720" tIns="45720" rIns="45720" bIns="45720" numCol="1" spcCol="1270" anchor="ctr" anchorCtr="0">
+        <a:bodyPr spcFirstLastPara="0" vert="horz" wrap="square" lIns="43180" tIns="43180" rIns="43180" bIns="43180" numCol="1" spcCol="1270" anchor="ctr" anchorCtr="0">
           <a:noAutofit/>
         </a:bodyPr>
         <a:lstStyle/>
         <a:p>
-          <a:pPr marL="0" lvl="0" indent="0" algn="ctr" defTabSz="1600200">
+          <a:pPr marL="0" lvl="0" indent="0" algn="ctr" defTabSz="1511300">
             <a:lnSpc>
               <a:spcPct val="90000"/>
             </a:lnSpc>
@@ -6230,25 +6166,25 @@
             <a:buNone/>
           </a:pPr>
           <a:r>
-            <a:rPr lang="en-US" sz="3600" kern="1200" dirty="0"/>
-            <a:t>Module</a:t>
+            <a:rPr lang="en-US" sz="3400" kern="1200" dirty="0"/>
+            <a:t>System</a:t>
           </a:r>
         </a:p>
       </dsp:txBody>
       <dsp:txXfrm>
-        <a:off x="2302933" y="2709333"/>
-        <a:ext cx="3522133" cy="903111"/>
+        <a:off x="1950719" y="3251200"/>
+        <a:ext cx="4226560" cy="1083733"/>
       </dsp:txXfrm>
     </dsp:sp>
-    <dsp:sp modelId="{44F29116-7FC2-45EF-9D6F-3F252B4A84DD}">
+    <dsp:sp modelId="{063F4755-9190-41F6-A154-E1F86298BB3E}">
       <dsp:nvSpPr>
         <dsp:cNvPr id="0" name=""/>
         <dsp:cNvSpPr/>
       </dsp:nvSpPr>
       <dsp:spPr>
         <a:xfrm>
-          <a:off x="677333" y="3612444"/>
-          <a:ext cx="6773333" cy="903111"/>
+          <a:off x="0" y="4334933"/>
+          <a:ext cx="8128000" cy="1083733"/>
         </a:xfrm>
         <a:prstGeom prst="trapezoid">
           <a:avLst>
@@ -6319,12 +6255,12 @@
         </a:fontRef>
       </dsp:style>
       <dsp:txBody>
-        <a:bodyPr spcFirstLastPara="0" vert="horz" wrap="square" lIns="45720" tIns="45720" rIns="45720" bIns="45720" numCol="1" spcCol="1270" anchor="ctr" anchorCtr="0">
+        <a:bodyPr spcFirstLastPara="0" vert="horz" wrap="square" lIns="43180" tIns="43180" rIns="43180" bIns="43180" numCol="1" spcCol="1270" anchor="ctr" anchorCtr="0">
           <a:noAutofit/>
         </a:bodyPr>
         <a:lstStyle/>
         <a:p>
-          <a:pPr marL="0" lvl="0" indent="0" algn="ctr" defTabSz="1600200">
+          <a:pPr marL="0" lvl="0" indent="0" algn="ctr" defTabSz="1511300">
             <a:lnSpc>
               <a:spcPct val="90000"/>
             </a:lnSpc>
@@ -6337,121 +6273,14 @@
             <a:buNone/>
           </a:pPr>
           <a:r>
-            <a:rPr lang="en-US" sz="3600" kern="1200" dirty="0"/>
-            <a:t>System</a:t>
-          </a:r>
-        </a:p>
-      </dsp:txBody>
-      <dsp:txXfrm>
-        <a:off x="1862666" y="3612444"/>
-        <a:ext cx="4402666" cy="903111"/>
-      </dsp:txXfrm>
-    </dsp:sp>
-    <dsp:sp modelId="{063F4755-9190-41F6-A154-E1F86298BB3E}">
-      <dsp:nvSpPr>
-        <dsp:cNvPr id="0" name=""/>
-        <dsp:cNvSpPr/>
-      </dsp:nvSpPr>
-      <dsp:spPr>
-        <a:xfrm>
-          <a:off x="0" y="4515555"/>
-          <a:ext cx="8128000" cy="903111"/>
-        </a:xfrm>
-        <a:prstGeom prst="trapezoid">
-          <a:avLst>
-            <a:gd name="adj" fmla="val 75000"/>
-          </a:avLst>
-        </a:prstGeom>
-        <a:gradFill rotWithShape="0">
-          <a:gsLst>
-            <a:gs pos="0">
-              <a:schemeClr val="accent2">
-                <a:hueOff val="0"/>
-                <a:satOff val="0"/>
-                <a:lumOff val="0"/>
-                <a:alphaOff val="0"/>
-                <a:satMod val="103000"/>
-                <a:lumMod val="102000"/>
-                <a:tint val="94000"/>
-              </a:schemeClr>
-            </a:gs>
-            <a:gs pos="50000">
-              <a:schemeClr val="accent2">
-                <a:hueOff val="0"/>
-                <a:satOff val="0"/>
-                <a:lumOff val="0"/>
-                <a:alphaOff val="0"/>
-                <a:satMod val="110000"/>
-                <a:lumMod val="100000"/>
-                <a:shade val="100000"/>
-              </a:schemeClr>
-            </a:gs>
-            <a:gs pos="100000">
-              <a:schemeClr val="accent2">
-                <a:hueOff val="0"/>
-                <a:satOff val="0"/>
-                <a:lumOff val="0"/>
-                <a:alphaOff val="0"/>
-                <a:lumMod val="99000"/>
-                <a:satMod val="120000"/>
-                <a:shade val="78000"/>
-              </a:schemeClr>
-            </a:gs>
-          </a:gsLst>
-          <a:lin ang="5400000" scaled="0"/>
-        </a:gradFill>
-        <a:ln>
-          <a:noFill/>
-        </a:ln>
-        <a:effectLst>
-          <a:outerShdw blurRad="57150" dist="19050" dir="5400000" algn="ctr" rotWithShape="0">
-            <a:srgbClr val="000000">
-              <a:alpha val="63000"/>
-            </a:srgbClr>
-          </a:outerShdw>
-        </a:effectLst>
-      </dsp:spPr>
-      <dsp:style>
-        <a:lnRef idx="0">
-          <a:scrgbClr r="0" g="0" b="0"/>
-        </a:lnRef>
-        <a:fillRef idx="3">
-          <a:scrgbClr r="0" g="0" b="0"/>
-        </a:fillRef>
-        <a:effectRef idx="3">
-          <a:scrgbClr r="0" g="0" b="0"/>
-        </a:effectRef>
-        <a:fontRef idx="minor">
-          <a:schemeClr val="lt1"/>
-        </a:fontRef>
-      </dsp:style>
-      <dsp:txBody>
-        <a:bodyPr spcFirstLastPara="0" vert="horz" wrap="square" lIns="45720" tIns="45720" rIns="45720" bIns="45720" numCol="1" spcCol="1270" anchor="ctr" anchorCtr="0">
-          <a:noAutofit/>
-        </a:bodyPr>
-        <a:lstStyle/>
-        <a:p>
-          <a:pPr marL="0" lvl="0" indent="0" algn="ctr" defTabSz="1600200">
-            <a:lnSpc>
-              <a:spcPct val="90000"/>
-            </a:lnSpc>
-            <a:spcBef>
-              <a:spcPct val="0"/>
-            </a:spcBef>
-            <a:spcAft>
-              <a:spcPct val="35000"/>
-            </a:spcAft>
-            <a:buNone/>
-          </a:pPr>
-          <a:r>
-            <a:rPr lang="en-US" sz="3600" kern="1200" dirty="0"/>
+            <a:rPr lang="en-US" sz="3400" kern="1200" dirty="0"/>
             <a:t>Team</a:t>
           </a:r>
         </a:p>
       </dsp:txBody>
       <dsp:txXfrm>
-        <a:off x="1422399" y="4515555"/>
-        <a:ext cx="5283200" cy="903111"/>
+        <a:off x="1422399" y="4334933"/>
+        <a:ext cx="5283200" cy="1083733"/>
       </dsp:txXfrm>
     </dsp:sp>
   </dsp:spTree>
@@ -15853,7 +15682,7 @@
           <a:p>
             <a:fld id="{0E95A006-DE61-43E6-8AA2-3D43426B7FB8}" type="datetimeFigureOut">
               <a:rPr lang="en-US" smtClean="0"/>
-              <a:t>12/17/2018</a:t>
+              <a:t>12/18/2018</a:t>
             </a:fld>
             <a:endParaRPr lang="en-US"/>
           </a:p>
@@ -16351,7 +16180,7 @@
           <a:p>
             <a:fld id="{90D4E0A7-C40C-472C-9687-D093D3F53AEA}" type="datetimeFigureOut">
               <a:rPr lang="en-US" smtClean="0"/>
-              <a:t>12/17/2018</a:t>
+              <a:t>12/18/2018</a:t>
             </a:fld>
             <a:endParaRPr lang="en-US"/>
           </a:p>
@@ -16549,7 +16378,7 @@
           <a:p>
             <a:fld id="{90D4E0A7-C40C-472C-9687-D093D3F53AEA}" type="datetimeFigureOut">
               <a:rPr lang="en-US" smtClean="0"/>
-              <a:t>12/17/2018</a:t>
+              <a:t>12/18/2018</a:t>
             </a:fld>
             <a:endParaRPr lang="en-US"/>
           </a:p>
@@ -16757,7 +16586,7 @@
           <a:p>
             <a:fld id="{90D4E0A7-C40C-472C-9687-D093D3F53AEA}" type="datetimeFigureOut">
               <a:rPr lang="en-US" smtClean="0"/>
-              <a:t>12/17/2018</a:t>
+              <a:t>12/18/2018</a:t>
             </a:fld>
             <a:endParaRPr lang="en-US"/>
           </a:p>
@@ -16955,7 +16784,7 @@
           <a:p>
             <a:fld id="{90D4E0A7-C40C-472C-9687-D093D3F53AEA}" type="datetimeFigureOut">
               <a:rPr lang="en-US" smtClean="0"/>
-              <a:t>12/17/2018</a:t>
+              <a:t>12/18/2018</a:t>
             </a:fld>
             <a:endParaRPr lang="en-US"/>
           </a:p>
@@ -17230,7 +17059,7 @@
           <a:p>
             <a:fld id="{90D4E0A7-C40C-472C-9687-D093D3F53AEA}" type="datetimeFigureOut">
               <a:rPr lang="en-US" smtClean="0"/>
-              <a:t>12/17/2018</a:t>
+              <a:t>12/18/2018</a:t>
             </a:fld>
             <a:endParaRPr lang="en-US"/>
           </a:p>
@@ -17495,7 +17324,7 @@
           <a:p>
             <a:fld id="{90D4E0A7-C40C-472C-9687-D093D3F53AEA}" type="datetimeFigureOut">
               <a:rPr lang="en-US" smtClean="0"/>
-              <a:t>12/17/2018</a:t>
+              <a:t>12/18/2018</a:t>
             </a:fld>
             <a:endParaRPr lang="en-US"/>
           </a:p>
@@ -17907,7 +17736,7 @@
           <a:p>
             <a:fld id="{90D4E0A7-C40C-472C-9687-D093D3F53AEA}" type="datetimeFigureOut">
               <a:rPr lang="en-US" smtClean="0"/>
-              <a:t>12/17/2018</a:t>
+              <a:t>12/18/2018</a:t>
             </a:fld>
             <a:endParaRPr lang="en-US"/>
           </a:p>
@@ -18048,7 +17877,7 @@
           <a:p>
             <a:fld id="{90D4E0A7-C40C-472C-9687-D093D3F53AEA}" type="datetimeFigureOut">
               <a:rPr lang="en-US" smtClean="0"/>
-              <a:t>12/17/2018</a:t>
+              <a:t>12/18/2018</a:t>
             </a:fld>
             <a:endParaRPr lang="en-US"/>
           </a:p>
@@ -18161,7 +17990,7 @@
           <a:p>
             <a:fld id="{90D4E0A7-C40C-472C-9687-D093D3F53AEA}" type="datetimeFigureOut">
               <a:rPr lang="en-US" smtClean="0"/>
-              <a:t>12/17/2018</a:t>
+              <a:t>12/18/2018</a:t>
             </a:fld>
             <a:endParaRPr lang="en-US"/>
           </a:p>
@@ -18472,7 +18301,7 @@
           <a:p>
             <a:fld id="{90D4E0A7-C40C-472C-9687-D093D3F53AEA}" type="datetimeFigureOut">
               <a:rPr lang="en-US" smtClean="0"/>
-              <a:t>12/17/2018</a:t>
+              <a:t>12/18/2018</a:t>
             </a:fld>
             <a:endParaRPr lang="en-US"/>
           </a:p>
@@ -18760,7 +18589,7 @@
           <a:p>
             <a:fld id="{90D4E0A7-C40C-472C-9687-D093D3F53AEA}" type="datetimeFigureOut">
               <a:rPr lang="en-US" smtClean="0"/>
-              <a:t>12/17/2018</a:t>
+              <a:t>12/18/2018</a:t>
             </a:fld>
             <a:endParaRPr lang="en-US"/>
           </a:p>
@@ -19001,7 +18830,7 @@
           <a:p>
             <a:fld id="{90D4E0A7-C40C-472C-9687-D093D3F53AEA}" type="datetimeFigureOut">
               <a:rPr lang="en-US" smtClean="0"/>
-              <a:t>12/17/2018</a:t>
+              <a:t>12/18/2018</a:t>
             </a:fld>
             <a:endParaRPr lang="en-US"/>
           </a:p>
@@ -19431,7 +19260,7 @@
           <p:nvPr>
             <p:extLst>
               <p:ext uri="{D42A27DB-BD31-4B8C-83A1-F6EECF244321}">
-                <p14:modId xmlns:p14="http://schemas.microsoft.com/office/powerpoint/2010/main" val="255686492"/>
+                <p14:modId xmlns:p14="http://schemas.microsoft.com/office/powerpoint/2010/main" val="3751254611"/>
               </p:ext>
             </p:extLst>
           </p:nvPr>

</xml_diff>